<commit_message>
Created the basic page template of:  - Menu Page  - Private Area Page  - Band Search Page  - Musician Search Page
</commit_message>
<xml_diff>
--- a/Musician Finder Specification Document.pptx
+++ b/Musician Finder Specification Document.pptx
@@ -5088,7 +5088,7 @@
                   </a:outerShdw>
                 </a:effectLst>
               </a:rPr>
-              <a:t>Main Menu Screen</a:t>
+              <a:t>Menu Screen</a:t>
             </a:r>
           </a:p>
         </p:txBody>
@@ -5750,6 +5750,31 @@
                   </a:outerShdw>
                 </a:effectLst>
               </a:rPr>
+              <a:t>Band Search Screen </a:t>
+            </a:r>
+            <a:r>
+              <a:rPr lang="en-US" sz="4400" b="1" i="1" u="sng" dirty="0">
+                <a:effectLst>
+                  <a:outerShdw blurRad="38100" dist="38100" dir="2700000" algn="tl">
+                    <a:srgbClr val="000000">
+                      <a:alpha val="43137"/>
+                    </a:srgbClr>
+                  </a:outerShdw>
+                </a:effectLst>
+                <a:sym typeface="Wingdings" panose="05000000000000000000" pitchFamily="2" charset="2"/>
+              </a:rPr>
+              <a:t> </a:t>
+            </a:r>
+            <a:r>
+              <a:rPr lang="en-US" sz="4400" b="1" i="1" u="sng" dirty="0">
+                <a:effectLst>
+                  <a:outerShdw blurRad="38100" dist="38100" dir="2700000" algn="tl">
+                    <a:srgbClr val="000000">
+                      <a:alpha val="43137"/>
+                    </a:srgbClr>
+                  </a:outerShdw>
+                </a:effectLst>
+              </a:rPr>
               <a:t>Find a Band</a:t>
             </a:r>
             <a:endParaRPr lang="en-US" b="1" i="1" u="sng" dirty="0">
@@ -5778,8 +5803,8 @@
         </p:nvSpPr>
         <p:spPr>
           <a:xfrm>
-            <a:off x="4591050" y="1285875"/>
-            <a:ext cx="3009900" cy="5372100"/>
+            <a:off x="4580878" y="1690687"/>
+            <a:ext cx="3020072" cy="4967287"/>
           </a:xfrm>
           <a:prstGeom prst="rect">
             <a:avLst/>
@@ -6011,6 +6036,31 @@
                   </a:outerShdw>
                 </a:effectLst>
               </a:rPr>
+              <a:t>Musician Search Screen </a:t>
+            </a:r>
+            <a:r>
+              <a:rPr lang="en-US" sz="4400" b="1" i="1" u="sng" dirty="0">
+                <a:effectLst>
+                  <a:outerShdw blurRad="38100" dist="38100" dir="2700000" algn="tl">
+                    <a:srgbClr val="000000">
+                      <a:alpha val="43137"/>
+                    </a:srgbClr>
+                  </a:outerShdw>
+                </a:effectLst>
+                <a:sym typeface="Wingdings" panose="05000000000000000000" pitchFamily="2" charset="2"/>
+              </a:rPr>
+              <a:t> </a:t>
+            </a:r>
+            <a:r>
+              <a:rPr lang="en-US" sz="4400" b="1" i="1" u="sng" dirty="0">
+                <a:effectLst>
+                  <a:outerShdw blurRad="38100" dist="38100" dir="2700000" algn="tl">
+                    <a:srgbClr val="000000">
+                      <a:alpha val="43137"/>
+                    </a:srgbClr>
+                  </a:outerShdw>
+                </a:effectLst>
+              </a:rPr>
               <a:t>Find a Musician</a:t>
             </a:r>
             <a:endParaRPr lang="en-US" b="1" i="1" u="sng" dirty="0">
@@ -6039,8 +6089,8 @@
         </p:nvSpPr>
         <p:spPr>
           <a:xfrm>
-            <a:off x="4591050" y="1285875"/>
-            <a:ext cx="3009900" cy="5372100"/>
+            <a:off x="4607510" y="1690687"/>
+            <a:ext cx="2993439" cy="4967287"/>
           </a:xfrm>
           <a:prstGeom prst="rect">
             <a:avLst/>

</xml_diff>

<commit_message>
Register page and Powerpoint slide edit
</commit_message>
<xml_diff>
--- a/Musician Finder Specification Document.pptx
+++ b/Musician Finder Specification Document.pptx
@@ -269,7 +269,7 @@
           <a:p>
             <a:fld id="{60236AC0-9DFC-4CD7-B90F-666E0616086E}" type="datetimeFigureOut">
               <a:rPr lang="en-US" smtClean="0"/>
-              <a:t>9/23/2020</a:t>
+              <a:t>9/24/2020</a:t>
             </a:fld>
             <a:endParaRPr lang="en-US"/>
           </a:p>
@@ -467,7 +467,7 @@
           <a:p>
             <a:fld id="{60236AC0-9DFC-4CD7-B90F-666E0616086E}" type="datetimeFigureOut">
               <a:rPr lang="en-US" smtClean="0"/>
-              <a:t>9/23/2020</a:t>
+              <a:t>9/24/2020</a:t>
             </a:fld>
             <a:endParaRPr lang="en-US"/>
           </a:p>
@@ -675,7 +675,7 @@
           <a:p>
             <a:fld id="{60236AC0-9DFC-4CD7-B90F-666E0616086E}" type="datetimeFigureOut">
               <a:rPr lang="en-US" smtClean="0"/>
-              <a:t>9/23/2020</a:t>
+              <a:t>9/24/2020</a:t>
             </a:fld>
             <a:endParaRPr lang="en-US"/>
           </a:p>
@@ -873,7 +873,7 @@
           <a:p>
             <a:fld id="{60236AC0-9DFC-4CD7-B90F-666E0616086E}" type="datetimeFigureOut">
               <a:rPr lang="en-US" smtClean="0"/>
-              <a:t>9/23/2020</a:t>
+              <a:t>9/24/2020</a:t>
             </a:fld>
             <a:endParaRPr lang="en-US"/>
           </a:p>
@@ -1148,7 +1148,7 @@
           <a:p>
             <a:fld id="{60236AC0-9DFC-4CD7-B90F-666E0616086E}" type="datetimeFigureOut">
               <a:rPr lang="en-US" smtClean="0"/>
-              <a:t>9/23/2020</a:t>
+              <a:t>9/24/2020</a:t>
             </a:fld>
             <a:endParaRPr lang="en-US"/>
           </a:p>
@@ -1413,7 +1413,7 @@
           <a:p>
             <a:fld id="{60236AC0-9DFC-4CD7-B90F-666E0616086E}" type="datetimeFigureOut">
               <a:rPr lang="en-US" smtClean="0"/>
-              <a:t>9/23/2020</a:t>
+              <a:t>9/24/2020</a:t>
             </a:fld>
             <a:endParaRPr lang="en-US"/>
           </a:p>
@@ -1825,7 +1825,7 @@
           <a:p>
             <a:fld id="{60236AC0-9DFC-4CD7-B90F-666E0616086E}" type="datetimeFigureOut">
               <a:rPr lang="en-US" smtClean="0"/>
-              <a:t>9/23/2020</a:t>
+              <a:t>9/24/2020</a:t>
             </a:fld>
             <a:endParaRPr lang="en-US"/>
           </a:p>
@@ -1966,7 +1966,7 @@
           <a:p>
             <a:fld id="{60236AC0-9DFC-4CD7-B90F-666E0616086E}" type="datetimeFigureOut">
               <a:rPr lang="en-US" smtClean="0"/>
-              <a:t>9/23/2020</a:t>
+              <a:t>9/24/2020</a:t>
             </a:fld>
             <a:endParaRPr lang="en-US"/>
           </a:p>
@@ -2079,7 +2079,7 @@
           <a:p>
             <a:fld id="{60236AC0-9DFC-4CD7-B90F-666E0616086E}" type="datetimeFigureOut">
               <a:rPr lang="en-US" smtClean="0"/>
-              <a:t>9/23/2020</a:t>
+              <a:t>9/24/2020</a:t>
             </a:fld>
             <a:endParaRPr lang="en-US"/>
           </a:p>
@@ -2390,7 +2390,7 @@
           <a:p>
             <a:fld id="{60236AC0-9DFC-4CD7-B90F-666E0616086E}" type="datetimeFigureOut">
               <a:rPr lang="en-US" smtClean="0"/>
-              <a:t>9/23/2020</a:t>
+              <a:t>9/24/2020</a:t>
             </a:fld>
             <a:endParaRPr lang="en-US"/>
           </a:p>
@@ -2678,7 +2678,7 @@
           <a:p>
             <a:fld id="{60236AC0-9DFC-4CD7-B90F-666E0616086E}" type="datetimeFigureOut">
               <a:rPr lang="en-US" smtClean="0"/>
-              <a:t>9/23/2020</a:t>
+              <a:t>9/24/2020</a:t>
             </a:fld>
             <a:endParaRPr lang="en-US"/>
           </a:p>
@@ -2919,7 +2919,7 @@
           <a:p>
             <a:fld id="{60236AC0-9DFC-4CD7-B90F-666E0616086E}" type="datetimeFigureOut">
               <a:rPr lang="en-US" smtClean="0"/>
-              <a:t>9/23/2020</a:t>
+              <a:t>9/24/2020</a:t>
             </a:fld>
             <a:endParaRPr lang="en-US"/>
           </a:p>
@@ -4059,7 +4059,7 @@
                 </a:solidFill>
                 <a:sym typeface="Wingdings" panose="05000000000000000000" pitchFamily="2" charset="2"/>
               </a:rPr>
-              <a:t>Required</a:t>
+              <a:t>Mandatory</a:t>
             </a:r>
           </a:p>
           <a:p>
@@ -6417,8 +6417,8 @@
         </p:nvSpPr>
         <p:spPr>
           <a:xfrm>
-            <a:off x="5333954" y="5480556"/>
-            <a:ext cx="1217073" cy="646331"/>
+            <a:off x="5306974" y="5480556"/>
+            <a:ext cx="1271032" cy="646331"/>
           </a:xfrm>
           <a:prstGeom prst="rect">
             <a:avLst/>
@@ -6456,7 +6456,7 @@
                 </a:solidFill>
                 <a:sym typeface="Wingdings" panose="05000000000000000000" pitchFamily="2" charset="2"/>
               </a:rPr>
-              <a:t>Required</a:t>
+              <a:t>Mandatory</a:t>
             </a:r>
           </a:p>
           <a:p>

</xml_diff>

<commit_message>
Summary last commits:  - Added configuration file (do not touch it yet without talking to Lidor)  - Edited the powerpoint slide  - Started building the Register layout page  - Added gradient background to all pages
</commit_message>
<xml_diff>
--- a/Musician Finder Specification Document.pptx
+++ b/Musician Finder Specification Document.pptx
@@ -6589,6 +6589,106 @@
           </a:p>
         </p:txBody>
       </p:sp>
+      <p:sp>
+        <p:nvSpPr>
+          <p:cNvPr id="8" name="Rectangle 7">
+            <a:extLst>
+              <a:ext uri="{FF2B5EF4-FFF2-40B4-BE49-F238E27FC236}">
+                <a16:creationId xmlns:a16="http://schemas.microsoft.com/office/drawing/2014/main" id="{1874B8AE-B1D1-4B09-A9DD-4F998F034EF7}"/>
+              </a:ext>
+            </a:extLst>
+          </p:cNvPr>
+          <p:cNvSpPr/>
+          <p:nvPr/>
+        </p:nvSpPr>
+        <p:spPr>
+          <a:xfrm>
+            <a:off x="5306974" y="2573484"/>
+            <a:ext cx="1271032" cy="692496"/>
+          </a:xfrm>
+          <a:prstGeom prst="rect">
+            <a:avLst/>
+          </a:prstGeom>
+          <a:noFill/>
+          <a:ln w="50800"/>
+        </p:spPr>
+        <p:style>
+          <a:lnRef idx="2">
+            <a:schemeClr val="accent1">
+              <a:shade val="50000"/>
+            </a:schemeClr>
+          </a:lnRef>
+          <a:fillRef idx="1">
+            <a:schemeClr val="accent1"/>
+          </a:fillRef>
+          <a:effectRef idx="0">
+            <a:schemeClr val="accent1"/>
+          </a:effectRef>
+          <a:fontRef idx="minor">
+            <a:schemeClr val="lt1"/>
+          </a:fontRef>
+        </p:style>
+        <p:txBody>
+          <a:bodyPr rtlCol="0" anchor="ctr"/>
+          <a:lstStyle/>
+          <a:p>
+            <a:pPr algn="ctr"/>
+            <a:r>
+              <a:rPr lang="en-US" sz="1400" dirty="0">
+                <a:solidFill>
+                  <a:schemeClr val="tx1"/>
+                </a:solidFill>
+              </a:rPr>
+              <a:t>Connect To Google Map</a:t>
+            </a:r>
+          </a:p>
+        </p:txBody>
+      </p:sp>
+      <p:cxnSp>
+        <p:nvCxnSpPr>
+          <p:cNvPr id="10" name="Connector: Elbow 9">
+            <a:extLst>
+              <a:ext uri="{FF2B5EF4-FFF2-40B4-BE49-F238E27FC236}">
+                <a16:creationId xmlns:a16="http://schemas.microsoft.com/office/drawing/2014/main" id="{8251FDED-925A-4291-8276-C51E9E6F68E1}"/>
+              </a:ext>
+            </a:extLst>
+          </p:cNvPr>
+          <p:cNvCxnSpPr>
+            <a:stCxn id="13" idx="3"/>
+            <a:endCxn id="8" idx="1"/>
+          </p:cNvCxnSpPr>
+          <p:nvPr/>
+        </p:nvCxnSpPr>
+        <p:spPr>
+          <a:xfrm flipV="1">
+            <a:off x="4078550" y="2919732"/>
+            <a:ext cx="1228424" cy="620170"/>
+          </a:xfrm>
+          <a:prstGeom prst="bentConnector3">
+            <a:avLst/>
+          </a:prstGeom>
+          <a:ln w="38100">
+            <a:solidFill>
+              <a:schemeClr val="accent2"/>
+            </a:solidFill>
+            <a:tailEnd type="triangle"/>
+          </a:ln>
+        </p:spPr>
+        <p:style>
+          <a:lnRef idx="1">
+            <a:schemeClr val="accent1"/>
+          </a:lnRef>
+          <a:fillRef idx="0">
+            <a:schemeClr val="accent1"/>
+          </a:fillRef>
+          <a:effectRef idx="0">
+            <a:schemeClr val="accent1"/>
+          </a:effectRef>
+          <a:fontRef idx="minor">
+            <a:schemeClr val="tx1"/>
+          </a:fontRef>
+        </p:style>
+      </p:cxnSp>
     </p:spTree>
     <p:extLst>
       <p:ext uri="{BB962C8B-B14F-4D97-AF65-F5344CB8AC3E}">

</xml_diff>

<commit_message>
Activity Area Building - Still Building + CSV file for it
</commit_message>
<xml_diff>
--- a/Musician Finder Specification Document.pptx
+++ b/Musician Finder Specification Document.pptx
@@ -269,7 +269,7 @@
           <a:p>
             <a:fld id="{60236AC0-9DFC-4CD7-B90F-666E0616086E}" type="datetimeFigureOut">
               <a:rPr lang="en-US" smtClean="0"/>
-              <a:t>9/25/2020</a:t>
+              <a:t>9/26/2020</a:t>
             </a:fld>
             <a:endParaRPr lang="en-US"/>
           </a:p>
@@ -467,7 +467,7 @@
           <a:p>
             <a:fld id="{60236AC0-9DFC-4CD7-B90F-666E0616086E}" type="datetimeFigureOut">
               <a:rPr lang="en-US" smtClean="0"/>
-              <a:t>9/25/2020</a:t>
+              <a:t>9/26/2020</a:t>
             </a:fld>
             <a:endParaRPr lang="en-US"/>
           </a:p>
@@ -675,7 +675,7 @@
           <a:p>
             <a:fld id="{60236AC0-9DFC-4CD7-B90F-666E0616086E}" type="datetimeFigureOut">
               <a:rPr lang="en-US" smtClean="0"/>
-              <a:t>9/25/2020</a:t>
+              <a:t>9/26/2020</a:t>
             </a:fld>
             <a:endParaRPr lang="en-US"/>
           </a:p>
@@ -873,7 +873,7 @@
           <a:p>
             <a:fld id="{60236AC0-9DFC-4CD7-B90F-666E0616086E}" type="datetimeFigureOut">
               <a:rPr lang="en-US" smtClean="0"/>
-              <a:t>9/25/2020</a:t>
+              <a:t>9/26/2020</a:t>
             </a:fld>
             <a:endParaRPr lang="en-US"/>
           </a:p>
@@ -1148,7 +1148,7 @@
           <a:p>
             <a:fld id="{60236AC0-9DFC-4CD7-B90F-666E0616086E}" type="datetimeFigureOut">
               <a:rPr lang="en-US" smtClean="0"/>
-              <a:t>9/25/2020</a:t>
+              <a:t>9/26/2020</a:t>
             </a:fld>
             <a:endParaRPr lang="en-US"/>
           </a:p>
@@ -1413,7 +1413,7 @@
           <a:p>
             <a:fld id="{60236AC0-9DFC-4CD7-B90F-666E0616086E}" type="datetimeFigureOut">
               <a:rPr lang="en-US" smtClean="0"/>
-              <a:t>9/25/2020</a:t>
+              <a:t>9/26/2020</a:t>
             </a:fld>
             <a:endParaRPr lang="en-US"/>
           </a:p>
@@ -1825,7 +1825,7 @@
           <a:p>
             <a:fld id="{60236AC0-9DFC-4CD7-B90F-666E0616086E}" type="datetimeFigureOut">
               <a:rPr lang="en-US" smtClean="0"/>
-              <a:t>9/25/2020</a:t>
+              <a:t>9/26/2020</a:t>
             </a:fld>
             <a:endParaRPr lang="en-US"/>
           </a:p>
@@ -1966,7 +1966,7 @@
           <a:p>
             <a:fld id="{60236AC0-9DFC-4CD7-B90F-666E0616086E}" type="datetimeFigureOut">
               <a:rPr lang="en-US" smtClean="0"/>
-              <a:t>9/25/2020</a:t>
+              <a:t>9/26/2020</a:t>
             </a:fld>
             <a:endParaRPr lang="en-US"/>
           </a:p>
@@ -2079,7 +2079,7 @@
           <a:p>
             <a:fld id="{60236AC0-9DFC-4CD7-B90F-666E0616086E}" type="datetimeFigureOut">
               <a:rPr lang="en-US" smtClean="0"/>
-              <a:t>9/25/2020</a:t>
+              <a:t>9/26/2020</a:t>
             </a:fld>
             <a:endParaRPr lang="en-US"/>
           </a:p>
@@ -2390,7 +2390,7 @@
           <a:p>
             <a:fld id="{60236AC0-9DFC-4CD7-B90F-666E0616086E}" type="datetimeFigureOut">
               <a:rPr lang="en-US" smtClean="0"/>
-              <a:t>9/25/2020</a:t>
+              <a:t>9/26/2020</a:t>
             </a:fld>
             <a:endParaRPr lang="en-US"/>
           </a:p>
@@ -2678,7 +2678,7 @@
           <a:p>
             <a:fld id="{60236AC0-9DFC-4CD7-B90F-666E0616086E}" type="datetimeFigureOut">
               <a:rPr lang="en-US" smtClean="0"/>
-              <a:t>9/25/2020</a:t>
+              <a:t>9/26/2020</a:t>
             </a:fld>
             <a:endParaRPr lang="en-US"/>
           </a:p>
@@ -2919,7 +2919,7 @@
           <a:p>
             <a:fld id="{60236AC0-9DFC-4CD7-B90F-666E0616086E}" type="datetimeFigureOut">
               <a:rPr lang="en-US" smtClean="0"/>
-              <a:t>9/25/2020</a:t>
+              <a:t>9/26/2020</a:t>
             </a:fld>
             <a:endParaRPr lang="en-US"/>
           </a:p>
@@ -6622,7 +6622,7 @@
         <p:spPr>
           <a:xfrm>
             <a:off x="5306974" y="2573484"/>
-            <a:ext cx="1271032" cy="692496"/>
+            <a:ext cx="1271032" cy="827918"/>
           </a:xfrm>
           <a:prstGeom prst="rect">
             <a:avLst/>
@@ -6657,7 +6657,7 @@
                   <a:schemeClr val="tx1"/>
                 </a:solidFill>
               </a:rPr>
-              <a:t>Connect To Google Map</a:t>
+              <a:t>Implemented Using JSON via Dropdown</a:t>
             </a:r>
           </a:p>
         </p:txBody>
@@ -6672,6 +6672,7 @@
             </a:extLst>
           </p:cNvPr>
           <p:cNvCxnSpPr>
+            <a:cxnSpLocks/>
             <a:stCxn id="13" idx="3"/>
             <a:endCxn id="8" idx="1"/>
           </p:cNvCxnSpPr>
@@ -6679,8 +6680,8 @@
         </p:nvCxnSpPr>
         <p:spPr>
           <a:xfrm flipV="1">
-            <a:off x="4078550" y="2919732"/>
-            <a:ext cx="1228424" cy="620170"/>
+            <a:off x="4078550" y="2987443"/>
+            <a:ext cx="1228424" cy="552459"/>
           </a:xfrm>
           <a:prstGeom prst="bentConnector3">
             <a:avLst/>

</xml_diff>

<commit_message>
Activity Area Building + CSV file for it
 - Still Building!!!!!!

 + PP slide - type data of all
</commit_message>
<xml_diff>
--- a/Musician Finder Specification Document.pptx
+++ b/Musician Finder Specification Document.pptx
@@ -269,7 +269,7 @@
           <a:p>
             <a:fld id="{60236AC0-9DFC-4CD7-B90F-666E0616086E}" type="datetimeFigureOut">
               <a:rPr lang="en-US" smtClean="0"/>
-              <a:t>9/26/2020</a:t>
+              <a:t>9/27/2020</a:t>
             </a:fld>
             <a:endParaRPr lang="en-US"/>
           </a:p>
@@ -467,7 +467,7 @@
           <a:p>
             <a:fld id="{60236AC0-9DFC-4CD7-B90F-666E0616086E}" type="datetimeFigureOut">
               <a:rPr lang="en-US" smtClean="0"/>
-              <a:t>9/26/2020</a:t>
+              <a:t>9/27/2020</a:t>
             </a:fld>
             <a:endParaRPr lang="en-US"/>
           </a:p>
@@ -675,7 +675,7 @@
           <a:p>
             <a:fld id="{60236AC0-9DFC-4CD7-B90F-666E0616086E}" type="datetimeFigureOut">
               <a:rPr lang="en-US" smtClean="0"/>
-              <a:t>9/26/2020</a:t>
+              <a:t>9/27/2020</a:t>
             </a:fld>
             <a:endParaRPr lang="en-US"/>
           </a:p>
@@ -873,7 +873,7 @@
           <a:p>
             <a:fld id="{60236AC0-9DFC-4CD7-B90F-666E0616086E}" type="datetimeFigureOut">
               <a:rPr lang="en-US" smtClean="0"/>
-              <a:t>9/26/2020</a:t>
+              <a:t>9/27/2020</a:t>
             </a:fld>
             <a:endParaRPr lang="en-US"/>
           </a:p>
@@ -1148,7 +1148,7 @@
           <a:p>
             <a:fld id="{60236AC0-9DFC-4CD7-B90F-666E0616086E}" type="datetimeFigureOut">
               <a:rPr lang="en-US" smtClean="0"/>
-              <a:t>9/26/2020</a:t>
+              <a:t>9/27/2020</a:t>
             </a:fld>
             <a:endParaRPr lang="en-US"/>
           </a:p>
@@ -1413,7 +1413,7 @@
           <a:p>
             <a:fld id="{60236AC0-9DFC-4CD7-B90F-666E0616086E}" type="datetimeFigureOut">
               <a:rPr lang="en-US" smtClean="0"/>
-              <a:t>9/26/2020</a:t>
+              <a:t>9/27/2020</a:t>
             </a:fld>
             <a:endParaRPr lang="en-US"/>
           </a:p>
@@ -1825,7 +1825,7 @@
           <a:p>
             <a:fld id="{60236AC0-9DFC-4CD7-B90F-666E0616086E}" type="datetimeFigureOut">
               <a:rPr lang="en-US" smtClean="0"/>
-              <a:t>9/26/2020</a:t>
+              <a:t>9/27/2020</a:t>
             </a:fld>
             <a:endParaRPr lang="en-US"/>
           </a:p>
@@ -1966,7 +1966,7 @@
           <a:p>
             <a:fld id="{60236AC0-9DFC-4CD7-B90F-666E0616086E}" type="datetimeFigureOut">
               <a:rPr lang="en-US" smtClean="0"/>
-              <a:t>9/26/2020</a:t>
+              <a:t>9/27/2020</a:t>
             </a:fld>
             <a:endParaRPr lang="en-US"/>
           </a:p>
@@ -2079,7 +2079,7 @@
           <a:p>
             <a:fld id="{60236AC0-9DFC-4CD7-B90F-666E0616086E}" type="datetimeFigureOut">
               <a:rPr lang="en-US" smtClean="0"/>
-              <a:t>9/26/2020</a:t>
+              <a:t>9/27/2020</a:t>
             </a:fld>
             <a:endParaRPr lang="en-US"/>
           </a:p>
@@ -2390,7 +2390,7 @@
           <a:p>
             <a:fld id="{60236AC0-9DFC-4CD7-B90F-666E0616086E}" type="datetimeFigureOut">
               <a:rPr lang="en-US" smtClean="0"/>
-              <a:t>9/26/2020</a:t>
+              <a:t>9/27/2020</a:t>
             </a:fld>
             <a:endParaRPr lang="en-US"/>
           </a:p>
@@ -2678,7 +2678,7 @@
           <a:p>
             <a:fld id="{60236AC0-9DFC-4CD7-B90F-666E0616086E}" type="datetimeFigureOut">
               <a:rPr lang="en-US" smtClean="0"/>
-              <a:t>9/26/2020</a:t>
+              <a:t>9/27/2020</a:t>
             </a:fld>
             <a:endParaRPr lang="en-US"/>
           </a:p>
@@ -2919,7 +2919,7 @@
           <a:p>
             <a:fld id="{60236AC0-9DFC-4CD7-B90F-666E0616086E}" type="datetimeFigureOut">
               <a:rPr lang="en-US" smtClean="0"/>
-              <a:t>9/26/2020</a:t>
+              <a:t>9/27/2020</a:t>
             </a:fld>
             <a:endParaRPr lang="en-US"/>
           </a:p>
@@ -6621,8 +6621,8 @@
         </p:nvSpPr>
         <p:spPr>
           <a:xfrm>
-            <a:off x="5306974" y="2573484"/>
-            <a:ext cx="1271032" cy="827918"/>
+            <a:off x="5306974" y="2317072"/>
+            <a:ext cx="1271032" cy="1111927"/>
           </a:xfrm>
           <a:prstGeom prst="rect">
             <a:avLst/>
@@ -6657,7 +6657,35 @@
                   <a:schemeClr val="tx1"/>
                 </a:solidFill>
               </a:rPr>
-              <a:t>Implemented Using JSON via Dropdown</a:t>
+              <a:t>Implemented Using </a:t>
+            </a:r>
+          </a:p>
+          <a:p>
+            <a:pPr algn="ctr"/>
+            <a:r>
+              <a:rPr lang="en-US" sz="1400" dirty="0">
+                <a:solidFill>
+                  <a:schemeClr val="tx1"/>
+                </a:solidFill>
+              </a:rPr>
+              <a:t>JSON </a:t>
+            </a:r>
+            <a:r>
+              <a:rPr lang="en-US" sz="1400" dirty="0">
+                <a:solidFill>
+                  <a:schemeClr val="tx1"/>
+                </a:solidFill>
+                <a:sym typeface="Wingdings" panose="05000000000000000000" pitchFamily="2" charset="2"/>
+              </a:rPr>
+              <a:t> CSV</a:t>
+            </a:r>
+            <a:r>
+              <a:rPr lang="en-US" sz="1400" dirty="0">
+                <a:solidFill>
+                  <a:schemeClr val="tx1"/>
+                </a:solidFill>
+              </a:rPr>
+              <a:t> via Dropdown</a:t>
             </a:r>
           </a:p>
         </p:txBody>
@@ -6680,8 +6708,8 @@
         </p:nvCxnSpPr>
         <p:spPr>
           <a:xfrm flipV="1">
-            <a:off x="4078550" y="2987443"/>
-            <a:ext cx="1228424" cy="552459"/>
+            <a:off x="4078550" y="2873036"/>
+            <a:ext cx="1228424" cy="666866"/>
           </a:xfrm>
           <a:prstGeom prst="bentConnector3">
             <a:avLst/>
@@ -9093,6 +9121,24 @@
               <a:rPr lang="en-US" dirty="0"/>
               <a:t>Area</a:t>
             </a:r>
+            <a:r>
+              <a:rPr lang="en-US" sz="1200" dirty="0">
+                <a:solidFill>
+                  <a:schemeClr val="tx1">
+                    <a:lumMod val="50000"/>
+                    <a:lumOff val="50000"/>
+                  </a:schemeClr>
+                </a:solidFill>
+                <a:effectLst>
+                  <a:outerShdw blurRad="38100" dist="38100" dir="2700000" algn="tl">
+                    <a:srgbClr val="000000">
+                      <a:alpha val="43137"/>
+                    </a:srgbClr>
+                  </a:outerShdw>
+                </a:effectLst>
+              </a:rPr>
+              <a:t>(String)</a:t>
+            </a:r>
           </a:p>
         </p:txBody>
       </p:sp>
@@ -9111,7 +9157,7 @@
         <p:spPr>
           <a:xfrm>
             <a:off x="838200" y="4652486"/>
-            <a:ext cx="1952626" cy="369332"/>
+            <a:ext cx="1952626" cy="553998"/>
           </a:xfrm>
           <a:prstGeom prst="rect">
             <a:avLst/>
@@ -9134,6 +9180,43 @@
               <a:rPr lang="en-US" dirty="0"/>
               <a:t>My Instrument</a:t>
             </a:r>
+            <a:r>
+              <a:rPr lang="en-US" sz="1800" dirty="0">
+                <a:solidFill>
+                  <a:schemeClr val="tx1">
+                    <a:lumMod val="50000"/>
+                    <a:lumOff val="50000"/>
+                  </a:schemeClr>
+                </a:solidFill>
+                <a:effectLst>
+                  <a:outerShdw blurRad="38100" dist="38100" dir="2700000" algn="tl">
+                    <a:srgbClr val="000000">
+                      <a:alpha val="43137"/>
+                    </a:srgbClr>
+                  </a:outerShdw>
+                </a:effectLst>
+              </a:rPr>
+              <a:t> </a:t>
+            </a:r>
+            <a:r>
+              <a:rPr lang="en-US" sz="1200" dirty="0">
+                <a:solidFill>
+                  <a:schemeClr val="tx1">
+                    <a:lumMod val="50000"/>
+                    <a:lumOff val="50000"/>
+                  </a:schemeClr>
+                </a:solidFill>
+                <a:effectLst>
+                  <a:outerShdw blurRad="38100" dist="38100" dir="2700000" algn="tl">
+                    <a:srgbClr val="000000">
+                      <a:alpha val="43137"/>
+                    </a:srgbClr>
+                  </a:outerShdw>
+                </a:effectLst>
+              </a:rPr>
+              <a:t>(String)</a:t>
+            </a:r>
+            <a:endParaRPr lang="en-US" sz="1200" dirty="0"/>
           </a:p>
         </p:txBody>
       </p:sp>
@@ -9175,6 +9258,43 @@
               <a:rPr lang="en-US" dirty="0"/>
               <a:t>Band Name</a:t>
             </a:r>
+            <a:r>
+              <a:rPr lang="en-US" sz="1800" dirty="0">
+                <a:solidFill>
+                  <a:schemeClr val="tx1">
+                    <a:lumMod val="50000"/>
+                    <a:lumOff val="50000"/>
+                  </a:schemeClr>
+                </a:solidFill>
+                <a:effectLst>
+                  <a:outerShdw blurRad="38100" dist="38100" dir="2700000" algn="tl">
+                    <a:srgbClr val="000000">
+                      <a:alpha val="43137"/>
+                    </a:srgbClr>
+                  </a:outerShdw>
+                </a:effectLst>
+              </a:rPr>
+              <a:t> </a:t>
+            </a:r>
+            <a:r>
+              <a:rPr lang="en-US" sz="1200" dirty="0">
+                <a:solidFill>
+                  <a:schemeClr val="tx1">
+                    <a:lumMod val="50000"/>
+                    <a:lumOff val="50000"/>
+                  </a:schemeClr>
+                </a:solidFill>
+                <a:effectLst>
+                  <a:outerShdw blurRad="38100" dist="38100" dir="2700000" algn="tl">
+                    <a:srgbClr val="000000">
+                      <a:alpha val="43137"/>
+                    </a:srgbClr>
+                  </a:outerShdw>
+                </a:effectLst>
+              </a:rPr>
+              <a:t>(String)</a:t>
+            </a:r>
+            <a:endParaRPr lang="en-US" sz="1200" dirty="0"/>
           </a:p>
         </p:txBody>
       </p:sp>
@@ -9216,6 +9336,43 @@
               <a:rPr lang="en-US" dirty="0"/>
               <a:t>Area</a:t>
             </a:r>
+            <a:r>
+              <a:rPr lang="en-US" sz="1800" dirty="0">
+                <a:solidFill>
+                  <a:schemeClr val="tx1">
+                    <a:lumMod val="50000"/>
+                    <a:lumOff val="50000"/>
+                  </a:schemeClr>
+                </a:solidFill>
+                <a:effectLst>
+                  <a:outerShdw blurRad="38100" dist="38100" dir="2700000" algn="tl">
+                    <a:srgbClr val="000000">
+                      <a:alpha val="43137"/>
+                    </a:srgbClr>
+                  </a:outerShdw>
+                </a:effectLst>
+              </a:rPr>
+              <a:t> </a:t>
+            </a:r>
+            <a:r>
+              <a:rPr lang="en-US" sz="1200" dirty="0">
+                <a:solidFill>
+                  <a:schemeClr val="tx1">
+                    <a:lumMod val="50000"/>
+                    <a:lumOff val="50000"/>
+                  </a:schemeClr>
+                </a:solidFill>
+                <a:effectLst>
+                  <a:outerShdw blurRad="38100" dist="38100" dir="2700000" algn="tl">
+                    <a:srgbClr val="000000">
+                      <a:alpha val="43137"/>
+                    </a:srgbClr>
+                  </a:outerShdw>
+                </a:effectLst>
+              </a:rPr>
+              <a:t>(String)</a:t>
+            </a:r>
+            <a:endParaRPr lang="en-US" sz="1200" dirty="0"/>
           </a:p>
         </p:txBody>
       </p:sp>
@@ -9295,10 +9452,46 @@
           <a:p>
             <a:pPr algn="ctr"/>
             <a:r>
-              <a:rPr lang="en-US"/>
+              <a:rPr lang="en-US" dirty="0"/>
               <a:t>Genre</a:t>
             </a:r>
-            <a:endParaRPr lang="en-US" dirty="0"/>
+            <a:r>
+              <a:rPr lang="en-US" sz="1800" dirty="0">
+                <a:solidFill>
+                  <a:schemeClr val="tx1">
+                    <a:lumMod val="50000"/>
+                    <a:lumOff val="50000"/>
+                  </a:schemeClr>
+                </a:solidFill>
+                <a:effectLst>
+                  <a:outerShdw blurRad="38100" dist="38100" dir="2700000" algn="tl">
+                    <a:srgbClr val="000000">
+                      <a:alpha val="43137"/>
+                    </a:srgbClr>
+                  </a:outerShdw>
+                </a:effectLst>
+              </a:rPr>
+              <a:t> </a:t>
+            </a:r>
+            <a:r>
+              <a:rPr lang="en-US" sz="1200" dirty="0">
+                <a:solidFill>
+                  <a:schemeClr val="tx1">
+                    <a:lumMod val="50000"/>
+                    <a:lumOff val="50000"/>
+                  </a:schemeClr>
+                </a:solidFill>
+                <a:effectLst>
+                  <a:outerShdw blurRad="38100" dist="38100" dir="2700000" algn="tl">
+                    <a:srgbClr val="000000">
+                      <a:alpha val="43137"/>
+                    </a:srgbClr>
+                  </a:outerShdw>
+                </a:effectLst>
+              </a:rPr>
+              <a:t>(String)</a:t>
+            </a:r>
+            <a:endParaRPr lang="en-US" sz="1200" dirty="0"/>
           </a:p>
         </p:txBody>
       </p:sp>
@@ -9487,8 +9680,8 @@
         </p:nvCxnSpPr>
         <p:spPr>
           <a:xfrm rot="5400000">
-            <a:off x="2282013" y="3252013"/>
-            <a:ext cx="2093953" cy="1076325"/>
+            <a:off x="2235846" y="3298180"/>
+            <a:ext cx="2186286" cy="1076325"/>
           </a:xfrm>
           <a:prstGeom prst="bentConnector2">
             <a:avLst/>

</xml_diff>

<commit_message>
Slide and Activity area complete
</commit_message>
<xml_diff>
--- a/Musician Finder Specification Document.pptx
+++ b/Musician Finder Specification Document.pptx
@@ -6621,7 +6621,7 @@
         </p:nvSpPr>
         <p:spPr>
           <a:xfrm>
-            <a:off x="5306974" y="2317072"/>
+            <a:off x="5315504" y="2574311"/>
             <a:ext cx="1271032" cy="1111927"/>
           </a:xfrm>
           <a:prstGeom prst="rect">
@@ -6708,11 +6708,114 @@
         </p:nvCxnSpPr>
         <p:spPr>
           <a:xfrm flipV="1">
-            <a:off x="4078550" y="2873036"/>
-            <a:ext cx="1228424" cy="666866"/>
+            <a:off x="4078550" y="3130275"/>
+            <a:ext cx="1236954" cy="409627"/>
           </a:xfrm>
           <a:prstGeom prst="bentConnector3">
             <a:avLst/>
+          </a:prstGeom>
+          <a:ln w="38100">
+            <a:solidFill>
+              <a:schemeClr val="accent2"/>
+            </a:solidFill>
+            <a:tailEnd type="triangle"/>
+          </a:ln>
+        </p:spPr>
+        <p:style>
+          <a:lnRef idx="1">
+            <a:schemeClr val="accent1"/>
+          </a:lnRef>
+          <a:fillRef idx="0">
+            <a:schemeClr val="accent1"/>
+          </a:fillRef>
+          <a:effectRef idx="0">
+            <a:schemeClr val="accent1"/>
+          </a:effectRef>
+          <a:fontRef idx="minor">
+            <a:schemeClr val="tx1"/>
+          </a:fontRef>
+        </p:style>
+      </p:cxnSp>
+      <p:sp>
+        <p:nvSpPr>
+          <p:cNvPr id="25" name="Rectangle 24">
+            <a:extLst>
+              <a:ext uri="{FF2B5EF4-FFF2-40B4-BE49-F238E27FC236}">
+                <a16:creationId xmlns:a16="http://schemas.microsoft.com/office/drawing/2014/main" id="{1B4AE86E-128E-4FBA-990F-BF82BFEB45D1}"/>
+              </a:ext>
+            </a:extLst>
+          </p:cNvPr>
+          <p:cNvSpPr/>
+          <p:nvPr/>
+        </p:nvSpPr>
+        <p:spPr>
+          <a:xfrm>
+            <a:off x="5906043" y="1425819"/>
+            <a:ext cx="1120807" cy="761850"/>
+          </a:xfrm>
+          <a:prstGeom prst="rect">
+            <a:avLst/>
+          </a:prstGeom>
+          <a:noFill/>
+          <a:ln w="50800"/>
+        </p:spPr>
+        <p:style>
+          <a:lnRef idx="2">
+            <a:schemeClr val="accent1">
+              <a:shade val="50000"/>
+            </a:schemeClr>
+          </a:lnRef>
+          <a:fillRef idx="1">
+            <a:schemeClr val="accent1"/>
+          </a:fillRef>
+          <a:effectRef idx="0">
+            <a:schemeClr val="accent1"/>
+          </a:effectRef>
+          <a:fontRef idx="minor">
+            <a:schemeClr val="lt1"/>
+          </a:fontRef>
+        </p:style>
+        <p:txBody>
+          <a:bodyPr rtlCol="0" anchor="ctr"/>
+          <a:lstStyle/>
+          <a:p>
+            <a:pPr algn="ctr"/>
+            <a:r>
+              <a:rPr lang="en-US" sz="1400" dirty="0">
+                <a:solidFill>
+                  <a:schemeClr val="tx1"/>
+                </a:solidFill>
+              </a:rPr>
+              <a:t>Currently Limited To Israel Cities</a:t>
+            </a:r>
+          </a:p>
+        </p:txBody>
+      </p:sp>
+      <p:cxnSp>
+        <p:nvCxnSpPr>
+          <p:cNvPr id="27" name="Connector: Elbow 26">
+            <a:extLst>
+              <a:ext uri="{FF2B5EF4-FFF2-40B4-BE49-F238E27FC236}">
+                <a16:creationId xmlns:a16="http://schemas.microsoft.com/office/drawing/2014/main" id="{F0FE453A-C0BC-40E3-A260-69D538E9ECF8}"/>
+              </a:ext>
+            </a:extLst>
+          </p:cNvPr>
+          <p:cNvCxnSpPr>
+            <a:stCxn id="8" idx="0"/>
+            <a:endCxn id="25" idx="1"/>
+          </p:cNvCxnSpPr>
+          <p:nvPr/>
+        </p:nvCxnSpPr>
+        <p:spPr>
+          <a:xfrm rot="16200000" flipV="1">
+            <a:off x="5544749" y="2168039"/>
+            <a:ext cx="767567" cy="44977"/>
+          </a:xfrm>
+          <a:prstGeom prst="bentConnector4">
+            <a:avLst>
+              <a:gd name="adj1" fmla="val 25186"/>
+              <a:gd name="adj2" fmla="val 1921240"/>
+            </a:avLst>
           </a:prstGeom>
           <a:ln w="38100">
             <a:solidFill>

</xml_diff>

<commit_message>
Added chat area for the PP slide
</commit_message>
<xml_diff>
--- a/Musician Finder Specification Document.pptx
+++ b/Musician Finder Specification Document.pptx
@@ -16,6 +16,7 @@
     <p:sldId id="265" r:id="rId10"/>
     <p:sldId id="263" r:id="rId11"/>
     <p:sldId id="264" r:id="rId12"/>
+    <p:sldId id="267" r:id="rId13"/>
   </p:sldIdLst>
   <p:sldSz cx="12192000" cy="6858000"/>
   <p:notesSz cx="6858000" cy="9144000"/>
@@ -269,7 +270,7 @@
           <a:p>
             <a:fld id="{60236AC0-9DFC-4CD7-B90F-666E0616086E}" type="datetimeFigureOut">
               <a:rPr lang="en-US" smtClean="0"/>
-              <a:t>9/27/2020</a:t>
+              <a:t>9/29/2020</a:t>
             </a:fld>
             <a:endParaRPr lang="en-US"/>
           </a:p>
@@ -467,7 +468,7 @@
           <a:p>
             <a:fld id="{60236AC0-9DFC-4CD7-B90F-666E0616086E}" type="datetimeFigureOut">
               <a:rPr lang="en-US" smtClean="0"/>
-              <a:t>9/27/2020</a:t>
+              <a:t>9/29/2020</a:t>
             </a:fld>
             <a:endParaRPr lang="en-US"/>
           </a:p>
@@ -675,7 +676,7 @@
           <a:p>
             <a:fld id="{60236AC0-9DFC-4CD7-B90F-666E0616086E}" type="datetimeFigureOut">
               <a:rPr lang="en-US" smtClean="0"/>
-              <a:t>9/27/2020</a:t>
+              <a:t>9/29/2020</a:t>
             </a:fld>
             <a:endParaRPr lang="en-US"/>
           </a:p>
@@ -873,7 +874,7 @@
           <a:p>
             <a:fld id="{60236AC0-9DFC-4CD7-B90F-666E0616086E}" type="datetimeFigureOut">
               <a:rPr lang="en-US" smtClean="0"/>
-              <a:t>9/27/2020</a:t>
+              <a:t>9/29/2020</a:t>
             </a:fld>
             <a:endParaRPr lang="en-US"/>
           </a:p>
@@ -1148,7 +1149,7 @@
           <a:p>
             <a:fld id="{60236AC0-9DFC-4CD7-B90F-666E0616086E}" type="datetimeFigureOut">
               <a:rPr lang="en-US" smtClean="0"/>
-              <a:t>9/27/2020</a:t>
+              <a:t>9/29/2020</a:t>
             </a:fld>
             <a:endParaRPr lang="en-US"/>
           </a:p>
@@ -1413,7 +1414,7 @@
           <a:p>
             <a:fld id="{60236AC0-9DFC-4CD7-B90F-666E0616086E}" type="datetimeFigureOut">
               <a:rPr lang="en-US" smtClean="0"/>
-              <a:t>9/27/2020</a:t>
+              <a:t>9/29/2020</a:t>
             </a:fld>
             <a:endParaRPr lang="en-US"/>
           </a:p>
@@ -1825,7 +1826,7 @@
           <a:p>
             <a:fld id="{60236AC0-9DFC-4CD7-B90F-666E0616086E}" type="datetimeFigureOut">
               <a:rPr lang="en-US" smtClean="0"/>
-              <a:t>9/27/2020</a:t>
+              <a:t>9/29/2020</a:t>
             </a:fld>
             <a:endParaRPr lang="en-US"/>
           </a:p>
@@ -1966,7 +1967,7 @@
           <a:p>
             <a:fld id="{60236AC0-9DFC-4CD7-B90F-666E0616086E}" type="datetimeFigureOut">
               <a:rPr lang="en-US" smtClean="0"/>
-              <a:t>9/27/2020</a:t>
+              <a:t>9/29/2020</a:t>
             </a:fld>
             <a:endParaRPr lang="en-US"/>
           </a:p>
@@ -2079,7 +2080,7 @@
           <a:p>
             <a:fld id="{60236AC0-9DFC-4CD7-B90F-666E0616086E}" type="datetimeFigureOut">
               <a:rPr lang="en-US" smtClean="0"/>
-              <a:t>9/27/2020</a:t>
+              <a:t>9/29/2020</a:t>
             </a:fld>
             <a:endParaRPr lang="en-US"/>
           </a:p>
@@ -2390,7 +2391,7 @@
           <a:p>
             <a:fld id="{60236AC0-9DFC-4CD7-B90F-666E0616086E}" type="datetimeFigureOut">
               <a:rPr lang="en-US" smtClean="0"/>
-              <a:t>9/27/2020</a:t>
+              <a:t>9/29/2020</a:t>
             </a:fld>
             <a:endParaRPr lang="en-US"/>
           </a:p>
@@ -2678,7 +2679,7 @@
           <a:p>
             <a:fld id="{60236AC0-9DFC-4CD7-B90F-666E0616086E}" type="datetimeFigureOut">
               <a:rPr lang="en-US" smtClean="0"/>
-              <a:t>9/27/2020</a:t>
+              <a:t>9/29/2020</a:t>
             </a:fld>
             <a:endParaRPr lang="en-US"/>
           </a:p>
@@ -2919,7 +2920,7 @@
           <a:p>
             <a:fld id="{60236AC0-9DFC-4CD7-B90F-666E0616086E}" type="datetimeFigureOut">
               <a:rPr lang="en-US" smtClean="0"/>
-              <a:t>9/27/2020</a:t>
+              <a:t>9/29/2020</a:t>
             </a:fld>
             <a:endParaRPr lang="en-US"/>
           </a:p>
@@ -5197,6 +5198,458 @@
 </p:sld>
 </file>
 
+<file path=ppt/slides/slide12.xml><?xml version="1.0" encoding="utf-8"?>
+<p:sld xmlns:a="http://schemas.openxmlformats.org/drawingml/2006/main" xmlns:r="http://schemas.openxmlformats.org/officeDocument/2006/relationships" xmlns:p="http://schemas.openxmlformats.org/presentationml/2006/main">
+  <p:cSld>
+    <p:spTree>
+      <p:nvGrpSpPr>
+        <p:cNvPr id="1" name=""/>
+        <p:cNvGrpSpPr/>
+        <p:nvPr/>
+      </p:nvGrpSpPr>
+      <p:grpSpPr>
+        <a:xfrm>
+          <a:off x="0" y="0"/>
+          <a:ext cx="0" cy="0"/>
+          <a:chOff x="0" y="0"/>
+          <a:chExt cx="0" cy="0"/>
+        </a:xfrm>
+      </p:grpSpPr>
+      <p:sp>
+        <p:nvSpPr>
+          <p:cNvPr id="2" name="Title 1">
+            <a:extLst>
+              <a:ext uri="{FF2B5EF4-FFF2-40B4-BE49-F238E27FC236}">
+                <a16:creationId xmlns:a16="http://schemas.microsoft.com/office/drawing/2014/main" id="{898184F1-7FCE-45D6-9341-1F5570B63BDD}"/>
+              </a:ext>
+            </a:extLst>
+          </p:cNvPr>
+          <p:cNvSpPr>
+            <a:spLocks noGrp="1"/>
+          </p:cNvSpPr>
+          <p:nvPr>
+            <p:ph type="title"/>
+          </p:nvPr>
+        </p:nvSpPr>
+        <p:spPr/>
+        <p:txBody>
+          <a:bodyPr/>
+          <a:lstStyle/>
+          <a:p>
+            <a:r>
+              <a:rPr lang="en-US" dirty="0"/>
+              <a:t>Chat Area</a:t>
+            </a:r>
+          </a:p>
+        </p:txBody>
+      </p:sp>
+      <p:sp>
+        <p:nvSpPr>
+          <p:cNvPr id="4" name="TextBox 3">
+            <a:extLst>
+              <a:ext uri="{FF2B5EF4-FFF2-40B4-BE49-F238E27FC236}">
+                <a16:creationId xmlns:a16="http://schemas.microsoft.com/office/drawing/2014/main" id="{59F6C74D-92C0-47BC-8CD7-3900E4C809D8}"/>
+              </a:ext>
+            </a:extLst>
+          </p:cNvPr>
+          <p:cNvSpPr txBox="1"/>
+          <p:nvPr/>
+        </p:nvSpPr>
+        <p:spPr>
+          <a:xfrm>
+            <a:off x="4110361" y="1331650"/>
+            <a:ext cx="3453414" cy="5362113"/>
+          </a:xfrm>
+          <a:prstGeom prst="rect">
+            <a:avLst/>
+          </a:prstGeom>
+          <a:noFill/>
+          <a:ln w="38100">
+            <a:solidFill>
+              <a:schemeClr val="tx1"/>
+            </a:solidFill>
+          </a:ln>
+        </p:spPr>
+        <p:txBody>
+          <a:bodyPr wrap="square" rtlCol="0">
+            <a:spAutoFit/>
+          </a:bodyPr>
+          <a:lstStyle/>
+          <a:p>
+            <a:endParaRPr lang="en-US" dirty="0"/>
+          </a:p>
+        </p:txBody>
+      </p:sp>
+      <p:sp>
+        <p:nvSpPr>
+          <p:cNvPr id="5" name="Rectangle 4">
+            <a:extLst>
+              <a:ext uri="{FF2B5EF4-FFF2-40B4-BE49-F238E27FC236}">
+                <a16:creationId xmlns:a16="http://schemas.microsoft.com/office/drawing/2014/main" id="{48034934-DCE1-4B47-AAED-D6E943722F05}"/>
+              </a:ext>
+            </a:extLst>
+          </p:cNvPr>
+          <p:cNvSpPr/>
+          <p:nvPr/>
+        </p:nvSpPr>
+        <p:spPr>
+          <a:xfrm>
+            <a:off x="4333875" y="1533526"/>
+            <a:ext cx="2990850" cy="3771900"/>
+          </a:xfrm>
+          <a:prstGeom prst="rect">
+            <a:avLst/>
+          </a:prstGeom>
+          <a:noFill/>
+          <a:ln w="50800"/>
+        </p:spPr>
+        <p:style>
+          <a:lnRef idx="2">
+            <a:schemeClr val="accent1">
+              <a:shade val="50000"/>
+            </a:schemeClr>
+          </a:lnRef>
+          <a:fillRef idx="1">
+            <a:schemeClr val="accent1"/>
+          </a:fillRef>
+          <a:effectRef idx="0">
+            <a:schemeClr val="accent1"/>
+          </a:effectRef>
+          <a:fontRef idx="minor">
+            <a:schemeClr val="lt1"/>
+          </a:fontRef>
+        </p:style>
+        <p:txBody>
+          <a:bodyPr rtlCol="0" anchor="ctr"/>
+          <a:lstStyle/>
+          <a:p>
+            <a:r>
+              <a:rPr lang="en-US" dirty="0" err="1">
+                <a:solidFill>
+                  <a:schemeClr val="tx1"/>
+                </a:solidFill>
+              </a:rPr>
+              <a:t>Sgfdgsdgd</a:t>
+            </a:r>
+            <a:endParaRPr lang="en-US" dirty="0">
+              <a:solidFill>
+                <a:schemeClr val="tx1"/>
+              </a:solidFill>
+            </a:endParaRPr>
+          </a:p>
+          <a:p>
+            <a:endParaRPr lang="en-US" dirty="0">
+              <a:solidFill>
+                <a:schemeClr val="tx1"/>
+              </a:solidFill>
+            </a:endParaRPr>
+          </a:p>
+          <a:p>
+            <a:pPr algn="r"/>
+            <a:r>
+              <a:rPr lang="en-US" dirty="0" err="1">
+                <a:solidFill>
+                  <a:schemeClr val="tx1"/>
+                </a:solidFill>
+              </a:rPr>
+              <a:t>Sdfgsdfgdsgds</a:t>
+            </a:r>
+            <a:endParaRPr lang="en-US" dirty="0">
+              <a:solidFill>
+                <a:schemeClr val="tx1"/>
+              </a:solidFill>
+            </a:endParaRPr>
+          </a:p>
+          <a:p>
+            <a:endParaRPr lang="en-US" dirty="0">
+              <a:solidFill>
+                <a:schemeClr val="tx1"/>
+              </a:solidFill>
+            </a:endParaRPr>
+          </a:p>
+          <a:p>
+            <a:r>
+              <a:rPr lang="en-US" dirty="0" err="1">
+                <a:solidFill>
+                  <a:schemeClr val="tx1"/>
+                </a:solidFill>
+              </a:rPr>
+              <a:t>Uytiyuiyi</a:t>
+            </a:r>
+            <a:endParaRPr lang="en-US" dirty="0">
+              <a:solidFill>
+                <a:schemeClr val="tx1"/>
+              </a:solidFill>
+            </a:endParaRPr>
+          </a:p>
+          <a:p>
+            <a:endParaRPr lang="en-US" dirty="0">
+              <a:solidFill>
+                <a:schemeClr val="tx1"/>
+              </a:solidFill>
+            </a:endParaRPr>
+          </a:p>
+          <a:p>
+            <a:pPr algn="r"/>
+            <a:r>
+              <a:rPr lang="en-US" dirty="0" err="1">
+                <a:solidFill>
+                  <a:schemeClr val="tx1"/>
+                </a:solidFill>
+              </a:rPr>
+              <a:t>Nmhjk,jh,hj</a:t>
+            </a:r>
+            <a:r>
+              <a:rPr lang="en-US" dirty="0">
+                <a:solidFill>
+                  <a:schemeClr val="tx1"/>
+                </a:solidFill>
+              </a:rPr>
+              <a:t>,</a:t>
+            </a:r>
+          </a:p>
+          <a:p>
+            <a:pPr algn="r"/>
+            <a:endParaRPr lang="en-US" dirty="0">
+              <a:solidFill>
+                <a:schemeClr val="tx1"/>
+              </a:solidFill>
+            </a:endParaRPr>
+          </a:p>
+          <a:p>
+            <a:pPr algn="r"/>
+            <a:r>
+              <a:rPr lang="en-US" dirty="0" err="1">
+                <a:solidFill>
+                  <a:schemeClr val="tx1"/>
+                </a:solidFill>
+              </a:rPr>
+              <a:t>Fgdfghdfgdhd</a:t>
+            </a:r>
+            <a:endParaRPr lang="en-US" dirty="0">
+              <a:solidFill>
+                <a:schemeClr val="tx1"/>
+              </a:solidFill>
+            </a:endParaRPr>
+          </a:p>
+          <a:p>
+            <a:pPr algn="r"/>
+            <a:endParaRPr lang="en-US" dirty="0">
+              <a:solidFill>
+                <a:schemeClr val="tx1"/>
+              </a:solidFill>
+            </a:endParaRPr>
+          </a:p>
+          <a:p>
+            <a:r>
+              <a:rPr lang="en-US" dirty="0">
+                <a:solidFill>
+                  <a:schemeClr val="tx1"/>
+                </a:solidFill>
+              </a:rPr>
+              <a:t>fdgdfg76686786</a:t>
+            </a:r>
+          </a:p>
+        </p:txBody>
+      </p:sp>
+      <p:sp>
+        <p:nvSpPr>
+          <p:cNvPr id="6" name="Rectangle 5">
+            <a:extLst>
+              <a:ext uri="{FF2B5EF4-FFF2-40B4-BE49-F238E27FC236}">
+                <a16:creationId xmlns:a16="http://schemas.microsoft.com/office/drawing/2014/main" id="{9B3988EB-0059-490C-A480-33E333D07784}"/>
+              </a:ext>
+            </a:extLst>
+          </p:cNvPr>
+          <p:cNvSpPr/>
+          <p:nvPr/>
+        </p:nvSpPr>
+        <p:spPr>
+          <a:xfrm>
+            <a:off x="4333875" y="5526350"/>
+            <a:ext cx="2990850" cy="966525"/>
+          </a:xfrm>
+          <a:prstGeom prst="rect">
+            <a:avLst/>
+          </a:prstGeom>
+          <a:noFill/>
+          <a:ln w="50800"/>
+        </p:spPr>
+        <p:style>
+          <a:lnRef idx="2">
+            <a:schemeClr val="accent1">
+              <a:shade val="50000"/>
+            </a:schemeClr>
+          </a:lnRef>
+          <a:fillRef idx="1">
+            <a:schemeClr val="accent1"/>
+          </a:fillRef>
+          <a:effectRef idx="0">
+            <a:schemeClr val="accent1"/>
+          </a:effectRef>
+          <a:fontRef idx="minor">
+            <a:schemeClr val="lt1"/>
+          </a:fontRef>
+        </p:style>
+        <p:txBody>
+          <a:bodyPr rtlCol="0" anchor="ctr"/>
+          <a:lstStyle/>
+          <a:p>
+            <a:pPr algn="ctr"/>
+            <a:endParaRPr lang="en-US"/>
+          </a:p>
+        </p:txBody>
+      </p:sp>
+      <p:sp>
+        <p:nvSpPr>
+          <p:cNvPr id="7" name="Rectangle 6">
+            <a:extLst>
+              <a:ext uri="{FF2B5EF4-FFF2-40B4-BE49-F238E27FC236}">
+                <a16:creationId xmlns:a16="http://schemas.microsoft.com/office/drawing/2014/main" id="{47C7D643-C2C5-4455-B9E7-B7BF3C184110}"/>
+              </a:ext>
+            </a:extLst>
+          </p:cNvPr>
+          <p:cNvSpPr/>
+          <p:nvPr/>
+        </p:nvSpPr>
+        <p:spPr>
+          <a:xfrm>
+            <a:off x="4467225" y="5676900"/>
+            <a:ext cx="2085975" cy="657225"/>
+          </a:xfrm>
+          <a:prstGeom prst="rect">
+            <a:avLst/>
+          </a:prstGeom>
+          <a:solidFill>
+            <a:schemeClr val="accent2"/>
+          </a:solidFill>
+          <a:ln w="38100">
+            <a:solidFill>
+              <a:srgbClr val="FF0000"/>
+            </a:solidFill>
+          </a:ln>
+        </p:spPr>
+        <p:style>
+          <a:lnRef idx="2">
+            <a:schemeClr val="accent1">
+              <a:shade val="50000"/>
+            </a:schemeClr>
+          </a:lnRef>
+          <a:fillRef idx="1">
+            <a:schemeClr val="accent1"/>
+          </a:fillRef>
+          <a:effectRef idx="0">
+            <a:schemeClr val="accent1"/>
+          </a:effectRef>
+          <a:fontRef idx="minor">
+            <a:schemeClr val="lt1"/>
+          </a:fontRef>
+        </p:style>
+        <p:txBody>
+          <a:bodyPr rtlCol="0" anchor="ctr"/>
+          <a:lstStyle/>
+          <a:p>
+            <a:pPr algn="ctr"/>
+            <a:endParaRPr lang="en-US"/>
+          </a:p>
+        </p:txBody>
+      </p:sp>
+      <p:sp>
+        <p:nvSpPr>
+          <p:cNvPr id="8" name="Oval 7">
+            <a:extLst>
+              <a:ext uri="{FF2B5EF4-FFF2-40B4-BE49-F238E27FC236}">
+                <a16:creationId xmlns:a16="http://schemas.microsoft.com/office/drawing/2014/main" id="{3753DEEE-01BC-49CE-B3C3-E9D673A207AB}"/>
+              </a:ext>
+            </a:extLst>
+          </p:cNvPr>
+          <p:cNvSpPr/>
+          <p:nvPr/>
+        </p:nvSpPr>
+        <p:spPr>
+          <a:xfrm>
+            <a:off x="6619875" y="5676901"/>
+            <a:ext cx="628649" cy="595050"/>
+          </a:xfrm>
+          <a:prstGeom prst="ellipse">
+            <a:avLst/>
+          </a:prstGeom>
+          <a:solidFill>
+            <a:schemeClr val="bg2">
+              <a:lumMod val="90000"/>
+            </a:schemeClr>
+          </a:solidFill>
+          <a:ln w="25400">
+            <a:solidFill>
+              <a:schemeClr val="tx1"/>
+            </a:solidFill>
+          </a:ln>
+        </p:spPr>
+        <p:style>
+          <a:lnRef idx="2">
+            <a:schemeClr val="accent1">
+              <a:shade val="50000"/>
+            </a:schemeClr>
+          </a:lnRef>
+          <a:fillRef idx="1">
+            <a:schemeClr val="accent1"/>
+          </a:fillRef>
+          <a:effectRef idx="0">
+            <a:schemeClr val="accent1"/>
+          </a:effectRef>
+          <a:fontRef idx="minor">
+            <a:schemeClr val="lt1"/>
+          </a:fontRef>
+        </p:style>
+        <p:txBody>
+          <a:bodyPr rtlCol="0" anchor="ctr"/>
+          <a:lstStyle/>
+          <a:p>
+            <a:pPr algn="ctr"/>
+            <a:r>
+              <a:rPr lang="en-US" sz="2800" b="1" dirty="0">
+                <a:solidFill>
+                  <a:schemeClr val="tx1"/>
+                </a:solidFill>
+                <a:effectLst>
+                  <a:outerShdw blurRad="38100" dist="38100" dir="2700000" algn="tl">
+                    <a:srgbClr val="000000">
+                      <a:alpha val="43137"/>
+                    </a:srgbClr>
+                  </a:outerShdw>
+                </a:effectLst>
+                <a:sym typeface="Wingdings 3" panose="05040102010807070707" pitchFamily="18" charset="2"/>
+              </a:rPr>
+              <a:t></a:t>
+            </a:r>
+            <a:endParaRPr lang="en-US" sz="2800" b="1" dirty="0">
+              <a:solidFill>
+                <a:schemeClr val="tx1"/>
+              </a:solidFill>
+              <a:effectLst>
+                <a:outerShdw blurRad="38100" dist="38100" dir="2700000" algn="tl">
+                  <a:srgbClr val="000000">
+                    <a:alpha val="43137"/>
+                  </a:srgbClr>
+                </a:outerShdw>
+              </a:effectLst>
+            </a:endParaRPr>
+          </a:p>
+        </p:txBody>
+      </p:sp>
+    </p:spTree>
+    <p:extLst>
+      <p:ext uri="{BB962C8B-B14F-4D97-AF65-F5344CB8AC3E}">
+        <p14:creationId xmlns:p14="http://schemas.microsoft.com/office/powerpoint/2010/main" val="1919413370"/>
+      </p:ext>
+    </p:extLst>
+  </p:cSld>
+  <p:clrMapOvr>
+    <a:masterClrMapping/>
+  </p:clrMapOvr>
+</p:sld>
+</file>
+
 <file path=ppt/slides/slide2.xml><?xml version="1.0" encoding="utf-8"?>
 <p:sld xmlns:a="http://schemas.openxmlformats.org/drawingml/2006/main" xmlns:r="http://schemas.openxmlformats.org/officeDocument/2006/relationships" xmlns:p="http://schemas.openxmlformats.org/presentationml/2006/main">
   <p:cSld>

</xml_diff>

<commit_message>
Finished everything related to the Instruments
</commit_message>
<xml_diff>
--- a/Musician Finder Specification Document.pptx
+++ b/Musician Finder Specification Document.pptx
@@ -3554,7 +3554,7 @@
             <p:ph idx="1"/>
             <p:extLst>
               <p:ext uri="{D42A27DB-BD31-4B8C-83A1-F6EECF244321}">
-                <p14:modId xmlns:p14="http://schemas.microsoft.com/office/powerpoint/2010/main" val="3004667234"/>
+                <p14:modId xmlns:p14="http://schemas.microsoft.com/office/powerpoint/2010/main" val="1876297956"/>
               </p:ext>
             </p:extLst>
           </p:nvPr>
@@ -3866,7 +3866,19 @@
                       </a:pPr>
                       <a:r>
                         <a:rPr lang="en-US" dirty="0"/>
-                        <a:t>Activity Area</a:t>
+                        <a:t>User </a:t>
+                      </a:r>
+                      <a:r>
+                        <a:rPr lang="en-US" sz="1800" kern="1200" dirty="0">
+                          <a:solidFill>
+                            <a:schemeClr val="dk1"/>
+                          </a:solidFill>
+                          <a:effectLst/>
+                          <a:latin typeface="+mn-lt"/>
+                          <a:ea typeface="+mn-ea"/>
+                          <a:cs typeface="+mn-cs"/>
+                        </a:rPr>
+                        <a:t>Location</a:t>
                       </a:r>
                       <a:r>
                         <a:rPr lang="en-US" dirty="0">
@@ -4828,8 +4840,12 @@
           <a:p>
             <a:pPr algn="ctr"/>
             <a:r>
+              <a:rPr lang="en-US" sz="1800" dirty="0"/>
+              <a:t>Location</a:t>
+            </a:r>
+            <a:r>
               <a:rPr lang="en-US" dirty="0"/>
-              <a:t>Area </a:t>
+              <a:t> </a:t>
             </a:r>
             <a:r>
               <a:rPr lang="en-US" sz="1200" dirty="0"/>
@@ -6540,7 +6556,7 @@
             <a:pPr algn="ctr"/>
             <a:r>
               <a:rPr lang="en-US" sz="1200" dirty="0"/>
-              <a:t>Activity Area</a:t>
+              <a:t>Location </a:t>
             </a:r>
             <a:r>
               <a:rPr lang="en-US" sz="1200" dirty="0">
@@ -6549,7 +6565,7 @@
                 </a:solidFill>
                 <a:sym typeface="Wingdings" panose="05000000000000000000" pitchFamily="2" charset="2"/>
               </a:rPr>
-              <a:t> </a:t>
+              <a:t></a:t>
             </a:r>
             <a:endParaRPr lang="en-US" sz="1200" dirty="0">
               <a:solidFill>
@@ -8166,7 +8182,7 @@
             <a:pPr algn="ctr"/>
             <a:r>
               <a:rPr lang="en-US" sz="1400" dirty="0"/>
-              <a:t>Area of Search</a:t>
+              <a:t>Location of Search</a:t>
             </a:r>
           </a:p>
           <a:p>
@@ -8452,7 +8468,7 @@
             <a:pPr algn="ctr"/>
             <a:r>
               <a:rPr lang="en-US" sz="1400" dirty="0"/>
-              <a:t>Area of Search</a:t>
+              <a:t>Location of Search</a:t>
             </a:r>
           </a:p>
           <a:p>
@@ -8844,7 +8860,7 @@
             <a:pPr algn="ctr"/>
             <a:r>
               <a:rPr lang="en-US" sz="1400" dirty="0"/>
-              <a:t>Area Wanted</a:t>
+              <a:t>Location Wanted</a:t>
             </a:r>
           </a:p>
           <a:p>
@@ -9040,7 +9056,7 @@
             <a:pPr algn="ctr"/>
             <a:r>
               <a:rPr lang="en-US" sz="1400" dirty="0"/>
-              <a:t>Area Wanted</a:t>
+              <a:t>Location Wanted</a:t>
             </a:r>
           </a:p>
           <a:p>
@@ -9709,8 +9725,8 @@
           <a:p>
             <a:pPr algn="ctr"/>
             <a:r>
-              <a:rPr lang="en-US" dirty="0"/>
-              <a:t>Area</a:t>
+              <a:rPr lang="en-US" sz="1800" dirty="0"/>
+              <a:t>Location</a:t>
             </a:r>
             <a:r>
               <a:rPr lang="en-US" sz="1200" dirty="0">
@@ -9924,8 +9940,8 @@
           <a:p>
             <a:pPr algn="ctr"/>
             <a:r>
-              <a:rPr lang="en-US" dirty="0"/>
-              <a:t>Area</a:t>
+              <a:rPr lang="en-US" sz="1800" dirty="0"/>
+              <a:t>Location</a:t>
             </a:r>
             <a:r>
               <a:rPr lang="en-US" sz="1800" dirty="0">

</xml_diff>

<commit_message>
Summary:  - WelcomePageActivity UI section is completed, finished everything in the UI including the logic of it in the WelcomePageActivity.java file  - MenuActivity UI section is completed and implemented all the necessary UI elements in to the projects, but:     - Chat section in the MenuActivity is not complete, need to decide about it with the entire team.
 #Lidor
</commit_message>
<xml_diff>
--- a/Musician Finder Specification Document.pptx
+++ b/Musician Finder Specification Document.pptx
@@ -15,8 +15,9 @@
     <p:sldId id="262" r:id="rId9"/>
     <p:sldId id="265" r:id="rId10"/>
     <p:sldId id="263" r:id="rId11"/>
-    <p:sldId id="264" r:id="rId12"/>
-    <p:sldId id="267" r:id="rId13"/>
+    <p:sldId id="268" r:id="rId12"/>
+    <p:sldId id="264" r:id="rId13"/>
+    <p:sldId id="267" r:id="rId14"/>
   </p:sldIdLst>
   <p:sldSz cx="12192000" cy="6858000"/>
   <p:notesSz cx="6858000" cy="9144000"/>
@@ -270,7 +271,7 @@
           <a:p>
             <a:fld id="{60236AC0-9DFC-4CD7-B90F-666E0616086E}" type="datetimeFigureOut">
               <a:rPr lang="en-US" smtClean="0"/>
-              <a:t>9/29/2020</a:t>
+              <a:t>10/4/2020</a:t>
             </a:fld>
             <a:endParaRPr lang="en-US"/>
           </a:p>
@@ -468,7 +469,7 @@
           <a:p>
             <a:fld id="{60236AC0-9DFC-4CD7-B90F-666E0616086E}" type="datetimeFigureOut">
               <a:rPr lang="en-US" smtClean="0"/>
-              <a:t>9/29/2020</a:t>
+              <a:t>10/4/2020</a:t>
             </a:fld>
             <a:endParaRPr lang="en-US"/>
           </a:p>
@@ -676,7 +677,7 @@
           <a:p>
             <a:fld id="{60236AC0-9DFC-4CD7-B90F-666E0616086E}" type="datetimeFigureOut">
               <a:rPr lang="en-US" smtClean="0"/>
-              <a:t>9/29/2020</a:t>
+              <a:t>10/4/2020</a:t>
             </a:fld>
             <a:endParaRPr lang="en-US"/>
           </a:p>
@@ -874,7 +875,7 @@
           <a:p>
             <a:fld id="{60236AC0-9DFC-4CD7-B90F-666E0616086E}" type="datetimeFigureOut">
               <a:rPr lang="en-US" smtClean="0"/>
-              <a:t>9/29/2020</a:t>
+              <a:t>10/4/2020</a:t>
             </a:fld>
             <a:endParaRPr lang="en-US"/>
           </a:p>
@@ -1149,7 +1150,7 @@
           <a:p>
             <a:fld id="{60236AC0-9DFC-4CD7-B90F-666E0616086E}" type="datetimeFigureOut">
               <a:rPr lang="en-US" smtClean="0"/>
-              <a:t>9/29/2020</a:t>
+              <a:t>10/4/2020</a:t>
             </a:fld>
             <a:endParaRPr lang="en-US"/>
           </a:p>
@@ -1414,7 +1415,7 @@
           <a:p>
             <a:fld id="{60236AC0-9DFC-4CD7-B90F-666E0616086E}" type="datetimeFigureOut">
               <a:rPr lang="en-US" smtClean="0"/>
-              <a:t>9/29/2020</a:t>
+              <a:t>10/4/2020</a:t>
             </a:fld>
             <a:endParaRPr lang="en-US"/>
           </a:p>
@@ -1826,7 +1827,7 @@
           <a:p>
             <a:fld id="{60236AC0-9DFC-4CD7-B90F-666E0616086E}" type="datetimeFigureOut">
               <a:rPr lang="en-US" smtClean="0"/>
-              <a:t>9/29/2020</a:t>
+              <a:t>10/4/2020</a:t>
             </a:fld>
             <a:endParaRPr lang="en-US"/>
           </a:p>
@@ -1967,7 +1968,7 @@
           <a:p>
             <a:fld id="{60236AC0-9DFC-4CD7-B90F-666E0616086E}" type="datetimeFigureOut">
               <a:rPr lang="en-US" smtClean="0"/>
-              <a:t>9/29/2020</a:t>
+              <a:t>10/4/2020</a:t>
             </a:fld>
             <a:endParaRPr lang="en-US"/>
           </a:p>
@@ -2080,7 +2081,7 @@
           <a:p>
             <a:fld id="{60236AC0-9DFC-4CD7-B90F-666E0616086E}" type="datetimeFigureOut">
               <a:rPr lang="en-US" smtClean="0"/>
-              <a:t>9/29/2020</a:t>
+              <a:t>10/4/2020</a:t>
             </a:fld>
             <a:endParaRPr lang="en-US"/>
           </a:p>
@@ -2391,7 +2392,7 @@
           <a:p>
             <a:fld id="{60236AC0-9DFC-4CD7-B90F-666E0616086E}" type="datetimeFigureOut">
               <a:rPr lang="en-US" smtClean="0"/>
-              <a:t>9/29/2020</a:t>
+              <a:t>10/4/2020</a:t>
             </a:fld>
             <a:endParaRPr lang="en-US"/>
           </a:p>
@@ -2679,7 +2680,7 @@
           <a:p>
             <a:fld id="{60236AC0-9DFC-4CD7-B90F-666E0616086E}" type="datetimeFigureOut">
               <a:rPr lang="en-US" smtClean="0"/>
-              <a:t>9/29/2020</a:t>
+              <a:t>10/4/2020</a:t>
             </a:fld>
             <a:endParaRPr lang="en-US"/>
           </a:p>
@@ -2920,7 +2921,7 @@
           <a:p>
             <a:fld id="{60236AC0-9DFC-4CD7-B90F-666E0616086E}" type="datetimeFigureOut">
               <a:rPr lang="en-US" smtClean="0"/>
-              <a:t>9/29/2020</a:t>
+              <a:t>10/4/2020</a:t>
             </a:fld>
             <a:endParaRPr lang="en-US"/>
           </a:p>
@@ -4137,6 +4138,684 @@
           <p:cNvPr id="2" name="Title 1">
             <a:extLst>
               <a:ext uri="{FF2B5EF4-FFF2-40B4-BE49-F238E27FC236}">
+                <a16:creationId xmlns:a16="http://schemas.microsoft.com/office/drawing/2014/main" id="{B2BB5CC9-69BD-468F-B28D-41F4E6334CE4}"/>
+              </a:ext>
+            </a:extLst>
+          </p:cNvPr>
+          <p:cNvSpPr>
+            <a:spLocks noGrp="1"/>
+          </p:cNvSpPr>
+          <p:nvPr>
+            <p:ph type="title"/>
+          </p:nvPr>
+        </p:nvSpPr>
+        <p:spPr/>
+        <p:txBody>
+          <a:bodyPr/>
+          <a:lstStyle/>
+          <a:p>
+            <a:r>
+              <a:rPr lang="en-US" b="1" i="1" u="sng" dirty="0">
+                <a:effectLst>
+                  <a:outerShdw blurRad="38100" dist="38100" dir="2700000" algn="tl">
+                    <a:srgbClr val="000000">
+                      <a:alpha val="43137"/>
+                    </a:srgbClr>
+                  </a:outerShdw>
+                </a:effectLst>
+              </a:rPr>
+              <a:t>Post Datasets</a:t>
+            </a:r>
+          </a:p>
+        </p:txBody>
+      </p:sp>
+      <p:graphicFrame>
+        <p:nvGraphicFramePr>
+          <p:cNvPr id="5" name="Table 5">
+            <a:extLst>
+              <a:ext uri="{FF2B5EF4-FFF2-40B4-BE49-F238E27FC236}">
+                <a16:creationId xmlns:a16="http://schemas.microsoft.com/office/drawing/2014/main" id="{B4883779-8EFB-49E8-A2E8-3297C12FD7C0}"/>
+              </a:ext>
+            </a:extLst>
+          </p:cNvPr>
+          <p:cNvGraphicFramePr>
+            <a:graphicFrameLocks noGrp="1"/>
+          </p:cNvGraphicFramePr>
+          <p:nvPr>
+            <p:ph idx="1"/>
+            <p:extLst>
+              <p:ext uri="{D42A27DB-BD31-4B8C-83A1-F6EECF244321}">
+                <p14:modId xmlns:p14="http://schemas.microsoft.com/office/powerpoint/2010/main" val="2393998114"/>
+              </p:ext>
+            </p:extLst>
+          </p:nvPr>
+        </p:nvGraphicFramePr>
+        <p:xfrm>
+          <a:off x="838200" y="1825625"/>
+          <a:ext cx="10515600" cy="4589856"/>
+        </p:xfrm>
+        <a:graphic>
+          <a:graphicData uri="http://schemas.openxmlformats.org/drawingml/2006/table">
+            <a:tbl>
+              <a:tblPr firstRow="1" bandRow="1">
+                <a:tableStyleId>{5C22544A-7EE6-4342-B048-85BDC9FD1C3A}</a:tableStyleId>
+              </a:tblPr>
+              <a:tblGrid>
+                <a:gridCol w="5257800">
+                  <a:extLst>
+                    <a:ext uri="{9D8B030D-6E8A-4147-A177-3AD203B41FA5}">
+                      <a16:colId xmlns:a16="http://schemas.microsoft.com/office/drawing/2014/main" val="999526759"/>
+                    </a:ext>
+                  </a:extLst>
+                </a:gridCol>
+                <a:gridCol w="5257800">
+                  <a:extLst>
+                    <a:ext uri="{9D8B030D-6E8A-4147-A177-3AD203B41FA5}">
+                      <a16:colId xmlns:a16="http://schemas.microsoft.com/office/drawing/2014/main" val="2621372417"/>
+                    </a:ext>
+                  </a:extLst>
+                </a:gridCol>
+              </a:tblGrid>
+              <a:tr h="509984">
+                <a:tc>
+                  <a:txBody>
+                    <a:bodyPr/>
+                    <a:lstStyle/>
+                    <a:p>
+                      <a:pPr algn="ctr"/>
+                      <a:r>
+                        <a:rPr lang="en-US" dirty="0"/>
+                        <a:t>Post</a:t>
+                      </a:r>
+                    </a:p>
+                  </a:txBody>
+                  <a:tcPr anchor="ctr"/>
+                </a:tc>
+                <a:tc>
+                  <a:txBody>
+                    <a:bodyPr/>
+                    <a:lstStyle/>
+                    <a:p>
+                      <a:pPr algn="ctr"/>
+                      <a:r>
+                        <a:rPr lang="en-US" dirty="0"/>
+                        <a:t>Comments</a:t>
+                      </a:r>
+                    </a:p>
+                  </a:txBody>
+                  <a:tcPr anchor="ctr"/>
+                </a:tc>
+                <a:extLst>
+                  <a:ext uri="{0D108BD9-81ED-4DB2-BD59-A6C34878D82A}">
+                    <a16:rowId xmlns:a16="http://schemas.microsoft.com/office/drawing/2014/main" val="1022876577"/>
+                  </a:ext>
+                </a:extLst>
+              </a:tr>
+              <a:tr h="509984">
+                <a:tc>
+                  <a:txBody>
+                    <a:bodyPr/>
+                    <a:lstStyle/>
+                    <a:p>
+                      <a:pPr algn="ctr"/>
+                      <a:r>
+                        <a:rPr lang="en-US" dirty="0"/>
+                        <a:t>Username</a:t>
+                      </a:r>
+                      <a:r>
+                        <a:rPr lang="en-US" dirty="0">
+                          <a:solidFill>
+                            <a:srgbClr val="FF0000"/>
+                          </a:solidFill>
+                          <a:sym typeface="Wingdings" panose="05000000000000000000" pitchFamily="2" charset="2"/>
+                        </a:rPr>
+                        <a:t></a:t>
+                      </a:r>
+                      <a:endParaRPr lang="en-US" dirty="0"/>
+                    </a:p>
+                  </a:txBody>
+                  <a:tcPr anchor="ctr"/>
+                </a:tc>
+                <a:tc>
+                  <a:txBody>
+                    <a:bodyPr/>
+                    <a:lstStyle/>
+                    <a:p>
+                      <a:pPr algn="ctr"/>
+                      <a:endParaRPr lang="en-US" dirty="0"/>
+                    </a:p>
+                  </a:txBody>
+                  <a:tcPr anchor="ctr"/>
+                </a:tc>
+                <a:extLst>
+                  <a:ext uri="{0D108BD9-81ED-4DB2-BD59-A6C34878D82A}">
+                    <a16:rowId xmlns:a16="http://schemas.microsoft.com/office/drawing/2014/main" val="864622098"/>
+                  </a:ext>
+                </a:extLst>
+              </a:tr>
+              <a:tr h="509984">
+                <a:tc rowSpan="2">
+                  <a:txBody>
+                    <a:bodyPr/>
+                    <a:lstStyle/>
+                    <a:p>
+                      <a:pPr algn="ctr"/>
+                      <a:r>
+                        <a:rPr lang="en-US" dirty="0"/>
+                        <a:t>Location</a:t>
+                      </a:r>
+                      <a:r>
+                        <a:rPr lang="en-US" dirty="0">
+                          <a:solidFill>
+                            <a:srgbClr val="FF0000"/>
+                          </a:solidFill>
+                          <a:sym typeface="Wingdings" panose="05000000000000000000" pitchFamily="2" charset="2"/>
+                        </a:rPr>
+                        <a:t></a:t>
+                      </a:r>
+                      <a:endParaRPr lang="en-US" dirty="0"/>
+                    </a:p>
+                  </a:txBody>
+                  <a:tcPr anchor="ctr"/>
+                </a:tc>
+                <a:tc>
+                  <a:txBody>
+                    <a:bodyPr/>
+                    <a:lstStyle/>
+                    <a:p>
+                      <a:pPr algn="ctr"/>
+                      <a:r>
+                        <a:rPr lang="en-GB" dirty="0"/>
+                        <a:t>Musician </a:t>
+                      </a:r>
+                      <a:r>
+                        <a:rPr lang="en-GB" dirty="0">
+                          <a:sym typeface="Wingdings" panose="05000000000000000000" pitchFamily="2" charset="2"/>
+                        </a:rPr>
+                        <a:t> Location Wanted</a:t>
+                      </a:r>
+                      <a:endParaRPr lang="en-US" dirty="0"/>
+                    </a:p>
+                  </a:txBody>
+                  <a:tcPr anchor="ctr"/>
+                </a:tc>
+                <a:extLst>
+                  <a:ext uri="{0D108BD9-81ED-4DB2-BD59-A6C34878D82A}">
+                    <a16:rowId xmlns:a16="http://schemas.microsoft.com/office/drawing/2014/main" val="2003856590"/>
+                  </a:ext>
+                </a:extLst>
+              </a:tr>
+              <a:tr h="509984">
+                <a:tc vMerge="1">
+                  <a:txBody>
+                    <a:bodyPr/>
+                    <a:lstStyle/>
+                    <a:p>
+                      <a:pPr algn="ctr"/>
+                      <a:endParaRPr lang="en-US" dirty="0"/>
+                    </a:p>
+                  </a:txBody>
+                  <a:tcPr anchor="ctr"/>
+                </a:tc>
+                <a:tc>
+                  <a:txBody>
+                    <a:bodyPr/>
+                    <a:lstStyle/>
+                    <a:p>
+                      <a:pPr algn="ctr"/>
+                      <a:r>
+                        <a:rPr lang="en-GB" dirty="0"/>
+                        <a:t>Band </a:t>
+                      </a:r>
+                      <a:r>
+                        <a:rPr lang="en-GB" dirty="0">
+                          <a:sym typeface="Wingdings" panose="05000000000000000000" pitchFamily="2" charset="2"/>
+                        </a:rPr>
+                        <a:t> Location Based</a:t>
+                      </a:r>
+                      <a:endParaRPr lang="en-US" dirty="0"/>
+                    </a:p>
+                  </a:txBody>
+                  <a:tcPr anchor="ctr"/>
+                </a:tc>
+                <a:extLst>
+                  <a:ext uri="{0D108BD9-81ED-4DB2-BD59-A6C34878D82A}">
+                    <a16:rowId xmlns:a16="http://schemas.microsoft.com/office/drawing/2014/main" val="2668732178"/>
+                  </a:ext>
+                </a:extLst>
+              </a:tr>
+              <a:tr h="509984">
+                <a:tc>
+                  <a:txBody>
+                    <a:bodyPr/>
+                    <a:lstStyle/>
+                    <a:p>
+                      <a:pPr algn="ctr"/>
+                      <a:r>
+                        <a:rPr lang="en-GB" dirty="0"/>
+                        <a:t>Genre</a:t>
+                      </a:r>
+                      <a:r>
+                        <a:rPr lang="en-US" dirty="0">
+                          <a:solidFill>
+                            <a:srgbClr val="FF0000"/>
+                          </a:solidFill>
+                          <a:sym typeface="Wingdings" panose="05000000000000000000" pitchFamily="2" charset="2"/>
+                        </a:rPr>
+                        <a:t></a:t>
+                      </a:r>
+                      <a:endParaRPr lang="en-US" dirty="0"/>
+                    </a:p>
+                  </a:txBody>
+                  <a:tcPr anchor="ctr"/>
+                </a:tc>
+                <a:tc>
+                  <a:txBody>
+                    <a:bodyPr/>
+                    <a:lstStyle/>
+                    <a:p>
+                      <a:pPr algn="ctr"/>
+                      <a:endParaRPr lang="en-US" dirty="0"/>
+                    </a:p>
+                  </a:txBody>
+                  <a:tcPr anchor="ctr"/>
+                </a:tc>
+                <a:extLst>
+                  <a:ext uri="{0D108BD9-81ED-4DB2-BD59-A6C34878D82A}">
+                    <a16:rowId xmlns:a16="http://schemas.microsoft.com/office/drawing/2014/main" val="1447506110"/>
+                  </a:ext>
+                </a:extLst>
+              </a:tr>
+              <a:tr h="509984">
+                <a:tc rowSpan="2">
+                  <a:txBody>
+                    <a:bodyPr/>
+                    <a:lstStyle/>
+                    <a:p>
+                      <a:pPr marL="0" marR="0" lvl="0" indent="0" algn="ctr" defTabSz="914400" rtl="0" eaLnBrk="1" fontAlgn="auto" latinLnBrk="0" hangingPunct="1">
+                        <a:lnSpc>
+                          <a:spcPct val="100000"/>
+                        </a:lnSpc>
+                        <a:spcBef>
+                          <a:spcPts val="0"/>
+                        </a:spcBef>
+                        <a:spcAft>
+                          <a:spcPts val="0"/>
+                        </a:spcAft>
+                        <a:buClrTx/>
+                        <a:buSzTx/>
+                        <a:buFontTx/>
+                        <a:buNone/>
+                        <a:tabLst/>
+                        <a:defRPr/>
+                      </a:pPr>
+                      <a:r>
+                        <a:rPr lang="en-GB" dirty="0"/>
+                        <a:t>Instrument</a:t>
+                      </a:r>
+                      <a:r>
+                        <a:rPr lang="en-US" dirty="0">
+                          <a:solidFill>
+                            <a:srgbClr val="FF0000"/>
+                          </a:solidFill>
+                          <a:sym typeface="Wingdings" panose="05000000000000000000" pitchFamily="2" charset="2"/>
+                        </a:rPr>
+                        <a:t></a:t>
+                      </a:r>
+                      <a:endParaRPr lang="en-US" dirty="0"/>
+                    </a:p>
+                  </a:txBody>
+                  <a:tcPr anchor="ctr"/>
+                </a:tc>
+                <a:tc>
+                  <a:txBody>
+                    <a:bodyPr/>
+                    <a:lstStyle/>
+                    <a:p>
+                      <a:pPr algn="ctr"/>
+                      <a:r>
+                        <a:rPr lang="en-GB" dirty="0"/>
+                        <a:t>Musician </a:t>
+                      </a:r>
+                      <a:r>
+                        <a:rPr lang="en-GB" dirty="0">
+                          <a:sym typeface="Wingdings" panose="05000000000000000000" pitchFamily="2" charset="2"/>
+                        </a:rPr>
+                        <a:t> My Instrument</a:t>
+                      </a:r>
+                      <a:endParaRPr lang="en-US" dirty="0"/>
+                    </a:p>
+                  </a:txBody>
+                  <a:tcPr anchor="ctr"/>
+                </a:tc>
+                <a:extLst>
+                  <a:ext uri="{0D108BD9-81ED-4DB2-BD59-A6C34878D82A}">
+                    <a16:rowId xmlns:a16="http://schemas.microsoft.com/office/drawing/2014/main" val="1286390632"/>
+                  </a:ext>
+                </a:extLst>
+              </a:tr>
+              <a:tr h="509984">
+                <a:tc vMerge="1">
+                  <a:txBody>
+                    <a:bodyPr/>
+                    <a:lstStyle/>
+                    <a:p>
+                      <a:pPr marL="0" marR="0" lvl="0" indent="0" algn="ctr" defTabSz="914400" rtl="0" eaLnBrk="1" fontAlgn="auto" latinLnBrk="0" hangingPunct="1">
+                        <a:lnSpc>
+                          <a:spcPct val="100000"/>
+                        </a:lnSpc>
+                        <a:spcBef>
+                          <a:spcPts val="0"/>
+                        </a:spcBef>
+                        <a:spcAft>
+                          <a:spcPts val="0"/>
+                        </a:spcAft>
+                        <a:buClrTx/>
+                        <a:buSzTx/>
+                        <a:buFontTx/>
+                        <a:buNone/>
+                        <a:tabLst/>
+                        <a:defRPr/>
+                      </a:pPr>
+                      <a:endParaRPr lang="en-US" dirty="0"/>
+                    </a:p>
+                  </a:txBody>
+                  <a:tcPr anchor="ctr"/>
+                </a:tc>
+                <a:tc>
+                  <a:txBody>
+                    <a:bodyPr/>
+                    <a:lstStyle/>
+                    <a:p>
+                      <a:pPr algn="ctr"/>
+                      <a:r>
+                        <a:rPr lang="en-GB" dirty="0"/>
+                        <a:t>Band </a:t>
+                      </a:r>
+                      <a:r>
+                        <a:rPr lang="en-GB" dirty="0">
+                          <a:sym typeface="Wingdings" panose="05000000000000000000" pitchFamily="2" charset="2"/>
+                        </a:rPr>
+                        <a:t> Instrument Missing</a:t>
+                      </a:r>
+                      <a:endParaRPr lang="en-US" dirty="0"/>
+                    </a:p>
+                  </a:txBody>
+                  <a:tcPr anchor="ctr"/>
+                </a:tc>
+                <a:extLst>
+                  <a:ext uri="{0D108BD9-81ED-4DB2-BD59-A6C34878D82A}">
+                    <a16:rowId xmlns:a16="http://schemas.microsoft.com/office/drawing/2014/main" val="2893492795"/>
+                  </a:ext>
+                </a:extLst>
+              </a:tr>
+              <a:tr h="509984">
+                <a:tc rowSpan="2">
+                  <a:txBody>
+                    <a:bodyPr/>
+                    <a:lstStyle/>
+                    <a:p>
+                      <a:pPr algn="ctr"/>
+                      <a:r>
+                        <a:rPr lang="en-GB" dirty="0"/>
+                        <a:t>Bio</a:t>
+                      </a:r>
+                      <a:r>
+                        <a:rPr lang="en-US" dirty="0">
+                          <a:solidFill>
+                            <a:srgbClr val="FF0000"/>
+                          </a:solidFill>
+                          <a:sym typeface="Wingdings" panose="05000000000000000000" pitchFamily="2" charset="2"/>
+                        </a:rPr>
+                        <a:t></a:t>
+                      </a:r>
+                      <a:r>
+                        <a:rPr lang="en-US" dirty="0">
+                          <a:solidFill>
+                            <a:schemeClr val="accent1"/>
+                          </a:solidFill>
+                          <a:sym typeface="Wingdings" panose="05000000000000000000" pitchFamily="2" charset="2"/>
+                        </a:rPr>
+                        <a:t></a:t>
+                      </a:r>
+                      <a:endParaRPr lang="en-US" dirty="0"/>
+                    </a:p>
+                  </a:txBody>
+                  <a:tcPr anchor="ctr"/>
+                </a:tc>
+                <a:tc>
+                  <a:txBody>
+                    <a:bodyPr/>
+                    <a:lstStyle/>
+                    <a:p>
+                      <a:pPr marL="0" marR="0" lvl="0" indent="0" algn="ctr" defTabSz="914400" rtl="0" eaLnBrk="1" fontAlgn="auto" latinLnBrk="0" hangingPunct="1">
+                        <a:lnSpc>
+                          <a:spcPct val="100000"/>
+                        </a:lnSpc>
+                        <a:spcBef>
+                          <a:spcPts val="0"/>
+                        </a:spcBef>
+                        <a:spcAft>
+                          <a:spcPts val="0"/>
+                        </a:spcAft>
+                        <a:buClrTx/>
+                        <a:buSzTx/>
+                        <a:buFontTx/>
+                        <a:buNone/>
+                        <a:tabLst/>
+                        <a:defRPr/>
+                      </a:pPr>
+                      <a:r>
+                        <a:rPr lang="en-US" dirty="0">
+                          <a:solidFill>
+                            <a:srgbClr val="FF0000"/>
+                          </a:solidFill>
+                          <a:sym typeface="Wingdings" panose="05000000000000000000" pitchFamily="2" charset="2"/>
+                        </a:rPr>
+                        <a:t></a:t>
+                      </a:r>
+                      <a:r>
+                        <a:rPr lang="en-GB" dirty="0"/>
+                        <a:t>Musician </a:t>
+                      </a:r>
+                      <a:r>
+                        <a:rPr lang="en-GB" dirty="0">
+                          <a:sym typeface="Wingdings" panose="05000000000000000000" pitchFamily="2" charset="2"/>
+                        </a:rPr>
+                        <a:t> 0</a:t>
+                      </a:r>
+                      <a:endParaRPr lang="en-US" dirty="0"/>
+                    </a:p>
+                  </a:txBody>
+                  <a:tcPr anchor="ctr"/>
+                </a:tc>
+                <a:extLst>
+                  <a:ext uri="{0D108BD9-81ED-4DB2-BD59-A6C34878D82A}">
+                    <a16:rowId xmlns:a16="http://schemas.microsoft.com/office/drawing/2014/main" val="787995426"/>
+                  </a:ext>
+                </a:extLst>
+              </a:tr>
+              <a:tr h="509984">
+                <a:tc vMerge="1">
+                  <a:txBody>
+                    <a:bodyPr/>
+                    <a:lstStyle/>
+                    <a:p>
+                      <a:pPr algn="ctr"/>
+                      <a:endParaRPr lang="en-US" dirty="0"/>
+                    </a:p>
+                  </a:txBody>
+                  <a:tcPr anchor="ctr"/>
+                </a:tc>
+                <a:tc>
+                  <a:txBody>
+                    <a:bodyPr/>
+                    <a:lstStyle/>
+                    <a:p>
+                      <a:pPr marL="0" marR="0" lvl="0" indent="0" algn="ctr" defTabSz="914400" rtl="0" eaLnBrk="1" fontAlgn="auto" latinLnBrk="0" hangingPunct="1">
+                        <a:lnSpc>
+                          <a:spcPct val="100000"/>
+                        </a:lnSpc>
+                        <a:spcBef>
+                          <a:spcPts val="0"/>
+                        </a:spcBef>
+                        <a:spcAft>
+                          <a:spcPts val="0"/>
+                        </a:spcAft>
+                        <a:buClrTx/>
+                        <a:buSzTx/>
+                        <a:buFontTx/>
+                        <a:buNone/>
+                        <a:tabLst/>
+                        <a:defRPr/>
+                      </a:pPr>
+                      <a:r>
+                        <a:rPr lang="en-US" dirty="0">
+                          <a:solidFill>
+                            <a:schemeClr val="accent1"/>
+                          </a:solidFill>
+                          <a:sym typeface="Wingdings" panose="05000000000000000000" pitchFamily="2" charset="2"/>
+                        </a:rPr>
+                        <a:t></a:t>
+                      </a:r>
+                      <a:r>
+                        <a:rPr lang="en-GB" dirty="0">
+                          <a:sym typeface="Wingdings" panose="05000000000000000000" pitchFamily="2" charset="2"/>
+                        </a:rPr>
+                        <a:t>Band  Free Text</a:t>
+                      </a:r>
+                      <a:endParaRPr lang="en-US" dirty="0"/>
+                    </a:p>
+                  </a:txBody>
+                  <a:tcPr anchor="ctr"/>
+                </a:tc>
+                <a:extLst>
+                  <a:ext uri="{0D108BD9-81ED-4DB2-BD59-A6C34878D82A}">
+                    <a16:rowId xmlns:a16="http://schemas.microsoft.com/office/drawing/2014/main" val="3148044796"/>
+                  </a:ext>
+                </a:extLst>
+              </a:tr>
+            </a:tbl>
+          </a:graphicData>
+        </a:graphic>
+      </p:graphicFrame>
+      <p:sp>
+        <p:nvSpPr>
+          <p:cNvPr id="6" name="TextBox 5">
+            <a:extLst>
+              <a:ext uri="{FF2B5EF4-FFF2-40B4-BE49-F238E27FC236}">
+                <a16:creationId xmlns:a16="http://schemas.microsoft.com/office/drawing/2014/main" id="{C50DB1BC-E153-4AC7-AE20-770D0C9C0419}"/>
+              </a:ext>
+            </a:extLst>
+          </p:cNvPr>
+          <p:cNvSpPr txBox="1"/>
+          <p:nvPr/>
+        </p:nvSpPr>
+        <p:spPr>
+          <a:xfrm>
+            <a:off x="9182100" y="704740"/>
+            <a:ext cx="2171700" cy="646331"/>
+          </a:xfrm>
+          <a:prstGeom prst="rect">
+            <a:avLst/>
+          </a:prstGeom>
+          <a:noFill/>
+          <a:ln w="38100">
+            <a:solidFill>
+              <a:schemeClr val="tx1">
+                <a:lumMod val="50000"/>
+                <a:lumOff val="50000"/>
+              </a:schemeClr>
+            </a:solidFill>
+          </a:ln>
+        </p:spPr>
+        <p:txBody>
+          <a:bodyPr wrap="square" rtlCol="0">
+            <a:spAutoFit/>
+          </a:bodyPr>
+          <a:lstStyle/>
+          <a:p>
+            <a:r>
+              <a:rPr lang="en-US" dirty="0">
+                <a:solidFill>
+                  <a:srgbClr val="FF0000"/>
+                </a:solidFill>
+                <a:sym typeface="Wingdings" panose="05000000000000000000" pitchFamily="2" charset="2"/>
+              </a:rPr>
+              <a:t> </a:t>
+            </a:r>
+            <a:r>
+              <a:rPr lang="en-US" sz="1400" dirty="0">
+                <a:solidFill>
+                  <a:srgbClr val="FF0000"/>
+                </a:solidFill>
+                <a:sym typeface="Wingdings" panose="05000000000000000000" pitchFamily="2" charset="2"/>
+              </a:rPr>
+              <a:t>Mandatory</a:t>
+            </a:r>
+          </a:p>
+          <a:p>
+            <a:r>
+              <a:rPr lang="en-US" dirty="0">
+                <a:solidFill>
+                  <a:schemeClr val="accent1"/>
+                </a:solidFill>
+                <a:sym typeface="Wingdings" panose="05000000000000000000" pitchFamily="2" charset="2"/>
+              </a:rPr>
+              <a:t> </a:t>
+            </a:r>
+            <a:r>
+              <a:rPr lang="en-US" sz="1400" dirty="0">
+                <a:solidFill>
+                  <a:schemeClr val="accent1"/>
+                </a:solidFill>
+                <a:sym typeface="Wingdings" panose="05000000000000000000" pitchFamily="2" charset="2"/>
+              </a:rPr>
+              <a:t>Optional</a:t>
+            </a:r>
+            <a:endParaRPr lang="en-US" sz="1400" dirty="0">
+              <a:solidFill>
+                <a:schemeClr val="accent1"/>
+              </a:solidFill>
+            </a:endParaRPr>
+          </a:p>
+        </p:txBody>
+      </p:sp>
+    </p:spTree>
+    <p:extLst>
+      <p:ext uri="{BB962C8B-B14F-4D97-AF65-F5344CB8AC3E}">
+        <p14:creationId xmlns:p14="http://schemas.microsoft.com/office/powerpoint/2010/main" val="1060623936"/>
+      </p:ext>
+    </p:extLst>
+  </p:cSld>
+  <p:clrMapOvr>
+    <a:masterClrMapping/>
+  </p:clrMapOvr>
+</p:sld>
+</file>
+
+<file path=ppt/slides/slide12.xml><?xml version="1.0" encoding="utf-8"?>
+<p:sld xmlns:a="http://schemas.openxmlformats.org/drawingml/2006/main" xmlns:r="http://schemas.openxmlformats.org/officeDocument/2006/relationships" xmlns:p="http://schemas.openxmlformats.org/presentationml/2006/main">
+  <p:cSld>
+    <p:spTree>
+      <p:nvGrpSpPr>
+        <p:cNvPr id="1" name=""/>
+        <p:cNvGrpSpPr/>
+        <p:nvPr/>
+      </p:nvGrpSpPr>
+      <p:grpSpPr>
+        <a:xfrm>
+          <a:off x="0" y="0"/>
+          <a:ext cx="0" cy="0"/>
+          <a:chOff x="0" y="0"/>
+          <a:chExt cx="0" cy="0"/>
+        </a:xfrm>
+      </p:grpSpPr>
+      <p:sp>
+        <p:nvSpPr>
+          <p:cNvPr id="2" name="Title 1">
+            <a:extLst>
+              <a:ext uri="{FF2B5EF4-FFF2-40B4-BE49-F238E27FC236}">
                 <a16:creationId xmlns:a16="http://schemas.microsoft.com/office/drawing/2014/main" id="{5CE4DC76-A747-4EB4-820D-4D63FBFCFD05}"/>
               </a:ext>
             </a:extLst>
@@ -5214,7 +5893,7 @@
 </p:sld>
 </file>
 
-<file path=ppt/slides/slide12.xml><?xml version="1.0" encoding="utf-8"?>
+<file path=ppt/slides/slide13.xml><?xml version="1.0" encoding="utf-8"?>
 <p:sld xmlns:a="http://schemas.openxmlformats.org/drawingml/2006/main" xmlns:r="http://schemas.openxmlformats.org/officeDocument/2006/relationships" xmlns:p="http://schemas.openxmlformats.org/presentationml/2006/main">
   <p:cSld>
     <p:spTree>
@@ -8860,7 +9539,7 @@
             <a:pPr algn="ctr"/>
             <a:r>
               <a:rPr lang="en-US" sz="1400" dirty="0"/>
-              <a:t>Location Wanted</a:t>
+              <a:t>Location Based</a:t>
             </a:r>
           </a:p>
           <a:p>
@@ -9105,7 +9784,7 @@
             <a:pPr algn="ctr"/>
             <a:r>
               <a:rPr lang="en-US" sz="1400" dirty="0"/>
-              <a:t>Band Members</a:t>
+              <a:t>Band Bio</a:t>
             </a:r>
           </a:p>
           <a:p>
@@ -9379,6 +10058,55 @@
                 </a:outerShdw>
               </a:effectLst>
             </a:endParaRPr>
+          </a:p>
+        </p:txBody>
+      </p:sp>
+      <p:sp>
+        <p:nvSpPr>
+          <p:cNvPr id="17" name="TextBox 16">
+            <a:extLst>
+              <a:ext uri="{FF2B5EF4-FFF2-40B4-BE49-F238E27FC236}">
+                <a16:creationId xmlns:a16="http://schemas.microsoft.com/office/drawing/2014/main" id="{D7879F54-1E08-4482-80A5-A7077AA7637C}"/>
+              </a:ext>
+            </a:extLst>
+          </p:cNvPr>
+          <p:cNvSpPr txBox="1"/>
+          <p:nvPr/>
+        </p:nvSpPr>
+        <p:spPr>
+          <a:xfrm>
+            <a:off x="2152647" y="4763453"/>
+            <a:ext cx="2505075" cy="738664"/>
+          </a:xfrm>
+          <a:prstGeom prst="rect">
+            <a:avLst/>
+          </a:prstGeom>
+          <a:noFill/>
+          <a:ln w="38100">
+            <a:solidFill>
+              <a:schemeClr val="tx1"/>
+            </a:solidFill>
+          </a:ln>
+        </p:spPr>
+        <p:txBody>
+          <a:bodyPr wrap="square" rtlCol="0">
+            <a:spAutoFit/>
+          </a:bodyPr>
+          <a:lstStyle/>
+          <a:p>
+            <a:pPr algn="ctr"/>
+            <a:endParaRPr lang="en-US" sz="1400" dirty="0"/>
+          </a:p>
+          <a:p>
+            <a:pPr algn="ctr"/>
+            <a:r>
+              <a:rPr lang="en-US" sz="1400" dirty="0"/>
+              <a:t>Genre</a:t>
+            </a:r>
+          </a:p>
+          <a:p>
+            <a:pPr algn="ctr"/>
+            <a:endParaRPr lang="en-US" sz="1400" dirty="0"/>
           </a:p>
         </p:txBody>
       </p:sp>

</xml_diff>

<commit_message>
Summary:  - Added Scroll option to ALL layouts  - Chat UI configuration
 #Lidor
</commit_message>
<xml_diff>
--- a/Musician Finder Specification Document.pptx
+++ b/Musician Finder Specification Document.pptx
@@ -11,13 +11,12 @@
     <p:sldId id="258" r:id="rId5"/>
     <p:sldId id="259" r:id="rId6"/>
     <p:sldId id="260" r:id="rId7"/>
-    <p:sldId id="261" r:id="rId8"/>
-    <p:sldId id="262" r:id="rId9"/>
-    <p:sldId id="265" r:id="rId10"/>
-    <p:sldId id="263" r:id="rId11"/>
-    <p:sldId id="268" r:id="rId12"/>
-    <p:sldId id="264" r:id="rId13"/>
-    <p:sldId id="267" r:id="rId14"/>
+    <p:sldId id="262" r:id="rId8"/>
+    <p:sldId id="265" r:id="rId9"/>
+    <p:sldId id="263" r:id="rId10"/>
+    <p:sldId id="268" r:id="rId11"/>
+    <p:sldId id="264" r:id="rId12"/>
+    <p:sldId id="267" r:id="rId13"/>
   </p:sldIdLst>
   <p:sldSz cx="12192000" cy="6858000"/>
   <p:notesSz cx="6858000" cy="9144000"/>
@@ -271,7 +270,7 @@
           <a:p>
             <a:fld id="{60236AC0-9DFC-4CD7-B90F-666E0616086E}" type="datetimeFigureOut">
               <a:rPr lang="en-US" smtClean="0"/>
-              <a:t>10/4/2020</a:t>
+              <a:t>10/8/2020</a:t>
             </a:fld>
             <a:endParaRPr lang="en-US"/>
           </a:p>
@@ -469,7 +468,7 @@
           <a:p>
             <a:fld id="{60236AC0-9DFC-4CD7-B90F-666E0616086E}" type="datetimeFigureOut">
               <a:rPr lang="en-US" smtClean="0"/>
-              <a:t>10/4/2020</a:t>
+              <a:t>10/8/2020</a:t>
             </a:fld>
             <a:endParaRPr lang="en-US"/>
           </a:p>
@@ -677,7 +676,7 @@
           <a:p>
             <a:fld id="{60236AC0-9DFC-4CD7-B90F-666E0616086E}" type="datetimeFigureOut">
               <a:rPr lang="en-US" smtClean="0"/>
-              <a:t>10/4/2020</a:t>
+              <a:t>10/8/2020</a:t>
             </a:fld>
             <a:endParaRPr lang="en-US"/>
           </a:p>
@@ -875,7 +874,7 @@
           <a:p>
             <a:fld id="{60236AC0-9DFC-4CD7-B90F-666E0616086E}" type="datetimeFigureOut">
               <a:rPr lang="en-US" smtClean="0"/>
-              <a:t>10/4/2020</a:t>
+              <a:t>10/8/2020</a:t>
             </a:fld>
             <a:endParaRPr lang="en-US"/>
           </a:p>
@@ -1150,7 +1149,7 @@
           <a:p>
             <a:fld id="{60236AC0-9DFC-4CD7-B90F-666E0616086E}" type="datetimeFigureOut">
               <a:rPr lang="en-US" smtClean="0"/>
-              <a:t>10/4/2020</a:t>
+              <a:t>10/8/2020</a:t>
             </a:fld>
             <a:endParaRPr lang="en-US"/>
           </a:p>
@@ -1415,7 +1414,7 @@
           <a:p>
             <a:fld id="{60236AC0-9DFC-4CD7-B90F-666E0616086E}" type="datetimeFigureOut">
               <a:rPr lang="en-US" smtClean="0"/>
-              <a:t>10/4/2020</a:t>
+              <a:t>10/8/2020</a:t>
             </a:fld>
             <a:endParaRPr lang="en-US"/>
           </a:p>
@@ -1827,7 +1826,7 @@
           <a:p>
             <a:fld id="{60236AC0-9DFC-4CD7-B90F-666E0616086E}" type="datetimeFigureOut">
               <a:rPr lang="en-US" smtClean="0"/>
-              <a:t>10/4/2020</a:t>
+              <a:t>10/8/2020</a:t>
             </a:fld>
             <a:endParaRPr lang="en-US"/>
           </a:p>
@@ -1968,7 +1967,7 @@
           <a:p>
             <a:fld id="{60236AC0-9DFC-4CD7-B90F-666E0616086E}" type="datetimeFigureOut">
               <a:rPr lang="en-US" smtClean="0"/>
-              <a:t>10/4/2020</a:t>
+              <a:t>10/8/2020</a:t>
             </a:fld>
             <a:endParaRPr lang="en-US"/>
           </a:p>
@@ -2081,7 +2080,7 @@
           <a:p>
             <a:fld id="{60236AC0-9DFC-4CD7-B90F-666E0616086E}" type="datetimeFigureOut">
               <a:rPr lang="en-US" smtClean="0"/>
-              <a:t>10/4/2020</a:t>
+              <a:t>10/8/2020</a:t>
             </a:fld>
             <a:endParaRPr lang="en-US"/>
           </a:p>
@@ -2392,7 +2391,7 @@
           <a:p>
             <a:fld id="{60236AC0-9DFC-4CD7-B90F-666E0616086E}" type="datetimeFigureOut">
               <a:rPr lang="en-US" smtClean="0"/>
-              <a:t>10/4/2020</a:t>
+              <a:t>10/8/2020</a:t>
             </a:fld>
             <a:endParaRPr lang="en-US"/>
           </a:p>
@@ -2680,7 +2679,7 @@
           <a:p>
             <a:fld id="{60236AC0-9DFC-4CD7-B90F-666E0616086E}" type="datetimeFigureOut">
               <a:rPr lang="en-US" smtClean="0"/>
-              <a:t>10/4/2020</a:t>
+              <a:t>10/8/2020</a:t>
             </a:fld>
             <a:endParaRPr lang="en-US"/>
           </a:p>
@@ -2921,7 +2920,7 @@
           <a:p>
             <a:fld id="{60236AC0-9DFC-4CD7-B90F-666E0616086E}" type="datetimeFigureOut">
               <a:rPr lang="en-US" smtClean="0"/>
-              <a:t>10/4/2020</a:t>
+              <a:t>10/8/2020</a:t>
             </a:fld>
             <a:endParaRPr lang="en-US"/>
           </a:p>
@@ -3487,636 +3486,6 @@
 </file>
 
 <file path=ppt/slides/slide10.xml><?xml version="1.0" encoding="utf-8"?>
-<p:sld xmlns:a="http://schemas.openxmlformats.org/drawingml/2006/main" xmlns:r="http://schemas.openxmlformats.org/officeDocument/2006/relationships" xmlns:p="http://schemas.openxmlformats.org/presentationml/2006/main">
-  <p:cSld>
-    <p:spTree>
-      <p:nvGrpSpPr>
-        <p:cNvPr id="1" name=""/>
-        <p:cNvGrpSpPr/>
-        <p:nvPr/>
-      </p:nvGrpSpPr>
-      <p:grpSpPr>
-        <a:xfrm>
-          <a:off x="0" y="0"/>
-          <a:ext cx="0" cy="0"/>
-          <a:chOff x="0" y="0"/>
-          <a:chExt cx="0" cy="0"/>
-        </a:xfrm>
-      </p:grpSpPr>
-      <p:sp>
-        <p:nvSpPr>
-          <p:cNvPr id="2" name="Title 1">
-            <a:extLst>
-              <a:ext uri="{FF2B5EF4-FFF2-40B4-BE49-F238E27FC236}">
-                <a16:creationId xmlns:a16="http://schemas.microsoft.com/office/drawing/2014/main" id="{B2BB5CC9-69BD-468F-B28D-41F4E6334CE4}"/>
-              </a:ext>
-            </a:extLst>
-          </p:cNvPr>
-          <p:cNvSpPr>
-            <a:spLocks noGrp="1"/>
-          </p:cNvSpPr>
-          <p:nvPr>
-            <p:ph type="title"/>
-          </p:nvPr>
-        </p:nvSpPr>
-        <p:spPr/>
-        <p:txBody>
-          <a:bodyPr/>
-          <a:lstStyle/>
-          <a:p>
-            <a:r>
-              <a:rPr lang="en-US" b="1" i="1" u="sng" dirty="0">
-                <a:effectLst>
-                  <a:outerShdw blurRad="38100" dist="38100" dir="2700000" algn="tl">
-                    <a:srgbClr val="000000">
-                      <a:alpha val="43137"/>
-                    </a:srgbClr>
-                  </a:outerShdw>
-                </a:effectLst>
-              </a:rPr>
-              <a:t>User Datasets</a:t>
-            </a:r>
-          </a:p>
-        </p:txBody>
-      </p:sp>
-      <p:graphicFrame>
-        <p:nvGraphicFramePr>
-          <p:cNvPr id="5" name="Table 5">
-            <a:extLst>
-              <a:ext uri="{FF2B5EF4-FFF2-40B4-BE49-F238E27FC236}">
-                <a16:creationId xmlns:a16="http://schemas.microsoft.com/office/drawing/2014/main" id="{B4883779-8EFB-49E8-A2E8-3297C12FD7C0}"/>
-              </a:ext>
-            </a:extLst>
-          </p:cNvPr>
-          <p:cNvGraphicFramePr>
-            <a:graphicFrameLocks noGrp="1"/>
-          </p:cNvGraphicFramePr>
-          <p:nvPr>
-            <p:ph idx="1"/>
-            <p:extLst>
-              <p:ext uri="{D42A27DB-BD31-4B8C-83A1-F6EECF244321}">
-                <p14:modId xmlns:p14="http://schemas.microsoft.com/office/powerpoint/2010/main" val="1876297956"/>
-              </p:ext>
-            </p:extLst>
-          </p:nvPr>
-        </p:nvGraphicFramePr>
-        <p:xfrm>
-          <a:off x="838200" y="1825625"/>
-          <a:ext cx="10515600" cy="4079872"/>
-        </p:xfrm>
-        <a:graphic>
-          <a:graphicData uri="http://schemas.openxmlformats.org/drawingml/2006/table">
-            <a:tbl>
-              <a:tblPr firstRow="1" bandRow="1">
-                <a:tableStyleId>{5C22544A-7EE6-4342-B048-85BDC9FD1C3A}</a:tableStyleId>
-              </a:tblPr>
-              <a:tblGrid>
-                <a:gridCol w="5257800">
-                  <a:extLst>
-                    <a:ext uri="{9D8B030D-6E8A-4147-A177-3AD203B41FA5}">
-                      <a16:colId xmlns:a16="http://schemas.microsoft.com/office/drawing/2014/main" val="999526759"/>
-                    </a:ext>
-                  </a:extLst>
-                </a:gridCol>
-                <a:gridCol w="5257800">
-                  <a:extLst>
-                    <a:ext uri="{9D8B030D-6E8A-4147-A177-3AD203B41FA5}">
-                      <a16:colId xmlns:a16="http://schemas.microsoft.com/office/drawing/2014/main" val="2621372417"/>
-                    </a:ext>
-                  </a:extLst>
-                </a:gridCol>
-              </a:tblGrid>
-              <a:tr h="509984">
-                <a:tc>
-                  <a:txBody>
-                    <a:bodyPr/>
-                    <a:lstStyle/>
-                    <a:p>
-                      <a:pPr algn="ctr"/>
-                      <a:r>
-                        <a:rPr lang="en-US" dirty="0"/>
-                        <a:t>Private</a:t>
-                      </a:r>
-                    </a:p>
-                  </a:txBody>
-                  <a:tcPr anchor="ctr"/>
-                </a:tc>
-                <a:tc>
-                  <a:txBody>
-                    <a:bodyPr/>
-                    <a:lstStyle/>
-                    <a:p>
-                      <a:pPr algn="ctr"/>
-                      <a:r>
-                        <a:rPr lang="en-US" dirty="0"/>
-                        <a:t>Public</a:t>
-                      </a:r>
-                    </a:p>
-                  </a:txBody>
-                  <a:tcPr anchor="ctr"/>
-                </a:tc>
-                <a:extLst>
-                  <a:ext uri="{0D108BD9-81ED-4DB2-BD59-A6C34878D82A}">
-                    <a16:rowId xmlns:a16="http://schemas.microsoft.com/office/drawing/2014/main" val="1022876577"/>
-                  </a:ext>
-                </a:extLst>
-              </a:tr>
-              <a:tr h="509984">
-                <a:tc>
-                  <a:txBody>
-                    <a:bodyPr/>
-                    <a:lstStyle/>
-                    <a:p>
-                      <a:pPr algn="ctr"/>
-                      <a:r>
-                        <a:rPr lang="en-US" dirty="0"/>
-                        <a:t>Username</a:t>
-                      </a:r>
-                      <a:r>
-                        <a:rPr lang="en-US" dirty="0">
-                          <a:solidFill>
-                            <a:srgbClr val="FF0000"/>
-                          </a:solidFill>
-                          <a:sym typeface="Wingdings" panose="05000000000000000000" pitchFamily="2" charset="2"/>
-                        </a:rPr>
-                        <a:t></a:t>
-                      </a:r>
-                      <a:endParaRPr lang="en-US" dirty="0"/>
-                    </a:p>
-                  </a:txBody>
-                  <a:tcPr anchor="ctr"/>
-                </a:tc>
-                <a:tc>
-                  <a:txBody>
-                    <a:bodyPr/>
-                    <a:lstStyle/>
-                    <a:p>
-                      <a:pPr algn="ctr"/>
-                      <a:r>
-                        <a:rPr lang="en-US" dirty="0"/>
-                        <a:t>Genre List</a:t>
-                      </a:r>
-                      <a:r>
-                        <a:rPr lang="en-US" dirty="0">
-                          <a:solidFill>
-                            <a:schemeClr val="accent1"/>
-                          </a:solidFill>
-                          <a:sym typeface="Wingdings" panose="05000000000000000000" pitchFamily="2" charset="2"/>
-                        </a:rPr>
-                        <a:t></a:t>
-                      </a:r>
-                      <a:endParaRPr lang="en-US" dirty="0"/>
-                    </a:p>
-                  </a:txBody>
-                  <a:tcPr anchor="ctr"/>
-                </a:tc>
-                <a:extLst>
-                  <a:ext uri="{0D108BD9-81ED-4DB2-BD59-A6C34878D82A}">
-                    <a16:rowId xmlns:a16="http://schemas.microsoft.com/office/drawing/2014/main" val="864622098"/>
-                  </a:ext>
-                </a:extLst>
-              </a:tr>
-              <a:tr h="509984">
-                <a:tc>
-                  <a:txBody>
-                    <a:bodyPr/>
-                    <a:lstStyle/>
-                    <a:p>
-                      <a:pPr algn="ctr"/>
-                      <a:r>
-                        <a:rPr lang="en-US" dirty="0"/>
-                        <a:t>Password</a:t>
-                      </a:r>
-                      <a:r>
-                        <a:rPr lang="en-US" dirty="0">
-                          <a:solidFill>
-                            <a:srgbClr val="FF0000"/>
-                          </a:solidFill>
-                          <a:sym typeface="Wingdings" panose="05000000000000000000" pitchFamily="2" charset="2"/>
-                        </a:rPr>
-                        <a:t></a:t>
-                      </a:r>
-                      <a:endParaRPr lang="en-US" dirty="0"/>
-                    </a:p>
-                  </a:txBody>
-                  <a:tcPr anchor="ctr"/>
-                </a:tc>
-                <a:tc>
-                  <a:txBody>
-                    <a:bodyPr/>
-                    <a:lstStyle/>
-                    <a:p>
-                      <a:pPr algn="ctr"/>
-                      <a:r>
-                        <a:rPr lang="en-US" dirty="0"/>
-                        <a:t>Bio</a:t>
-                      </a:r>
-                      <a:r>
-                        <a:rPr lang="en-US" dirty="0">
-                          <a:solidFill>
-                            <a:schemeClr val="accent1"/>
-                          </a:solidFill>
-                          <a:sym typeface="Wingdings" panose="05000000000000000000" pitchFamily="2" charset="2"/>
-                        </a:rPr>
-                        <a:t></a:t>
-                      </a:r>
-                      <a:endParaRPr lang="en-US" dirty="0"/>
-                    </a:p>
-                  </a:txBody>
-                  <a:tcPr anchor="ctr"/>
-                </a:tc>
-                <a:extLst>
-                  <a:ext uri="{0D108BD9-81ED-4DB2-BD59-A6C34878D82A}">
-                    <a16:rowId xmlns:a16="http://schemas.microsoft.com/office/drawing/2014/main" val="2003856590"/>
-                  </a:ext>
-                </a:extLst>
-              </a:tr>
-              <a:tr h="509984">
-                <a:tc>
-                  <a:txBody>
-                    <a:bodyPr/>
-                    <a:lstStyle/>
-                    <a:p>
-                      <a:pPr algn="ctr"/>
-                      <a:endParaRPr lang="en-US" dirty="0"/>
-                    </a:p>
-                  </a:txBody>
-                  <a:tcPr anchor="ctr"/>
-                </a:tc>
-                <a:tc>
-                  <a:txBody>
-                    <a:bodyPr/>
-                    <a:lstStyle/>
-                    <a:p>
-                      <a:pPr algn="ctr"/>
-                      <a:r>
-                        <a:rPr lang="en-US" dirty="0"/>
-                        <a:t>Link to ***</a:t>
-                      </a:r>
-                      <a:r>
-                        <a:rPr lang="en-US" dirty="0">
-                          <a:solidFill>
-                            <a:schemeClr val="accent1"/>
-                          </a:solidFill>
-                          <a:sym typeface="Wingdings" panose="05000000000000000000" pitchFamily="2" charset="2"/>
-                        </a:rPr>
-                        <a:t></a:t>
-                      </a:r>
-                      <a:endParaRPr lang="en-US" dirty="0"/>
-                    </a:p>
-                  </a:txBody>
-                  <a:tcPr anchor="ctr"/>
-                </a:tc>
-                <a:extLst>
-                  <a:ext uri="{0D108BD9-81ED-4DB2-BD59-A6C34878D82A}">
-                    <a16:rowId xmlns:a16="http://schemas.microsoft.com/office/drawing/2014/main" val="1447506110"/>
-                  </a:ext>
-                </a:extLst>
-              </a:tr>
-              <a:tr h="509984">
-                <a:tc>
-                  <a:txBody>
-                    <a:bodyPr/>
-                    <a:lstStyle/>
-                    <a:p>
-                      <a:pPr marL="0" marR="0" lvl="0" indent="0" algn="ctr" defTabSz="914400" rtl="0" eaLnBrk="1" fontAlgn="auto" latinLnBrk="0" hangingPunct="1">
-                        <a:lnSpc>
-                          <a:spcPct val="100000"/>
-                        </a:lnSpc>
-                        <a:spcBef>
-                          <a:spcPts val="0"/>
-                        </a:spcBef>
-                        <a:spcAft>
-                          <a:spcPts val="0"/>
-                        </a:spcAft>
-                        <a:buClrTx/>
-                        <a:buSzTx/>
-                        <a:buFontTx/>
-                        <a:buNone/>
-                        <a:tabLst/>
-                        <a:defRPr/>
-                      </a:pPr>
-                      <a:endParaRPr lang="en-US" dirty="0"/>
-                    </a:p>
-                  </a:txBody>
-                  <a:tcPr anchor="ctr"/>
-                </a:tc>
-                <a:tc>
-                  <a:txBody>
-                    <a:bodyPr/>
-                    <a:lstStyle/>
-                    <a:p>
-                      <a:pPr algn="ctr"/>
-                      <a:r>
-                        <a:rPr lang="en-US" dirty="0"/>
-                        <a:t>Instruments + details per one</a:t>
-                      </a:r>
-                      <a:r>
-                        <a:rPr lang="en-US" dirty="0">
-                          <a:solidFill>
-                            <a:srgbClr val="FF0000"/>
-                          </a:solidFill>
-                          <a:sym typeface="Wingdings" panose="05000000000000000000" pitchFamily="2" charset="2"/>
-                        </a:rPr>
-                        <a:t></a:t>
-                      </a:r>
-                      <a:endParaRPr lang="en-US" dirty="0"/>
-                    </a:p>
-                  </a:txBody>
-                  <a:tcPr anchor="ctr"/>
-                </a:tc>
-                <a:extLst>
-                  <a:ext uri="{0D108BD9-81ED-4DB2-BD59-A6C34878D82A}">
-                    <a16:rowId xmlns:a16="http://schemas.microsoft.com/office/drawing/2014/main" val="1286390632"/>
-                  </a:ext>
-                </a:extLst>
-              </a:tr>
-              <a:tr h="509984">
-                <a:tc>
-                  <a:txBody>
-                    <a:bodyPr/>
-                    <a:lstStyle/>
-                    <a:p>
-                      <a:pPr algn="ctr"/>
-                      <a:endParaRPr lang="en-US" dirty="0"/>
-                    </a:p>
-                  </a:txBody>
-                  <a:tcPr anchor="ctr"/>
-                </a:tc>
-                <a:tc>
-                  <a:txBody>
-                    <a:bodyPr/>
-                    <a:lstStyle/>
-                    <a:p>
-                      <a:pPr marL="0" marR="0" lvl="0" indent="0" algn="ctr" defTabSz="914400" rtl="0" eaLnBrk="1" fontAlgn="auto" latinLnBrk="0" hangingPunct="1">
-                        <a:lnSpc>
-                          <a:spcPct val="100000"/>
-                        </a:lnSpc>
-                        <a:spcBef>
-                          <a:spcPts val="0"/>
-                        </a:spcBef>
-                        <a:spcAft>
-                          <a:spcPts val="0"/>
-                        </a:spcAft>
-                        <a:buClrTx/>
-                        <a:buSzTx/>
-                        <a:buFontTx/>
-                        <a:buNone/>
-                        <a:tabLst/>
-                        <a:defRPr/>
-                      </a:pPr>
-                      <a:r>
-                        <a:rPr lang="en-US" dirty="0"/>
-                        <a:t>User </a:t>
-                      </a:r>
-                      <a:r>
-                        <a:rPr lang="en-US" sz="1800" kern="1200" dirty="0">
-                          <a:solidFill>
-                            <a:schemeClr val="dk1"/>
-                          </a:solidFill>
-                          <a:effectLst/>
-                          <a:latin typeface="+mn-lt"/>
-                          <a:ea typeface="+mn-ea"/>
-                          <a:cs typeface="+mn-cs"/>
-                        </a:rPr>
-                        <a:t>Location</a:t>
-                      </a:r>
-                      <a:r>
-                        <a:rPr lang="en-US" dirty="0">
-                          <a:solidFill>
-                            <a:srgbClr val="FF0000"/>
-                          </a:solidFill>
-                          <a:sym typeface="Wingdings" panose="05000000000000000000" pitchFamily="2" charset="2"/>
-                        </a:rPr>
-                        <a:t></a:t>
-                      </a:r>
-                      <a:endParaRPr lang="en-US" dirty="0"/>
-                    </a:p>
-                  </a:txBody>
-                  <a:tcPr anchor="ctr"/>
-                </a:tc>
-                <a:extLst>
-                  <a:ext uri="{0D108BD9-81ED-4DB2-BD59-A6C34878D82A}">
-                    <a16:rowId xmlns:a16="http://schemas.microsoft.com/office/drawing/2014/main" val="787995426"/>
-                  </a:ext>
-                </a:extLst>
-              </a:tr>
-              <a:tr h="509984">
-                <a:tc>
-                  <a:txBody>
-                    <a:bodyPr/>
-                    <a:lstStyle/>
-                    <a:p>
-                      <a:pPr algn="ctr"/>
-                      <a:endParaRPr lang="en-US" dirty="0"/>
-                    </a:p>
-                  </a:txBody>
-                  <a:tcPr anchor="ctr"/>
-                </a:tc>
-                <a:tc>
-                  <a:txBody>
-                    <a:bodyPr/>
-                    <a:lstStyle/>
-                    <a:p>
-                      <a:pPr marL="0" marR="0" lvl="0" indent="0" algn="ctr" defTabSz="914400" rtl="0" eaLnBrk="1" fontAlgn="auto" latinLnBrk="0" hangingPunct="1">
-                        <a:lnSpc>
-                          <a:spcPct val="100000"/>
-                        </a:lnSpc>
-                        <a:spcBef>
-                          <a:spcPts val="0"/>
-                        </a:spcBef>
-                        <a:spcAft>
-                          <a:spcPts val="0"/>
-                        </a:spcAft>
-                        <a:buClrTx/>
-                        <a:buSzTx/>
-                        <a:buFontTx/>
-                        <a:buNone/>
-                        <a:tabLst/>
-                        <a:defRPr/>
-                      </a:pPr>
-                      <a:r>
-                        <a:rPr lang="en-US"/>
-                        <a:t>Age</a:t>
-                      </a:r>
-                      <a:r>
-                        <a:rPr lang="en-US">
-                          <a:solidFill>
-                            <a:srgbClr val="FF0000"/>
-                          </a:solidFill>
-                          <a:sym typeface="Wingdings" panose="05000000000000000000" pitchFamily="2" charset="2"/>
-                        </a:rPr>
-                        <a:t></a:t>
-                      </a:r>
-                      <a:endParaRPr lang="en-US" dirty="0"/>
-                    </a:p>
-                  </a:txBody>
-                  <a:tcPr anchor="ctr"/>
-                </a:tc>
-                <a:extLst>
-                  <a:ext uri="{0D108BD9-81ED-4DB2-BD59-A6C34878D82A}">
-                    <a16:rowId xmlns:a16="http://schemas.microsoft.com/office/drawing/2014/main" val="3148044796"/>
-                  </a:ext>
-                </a:extLst>
-              </a:tr>
-              <a:tr h="509984">
-                <a:tc>
-                  <a:txBody>
-                    <a:bodyPr/>
-                    <a:lstStyle/>
-                    <a:p>
-                      <a:pPr algn="ctr"/>
-                      <a:endParaRPr lang="en-US" dirty="0"/>
-                    </a:p>
-                  </a:txBody>
-                  <a:tcPr anchor="ctr"/>
-                </a:tc>
-                <a:tc>
-                  <a:txBody>
-                    <a:bodyPr/>
-                    <a:lstStyle/>
-                    <a:p>
-                      <a:pPr marL="0" marR="0" lvl="0" indent="0" algn="ctr" defTabSz="914400" rtl="0" eaLnBrk="1" fontAlgn="auto" latinLnBrk="0" hangingPunct="1">
-                        <a:lnSpc>
-                          <a:spcPct val="100000"/>
-                        </a:lnSpc>
-                        <a:spcBef>
-                          <a:spcPts val="0"/>
-                        </a:spcBef>
-                        <a:spcAft>
-                          <a:spcPts val="0"/>
-                        </a:spcAft>
-                        <a:buClrTx/>
-                        <a:buSzTx/>
-                        <a:buFontTx/>
-                        <a:buNone/>
-                        <a:tabLst/>
-                        <a:defRPr/>
-                      </a:pPr>
-                      <a:r>
-                        <a:rPr lang="en-US" dirty="0"/>
-                        <a:t>Name</a:t>
-                      </a:r>
-                      <a:r>
-                        <a:rPr lang="en-US" dirty="0">
-                          <a:solidFill>
-                            <a:srgbClr val="FF0000"/>
-                          </a:solidFill>
-                          <a:sym typeface="Wingdings" panose="05000000000000000000" pitchFamily="2" charset="2"/>
-                        </a:rPr>
-                        <a:t></a:t>
-                      </a:r>
-                      <a:endParaRPr lang="en-US" dirty="0"/>
-                    </a:p>
-                  </a:txBody>
-                  <a:tcPr anchor="ctr"/>
-                </a:tc>
-                <a:extLst>
-                  <a:ext uri="{0D108BD9-81ED-4DB2-BD59-A6C34878D82A}">
-                    <a16:rowId xmlns:a16="http://schemas.microsoft.com/office/drawing/2014/main" val="2921019506"/>
-                  </a:ext>
-                </a:extLst>
-              </a:tr>
-            </a:tbl>
-          </a:graphicData>
-        </a:graphic>
-      </p:graphicFrame>
-      <p:sp>
-        <p:nvSpPr>
-          <p:cNvPr id="6" name="TextBox 5">
-            <a:extLst>
-              <a:ext uri="{FF2B5EF4-FFF2-40B4-BE49-F238E27FC236}">
-                <a16:creationId xmlns:a16="http://schemas.microsoft.com/office/drawing/2014/main" id="{C50DB1BC-E153-4AC7-AE20-770D0C9C0419}"/>
-              </a:ext>
-            </a:extLst>
-          </p:cNvPr>
-          <p:cNvSpPr txBox="1"/>
-          <p:nvPr/>
-        </p:nvSpPr>
-        <p:spPr>
-          <a:xfrm>
-            <a:off x="9182100" y="704740"/>
-            <a:ext cx="2171700" cy="646331"/>
-          </a:xfrm>
-          <a:prstGeom prst="rect">
-            <a:avLst/>
-          </a:prstGeom>
-          <a:noFill/>
-          <a:ln w="38100">
-            <a:solidFill>
-              <a:schemeClr val="tx1">
-                <a:lumMod val="50000"/>
-                <a:lumOff val="50000"/>
-              </a:schemeClr>
-            </a:solidFill>
-          </a:ln>
-        </p:spPr>
-        <p:txBody>
-          <a:bodyPr wrap="square" rtlCol="0">
-            <a:spAutoFit/>
-          </a:bodyPr>
-          <a:lstStyle/>
-          <a:p>
-            <a:r>
-              <a:rPr lang="en-US" dirty="0">
-                <a:solidFill>
-                  <a:srgbClr val="FF0000"/>
-                </a:solidFill>
-                <a:sym typeface="Wingdings" panose="05000000000000000000" pitchFamily="2" charset="2"/>
-              </a:rPr>
-              <a:t> </a:t>
-            </a:r>
-            <a:r>
-              <a:rPr lang="en-US" sz="1400" dirty="0">
-                <a:solidFill>
-                  <a:srgbClr val="FF0000"/>
-                </a:solidFill>
-                <a:sym typeface="Wingdings" panose="05000000000000000000" pitchFamily="2" charset="2"/>
-              </a:rPr>
-              <a:t>Mandatory</a:t>
-            </a:r>
-          </a:p>
-          <a:p>
-            <a:r>
-              <a:rPr lang="en-US" dirty="0">
-                <a:solidFill>
-                  <a:schemeClr val="accent1"/>
-                </a:solidFill>
-                <a:sym typeface="Wingdings" panose="05000000000000000000" pitchFamily="2" charset="2"/>
-              </a:rPr>
-              <a:t> </a:t>
-            </a:r>
-            <a:r>
-              <a:rPr lang="en-US" sz="1400" dirty="0">
-                <a:solidFill>
-                  <a:schemeClr val="accent1"/>
-                </a:solidFill>
-                <a:sym typeface="Wingdings" panose="05000000000000000000" pitchFamily="2" charset="2"/>
-              </a:rPr>
-              <a:t>Optional</a:t>
-            </a:r>
-            <a:endParaRPr lang="en-US" sz="1400" dirty="0">
-              <a:solidFill>
-                <a:schemeClr val="accent1"/>
-              </a:solidFill>
-            </a:endParaRPr>
-          </a:p>
-        </p:txBody>
-      </p:sp>
-    </p:spTree>
-    <p:extLst>
-      <p:ext uri="{BB962C8B-B14F-4D97-AF65-F5344CB8AC3E}">
-        <p14:creationId xmlns:p14="http://schemas.microsoft.com/office/powerpoint/2010/main" val="2205242116"/>
-      </p:ext>
-    </p:extLst>
-  </p:cSld>
-  <p:clrMapOvr>
-    <a:masterClrMapping/>
-  </p:clrMapOvr>
-</p:sld>
-</file>
-
-<file path=ppt/slides/slide11.xml><?xml version="1.0" encoding="utf-8"?>
 <p:sld xmlns:a="http://schemas.openxmlformats.org/drawingml/2006/main" xmlns:r="http://schemas.openxmlformats.org/officeDocument/2006/relationships" xmlns:p="http://schemas.openxmlformats.org/presentationml/2006/main">
   <p:cSld>
     <p:spTree>
@@ -4794,7 +4163,7 @@
 </p:sld>
 </file>
 
-<file path=ppt/slides/slide12.xml><?xml version="1.0" encoding="utf-8"?>
+<file path=ppt/slides/slide11.xml><?xml version="1.0" encoding="utf-8"?>
 <p:sld xmlns:a="http://schemas.openxmlformats.org/drawingml/2006/main" xmlns:r="http://schemas.openxmlformats.org/officeDocument/2006/relationships" xmlns:p="http://schemas.openxmlformats.org/presentationml/2006/main">
   <p:cSld>
     <p:spTree>
@@ -5893,7 +5262,7 @@
 </p:sld>
 </file>
 
-<file path=ppt/slides/slide13.xml><?xml version="1.0" encoding="utf-8"?>
+<file path=ppt/slides/slide12.xml><?xml version="1.0" encoding="utf-8"?>
 <p:sld xmlns:a="http://schemas.openxmlformats.org/drawingml/2006/main" xmlns:r="http://schemas.openxmlformats.org/officeDocument/2006/relationships" xmlns:p="http://schemas.openxmlformats.org/presentationml/2006/main">
   <p:cSld>
     <p:spTree>
@@ -8745,32 +8114,7 @@
                   </a:outerShdw>
                 </a:effectLst>
               </a:rPr>
-              <a:t>Band Search Screen </a:t>
-            </a:r>
-            <a:r>
-              <a:rPr lang="en-US" sz="4400" b="1" i="1" u="sng" dirty="0">
-                <a:effectLst>
-                  <a:outerShdw blurRad="38100" dist="38100" dir="2700000" algn="tl">
-                    <a:srgbClr val="000000">
-                      <a:alpha val="43137"/>
-                    </a:srgbClr>
-                  </a:outerShdw>
-                </a:effectLst>
-                <a:sym typeface="Wingdings" panose="05000000000000000000" pitchFamily="2" charset="2"/>
-              </a:rPr>
-              <a:t> </a:t>
-            </a:r>
-            <a:r>
-              <a:rPr lang="en-US" sz="4400" b="1" i="1" u="sng" dirty="0">
-                <a:effectLst>
-                  <a:outerShdw blurRad="38100" dist="38100" dir="2700000" algn="tl">
-                    <a:srgbClr val="000000">
-                      <a:alpha val="43137"/>
-                    </a:srgbClr>
-                  </a:outerShdw>
-                </a:effectLst>
-              </a:rPr>
-              <a:t>Find a Band</a:t>
+              <a:t>Search Screen</a:t>
             </a:r>
             <a:endParaRPr lang="en-US" b="1" i="1" u="sng" dirty="0">
               <a:effectLst>
@@ -8884,7 +8228,7 @@
         </p:nvSpPr>
         <p:spPr>
           <a:xfrm>
-            <a:off x="4838700" y="3509250"/>
+            <a:off x="4838700" y="3111820"/>
             <a:ext cx="2514600" cy="738664"/>
           </a:xfrm>
           <a:prstGeom prst="rect">
@@ -8933,7 +8277,7 @@
         </p:nvSpPr>
         <p:spPr>
           <a:xfrm>
-            <a:off x="4838700" y="4986578"/>
+            <a:off x="4838700" y="4191718"/>
             <a:ext cx="2514600" cy="738664"/>
           </a:xfrm>
           <a:prstGeom prst="rect">
@@ -8959,7 +8303,7 @@
             <a:pPr algn="ctr"/>
             <a:r>
               <a:rPr lang="en-US" sz="1400" dirty="0"/>
-              <a:t>My Instrument</a:t>
+              <a:t>Instrument</a:t>
             </a:r>
           </a:p>
           <a:p>
@@ -8968,6 +8312,146 @@
           </a:p>
         </p:txBody>
       </p:sp>
+      <p:sp>
+        <p:nvSpPr>
+          <p:cNvPr id="7" name="TextBox 6">
+            <a:extLst>
+              <a:ext uri="{FF2B5EF4-FFF2-40B4-BE49-F238E27FC236}">
+                <a16:creationId xmlns:a16="http://schemas.microsoft.com/office/drawing/2014/main" id="{BE031BFC-C907-406F-BAEF-8691DFD743E8}"/>
+              </a:ext>
+            </a:extLst>
+          </p:cNvPr>
+          <p:cNvSpPr txBox="1"/>
+          <p:nvPr/>
+        </p:nvSpPr>
+        <p:spPr>
+          <a:xfrm>
+            <a:off x="4833614" y="5271616"/>
+            <a:ext cx="2514600" cy="738664"/>
+          </a:xfrm>
+          <a:prstGeom prst="rect">
+            <a:avLst/>
+          </a:prstGeom>
+          <a:noFill/>
+          <a:ln w="38100">
+            <a:solidFill>
+              <a:schemeClr val="tx1"/>
+            </a:solidFill>
+          </a:ln>
+        </p:spPr>
+        <p:txBody>
+          <a:bodyPr wrap="square" rtlCol="0">
+            <a:spAutoFit/>
+          </a:bodyPr>
+          <a:lstStyle/>
+          <a:p>
+            <a:pPr algn="ctr"/>
+            <a:endParaRPr lang="en-US" sz="1400" dirty="0"/>
+          </a:p>
+          <a:p>
+            <a:pPr algn="ctr"/>
+            <a:r>
+              <a:rPr lang="en-US" sz="1400" dirty="0"/>
+              <a:t>Bio</a:t>
+            </a:r>
+          </a:p>
+          <a:p>
+            <a:pPr algn="ctr"/>
+            <a:endParaRPr lang="en-US" sz="1400" dirty="0"/>
+          </a:p>
+        </p:txBody>
+      </p:sp>
+      <p:sp>
+        <p:nvSpPr>
+          <p:cNvPr id="3" name="TextBox 2">
+            <a:extLst>
+              <a:ext uri="{FF2B5EF4-FFF2-40B4-BE49-F238E27FC236}">
+                <a16:creationId xmlns:a16="http://schemas.microsoft.com/office/drawing/2014/main" id="{5B0E6257-94AB-401D-A8CF-25DADE521AEE}"/>
+              </a:ext>
+            </a:extLst>
+          </p:cNvPr>
+          <p:cNvSpPr txBox="1"/>
+          <p:nvPr/>
+        </p:nvSpPr>
+        <p:spPr>
+          <a:xfrm>
+            <a:off x="8687262" y="3244334"/>
+            <a:ext cx="1580225" cy="369332"/>
+          </a:xfrm>
+          <a:prstGeom prst="rect">
+            <a:avLst/>
+          </a:prstGeom>
+          <a:noFill/>
+          <a:ln w="38100">
+            <a:solidFill>
+              <a:schemeClr val="accent1"/>
+            </a:solidFill>
+          </a:ln>
+        </p:spPr>
+        <p:txBody>
+          <a:bodyPr wrap="square" rtlCol="0">
+            <a:spAutoFit/>
+          </a:bodyPr>
+          <a:lstStyle/>
+          <a:p>
+            <a:r>
+              <a:rPr lang="en-US" dirty="0"/>
+              <a:t>For Band Only</a:t>
+            </a:r>
+          </a:p>
+        </p:txBody>
+      </p:sp>
+      <p:cxnSp>
+        <p:nvCxnSpPr>
+          <p:cNvPr id="5" name="Connector: Elbow 4">
+            <a:extLst>
+              <a:ext uri="{FF2B5EF4-FFF2-40B4-BE49-F238E27FC236}">
+                <a16:creationId xmlns:a16="http://schemas.microsoft.com/office/drawing/2014/main" id="{28B7BBCD-DFE8-4319-9642-F05B5E522843}"/>
+              </a:ext>
+            </a:extLst>
+          </p:cNvPr>
+          <p:cNvCxnSpPr>
+            <a:cxnSpLocks/>
+            <a:stCxn id="10" idx="3"/>
+            <a:endCxn id="3" idx="0"/>
+          </p:cNvCxnSpPr>
+          <p:nvPr/>
+        </p:nvCxnSpPr>
+        <p:spPr>
+          <a:xfrm flipV="1">
+            <a:off x="7353300" y="3244334"/>
+            <a:ext cx="2124075" cy="236818"/>
+          </a:xfrm>
+          <a:prstGeom prst="bentConnector4">
+            <a:avLst>
+              <a:gd name="adj1" fmla="val 31401"/>
+              <a:gd name="adj2" fmla="val 252486"/>
+            </a:avLst>
+          </a:prstGeom>
+          <a:ln w="38100">
+            <a:solidFill>
+              <a:schemeClr val="accent2">
+                <a:lumMod val="75000"/>
+              </a:schemeClr>
+            </a:solidFill>
+            <a:tailEnd type="triangle"/>
+          </a:ln>
+        </p:spPr>
+        <p:style>
+          <a:lnRef idx="1">
+            <a:schemeClr val="accent1"/>
+          </a:lnRef>
+          <a:fillRef idx="0">
+            <a:schemeClr val="accent1"/>
+          </a:fillRef>
+          <a:effectRef idx="0">
+            <a:schemeClr val="accent1"/>
+          </a:effectRef>
+          <a:fontRef idx="minor">
+            <a:schemeClr val="tx1"/>
+          </a:fontRef>
+        </p:style>
+      </p:cxnSp>
     </p:spTree>
     <p:extLst>
       <p:ext uri="{BB962C8B-B14F-4D97-AF65-F5344CB8AC3E}">
@@ -9003,292 +8487,6 @@
           <p:cNvPr id="2" name="Title 1">
             <a:extLst>
               <a:ext uri="{FF2B5EF4-FFF2-40B4-BE49-F238E27FC236}">
-                <a16:creationId xmlns:a16="http://schemas.microsoft.com/office/drawing/2014/main" id="{0082F327-D34C-45CB-A75D-B8D15DFC7073}"/>
-              </a:ext>
-            </a:extLst>
-          </p:cNvPr>
-          <p:cNvSpPr>
-            <a:spLocks noGrp="1"/>
-          </p:cNvSpPr>
-          <p:nvPr>
-            <p:ph type="title"/>
-          </p:nvPr>
-        </p:nvSpPr>
-        <p:spPr/>
-        <p:txBody>
-          <a:bodyPr>
-            <a:normAutofit/>
-          </a:bodyPr>
-          <a:lstStyle/>
-          <a:p>
-            <a:r>
-              <a:rPr lang="en-US" sz="4400" b="1" i="1" u="sng" dirty="0">
-                <a:effectLst>
-                  <a:outerShdw blurRad="38100" dist="38100" dir="2700000" algn="tl">
-                    <a:srgbClr val="000000">
-                      <a:alpha val="43137"/>
-                    </a:srgbClr>
-                  </a:outerShdw>
-                </a:effectLst>
-              </a:rPr>
-              <a:t>Musician Search Screen </a:t>
-            </a:r>
-            <a:r>
-              <a:rPr lang="en-US" sz="4400" b="1" i="1" u="sng" dirty="0">
-                <a:effectLst>
-                  <a:outerShdw blurRad="38100" dist="38100" dir="2700000" algn="tl">
-                    <a:srgbClr val="000000">
-                      <a:alpha val="43137"/>
-                    </a:srgbClr>
-                  </a:outerShdw>
-                </a:effectLst>
-                <a:sym typeface="Wingdings" panose="05000000000000000000" pitchFamily="2" charset="2"/>
-              </a:rPr>
-              <a:t> </a:t>
-            </a:r>
-            <a:r>
-              <a:rPr lang="en-US" sz="4400" b="1" i="1" u="sng" dirty="0">
-                <a:effectLst>
-                  <a:outerShdw blurRad="38100" dist="38100" dir="2700000" algn="tl">
-                    <a:srgbClr val="000000">
-                      <a:alpha val="43137"/>
-                    </a:srgbClr>
-                  </a:outerShdw>
-                </a:effectLst>
-              </a:rPr>
-              <a:t>Find a Musician</a:t>
-            </a:r>
-            <a:endParaRPr lang="en-US" b="1" i="1" u="sng" dirty="0">
-              <a:effectLst>
-                <a:outerShdw blurRad="38100" dist="38100" dir="2700000" algn="tl">
-                  <a:srgbClr val="000000">
-                    <a:alpha val="43137"/>
-                  </a:srgbClr>
-                </a:outerShdw>
-              </a:effectLst>
-            </a:endParaRPr>
-          </a:p>
-        </p:txBody>
-      </p:sp>
-      <p:sp>
-        <p:nvSpPr>
-          <p:cNvPr id="5" name="TextBox 4">
-            <a:extLst>
-              <a:ext uri="{FF2B5EF4-FFF2-40B4-BE49-F238E27FC236}">
-                <a16:creationId xmlns:a16="http://schemas.microsoft.com/office/drawing/2014/main" id="{DEA59934-2927-415C-A4BE-FC714F543CE1}"/>
-              </a:ext>
-            </a:extLst>
-          </p:cNvPr>
-          <p:cNvSpPr txBox="1"/>
-          <p:nvPr/>
-        </p:nvSpPr>
-        <p:spPr>
-          <a:xfrm>
-            <a:off x="4607510" y="1690687"/>
-            <a:ext cx="2993439" cy="4967287"/>
-          </a:xfrm>
-          <a:prstGeom prst="rect">
-            <a:avLst/>
-          </a:prstGeom>
-          <a:noFill/>
-          <a:ln w="38100">
-            <a:solidFill>
-              <a:schemeClr val="tx1"/>
-            </a:solidFill>
-          </a:ln>
-        </p:spPr>
-        <p:txBody>
-          <a:bodyPr wrap="square" rtlCol="0">
-            <a:spAutoFit/>
-          </a:bodyPr>
-          <a:lstStyle/>
-          <a:p>
-            <a:endParaRPr lang="en-US" dirty="0"/>
-          </a:p>
-        </p:txBody>
-      </p:sp>
-      <p:sp>
-        <p:nvSpPr>
-          <p:cNvPr id="6" name="TextBox 5">
-            <a:extLst>
-              <a:ext uri="{FF2B5EF4-FFF2-40B4-BE49-F238E27FC236}">
-                <a16:creationId xmlns:a16="http://schemas.microsoft.com/office/drawing/2014/main" id="{E80F52DF-C86F-4CE8-B8A7-251CCDF2E7EE}"/>
-              </a:ext>
-            </a:extLst>
-          </p:cNvPr>
-          <p:cNvSpPr txBox="1"/>
-          <p:nvPr/>
-        </p:nvSpPr>
-        <p:spPr>
-          <a:xfrm>
-            <a:off x="4838700" y="2031922"/>
-            <a:ext cx="2514600" cy="738664"/>
-          </a:xfrm>
-          <a:prstGeom prst="rect">
-            <a:avLst/>
-          </a:prstGeom>
-          <a:noFill/>
-          <a:ln w="38100">
-            <a:solidFill>
-              <a:schemeClr val="tx1"/>
-            </a:solidFill>
-          </a:ln>
-        </p:spPr>
-        <p:txBody>
-          <a:bodyPr wrap="square" rtlCol="0">
-            <a:spAutoFit/>
-          </a:bodyPr>
-          <a:lstStyle/>
-          <a:p>
-            <a:pPr algn="ctr"/>
-            <a:endParaRPr lang="en-US" sz="1400" dirty="0"/>
-          </a:p>
-          <a:p>
-            <a:pPr algn="ctr"/>
-            <a:r>
-              <a:rPr lang="en-US" sz="1400" dirty="0"/>
-              <a:t>Location of Search</a:t>
-            </a:r>
-          </a:p>
-          <a:p>
-            <a:pPr algn="ctr"/>
-            <a:endParaRPr lang="en-US" sz="1400" dirty="0"/>
-          </a:p>
-        </p:txBody>
-      </p:sp>
-      <p:sp>
-        <p:nvSpPr>
-          <p:cNvPr id="7" name="TextBox 6">
-            <a:extLst>
-              <a:ext uri="{FF2B5EF4-FFF2-40B4-BE49-F238E27FC236}">
-                <a16:creationId xmlns:a16="http://schemas.microsoft.com/office/drawing/2014/main" id="{EAC28996-666D-4391-BCC7-821DAFE9213C}"/>
-              </a:ext>
-            </a:extLst>
-          </p:cNvPr>
-          <p:cNvSpPr txBox="1"/>
-          <p:nvPr/>
-        </p:nvSpPr>
-        <p:spPr>
-          <a:xfrm>
-            <a:off x="4838700" y="3509250"/>
-            <a:ext cx="2514600" cy="738664"/>
-          </a:xfrm>
-          <a:prstGeom prst="rect">
-            <a:avLst/>
-          </a:prstGeom>
-          <a:noFill/>
-          <a:ln w="38100">
-            <a:solidFill>
-              <a:schemeClr val="tx1"/>
-            </a:solidFill>
-          </a:ln>
-        </p:spPr>
-        <p:txBody>
-          <a:bodyPr wrap="square" rtlCol="0">
-            <a:spAutoFit/>
-          </a:bodyPr>
-          <a:lstStyle/>
-          <a:p>
-            <a:pPr algn="ctr"/>
-            <a:endParaRPr lang="en-US" sz="1400" dirty="0"/>
-          </a:p>
-          <a:p>
-            <a:pPr algn="ctr"/>
-            <a:r>
-              <a:rPr lang="en-US" sz="1400" dirty="0"/>
-              <a:t>Genre Required</a:t>
-            </a:r>
-          </a:p>
-          <a:p>
-            <a:pPr algn="ctr"/>
-            <a:endParaRPr lang="en-US" sz="1400" dirty="0"/>
-          </a:p>
-        </p:txBody>
-      </p:sp>
-      <p:sp>
-        <p:nvSpPr>
-          <p:cNvPr id="8" name="TextBox 7">
-            <a:extLst>
-              <a:ext uri="{FF2B5EF4-FFF2-40B4-BE49-F238E27FC236}">
-                <a16:creationId xmlns:a16="http://schemas.microsoft.com/office/drawing/2014/main" id="{18543672-2E00-43D4-AF39-CA2DEBFAD160}"/>
-              </a:ext>
-            </a:extLst>
-          </p:cNvPr>
-          <p:cNvSpPr txBox="1"/>
-          <p:nvPr/>
-        </p:nvSpPr>
-        <p:spPr>
-          <a:xfrm>
-            <a:off x="4838700" y="4986578"/>
-            <a:ext cx="2514600" cy="738664"/>
-          </a:xfrm>
-          <a:prstGeom prst="rect">
-            <a:avLst/>
-          </a:prstGeom>
-          <a:noFill/>
-          <a:ln w="38100">
-            <a:solidFill>
-              <a:schemeClr val="tx1"/>
-            </a:solidFill>
-          </a:ln>
-        </p:spPr>
-        <p:txBody>
-          <a:bodyPr wrap="square" rtlCol="0">
-            <a:spAutoFit/>
-          </a:bodyPr>
-          <a:lstStyle/>
-          <a:p>
-            <a:pPr algn="ctr"/>
-            <a:endParaRPr lang="en-US" sz="1400" dirty="0"/>
-          </a:p>
-          <a:p>
-            <a:pPr algn="ctr"/>
-            <a:r>
-              <a:rPr lang="en-US" sz="1400" dirty="0"/>
-              <a:t>Instrument Required</a:t>
-            </a:r>
-          </a:p>
-          <a:p>
-            <a:pPr algn="ctr"/>
-            <a:endParaRPr lang="en-US" sz="1400" dirty="0"/>
-          </a:p>
-        </p:txBody>
-      </p:sp>
-    </p:spTree>
-    <p:extLst>
-      <p:ext uri="{BB962C8B-B14F-4D97-AF65-F5344CB8AC3E}">
-        <p14:creationId xmlns:p14="http://schemas.microsoft.com/office/powerpoint/2010/main" val="2403300514"/>
-      </p:ext>
-    </p:extLst>
-  </p:cSld>
-  <p:clrMapOvr>
-    <a:masterClrMapping/>
-  </p:clrMapOvr>
-</p:sld>
-</file>
-
-<file path=ppt/slides/slide8.xml><?xml version="1.0" encoding="utf-8"?>
-<p:sld xmlns:a="http://schemas.openxmlformats.org/drawingml/2006/main" xmlns:r="http://schemas.openxmlformats.org/officeDocument/2006/relationships" xmlns:p="http://schemas.openxmlformats.org/presentationml/2006/main">
-  <p:cSld>
-    <p:spTree>
-      <p:nvGrpSpPr>
-        <p:cNvPr id="1" name=""/>
-        <p:cNvGrpSpPr/>
-        <p:nvPr/>
-      </p:nvGrpSpPr>
-      <p:grpSpPr>
-        <a:xfrm>
-          <a:off x="0" y="0"/>
-          <a:ext cx="0" cy="0"/>
-          <a:chOff x="0" y="0"/>
-          <a:chExt cx="0" cy="0"/>
-        </a:xfrm>
-      </p:grpSpPr>
-      <p:sp>
-        <p:nvSpPr>
-          <p:cNvPr id="2" name="Title 1">
-            <a:extLst>
-              <a:ext uri="{FF2B5EF4-FFF2-40B4-BE49-F238E27FC236}">
                 <a16:creationId xmlns:a16="http://schemas.microsoft.com/office/drawing/2014/main" id="{57159C27-82A0-4556-BAD1-48F1C6ED5025}"/>
               </a:ext>
             </a:extLst>
@@ -10110,10 +9308,1240 @@
           </a:p>
         </p:txBody>
       </p:sp>
+      <p:sp>
+        <p:nvSpPr>
+          <p:cNvPr id="18" name="TextBox 17">
+            <a:extLst>
+              <a:ext uri="{FF2B5EF4-FFF2-40B4-BE49-F238E27FC236}">
+                <a16:creationId xmlns:a16="http://schemas.microsoft.com/office/drawing/2014/main" id="{0BB1784E-63C7-4932-9A4D-0CDE186FA8BB}"/>
+              </a:ext>
+            </a:extLst>
+          </p:cNvPr>
+          <p:cNvSpPr txBox="1"/>
+          <p:nvPr/>
+        </p:nvSpPr>
+        <p:spPr>
+          <a:xfrm>
+            <a:off x="2152646" y="5778342"/>
+            <a:ext cx="2505075" cy="738664"/>
+          </a:xfrm>
+          <a:prstGeom prst="rect">
+            <a:avLst/>
+          </a:prstGeom>
+          <a:noFill/>
+          <a:ln w="38100">
+            <a:solidFill>
+              <a:schemeClr val="tx1"/>
+            </a:solidFill>
+          </a:ln>
+        </p:spPr>
+        <p:txBody>
+          <a:bodyPr wrap="square" rtlCol="0">
+            <a:spAutoFit/>
+          </a:bodyPr>
+          <a:lstStyle/>
+          <a:p>
+            <a:pPr algn="ctr"/>
+            <a:endParaRPr lang="en-US" sz="1400" dirty="0"/>
+          </a:p>
+          <a:p>
+            <a:pPr algn="ctr"/>
+            <a:r>
+              <a:rPr lang="en-US" sz="1400" dirty="0"/>
+              <a:t>Musician Bio</a:t>
+            </a:r>
+          </a:p>
+          <a:p>
+            <a:pPr algn="ctr"/>
+            <a:endParaRPr lang="en-US" sz="1400" dirty="0"/>
+          </a:p>
+        </p:txBody>
+      </p:sp>
     </p:spTree>
     <p:extLst>
       <p:ext uri="{BB962C8B-B14F-4D97-AF65-F5344CB8AC3E}">
         <p14:creationId xmlns:p14="http://schemas.microsoft.com/office/powerpoint/2010/main" val="4166473963"/>
+      </p:ext>
+    </p:extLst>
+  </p:cSld>
+  <p:clrMapOvr>
+    <a:masterClrMapping/>
+  </p:clrMapOvr>
+</p:sld>
+</file>
+
+<file path=ppt/slides/slide8.xml><?xml version="1.0" encoding="utf-8"?>
+<p:sld xmlns:a="http://schemas.openxmlformats.org/drawingml/2006/main" xmlns:r="http://schemas.openxmlformats.org/officeDocument/2006/relationships" xmlns:p="http://schemas.openxmlformats.org/presentationml/2006/main">
+  <p:cSld>
+    <p:spTree>
+      <p:nvGrpSpPr>
+        <p:cNvPr id="1" name=""/>
+        <p:cNvGrpSpPr/>
+        <p:nvPr/>
+      </p:nvGrpSpPr>
+      <p:grpSpPr>
+        <a:xfrm>
+          <a:off x="0" y="0"/>
+          <a:ext cx="0" cy="0"/>
+          <a:chOff x="0" y="0"/>
+          <a:chExt cx="0" cy="0"/>
+        </a:xfrm>
+      </p:grpSpPr>
+      <p:sp>
+        <p:nvSpPr>
+          <p:cNvPr id="2" name="Title 1">
+            <a:extLst>
+              <a:ext uri="{FF2B5EF4-FFF2-40B4-BE49-F238E27FC236}">
+                <a16:creationId xmlns:a16="http://schemas.microsoft.com/office/drawing/2014/main" id="{3B0E6CD8-2EE9-4D93-919B-2E506565E236}"/>
+              </a:ext>
+            </a:extLst>
+          </p:cNvPr>
+          <p:cNvSpPr>
+            <a:spLocks noGrp="1"/>
+          </p:cNvSpPr>
+          <p:nvPr>
+            <p:ph type="title"/>
+          </p:nvPr>
+        </p:nvSpPr>
+        <p:spPr/>
+        <p:txBody>
+          <a:bodyPr/>
+          <a:lstStyle/>
+          <a:p>
+            <a:r>
+              <a:rPr lang="en-US" b="1" i="1" u="sng" dirty="0">
+                <a:effectLst>
+                  <a:outerShdw blurRad="38100" dist="38100" dir="2700000" algn="tl">
+                    <a:srgbClr val="000000">
+                      <a:alpha val="43137"/>
+                    </a:srgbClr>
+                  </a:outerShdw>
+                </a:effectLst>
+              </a:rPr>
+              <a:t>Publish Dataset</a:t>
+            </a:r>
+          </a:p>
+        </p:txBody>
+      </p:sp>
+      <p:sp>
+        <p:nvSpPr>
+          <p:cNvPr id="4" name="TextBox 3">
+            <a:extLst>
+              <a:ext uri="{FF2B5EF4-FFF2-40B4-BE49-F238E27FC236}">
+                <a16:creationId xmlns:a16="http://schemas.microsoft.com/office/drawing/2014/main" id="{41F12315-E091-4F16-AA81-14C765050F09}"/>
+              </a:ext>
+            </a:extLst>
+          </p:cNvPr>
+          <p:cNvSpPr txBox="1"/>
+          <p:nvPr/>
+        </p:nvSpPr>
+        <p:spPr>
+          <a:xfrm>
+            <a:off x="5248275" y="1321356"/>
+            <a:ext cx="1695450" cy="369332"/>
+          </a:xfrm>
+          <a:prstGeom prst="rect">
+            <a:avLst/>
+          </a:prstGeom>
+          <a:noFill/>
+          <a:ln w="50800">
+            <a:solidFill>
+              <a:schemeClr val="tx1"/>
+            </a:solidFill>
+          </a:ln>
+        </p:spPr>
+        <p:txBody>
+          <a:bodyPr wrap="square" rtlCol="0">
+            <a:spAutoFit/>
+          </a:bodyPr>
+          <a:lstStyle/>
+          <a:p>
+            <a:pPr algn="ctr"/>
+            <a:r>
+              <a:rPr lang="en-US" b="1" i="1" u="sng" dirty="0">
+                <a:effectLst>
+                  <a:outerShdw blurRad="38100" dist="38100" dir="2700000" algn="tl">
+                    <a:srgbClr val="000000">
+                      <a:alpha val="43137"/>
+                    </a:srgbClr>
+                  </a:outerShdw>
+                </a:effectLst>
+              </a:rPr>
+              <a:t>Publishment</a:t>
+            </a:r>
+          </a:p>
+        </p:txBody>
+      </p:sp>
+      <p:sp>
+        <p:nvSpPr>
+          <p:cNvPr id="5" name="Oval 4">
+            <a:extLst>
+              <a:ext uri="{FF2B5EF4-FFF2-40B4-BE49-F238E27FC236}">
+                <a16:creationId xmlns:a16="http://schemas.microsoft.com/office/drawing/2014/main" id="{3C5EB8A4-5208-4F37-BF20-A06E51424809}"/>
+              </a:ext>
+            </a:extLst>
+          </p:cNvPr>
+          <p:cNvSpPr/>
+          <p:nvPr/>
+        </p:nvSpPr>
+        <p:spPr>
+          <a:xfrm>
+            <a:off x="3048001" y="2009774"/>
+            <a:ext cx="1638300" cy="733425"/>
+          </a:xfrm>
+          <a:prstGeom prst="ellipse">
+            <a:avLst/>
+          </a:prstGeom>
+          <a:noFill/>
+          <a:ln w="38100">
+            <a:solidFill>
+              <a:schemeClr val="tx1"/>
+            </a:solidFill>
+          </a:ln>
+        </p:spPr>
+        <p:style>
+          <a:lnRef idx="2">
+            <a:schemeClr val="accent1">
+              <a:shade val="50000"/>
+            </a:schemeClr>
+          </a:lnRef>
+          <a:fillRef idx="1">
+            <a:schemeClr val="accent1"/>
+          </a:fillRef>
+          <a:effectRef idx="0">
+            <a:schemeClr val="accent1"/>
+          </a:effectRef>
+          <a:fontRef idx="minor">
+            <a:schemeClr val="lt1"/>
+          </a:fontRef>
+        </p:style>
+        <p:txBody>
+          <a:bodyPr rtlCol="0" anchor="ctr"/>
+          <a:lstStyle/>
+          <a:p>
+            <a:pPr algn="ctr"/>
+            <a:r>
+              <a:rPr lang="en-US" dirty="0">
+                <a:solidFill>
+                  <a:schemeClr val="tx1"/>
+                </a:solidFill>
+              </a:rPr>
+              <a:t>Musician</a:t>
+            </a:r>
+          </a:p>
+        </p:txBody>
+      </p:sp>
+      <p:sp>
+        <p:nvSpPr>
+          <p:cNvPr id="6" name="Oval 5">
+            <a:extLst>
+              <a:ext uri="{FF2B5EF4-FFF2-40B4-BE49-F238E27FC236}">
+                <a16:creationId xmlns:a16="http://schemas.microsoft.com/office/drawing/2014/main" id="{78286BC0-6589-4777-B4B6-150651FE417A}"/>
+              </a:ext>
+            </a:extLst>
+          </p:cNvPr>
+          <p:cNvSpPr/>
+          <p:nvPr/>
+        </p:nvSpPr>
+        <p:spPr>
+          <a:xfrm>
+            <a:off x="7505701" y="2009774"/>
+            <a:ext cx="1638300" cy="733425"/>
+          </a:xfrm>
+          <a:prstGeom prst="ellipse">
+            <a:avLst/>
+          </a:prstGeom>
+          <a:noFill/>
+          <a:ln w="38100">
+            <a:solidFill>
+              <a:schemeClr val="tx1"/>
+            </a:solidFill>
+          </a:ln>
+        </p:spPr>
+        <p:style>
+          <a:lnRef idx="2">
+            <a:schemeClr val="accent1">
+              <a:shade val="50000"/>
+            </a:schemeClr>
+          </a:lnRef>
+          <a:fillRef idx="1">
+            <a:schemeClr val="accent1"/>
+          </a:fillRef>
+          <a:effectRef idx="0">
+            <a:schemeClr val="accent1"/>
+          </a:effectRef>
+          <a:fontRef idx="minor">
+            <a:schemeClr val="lt1"/>
+          </a:fontRef>
+        </p:style>
+        <p:txBody>
+          <a:bodyPr rtlCol="0" anchor="ctr"/>
+          <a:lstStyle/>
+          <a:p>
+            <a:pPr algn="ctr"/>
+            <a:r>
+              <a:rPr lang="en-US" dirty="0">
+                <a:solidFill>
+                  <a:schemeClr val="tx1"/>
+                </a:solidFill>
+              </a:rPr>
+              <a:t>Band</a:t>
+            </a:r>
+          </a:p>
+        </p:txBody>
+      </p:sp>
+      <p:sp>
+        <p:nvSpPr>
+          <p:cNvPr id="8" name="TextBox 7">
+            <a:extLst>
+              <a:ext uri="{FF2B5EF4-FFF2-40B4-BE49-F238E27FC236}">
+                <a16:creationId xmlns:a16="http://schemas.microsoft.com/office/drawing/2014/main" id="{C51CCC77-5836-4745-A372-07577990BD04}"/>
+              </a:ext>
+            </a:extLst>
+          </p:cNvPr>
+          <p:cNvSpPr txBox="1"/>
+          <p:nvPr/>
+        </p:nvSpPr>
+        <p:spPr>
+          <a:xfrm>
+            <a:off x="838200" y="3244334"/>
+            <a:ext cx="1952626" cy="369332"/>
+          </a:xfrm>
+          <a:prstGeom prst="rect">
+            <a:avLst/>
+          </a:prstGeom>
+          <a:noFill/>
+          <a:ln w="38100">
+            <a:solidFill>
+              <a:schemeClr val="tx1"/>
+            </a:solidFill>
+          </a:ln>
+        </p:spPr>
+        <p:txBody>
+          <a:bodyPr wrap="square" rtlCol="0">
+            <a:spAutoFit/>
+          </a:bodyPr>
+          <a:lstStyle/>
+          <a:p>
+            <a:pPr algn="ctr"/>
+            <a:r>
+              <a:rPr lang="en-US" b="1" u="sng" dirty="0">
+                <a:effectLst>
+                  <a:outerShdw blurRad="38100" dist="38100" dir="2700000" algn="tl">
+                    <a:srgbClr val="000000">
+                      <a:alpha val="43137"/>
+                    </a:srgbClr>
+                  </a:outerShdw>
+                </a:effectLst>
+              </a:rPr>
+              <a:t>Key</a:t>
+            </a:r>
+            <a:r>
+              <a:rPr lang="en-US" b="1" dirty="0">
+                <a:sym typeface="Wingdings" panose="05000000000000000000" pitchFamily="2" charset="2"/>
+              </a:rPr>
+              <a:t> </a:t>
+            </a:r>
+            <a:r>
+              <a:rPr lang="en-US" sz="1200" b="1" dirty="0">
+                <a:solidFill>
+                  <a:schemeClr val="tx1">
+                    <a:lumMod val="50000"/>
+                    <a:lumOff val="50000"/>
+                  </a:schemeClr>
+                </a:solidFill>
+                <a:sym typeface="Wingdings" panose="05000000000000000000" pitchFamily="2" charset="2"/>
+              </a:rPr>
+              <a:t>(Username)</a:t>
+            </a:r>
+            <a:endParaRPr lang="en-US" sz="1200" b="1" dirty="0">
+              <a:solidFill>
+                <a:schemeClr val="tx1">
+                  <a:lumMod val="50000"/>
+                  <a:lumOff val="50000"/>
+                </a:schemeClr>
+              </a:solidFill>
+            </a:endParaRPr>
+          </a:p>
+        </p:txBody>
+      </p:sp>
+      <p:sp>
+        <p:nvSpPr>
+          <p:cNvPr id="9" name="TextBox 8">
+            <a:extLst>
+              <a:ext uri="{FF2B5EF4-FFF2-40B4-BE49-F238E27FC236}">
+                <a16:creationId xmlns:a16="http://schemas.microsoft.com/office/drawing/2014/main" id="{C45E3813-26E2-491C-82D4-F6FD6D6FBBBF}"/>
+              </a:ext>
+            </a:extLst>
+          </p:cNvPr>
+          <p:cNvSpPr txBox="1"/>
+          <p:nvPr/>
+        </p:nvSpPr>
+        <p:spPr>
+          <a:xfrm>
+            <a:off x="838200" y="3948410"/>
+            <a:ext cx="1952626" cy="369332"/>
+          </a:xfrm>
+          <a:prstGeom prst="rect">
+            <a:avLst/>
+          </a:prstGeom>
+          <a:noFill/>
+          <a:ln w="38100">
+            <a:solidFill>
+              <a:schemeClr val="tx1"/>
+            </a:solidFill>
+          </a:ln>
+        </p:spPr>
+        <p:txBody>
+          <a:bodyPr wrap="square" rtlCol="0">
+            <a:spAutoFit/>
+          </a:bodyPr>
+          <a:lstStyle/>
+          <a:p>
+            <a:pPr algn="ctr"/>
+            <a:r>
+              <a:rPr lang="en-US" sz="1800" dirty="0"/>
+              <a:t>Location</a:t>
+            </a:r>
+            <a:r>
+              <a:rPr lang="en-US" sz="1200" dirty="0">
+                <a:solidFill>
+                  <a:schemeClr val="tx1">
+                    <a:lumMod val="50000"/>
+                    <a:lumOff val="50000"/>
+                  </a:schemeClr>
+                </a:solidFill>
+                <a:effectLst>
+                  <a:outerShdw blurRad="38100" dist="38100" dir="2700000" algn="tl">
+                    <a:srgbClr val="000000">
+                      <a:alpha val="43137"/>
+                    </a:srgbClr>
+                  </a:outerShdw>
+                </a:effectLst>
+              </a:rPr>
+              <a:t>(String)</a:t>
+            </a:r>
+          </a:p>
+        </p:txBody>
+      </p:sp>
+      <p:sp>
+        <p:nvSpPr>
+          <p:cNvPr id="10" name="TextBox 9">
+            <a:extLst>
+              <a:ext uri="{FF2B5EF4-FFF2-40B4-BE49-F238E27FC236}">
+                <a16:creationId xmlns:a16="http://schemas.microsoft.com/office/drawing/2014/main" id="{C1C8CB04-0B54-4F58-9EDE-6981B617179B}"/>
+              </a:ext>
+            </a:extLst>
+          </p:cNvPr>
+          <p:cNvSpPr txBox="1"/>
+          <p:nvPr/>
+        </p:nvSpPr>
+        <p:spPr>
+          <a:xfrm>
+            <a:off x="838200" y="4652486"/>
+            <a:ext cx="1952626" cy="553998"/>
+          </a:xfrm>
+          <a:prstGeom prst="rect">
+            <a:avLst/>
+          </a:prstGeom>
+          <a:noFill/>
+          <a:ln w="38100">
+            <a:solidFill>
+              <a:schemeClr val="tx1"/>
+            </a:solidFill>
+          </a:ln>
+        </p:spPr>
+        <p:txBody>
+          <a:bodyPr wrap="square" rtlCol="0">
+            <a:spAutoFit/>
+          </a:bodyPr>
+          <a:lstStyle/>
+          <a:p>
+            <a:pPr algn="ctr"/>
+            <a:r>
+              <a:rPr lang="en-US" dirty="0"/>
+              <a:t>My Instrument</a:t>
+            </a:r>
+            <a:r>
+              <a:rPr lang="en-US" sz="1800" dirty="0">
+                <a:solidFill>
+                  <a:schemeClr val="tx1">
+                    <a:lumMod val="50000"/>
+                    <a:lumOff val="50000"/>
+                  </a:schemeClr>
+                </a:solidFill>
+                <a:effectLst>
+                  <a:outerShdw blurRad="38100" dist="38100" dir="2700000" algn="tl">
+                    <a:srgbClr val="000000">
+                      <a:alpha val="43137"/>
+                    </a:srgbClr>
+                  </a:outerShdw>
+                </a:effectLst>
+              </a:rPr>
+              <a:t> </a:t>
+            </a:r>
+            <a:r>
+              <a:rPr lang="en-US" sz="1200" dirty="0">
+                <a:solidFill>
+                  <a:schemeClr val="tx1">
+                    <a:lumMod val="50000"/>
+                    <a:lumOff val="50000"/>
+                  </a:schemeClr>
+                </a:solidFill>
+                <a:effectLst>
+                  <a:outerShdw blurRad="38100" dist="38100" dir="2700000" algn="tl">
+                    <a:srgbClr val="000000">
+                      <a:alpha val="43137"/>
+                    </a:srgbClr>
+                  </a:outerShdw>
+                </a:effectLst>
+              </a:rPr>
+              <a:t>(String)</a:t>
+            </a:r>
+            <a:endParaRPr lang="en-US" sz="1200" dirty="0"/>
+          </a:p>
+        </p:txBody>
+      </p:sp>
+      <p:sp>
+        <p:nvSpPr>
+          <p:cNvPr id="11" name="TextBox 10">
+            <a:extLst>
+              <a:ext uri="{FF2B5EF4-FFF2-40B4-BE49-F238E27FC236}">
+                <a16:creationId xmlns:a16="http://schemas.microsoft.com/office/drawing/2014/main" id="{858AFF6A-75A9-4324-B25F-AEF5755E3EE5}"/>
+              </a:ext>
+            </a:extLst>
+          </p:cNvPr>
+          <p:cNvSpPr txBox="1"/>
+          <p:nvPr/>
+        </p:nvSpPr>
+        <p:spPr>
+          <a:xfrm>
+            <a:off x="9144002" y="3244334"/>
+            <a:ext cx="2209798" cy="369332"/>
+          </a:xfrm>
+          <a:prstGeom prst="rect">
+            <a:avLst/>
+          </a:prstGeom>
+          <a:noFill/>
+          <a:ln w="38100">
+            <a:solidFill>
+              <a:schemeClr val="tx1"/>
+            </a:solidFill>
+          </a:ln>
+        </p:spPr>
+        <p:txBody>
+          <a:bodyPr wrap="square" rtlCol="0">
+            <a:spAutoFit/>
+          </a:bodyPr>
+          <a:lstStyle/>
+          <a:p>
+            <a:pPr algn="ctr"/>
+            <a:r>
+              <a:rPr lang="en-US" dirty="0"/>
+              <a:t>Band Name</a:t>
+            </a:r>
+            <a:r>
+              <a:rPr lang="en-US" sz="1800" dirty="0">
+                <a:solidFill>
+                  <a:schemeClr val="tx1">
+                    <a:lumMod val="50000"/>
+                    <a:lumOff val="50000"/>
+                  </a:schemeClr>
+                </a:solidFill>
+                <a:effectLst>
+                  <a:outerShdw blurRad="38100" dist="38100" dir="2700000" algn="tl">
+                    <a:srgbClr val="000000">
+                      <a:alpha val="43137"/>
+                    </a:srgbClr>
+                  </a:outerShdw>
+                </a:effectLst>
+              </a:rPr>
+              <a:t> </a:t>
+            </a:r>
+            <a:r>
+              <a:rPr lang="en-US" sz="1200" dirty="0">
+                <a:solidFill>
+                  <a:schemeClr val="tx1">
+                    <a:lumMod val="50000"/>
+                    <a:lumOff val="50000"/>
+                  </a:schemeClr>
+                </a:solidFill>
+                <a:effectLst>
+                  <a:outerShdw blurRad="38100" dist="38100" dir="2700000" algn="tl">
+                    <a:srgbClr val="000000">
+                      <a:alpha val="43137"/>
+                    </a:srgbClr>
+                  </a:outerShdw>
+                </a:effectLst>
+              </a:rPr>
+              <a:t>(String)</a:t>
+            </a:r>
+            <a:endParaRPr lang="en-US" sz="1200" dirty="0"/>
+          </a:p>
+        </p:txBody>
+      </p:sp>
+      <p:sp>
+        <p:nvSpPr>
+          <p:cNvPr id="12" name="TextBox 11">
+            <a:extLst>
+              <a:ext uri="{FF2B5EF4-FFF2-40B4-BE49-F238E27FC236}">
+                <a16:creationId xmlns:a16="http://schemas.microsoft.com/office/drawing/2014/main" id="{06F84E4B-4D9B-4460-9001-E7B1C6D190B1}"/>
+              </a:ext>
+            </a:extLst>
+          </p:cNvPr>
+          <p:cNvSpPr txBox="1"/>
+          <p:nvPr/>
+        </p:nvSpPr>
+        <p:spPr>
+          <a:xfrm>
+            <a:off x="9144002" y="3948410"/>
+            <a:ext cx="2209798" cy="369332"/>
+          </a:xfrm>
+          <a:prstGeom prst="rect">
+            <a:avLst/>
+          </a:prstGeom>
+          <a:noFill/>
+          <a:ln w="38100">
+            <a:solidFill>
+              <a:schemeClr val="tx1"/>
+            </a:solidFill>
+          </a:ln>
+        </p:spPr>
+        <p:txBody>
+          <a:bodyPr wrap="square" rtlCol="0">
+            <a:spAutoFit/>
+          </a:bodyPr>
+          <a:lstStyle/>
+          <a:p>
+            <a:pPr algn="ctr"/>
+            <a:r>
+              <a:rPr lang="en-US" sz="1800" dirty="0"/>
+              <a:t>Location</a:t>
+            </a:r>
+            <a:r>
+              <a:rPr lang="en-US" sz="1800" dirty="0">
+                <a:solidFill>
+                  <a:schemeClr val="tx1">
+                    <a:lumMod val="50000"/>
+                    <a:lumOff val="50000"/>
+                  </a:schemeClr>
+                </a:solidFill>
+                <a:effectLst>
+                  <a:outerShdw blurRad="38100" dist="38100" dir="2700000" algn="tl">
+                    <a:srgbClr val="000000">
+                      <a:alpha val="43137"/>
+                    </a:srgbClr>
+                  </a:outerShdw>
+                </a:effectLst>
+              </a:rPr>
+              <a:t> </a:t>
+            </a:r>
+            <a:r>
+              <a:rPr lang="en-US" sz="1200" dirty="0">
+                <a:solidFill>
+                  <a:schemeClr val="tx1">
+                    <a:lumMod val="50000"/>
+                    <a:lumOff val="50000"/>
+                  </a:schemeClr>
+                </a:solidFill>
+                <a:effectLst>
+                  <a:outerShdw blurRad="38100" dist="38100" dir="2700000" algn="tl">
+                    <a:srgbClr val="000000">
+                      <a:alpha val="43137"/>
+                    </a:srgbClr>
+                  </a:outerShdw>
+                </a:effectLst>
+              </a:rPr>
+              <a:t>(String)</a:t>
+            </a:r>
+            <a:endParaRPr lang="en-US" sz="1200" dirty="0"/>
+          </a:p>
+        </p:txBody>
+      </p:sp>
+      <p:sp>
+        <p:nvSpPr>
+          <p:cNvPr id="13" name="TextBox 12">
+            <a:extLst>
+              <a:ext uri="{FF2B5EF4-FFF2-40B4-BE49-F238E27FC236}">
+                <a16:creationId xmlns:a16="http://schemas.microsoft.com/office/drawing/2014/main" id="{4AEB3D80-3116-4832-88E9-911D9D2F9DB9}"/>
+              </a:ext>
+            </a:extLst>
+          </p:cNvPr>
+          <p:cNvSpPr txBox="1"/>
+          <p:nvPr/>
+        </p:nvSpPr>
+        <p:spPr>
+          <a:xfrm>
+            <a:off x="9144002" y="4652486"/>
+            <a:ext cx="2209798" cy="369332"/>
+          </a:xfrm>
+          <a:prstGeom prst="rect">
+            <a:avLst/>
+          </a:prstGeom>
+          <a:noFill/>
+          <a:ln w="38100">
+            <a:solidFill>
+              <a:schemeClr val="tx1"/>
+            </a:solidFill>
+          </a:ln>
+        </p:spPr>
+        <p:txBody>
+          <a:bodyPr wrap="square" rtlCol="0">
+            <a:spAutoFit/>
+          </a:bodyPr>
+          <a:lstStyle/>
+          <a:p>
+            <a:pPr algn="ctr"/>
+            <a:r>
+              <a:rPr lang="en-US" dirty="0"/>
+              <a:t>Instrument In Need</a:t>
+            </a:r>
+          </a:p>
+        </p:txBody>
+      </p:sp>
+      <p:sp>
+        <p:nvSpPr>
+          <p:cNvPr id="15" name="TextBox 14">
+            <a:extLst>
+              <a:ext uri="{FF2B5EF4-FFF2-40B4-BE49-F238E27FC236}">
+                <a16:creationId xmlns:a16="http://schemas.microsoft.com/office/drawing/2014/main" id="{3555A274-59BD-4966-954D-921FAC89A472}"/>
+              </a:ext>
+            </a:extLst>
+          </p:cNvPr>
+          <p:cNvSpPr txBox="1"/>
+          <p:nvPr/>
+        </p:nvSpPr>
+        <p:spPr>
+          <a:xfrm>
+            <a:off x="9144002" y="5356562"/>
+            <a:ext cx="2209798" cy="369332"/>
+          </a:xfrm>
+          <a:prstGeom prst="rect">
+            <a:avLst/>
+          </a:prstGeom>
+          <a:noFill/>
+          <a:ln w="38100">
+            <a:solidFill>
+              <a:schemeClr val="tx1"/>
+            </a:solidFill>
+          </a:ln>
+        </p:spPr>
+        <p:txBody>
+          <a:bodyPr wrap="square" rtlCol="0">
+            <a:spAutoFit/>
+          </a:bodyPr>
+          <a:lstStyle/>
+          <a:p>
+            <a:pPr algn="ctr"/>
+            <a:r>
+              <a:rPr lang="en-US" dirty="0"/>
+              <a:t>Genre</a:t>
+            </a:r>
+            <a:r>
+              <a:rPr lang="en-US" sz="1800" dirty="0">
+                <a:solidFill>
+                  <a:schemeClr val="tx1">
+                    <a:lumMod val="50000"/>
+                    <a:lumOff val="50000"/>
+                  </a:schemeClr>
+                </a:solidFill>
+                <a:effectLst>
+                  <a:outerShdw blurRad="38100" dist="38100" dir="2700000" algn="tl">
+                    <a:srgbClr val="000000">
+                      <a:alpha val="43137"/>
+                    </a:srgbClr>
+                  </a:outerShdw>
+                </a:effectLst>
+              </a:rPr>
+              <a:t> </a:t>
+            </a:r>
+            <a:r>
+              <a:rPr lang="en-US" sz="1200" dirty="0">
+                <a:solidFill>
+                  <a:schemeClr val="tx1">
+                    <a:lumMod val="50000"/>
+                    <a:lumOff val="50000"/>
+                  </a:schemeClr>
+                </a:solidFill>
+                <a:effectLst>
+                  <a:outerShdw blurRad="38100" dist="38100" dir="2700000" algn="tl">
+                    <a:srgbClr val="000000">
+                      <a:alpha val="43137"/>
+                    </a:srgbClr>
+                  </a:outerShdw>
+                </a:effectLst>
+              </a:rPr>
+              <a:t>(String)</a:t>
+            </a:r>
+            <a:endParaRPr lang="en-US" sz="1200" dirty="0"/>
+          </a:p>
+        </p:txBody>
+      </p:sp>
+      <p:cxnSp>
+        <p:nvCxnSpPr>
+          <p:cNvPr id="18" name="Connector: Elbow 17">
+            <a:extLst>
+              <a:ext uri="{FF2B5EF4-FFF2-40B4-BE49-F238E27FC236}">
+                <a16:creationId xmlns:a16="http://schemas.microsoft.com/office/drawing/2014/main" id="{FBB3F3BA-9496-4EB6-8FF2-731D2EE79486}"/>
+              </a:ext>
+            </a:extLst>
+          </p:cNvPr>
+          <p:cNvCxnSpPr>
+            <a:stCxn id="4" idx="3"/>
+            <a:endCxn id="6" idx="0"/>
+          </p:cNvCxnSpPr>
+          <p:nvPr/>
+        </p:nvCxnSpPr>
+        <p:spPr>
+          <a:xfrm>
+            <a:off x="6943725" y="1506022"/>
+            <a:ext cx="1381126" cy="503752"/>
+          </a:xfrm>
+          <a:prstGeom prst="bentConnector2">
+            <a:avLst/>
+          </a:prstGeom>
+          <a:ln w="25400">
+            <a:tailEnd type="triangle"/>
+          </a:ln>
+        </p:spPr>
+        <p:style>
+          <a:lnRef idx="1">
+            <a:schemeClr val="accent1"/>
+          </a:lnRef>
+          <a:fillRef idx="0">
+            <a:schemeClr val="accent1"/>
+          </a:fillRef>
+          <a:effectRef idx="0">
+            <a:schemeClr val="accent1"/>
+          </a:effectRef>
+          <a:fontRef idx="minor">
+            <a:schemeClr val="tx1"/>
+          </a:fontRef>
+        </p:style>
+      </p:cxnSp>
+      <p:cxnSp>
+        <p:nvCxnSpPr>
+          <p:cNvPr id="20" name="Connector: Elbow 19">
+            <a:extLst>
+              <a:ext uri="{FF2B5EF4-FFF2-40B4-BE49-F238E27FC236}">
+                <a16:creationId xmlns:a16="http://schemas.microsoft.com/office/drawing/2014/main" id="{09FF27AB-9C1B-490E-85C9-C0AC526BBD96}"/>
+              </a:ext>
+            </a:extLst>
+          </p:cNvPr>
+          <p:cNvCxnSpPr>
+            <a:stCxn id="4" idx="1"/>
+            <a:endCxn id="5" idx="0"/>
+          </p:cNvCxnSpPr>
+          <p:nvPr/>
+        </p:nvCxnSpPr>
+        <p:spPr>
+          <a:xfrm rot="10800000" flipV="1">
+            <a:off x="3867151" y="1506022"/>
+            <a:ext cx="1381124" cy="503752"/>
+          </a:xfrm>
+          <a:prstGeom prst="bentConnector2">
+            <a:avLst/>
+          </a:prstGeom>
+          <a:ln w="25400">
+            <a:tailEnd type="triangle"/>
+          </a:ln>
+        </p:spPr>
+        <p:style>
+          <a:lnRef idx="1">
+            <a:schemeClr val="accent1"/>
+          </a:lnRef>
+          <a:fillRef idx="0">
+            <a:schemeClr val="accent1"/>
+          </a:fillRef>
+          <a:effectRef idx="0">
+            <a:schemeClr val="accent1"/>
+          </a:effectRef>
+          <a:fontRef idx="minor">
+            <a:schemeClr val="tx1"/>
+          </a:fontRef>
+        </p:style>
+      </p:cxnSp>
+      <p:cxnSp>
+        <p:nvCxnSpPr>
+          <p:cNvPr id="22" name="Connector: Elbow 21">
+            <a:extLst>
+              <a:ext uri="{FF2B5EF4-FFF2-40B4-BE49-F238E27FC236}">
+                <a16:creationId xmlns:a16="http://schemas.microsoft.com/office/drawing/2014/main" id="{F6BC9CFE-F00A-412E-A1CE-37418DFB9B54}"/>
+              </a:ext>
+            </a:extLst>
+          </p:cNvPr>
+          <p:cNvCxnSpPr>
+            <a:stCxn id="5" idx="4"/>
+            <a:endCxn id="8" idx="3"/>
+          </p:cNvCxnSpPr>
+          <p:nvPr/>
+        </p:nvCxnSpPr>
+        <p:spPr>
+          <a:xfrm rot="5400000">
+            <a:off x="2986089" y="2547937"/>
+            <a:ext cx="685801" cy="1076325"/>
+          </a:xfrm>
+          <a:prstGeom prst="bentConnector2">
+            <a:avLst/>
+          </a:prstGeom>
+          <a:ln w="25400">
+            <a:tailEnd type="triangle"/>
+          </a:ln>
+        </p:spPr>
+        <p:style>
+          <a:lnRef idx="1">
+            <a:schemeClr val="accent1"/>
+          </a:lnRef>
+          <a:fillRef idx="0">
+            <a:schemeClr val="accent1"/>
+          </a:fillRef>
+          <a:effectRef idx="0">
+            <a:schemeClr val="accent1"/>
+          </a:effectRef>
+          <a:fontRef idx="minor">
+            <a:schemeClr val="tx1"/>
+          </a:fontRef>
+        </p:style>
+      </p:cxnSp>
+      <p:cxnSp>
+        <p:nvCxnSpPr>
+          <p:cNvPr id="28" name="Connector: Elbow 27">
+            <a:extLst>
+              <a:ext uri="{FF2B5EF4-FFF2-40B4-BE49-F238E27FC236}">
+                <a16:creationId xmlns:a16="http://schemas.microsoft.com/office/drawing/2014/main" id="{83B0FF15-C69E-4FF8-BC5D-043A5B521F74}"/>
+              </a:ext>
+            </a:extLst>
+          </p:cNvPr>
+          <p:cNvCxnSpPr>
+            <a:stCxn id="5" idx="4"/>
+            <a:endCxn id="9" idx="3"/>
+          </p:cNvCxnSpPr>
+          <p:nvPr/>
+        </p:nvCxnSpPr>
+        <p:spPr>
+          <a:xfrm rot="5400000">
+            <a:off x="2634051" y="2899975"/>
+            <a:ext cx="1389877" cy="1076325"/>
+          </a:xfrm>
+          <a:prstGeom prst="bentConnector2">
+            <a:avLst/>
+          </a:prstGeom>
+          <a:ln w="25400">
+            <a:tailEnd type="triangle"/>
+          </a:ln>
+        </p:spPr>
+        <p:style>
+          <a:lnRef idx="1">
+            <a:schemeClr val="accent1"/>
+          </a:lnRef>
+          <a:fillRef idx="0">
+            <a:schemeClr val="accent1"/>
+          </a:fillRef>
+          <a:effectRef idx="0">
+            <a:schemeClr val="accent1"/>
+          </a:effectRef>
+          <a:fontRef idx="minor">
+            <a:schemeClr val="tx1"/>
+          </a:fontRef>
+        </p:style>
+      </p:cxnSp>
+      <p:cxnSp>
+        <p:nvCxnSpPr>
+          <p:cNvPr id="30" name="Connector: Elbow 29">
+            <a:extLst>
+              <a:ext uri="{FF2B5EF4-FFF2-40B4-BE49-F238E27FC236}">
+                <a16:creationId xmlns:a16="http://schemas.microsoft.com/office/drawing/2014/main" id="{2116D9DD-5D29-48A8-A2D3-300AEBC5386B}"/>
+              </a:ext>
+            </a:extLst>
+          </p:cNvPr>
+          <p:cNvCxnSpPr>
+            <a:stCxn id="5" idx="4"/>
+            <a:endCxn id="10" idx="3"/>
+          </p:cNvCxnSpPr>
+          <p:nvPr/>
+        </p:nvCxnSpPr>
+        <p:spPr>
+          <a:xfrm rot="5400000">
+            <a:off x="2235846" y="3298180"/>
+            <a:ext cx="2186286" cy="1076325"/>
+          </a:xfrm>
+          <a:prstGeom prst="bentConnector2">
+            <a:avLst/>
+          </a:prstGeom>
+          <a:ln w="25400">
+            <a:tailEnd type="triangle"/>
+          </a:ln>
+        </p:spPr>
+        <p:style>
+          <a:lnRef idx="1">
+            <a:schemeClr val="accent1"/>
+          </a:lnRef>
+          <a:fillRef idx="0">
+            <a:schemeClr val="accent1"/>
+          </a:fillRef>
+          <a:effectRef idx="0">
+            <a:schemeClr val="accent1"/>
+          </a:effectRef>
+          <a:fontRef idx="minor">
+            <a:schemeClr val="tx1"/>
+          </a:fontRef>
+        </p:style>
+      </p:cxnSp>
+      <p:cxnSp>
+        <p:nvCxnSpPr>
+          <p:cNvPr id="32" name="Connector: Elbow 31">
+            <a:extLst>
+              <a:ext uri="{FF2B5EF4-FFF2-40B4-BE49-F238E27FC236}">
+                <a16:creationId xmlns:a16="http://schemas.microsoft.com/office/drawing/2014/main" id="{6394D815-BF03-42BB-BB9A-4F2C30AA7C7F}"/>
+              </a:ext>
+            </a:extLst>
+          </p:cNvPr>
+          <p:cNvCxnSpPr>
+            <a:stCxn id="6" idx="4"/>
+            <a:endCxn id="11" idx="1"/>
+          </p:cNvCxnSpPr>
+          <p:nvPr/>
+        </p:nvCxnSpPr>
+        <p:spPr>
+          <a:xfrm rot="16200000" flipH="1">
+            <a:off x="8391526" y="2676523"/>
+            <a:ext cx="685801" cy="819151"/>
+          </a:xfrm>
+          <a:prstGeom prst="bentConnector2">
+            <a:avLst/>
+          </a:prstGeom>
+          <a:ln w="25400">
+            <a:tailEnd type="triangle"/>
+          </a:ln>
+        </p:spPr>
+        <p:style>
+          <a:lnRef idx="1">
+            <a:schemeClr val="accent1"/>
+          </a:lnRef>
+          <a:fillRef idx="0">
+            <a:schemeClr val="accent1"/>
+          </a:fillRef>
+          <a:effectRef idx="0">
+            <a:schemeClr val="accent1"/>
+          </a:effectRef>
+          <a:fontRef idx="minor">
+            <a:schemeClr val="tx1"/>
+          </a:fontRef>
+        </p:style>
+      </p:cxnSp>
+      <p:cxnSp>
+        <p:nvCxnSpPr>
+          <p:cNvPr id="34" name="Connector: Elbow 33">
+            <a:extLst>
+              <a:ext uri="{FF2B5EF4-FFF2-40B4-BE49-F238E27FC236}">
+                <a16:creationId xmlns:a16="http://schemas.microsoft.com/office/drawing/2014/main" id="{BC88EA65-B3FA-48A2-821D-70DA839E8AB0}"/>
+              </a:ext>
+            </a:extLst>
+          </p:cNvPr>
+          <p:cNvCxnSpPr>
+            <a:stCxn id="6" idx="4"/>
+            <a:endCxn id="12" idx="1"/>
+          </p:cNvCxnSpPr>
+          <p:nvPr/>
+        </p:nvCxnSpPr>
+        <p:spPr>
+          <a:xfrm rot="16200000" flipH="1">
+            <a:off x="8039488" y="3028561"/>
+            <a:ext cx="1389877" cy="819151"/>
+          </a:xfrm>
+          <a:prstGeom prst="bentConnector2">
+            <a:avLst/>
+          </a:prstGeom>
+          <a:ln w="25400">
+            <a:tailEnd type="triangle"/>
+          </a:ln>
+        </p:spPr>
+        <p:style>
+          <a:lnRef idx="1">
+            <a:schemeClr val="accent1"/>
+          </a:lnRef>
+          <a:fillRef idx="0">
+            <a:schemeClr val="accent1"/>
+          </a:fillRef>
+          <a:effectRef idx="0">
+            <a:schemeClr val="accent1"/>
+          </a:effectRef>
+          <a:fontRef idx="minor">
+            <a:schemeClr val="tx1"/>
+          </a:fontRef>
+        </p:style>
+      </p:cxnSp>
+      <p:cxnSp>
+        <p:nvCxnSpPr>
+          <p:cNvPr id="36" name="Connector: Elbow 35">
+            <a:extLst>
+              <a:ext uri="{FF2B5EF4-FFF2-40B4-BE49-F238E27FC236}">
+                <a16:creationId xmlns:a16="http://schemas.microsoft.com/office/drawing/2014/main" id="{21C25B0F-D050-4F40-9CF5-2500B97B5833}"/>
+              </a:ext>
+            </a:extLst>
+          </p:cNvPr>
+          <p:cNvCxnSpPr>
+            <a:stCxn id="6" idx="4"/>
+            <a:endCxn id="13" idx="1"/>
+          </p:cNvCxnSpPr>
+          <p:nvPr/>
+        </p:nvCxnSpPr>
+        <p:spPr>
+          <a:xfrm rot="16200000" flipH="1">
+            <a:off x="7687450" y="3380599"/>
+            <a:ext cx="2093953" cy="819151"/>
+          </a:xfrm>
+          <a:prstGeom prst="bentConnector2">
+            <a:avLst/>
+          </a:prstGeom>
+          <a:ln w="25400">
+            <a:tailEnd type="triangle"/>
+          </a:ln>
+        </p:spPr>
+        <p:style>
+          <a:lnRef idx="1">
+            <a:schemeClr val="accent1"/>
+          </a:lnRef>
+          <a:fillRef idx="0">
+            <a:schemeClr val="accent1"/>
+          </a:fillRef>
+          <a:effectRef idx="0">
+            <a:schemeClr val="accent1"/>
+          </a:effectRef>
+          <a:fontRef idx="minor">
+            <a:schemeClr val="tx1"/>
+          </a:fontRef>
+        </p:style>
+      </p:cxnSp>
+      <p:cxnSp>
+        <p:nvCxnSpPr>
+          <p:cNvPr id="38" name="Connector: Elbow 37">
+            <a:extLst>
+              <a:ext uri="{FF2B5EF4-FFF2-40B4-BE49-F238E27FC236}">
+                <a16:creationId xmlns:a16="http://schemas.microsoft.com/office/drawing/2014/main" id="{01FD20A6-7437-425F-BDA1-A5FB560C5051}"/>
+              </a:ext>
+            </a:extLst>
+          </p:cNvPr>
+          <p:cNvCxnSpPr>
+            <a:stCxn id="6" idx="4"/>
+            <a:endCxn id="15" idx="1"/>
+          </p:cNvCxnSpPr>
+          <p:nvPr/>
+        </p:nvCxnSpPr>
+        <p:spPr>
+          <a:xfrm rot="16200000" flipH="1">
+            <a:off x="7335412" y="3732637"/>
+            <a:ext cx="2798029" cy="819151"/>
+          </a:xfrm>
+          <a:prstGeom prst="bentConnector2">
+            <a:avLst/>
+          </a:prstGeom>
+          <a:ln w="25400">
+            <a:tailEnd type="triangle"/>
+          </a:ln>
+        </p:spPr>
+        <p:style>
+          <a:lnRef idx="1">
+            <a:schemeClr val="accent1"/>
+          </a:lnRef>
+          <a:fillRef idx="0">
+            <a:schemeClr val="accent1"/>
+          </a:fillRef>
+          <a:effectRef idx="0">
+            <a:schemeClr val="accent1"/>
+          </a:effectRef>
+          <a:fontRef idx="minor">
+            <a:schemeClr val="tx1"/>
+          </a:fontRef>
+        </p:style>
+      </p:cxnSp>
+      <p:sp>
+        <p:nvSpPr>
+          <p:cNvPr id="39" name="TextBox 38">
+            <a:extLst>
+              <a:ext uri="{FF2B5EF4-FFF2-40B4-BE49-F238E27FC236}">
+                <a16:creationId xmlns:a16="http://schemas.microsoft.com/office/drawing/2014/main" id="{1E38FF72-446C-4B6B-991B-2705D7987FB8}"/>
+              </a:ext>
+            </a:extLst>
+          </p:cNvPr>
+          <p:cNvSpPr txBox="1"/>
+          <p:nvPr/>
+        </p:nvSpPr>
+        <p:spPr>
+          <a:xfrm>
+            <a:off x="9144001" y="6059089"/>
+            <a:ext cx="2209798" cy="369332"/>
+          </a:xfrm>
+          <a:prstGeom prst="rect">
+            <a:avLst/>
+          </a:prstGeom>
+          <a:noFill/>
+          <a:ln w="38100">
+            <a:solidFill>
+              <a:schemeClr val="tx1"/>
+            </a:solidFill>
+          </a:ln>
+        </p:spPr>
+        <p:txBody>
+          <a:bodyPr wrap="square" rtlCol="0">
+            <a:spAutoFit/>
+          </a:bodyPr>
+          <a:lstStyle/>
+          <a:p>
+            <a:pPr algn="ctr"/>
+            <a:r>
+              <a:rPr lang="en-US" dirty="0"/>
+              <a:t>Band Members</a:t>
+            </a:r>
+          </a:p>
+        </p:txBody>
+      </p:sp>
+      <p:cxnSp>
+        <p:nvCxnSpPr>
+          <p:cNvPr id="42" name="Connector: Elbow 41">
+            <a:extLst>
+              <a:ext uri="{FF2B5EF4-FFF2-40B4-BE49-F238E27FC236}">
+                <a16:creationId xmlns:a16="http://schemas.microsoft.com/office/drawing/2014/main" id="{11512B6E-C858-4899-B5CE-50A81E89E66E}"/>
+              </a:ext>
+            </a:extLst>
+          </p:cNvPr>
+          <p:cNvCxnSpPr>
+            <a:stCxn id="6" idx="4"/>
+            <a:endCxn id="39" idx="1"/>
+          </p:cNvCxnSpPr>
+          <p:nvPr/>
+        </p:nvCxnSpPr>
+        <p:spPr>
+          <a:xfrm rot="16200000" flipH="1">
+            <a:off x="6984148" y="4083902"/>
+            <a:ext cx="3500556" cy="819150"/>
+          </a:xfrm>
+          <a:prstGeom prst="bentConnector2">
+            <a:avLst/>
+          </a:prstGeom>
+          <a:ln w="25400">
+            <a:tailEnd type="triangle"/>
+          </a:ln>
+        </p:spPr>
+        <p:style>
+          <a:lnRef idx="1">
+            <a:schemeClr val="accent1"/>
+          </a:lnRef>
+          <a:fillRef idx="0">
+            <a:schemeClr val="accent1"/>
+          </a:fillRef>
+          <a:effectRef idx="0">
+            <a:schemeClr val="accent1"/>
+          </a:effectRef>
+          <a:fontRef idx="minor">
+            <a:schemeClr val="tx1"/>
+          </a:fontRef>
+        </p:style>
+      </p:cxnSp>
+    </p:spTree>
+    <p:extLst>
+      <p:ext uri="{BB962C8B-B14F-4D97-AF65-F5344CB8AC3E}">
+        <p14:creationId xmlns:p14="http://schemas.microsoft.com/office/powerpoint/2010/main" val="1044828157"/>
       </p:ext>
     </p:extLst>
   </p:cSld>
@@ -10145,7 +10573,7 @@
           <p:cNvPr id="2" name="Title 1">
             <a:extLst>
               <a:ext uri="{FF2B5EF4-FFF2-40B4-BE49-F238E27FC236}">
-                <a16:creationId xmlns:a16="http://schemas.microsoft.com/office/drawing/2014/main" id="{3B0E6CD8-2EE9-4D93-919B-2E506565E236}"/>
+                <a16:creationId xmlns:a16="http://schemas.microsoft.com/office/drawing/2014/main" id="{B2BB5CC9-69BD-468F-B28D-41F4E6334CE4}"/>
               </a:ext>
             </a:extLst>
           </p:cNvPr>
@@ -10171,17 +10599,499 @@
                   </a:outerShdw>
                 </a:effectLst>
               </a:rPr>
-              <a:t>Publish Dataset</a:t>
-            </a:r>
-          </a:p>
-        </p:txBody>
-      </p:sp>
-      <p:sp>
-        <p:nvSpPr>
-          <p:cNvPr id="4" name="TextBox 3">
-            <a:extLst>
-              <a:ext uri="{FF2B5EF4-FFF2-40B4-BE49-F238E27FC236}">
-                <a16:creationId xmlns:a16="http://schemas.microsoft.com/office/drawing/2014/main" id="{41F12315-E091-4F16-AA81-14C765050F09}"/>
+              <a:t>User Datasets</a:t>
+            </a:r>
+          </a:p>
+        </p:txBody>
+      </p:sp>
+      <p:graphicFrame>
+        <p:nvGraphicFramePr>
+          <p:cNvPr id="5" name="Table 5">
+            <a:extLst>
+              <a:ext uri="{FF2B5EF4-FFF2-40B4-BE49-F238E27FC236}">
+                <a16:creationId xmlns:a16="http://schemas.microsoft.com/office/drawing/2014/main" id="{B4883779-8EFB-49E8-A2E8-3297C12FD7C0}"/>
+              </a:ext>
+            </a:extLst>
+          </p:cNvPr>
+          <p:cNvGraphicFramePr>
+            <a:graphicFrameLocks noGrp="1"/>
+          </p:cNvGraphicFramePr>
+          <p:nvPr>
+            <p:ph idx="1"/>
+            <p:extLst>
+              <p:ext uri="{D42A27DB-BD31-4B8C-83A1-F6EECF244321}">
+                <p14:modId xmlns:p14="http://schemas.microsoft.com/office/powerpoint/2010/main" val="1876297956"/>
+              </p:ext>
+            </p:extLst>
+          </p:nvPr>
+        </p:nvGraphicFramePr>
+        <p:xfrm>
+          <a:off x="838200" y="1825625"/>
+          <a:ext cx="10515600" cy="4079872"/>
+        </p:xfrm>
+        <a:graphic>
+          <a:graphicData uri="http://schemas.openxmlformats.org/drawingml/2006/table">
+            <a:tbl>
+              <a:tblPr firstRow="1" bandRow="1">
+                <a:tableStyleId>{5C22544A-7EE6-4342-B048-85BDC9FD1C3A}</a:tableStyleId>
+              </a:tblPr>
+              <a:tblGrid>
+                <a:gridCol w="5257800">
+                  <a:extLst>
+                    <a:ext uri="{9D8B030D-6E8A-4147-A177-3AD203B41FA5}">
+                      <a16:colId xmlns:a16="http://schemas.microsoft.com/office/drawing/2014/main" val="999526759"/>
+                    </a:ext>
+                  </a:extLst>
+                </a:gridCol>
+                <a:gridCol w="5257800">
+                  <a:extLst>
+                    <a:ext uri="{9D8B030D-6E8A-4147-A177-3AD203B41FA5}">
+                      <a16:colId xmlns:a16="http://schemas.microsoft.com/office/drawing/2014/main" val="2621372417"/>
+                    </a:ext>
+                  </a:extLst>
+                </a:gridCol>
+              </a:tblGrid>
+              <a:tr h="509984">
+                <a:tc>
+                  <a:txBody>
+                    <a:bodyPr/>
+                    <a:lstStyle/>
+                    <a:p>
+                      <a:pPr algn="ctr"/>
+                      <a:r>
+                        <a:rPr lang="en-US" dirty="0"/>
+                        <a:t>Private</a:t>
+                      </a:r>
+                    </a:p>
+                  </a:txBody>
+                  <a:tcPr anchor="ctr"/>
+                </a:tc>
+                <a:tc>
+                  <a:txBody>
+                    <a:bodyPr/>
+                    <a:lstStyle/>
+                    <a:p>
+                      <a:pPr algn="ctr"/>
+                      <a:r>
+                        <a:rPr lang="en-US" dirty="0"/>
+                        <a:t>Public</a:t>
+                      </a:r>
+                    </a:p>
+                  </a:txBody>
+                  <a:tcPr anchor="ctr"/>
+                </a:tc>
+                <a:extLst>
+                  <a:ext uri="{0D108BD9-81ED-4DB2-BD59-A6C34878D82A}">
+                    <a16:rowId xmlns:a16="http://schemas.microsoft.com/office/drawing/2014/main" val="1022876577"/>
+                  </a:ext>
+                </a:extLst>
+              </a:tr>
+              <a:tr h="509984">
+                <a:tc>
+                  <a:txBody>
+                    <a:bodyPr/>
+                    <a:lstStyle/>
+                    <a:p>
+                      <a:pPr algn="ctr"/>
+                      <a:r>
+                        <a:rPr lang="en-US" dirty="0"/>
+                        <a:t>Username</a:t>
+                      </a:r>
+                      <a:r>
+                        <a:rPr lang="en-US" dirty="0">
+                          <a:solidFill>
+                            <a:srgbClr val="FF0000"/>
+                          </a:solidFill>
+                          <a:sym typeface="Wingdings" panose="05000000000000000000" pitchFamily="2" charset="2"/>
+                        </a:rPr>
+                        <a:t></a:t>
+                      </a:r>
+                      <a:endParaRPr lang="en-US" dirty="0"/>
+                    </a:p>
+                  </a:txBody>
+                  <a:tcPr anchor="ctr"/>
+                </a:tc>
+                <a:tc>
+                  <a:txBody>
+                    <a:bodyPr/>
+                    <a:lstStyle/>
+                    <a:p>
+                      <a:pPr algn="ctr"/>
+                      <a:r>
+                        <a:rPr lang="en-US" dirty="0"/>
+                        <a:t>Genre List</a:t>
+                      </a:r>
+                      <a:r>
+                        <a:rPr lang="en-US" dirty="0">
+                          <a:solidFill>
+                            <a:schemeClr val="accent1"/>
+                          </a:solidFill>
+                          <a:sym typeface="Wingdings" panose="05000000000000000000" pitchFamily="2" charset="2"/>
+                        </a:rPr>
+                        <a:t></a:t>
+                      </a:r>
+                      <a:endParaRPr lang="en-US" dirty="0"/>
+                    </a:p>
+                  </a:txBody>
+                  <a:tcPr anchor="ctr"/>
+                </a:tc>
+                <a:extLst>
+                  <a:ext uri="{0D108BD9-81ED-4DB2-BD59-A6C34878D82A}">
+                    <a16:rowId xmlns:a16="http://schemas.microsoft.com/office/drawing/2014/main" val="864622098"/>
+                  </a:ext>
+                </a:extLst>
+              </a:tr>
+              <a:tr h="509984">
+                <a:tc>
+                  <a:txBody>
+                    <a:bodyPr/>
+                    <a:lstStyle/>
+                    <a:p>
+                      <a:pPr algn="ctr"/>
+                      <a:r>
+                        <a:rPr lang="en-US" dirty="0"/>
+                        <a:t>Password</a:t>
+                      </a:r>
+                      <a:r>
+                        <a:rPr lang="en-US" dirty="0">
+                          <a:solidFill>
+                            <a:srgbClr val="FF0000"/>
+                          </a:solidFill>
+                          <a:sym typeface="Wingdings" panose="05000000000000000000" pitchFamily="2" charset="2"/>
+                        </a:rPr>
+                        <a:t></a:t>
+                      </a:r>
+                      <a:endParaRPr lang="en-US" dirty="0"/>
+                    </a:p>
+                  </a:txBody>
+                  <a:tcPr anchor="ctr"/>
+                </a:tc>
+                <a:tc>
+                  <a:txBody>
+                    <a:bodyPr/>
+                    <a:lstStyle/>
+                    <a:p>
+                      <a:pPr algn="ctr"/>
+                      <a:r>
+                        <a:rPr lang="en-US" dirty="0"/>
+                        <a:t>Bio</a:t>
+                      </a:r>
+                      <a:r>
+                        <a:rPr lang="en-US" dirty="0">
+                          <a:solidFill>
+                            <a:schemeClr val="accent1"/>
+                          </a:solidFill>
+                          <a:sym typeface="Wingdings" panose="05000000000000000000" pitchFamily="2" charset="2"/>
+                        </a:rPr>
+                        <a:t></a:t>
+                      </a:r>
+                      <a:endParaRPr lang="en-US" dirty="0"/>
+                    </a:p>
+                  </a:txBody>
+                  <a:tcPr anchor="ctr"/>
+                </a:tc>
+                <a:extLst>
+                  <a:ext uri="{0D108BD9-81ED-4DB2-BD59-A6C34878D82A}">
+                    <a16:rowId xmlns:a16="http://schemas.microsoft.com/office/drawing/2014/main" val="2003856590"/>
+                  </a:ext>
+                </a:extLst>
+              </a:tr>
+              <a:tr h="509984">
+                <a:tc>
+                  <a:txBody>
+                    <a:bodyPr/>
+                    <a:lstStyle/>
+                    <a:p>
+                      <a:pPr algn="ctr"/>
+                      <a:endParaRPr lang="en-US" dirty="0"/>
+                    </a:p>
+                  </a:txBody>
+                  <a:tcPr anchor="ctr"/>
+                </a:tc>
+                <a:tc>
+                  <a:txBody>
+                    <a:bodyPr/>
+                    <a:lstStyle/>
+                    <a:p>
+                      <a:pPr algn="ctr"/>
+                      <a:r>
+                        <a:rPr lang="en-US" dirty="0"/>
+                        <a:t>Link to ***</a:t>
+                      </a:r>
+                      <a:r>
+                        <a:rPr lang="en-US" dirty="0">
+                          <a:solidFill>
+                            <a:schemeClr val="accent1"/>
+                          </a:solidFill>
+                          <a:sym typeface="Wingdings" panose="05000000000000000000" pitchFamily="2" charset="2"/>
+                        </a:rPr>
+                        <a:t></a:t>
+                      </a:r>
+                      <a:endParaRPr lang="en-US" dirty="0"/>
+                    </a:p>
+                  </a:txBody>
+                  <a:tcPr anchor="ctr"/>
+                </a:tc>
+                <a:extLst>
+                  <a:ext uri="{0D108BD9-81ED-4DB2-BD59-A6C34878D82A}">
+                    <a16:rowId xmlns:a16="http://schemas.microsoft.com/office/drawing/2014/main" val="1447506110"/>
+                  </a:ext>
+                </a:extLst>
+              </a:tr>
+              <a:tr h="509984">
+                <a:tc>
+                  <a:txBody>
+                    <a:bodyPr/>
+                    <a:lstStyle/>
+                    <a:p>
+                      <a:pPr marL="0" marR="0" lvl="0" indent="0" algn="ctr" defTabSz="914400" rtl="0" eaLnBrk="1" fontAlgn="auto" latinLnBrk="0" hangingPunct="1">
+                        <a:lnSpc>
+                          <a:spcPct val="100000"/>
+                        </a:lnSpc>
+                        <a:spcBef>
+                          <a:spcPts val="0"/>
+                        </a:spcBef>
+                        <a:spcAft>
+                          <a:spcPts val="0"/>
+                        </a:spcAft>
+                        <a:buClrTx/>
+                        <a:buSzTx/>
+                        <a:buFontTx/>
+                        <a:buNone/>
+                        <a:tabLst/>
+                        <a:defRPr/>
+                      </a:pPr>
+                      <a:endParaRPr lang="en-US" dirty="0"/>
+                    </a:p>
+                  </a:txBody>
+                  <a:tcPr anchor="ctr"/>
+                </a:tc>
+                <a:tc>
+                  <a:txBody>
+                    <a:bodyPr/>
+                    <a:lstStyle/>
+                    <a:p>
+                      <a:pPr algn="ctr"/>
+                      <a:r>
+                        <a:rPr lang="en-US" dirty="0"/>
+                        <a:t>Instruments + details per one</a:t>
+                      </a:r>
+                      <a:r>
+                        <a:rPr lang="en-US" dirty="0">
+                          <a:solidFill>
+                            <a:srgbClr val="FF0000"/>
+                          </a:solidFill>
+                          <a:sym typeface="Wingdings" panose="05000000000000000000" pitchFamily="2" charset="2"/>
+                        </a:rPr>
+                        <a:t></a:t>
+                      </a:r>
+                      <a:endParaRPr lang="en-US" dirty="0"/>
+                    </a:p>
+                  </a:txBody>
+                  <a:tcPr anchor="ctr"/>
+                </a:tc>
+                <a:extLst>
+                  <a:ext uri="{0D108BD9-81ED-4DB2-BD59-A6C34878D82A}">
+                    <a16:rowId xmlns:a16="http://schemas.microsoft.com/office/drawing/2014/main" val="1286390632"/>
+                  </a:ext>
+                </a:extLst>
+              </a:tr>
+              <a:tr h="509984">
+                <a:tc>
+                  <a:txBody>
+                    <a:bodyPr/>
+                    <a:lstStyle/>
+                    <a:p>
+                      <a:pPr algn="ctr"/>
+                      <a:endParaRPr lang="en-US" dirty="0"/>
+                    </a:p>
+                  </a:txBody>
+                  <a:tcPr anchor="ctr"/>
+                </a:tc>
+                <a:tc>
+                  <a:txBody>
+                    <a:bodyPr/>
+                    <a:lstStyle/>
+                    <a:p>
+                      <a:pPr marL="0" marR="0" lvl="0" indent="0" algn="ctr" defTabSz="914400" rtl="0" eaLnBrk="1" fontAlgn="auto" latinLnBrk="0" hangingPunct="1">
+                        <a:lnSpc>
+                          <a:spcPct val="100000"/>
+                        </a:lnSpc>
+                        <a:spcBef>
+                          <a:spcPts val="0"/>
+                        </a:spcBef>
+                        <a:spcAft>
+                          <a:spcPts val="0"/>
+                        </a:spcAft>
+                        <a:buClrTx/>
+                        <a:buSzTx/>
+                        <a:buFontTx/>
+                        <a:buNone/>
+                        <a:tabLst/>
+                        <a:defRPr/>
+                      </a:pPr>
+                      <a:r>
+                        <a:rPr lang="en-US" dirty="0"/>
+                        <a:t>User </a:t>
+                      </a:r>
+                      <a:r>
+                        <a:rPr lang="en-US" sz="1800" kern="1200" dirty="0">
+                          <a:solidFill>
+                            <a:schemeClr val="dk1"/>
+                          </a:solidFill>
+                          <a:effectLst/>
+                          <a:latin typeface="+mn-lt"/>
+                          <a:ea typeface="+mn-ea"/>
+                          <a:cs typeface="+mn-cs"/>
+                        </a:rPr>
+                        <a:t>Location</a:t>
+                      </a:r>
+                      <a:r>
+                        <a:rPr lang="en-US" dirty="0">
+                          <a:solidFill>
+                            <a:srgbClr val="FF0000"/>
+                          </a:solidFill>
+                          <a:sym typeface="Wingdings" panose="05000000000000000000" pitchFamily="2" charset="2"/>
+                        </a:rPr>
+                        <a:t></a:t>
+                      </a:r>
+                      <a:endParaRPr lang="en-US" dirty="0"/>
+                    </a:p>
+                  </a:txBody>
+                  <a:tcPr anchor="ctr"/>
+                </a:tc>
+                <a:extLst>
+                  <a:ext uri="{0D108BD9-81ED-4DB2-BD59-A6C34878D82A}">
+                    <a16:rowId xmlns:a16="http://schemas.microsoft.com/office/drawing/2014/main" val="787995426"/>
+                  </a:ext>
+                </a:extLst>
+              </a:tr>
+              <a:tr h="509984">
+                <a:tc>
+                  <a:txBody>
+                    <a:bodyPr/>
+                    <a:lstStyle/>
+                    <a:p>
+                      <a:pPr algn="ctr"/>
+                      <a:endParaRPr lang="en-US" dirty="0"/>
+                    </a:p>
+                  </a:txBody>
+                  <a:tcPr anchor="ctr"/>
+                </a:tc>
+                <a:tc>
+                  <a:txBody>
+                    <a:bodyPr/>
+                    <a:lstStyle/>
+                    <a:p>
+                      <a:pPr marL="0" marR="0" lvl="0" indent="0" algn="ctr" defTabSz="914400" rtl="0" eaLnBrk="1" fontAlgn="auto" latinLnBrk="0" hangingPunct="1">
+                        <a:lnSpc>
+                          <a:spcPct val="100000"/>
+                        </a:lnSpc>
+                        <a:spcBef>
+                          <a:spcPts val="0"/>
+                        </a:spcBef>
+                        <a:spcAft>
+                          <a:spcPts val="0"/>
+                        </a:spcAft>
+                        <a:buClrTx/>
+                        <a:buSzTx/>
+                        <a:buFontTx/>
+                        <a:buNone/>
+                        <a:tabLst/>
+                        <a:defRPr/>
+                      </a:pPr>
+                      <a:r>
+                        <a:rPr lang="en-US"/>
+                        <a:t>Age</a:t>
+                      </a:r>
+                      <a:r>
+                        <a:rPr lang="en-US">
+                          <a:solidFill>
+                            <a:srgbClr val="FF0000"/>
+                          </a:solidFill>
+                          <a:sym typeface="Wingdings" panose="05000000000000000000" pitchFamily="2" charset="2"/>
+                        </a:rPr>
+                        <a:t></a:t>
+                      </a:r>
+                      <a:endParaRPr lang="en-US" dirty="0"/>
+                    </a:p>
+                  </a:txBody>
+                  <a:tcPr anchor="ctr"/>
+                </a:tc>
+                <a:extLst>
+                  <a:ext uri="{0D108BD9-81ED-4DB2-BD59-A6C34878D82A}">
+                    <a16:rowId xmlns:a16="http://schemas.microsoft.com/office/drawing/2014/main" val="3148044796"/>
+                  </a:ext>
+                </a:extLst>
+              </a:tr>
+              <a:tr h="509984">
+                <a:tc>
+                  <a:txBody>
+                    <a:bodyPr/>
+                    <a:lstStyle/>
+                    <a:p>
+                      <a:pPr algn="ctr"/>
+                      <a:endParaRPr lang="en-US" dirty="0"/>
+                    </a:p>
+                  </a:txBody>
+                  <a:tcPr anchor="ctr"/>
+                </a:tc>
+                <a:tc>
+                  <a:txBody>
+                    <a:bodyPr/>
+                    <a:lstStyle/>
+                    <a:p>
+                      <a:pPr marL="0" marR="0" lvl="0" indent="0" algn="ctr" defTabSz="914400" rtl="0" eaLnBrk="1" fontAlgn="auto" latinLnBrk="0" hangingPunct="1">
+                        <a:lnSpc>
+                          <a:spcPct val="100000"/>
+                        </a:lnSpc>
+                        <a:spcBef>
+                          <a:spcPts val="0"/>
+                        </a:spcBef>
+                        <a:spcAft>
+                          <a:spcPts val="0"/>
+                        </a:spcAft>
+                        <a:buClrTx/>
+                        <a:buSzTx/>
+                        <a:buFontTx/>
+                        <a:buNone/>
+                        <a:tabLst/>
+                        <a:defRPr/>
+                      </a:pPr>
+                      <a:r>
+                        <a:rPr lang="en-US" dirty="0"/>
+                        <a:t>Name</a:t>
+                      </a:r>
+                      <a:r>
+                        <a:rPr lang="en-US" dirty="0">
+                          <a:solidFill>
+                            <a:srgbClr val="FF0000"/>
+                          </a:solidFill>
+                          <a:sym typeface="Wingdings" panose="05000000000000000000" pitchFamily="2" charset="2"/>
+                        </a:rPr>
+                        <a:t></a:t>
+                      </a:r>
+                      <a:endParaRPr lang="en-US" dirty="0"/>
+                    </a:p>
+                  </a:txBody>
+                  <a:tcPr anchor="ctr"/>
+                </a:tc>
+                <a:extLst>
+                  <a:ext uri="{0D108BD9-81ED-4DB2-BD59-A6C34878D82A}">
+                    <a16:rowId xmlns:a16="http://schemas.microsoft.com/office/drawing/2014/main" val="2921019506"/>
+                  </a:ext>
+                </a:extLst>
+              </a:tr>
+            </a:tbl>
+          </a:graphicData>
+        </a:graphic>
+      </p:graphicFrame>
+      <p:sp>
+        <p:nvSpPr>
+          <p:cNvPr id="6" name="TextBox 5">
+            <a:extLst>
+              <a:ext uri="{FF2B5EF4-FFF2-40B4-BE49-F238E27FC236}">
+                <a16:creationId xmlns:a16="http://schemas.microsoft.com/office/drawing/2014/main" id="{C50DB1BC-E153-4AC7-AE20-770D0C9C0419}"/>
               </a:ext>
             </a:extLst>
           </p:cNvPr>
@@ -10190,16 +11100,19 @@
         </p:nvSpPr>
         <p:spPr>
           <a:xfrm>
-            <a:off x="5248275" y="1321356"/>
-            <a:ext cx="1695450" cy="369332"/>
+            <a:off x="9182100" y="704740"/>
+            <a:ext cx="2171700" cy="646331"/>
           </a:xfrm>
           <a:prstGeom prst="rect">
             <a:avLst/>
           </a:prstGeom>
           <a:noFill/>
-          <a:ln w="50800">
+          <a:ln w="38100">
             <a:solidFill>
-              <a:schemeClr val="tx1"/>
+              <a:schemeClr val="tx1">
+                <a:lumMod val="50000"/>
+                <a:lumOff val="50000"/>
+              </a:schemeClr>
             </a:solidFill>
           </a:ln>
         </p:spPr>
@@ -10209,1092 +11122,56 @@
           </a:bodyPr>
           <a:lstStyle/>
           <a:p>
-            <a:pPr algn="ctr"/>
-            <a:r>
-              <a:rPr lang="en-US" b="1" i="1" u="sng" dirty="0">
-                <a:effectLst>
-                  <a:outerShdw blurRad="38100" dist="38100" dir="2700000" algn="tl">
-                    <a:srgbClr val="000000">
-                      <a:alpha val="43137"/>
-                    </a:srgbClr>
-                  </a:outerShdw>
-                </a:effectLst>
-              </a:rPr>
-              <a:t>Publishment</a:t>
-            </a:r>
-          </a:p>
-        </p:txBody>
-      </p:sp>
-      <p:sp>
-        <p:nvSpPr>
-          <p:cNvPr id="5" name="Oval 4">
-            <a:extLst>
-              <a:ext uri="{FF2B5EF4-FFF2-40B4-BE49-F238E27FC236}">
-                <a16:creationId xmlns:a16="http://schemas.microsoft.com/office/drawing/2014/main" id="{3C5EB8A4-5208-4F37-BF20-A06E51424809}"/>
-              </a:ext>
-            </a:extLst>
-          </p:cNvPr>
-          <p:cNvSpPr/>
-          <p:nvPr/>
-        </p:nvSpPr>
-        <p:spPr>
-          <a:xfrm>
-            <a:off x="3048001" y="2009774"/>
-            <a:ext cx="1638300" cy="733425"/>
-          </a:xfrm>
-          <a:prstGeom prst="ellipse">
-            <a:avLst/>
-          </a:prstGeom>
-          <a:noFill/>
-          <a:ln w="38100">
-            <a:solidFill>
-              <a:schemeClr val="tx1"/>
-            </a:solidFill>
-          </a:ln>
-        </p:spPr>
-        <p:style>
-          <a:lnRef idx="2">
-            <a:schemeClr val="accent1">
-              <a:shade val="50000"/>
-            </a:schemeClr>
-          </a:lnRef>
-          <a:fillRef idx="1">
-            <a:schemeClr val="accent1"/>
-          </a:fillRef>
-          <a:effectRef idx="0">
-            <a:schemeClr val="accent1"/>
-          </a:effectRef>
-          <a:fontRef idx="minor">
-            <a:schemeClr val="lt1"/>
-          </a:fontRef>
-        </p:style>
-        <p:txBody>
-          <a:bodyPr rtlCol="0" anchor="ctr"/>
-          <a:lstStyle/>
-          <a:p>
-            <a:pPr algn="ctr"/>
             <a:r>
               <a:rPr lang="en-US" dirty="0">
                 <a:solidFill>
-                  <a:schemeClr val="tx1"/>
-                </a:solidFill>
-              </a:rPr>
-              <a:t>Musician</a:t>
-            </a:r>
-          </a:p>
-        </p:txBody>
-      </p:sp>
-      <p:sp>
-        <p:nvSpPr>
-          <p:cNvPr id="6" name="Oval 5">
-            <a:extLst>
-              <a:ext uri="{FF2B5EF4-FFF2-40B4-BE49-F238E27FC236}">
-                <a16:creationId xmlns:a16="http://schemas.microsoft.com/office/drawing/2014/main" id="{78286BC0-6589-4777-B4B6-150651FE417A}"/>
-              </a:ext>
-            </a:extLst>
-          </p:cNvPr>
-          <p:cNvSpPr/>
-          <p:nvPr/>
-        </p:nvSpPr>
-        <p:spPr>
-          <a:xfrm>
-            <a:off x="7505701" y="2009774"/>
-            <a:ext cx="1638300" cy="733425"/>
-          </a:xfrm>
-          <a:prstGeom prst="ellipse">
-            <a:avLst/>
-          </a:prstGeom>
-          <a:noFill/>
-          <a:ln w="38100">
-            <a:solidFill>
-              <a:schemeClr val="tx1"/>
-            </a:solidFill>
-          </a:ln>
-        </p:spPr>
-        <p:style>
-          <a:lnRef idx="2">
-            <a:schemeClr val="accent1">
-              <a:shade val="50000"/>
-            </a:schemeClr>
-          </a:lnRef>
-          <a:fillRef idx="1">
-            <a:schemeClr val="accent1"/>
-          </a:fillRef>
-          <a:effectRef idx="0">
-            <a:schemeClr val="accent1"/>
-          </a:effectRef>
-          <a:fontRef idx="minor">
-            <a:schemeClr val="lt1"/>
-          </a:fontRef>
-        </p:style>
-        <p:txBody>
-          <a:bodyPr rtlCol="0" anchor="ctr"/>
-          <a:lstStyle/>
-          <a:p>
-            <a:pPr algn="ctr"/>
-            <a:r>
-              <a:rPr lang="en-US" dirty="0">
-                <a:solidFill>
-                  <a:schemeClr val="tx1"/>
-                </a:solidFill>
-              </a:rPr>
-              <a:t>Band</a:t>
-            </a:r>
-          </a:p>
-        </p:txBody>
-      </p:sp>
-      <p:sp>
-        <p:nvSpPr>
-          <p:cNvPr id="8" name="TextBox 7">
-            <a:extLst>
-              <a:ext uri="{FF2B5EF4-FFF2-40B4-BE49-F238E27FC236}">
-                <a16:creationId xmlns:a16="http://schemas.microsoft.com/office/drawing/2014/main" id="{C51CCC77-5836-4745-A372-07577990BD04}"/>
-              </a:ext>
-            </a:extLst>
-          </p:cNvPr>
-          <p:cNvSpPr txBox="1"/>
-          <p:nvPr/>
-        </p:nvSpPr>
-        <p:spPr>
-          <a:xfrm>
-            <a:off x="838200" y="3244334"/>
-            <a:ext cx="1952626" cy="369332"/>
-          </a:xfrm>
-          <a:prstGeom prst="rect">
-            <a:avLst/>
-          </a:prstGeom>
-          <a:noFill/>
-          <a:ln w="38100">
-            <a:solidFill>
-              <a:schemeClr val="tx1"/>
-            </a:solidFill>
-          </a:ln>
-        </p:spPr>
-        <p:txBody>
-          <a:bodyPr wrap="square" rtlCol="0">
-            <a:spAutoFit/>
-          </a:bodyPr>
-          <a:lstStyle/>
-          <a:p>
-            <a:pPr algn="ctr"/>
-            <a:r>
-              <a:rPr lang="en-US" b="1" u="sng" dirty="0">
-                <a:effectLst>
-                  <a:outerShdw blurRad="38100" dist="38100" dir="2700000" algn="tl">
-                    <a:srgbClr val="000000">
-                      <a:alpha val="43137"/>
-                    </a:srgbClr>
-                  </a:outerShdw>
-                </a:effectLst>
-              </a:rPr>
-              <a:t>Key</a:t>
-            </a:r>
-            <a:r>
-              <a:rPr lang="en-US" b="1" dirty="0">
-                <a:sym typeface="Wingdings" panose="05000000000000000000" pitchFamily="2" charset="2"/>
-              </a:rPr>
-              <a:t> </a:t>
-            </a:r>
-            <a:r>
-              <a:rPr lang="en-US" sz="1200" b="1" dirty="0">
-                <a:solidFill>
-                  <a:schemeClr val="tx1">
-                    <a:lumMod val="50000"/>
-                    <a:lumOff val="50000"/>
-                  </a:schemeClr>
+                  <a:srgbClr val="FF0000"/>
                 </a:solidFill>
                 <a:sym typeface="Wingdings" panose="05000000000000000000" pitchFamily="2" charset="2"/>
               </a:rPr>
-              <a:t>(Username)</a:t>
-            </a:r>
-            <a:endParaRPr lang="en-US" sz="1200" b="1" dirty="0">
+              <a:t> </a:t>
+            </a:r>
+            <a:r>
+              <a:rPr lang="en-US" sz="1400" dirty="0">
+                <a:solidFill>
+                  <a:srgbClr val="FF0000"/>
+                </a:solidFill>
+                <a:sym typeface="Wingdings" panose="05000000000000000000" pitchFamily="2" charset="2"/>
+              </a:rPr>
+              <a:t>Mandatory</a:t>
+            </a:r>
+          </a:p>
+          <a:p>
+            <a:r>
+              <a:rPr lang="en-US" dirty="0">
+                <a:solidFill>
+                  <a:schemeClr val="accent1"/>
+                </a:solidFill>
+                <a:sym typeface="Wingdings" panose="05000000000000000000" pitchFamily="2" charset="2"/>
+              </a:rPr>
+              <a:t> </a:t>
+            </a:r>
+            <a:r>
+              <a:rPr lang="en-US" sz="1400" dirty="0">
+                <a:solidFill>
+                  <a:schemeClr val="accent1"/>
+                </a:solidFill>
+                <a:sym typeface="Wingdings" panose="05000000000000000000" pitchFamily="2" charset="2"/>
+              </a:rPr>
+              <a:t>Optional</a:t>
+            </a:r>
+            <a:endParaRPr lang="en-US" sz="1400" dirty="0">
               <a:solidFill>
-                <a:schemeClr val="tx1">
-                  <a:lumMod val="50000"/>
-                  <a:lumOff val="50000"/>
-                </a:schemeClr>
+                <a:schemeClr val="accent1"/>
               </a:solidFill>
             </a:endParaRPr>
           </a:p>
         </p:txBody>
       </p:sp>
-      <p:sp>
-        <p:nvSpPr>
-          <p:cNvPr id="9" name="TextBox 8">
-            <a:extLst>
-              <a:ext uri="{FF2B5EF4-FFF2-40B4-BE49-F238E27FC236}">
-                <a16:creationId xmlns:a16="http://schemas.microsoft.com/office/drawing/2014/main" id="{C45E3813-26E2-491C-82D4-F6FD6D6FBBBF}"/>
-              </a:ext>
-            </a:extLst>
-          </p:cNvPr>
-          <p:cNvSpPr txBox="1"/>
-          <p:nvPr/>
-        </p:nvSpPr>
-        <p:spPr>
-          <a:xfrm>
-            <a:off x="838200" y="3948410"/>
-            <a:ext cx="1952626" cy="369332"/>
-          </a:xfrm>
-          <a:prstGeom prst="rect">
-            <a:avLst/>
-          </a:prstGeom>
-          <a:noFill/>
-          <a:ln w="38100">
-            <a:solidFill>
-              <a:schemeClr val="tx1"/>
-            </a:solidFill>
-          </a:ln>
-        </p:spPr>
-        <p:txBody>
-          <a:bodyPr wrap="square" rtlCol="0">
-            <a:spAutoFit/>
-          </a:bodyPr>
-          <a:lstStyle/>
-          <a:p>
-            <a:pPr algn="ctr"/>
-            <a:r>
-              <a:rPr lang="en-US" sz="1800" dirty="0"/>
-              <a:t>Location</a:t>
-            </a:r>
-            <a:r>
-              <a:rPr lang="en-US" sz="1200" dirty="0">
-                <a:solidFill>
-                  <a:schemeClr val="tx1">
-                    <a:lumMod val="50000"/>
-                    <a:lumOff val="50000"/>
-                  </a:schemeClr>
-                </a:solidFill>
-                <a:effectLst>
-                  <a:outerShdw blurRad="38100" dist="38100" dir="2700000" algn="tl">
-                    <a:srgbClr val="000000">
-                      <a:alpha val="43137"/>
-                    </a:srgbClr>
-                  </a:outerShdw>
-                </a:effectLst>
-              </a:rPr>
-              <a:t>(String)</a:t>
-            </a:r>
-          </a:p>
-        </p:txBody>
-      </p:sp>
-      <p:sp>
-        <p:nvSpPr>
-          <p:cNvPr id="10" name="TextBox 9">
-            <a:extLst>
-              <a:ext uri="{FF2B5EF4-FFF2-40B4-BE49-F238E27FC236}">
-                <a16:creationId xmlns:a16="http://schemas.microsoft.com/office/drawing/2014/main" id="{C1C8CB04-0B54-4F58-9EDE-6981B617179B}"/>
-              </a:ext>
-            </a:extLst>
-          </p:cNvPr>
-          <p:cNvSpPr txBox="1"/>
-          <p:nvPr/>
-        </p:nvSpPr>
-        <p:spPr>
-          <a:xfrm>
-            <a:off x="838200" y="4652486"/>
-            <a:ext cx="1952626" cy="553998"/>
-          </a:xfrm>
-          <a:prstGeom prst="rect">
-            <a:avLst/>
-          </a:prstGeom>
-          <a:noFill/>
-          <a:ln w="38100">
-            <a:solidFill>
-              <a:schemeClr val="tx1"/>
-            </a:solidFill>
-          </a:ln>
-        </p:spPr>
-        <p:txBody>
-          <a:bodyPr wrap="square" rtlCol="0">
-            <a:spAutoFit/>
-          </a:bodyPr>
-          <a:lstStyle/>
-          <a:p>
-            <a:pPr algn="ctr"/>
-            <a:r>
-              <a:rPr lang="en-US" dirty="0"/>
-              <a:t>My Instrument</a:t>
-            </a:r>
-            <a:r>
-              <a:rPr lang="en-US" sz="1800" dirty="0">
-                <a:solidFill>
-                  <a:schemeClr val="tx1">
-                    <a:lumMod val="50000"/>
-                    <a:lumOff val="50000"/>
-                  </a:schemeClr>
-                </a:solidFill>
-                <a:effectLst>
-                  <a:outerShdw blurRad="38100" dist="38100" dir="2700000" algn="tl">
-                    <a:srgbClr val="000000">
-                      <a:alpha val="43137"/>
-                    </a:srgbClr>
-                  </a:outerShdw>
-                </a:effectLst>
-              </a:rPr>
-              <a:t> </a:t>
-            </a:r>
-            <a:r>
-              <a:rPr lang="en-US" sz="1200" dirty="0">
-                <a:solidFill>
-                  <a:schemeClr val="tx1">
-                    <a:lumMod val="50000"/>
-                    <a:lumOff val="50000"/>
-                  </a:schemeClr>
-                </a:solidFill>
-                <a:effectLst>
-                  <a:outerShdw blurRad="38100" dist="38100" dir="2700000" algn="tl">
-                    <a:srgbClr val="000000">
-                      <a:alpha val="43137"/>
-                    </a:srgbClr>
-                  </a:outerShdw>
-                </a:effectLst>
-              </a:rPr>
-              <a:t>(String)</a:t>
-            </a:r>
-            <a:endParaRPr lang="en-US" sz="1200" dirty="0"/>
-          </a:p>
-        </p:txBody>
-      </p:sp>
-      <p:sp>
-        <p:nvSpPr>
-          <p:cNvPr id="11" name="TextBox 10">
-            <a:extLst>
-              <a:ext uri="{FF2B5EF4-FFF2-40B4-BE49-F238E27FC236}">
-                <a16:creationId xmlns:a16="http://schemas.microsoft.com/office/drawing/2014/main" id="{858AFF6A-75A9-4324-B25F-AEF5755E3EE5}"/>
-              </a:ext>
-            </a:extLst>
-          </p:cNvPr>
-          <p:cNvSpPr txBox="1"/>
-          <p:nvPr/>
-        </p:nvSpPr>
-        <p:spPr>
-          <a:xfrm>
-            <a:off x="9144002" y="3244334"/>
-            <a:ext cx="2209798" cy="369332"/>
-          </a:xfrm>
-          <a:prstGeom prst="rect">
-            <a:avLst/>
-          </a:prstGeom>
-          <a:noFill/>
-          <a:ln w="38100">
-            <a:solidFill>
-              <a:schemeClr val="tx1"/>
-            </a:solidFill>
-          </a:ln>
-        </p:spPr>
-        <p:txBody>
-          <a:bodyPr wrap="square" rtlCol="0">
-            <a:spAutoFit/>
-          </a:bodyPr>
-          <a:lstStyle/>
-          <a:p>
-            <a:pPr algn="ctr"/>
-            <a:r>
-              <a:rPr lang="en-US" dirty="0"/>
-              <a:t>Band Name</a:t>
-            </a:r>
-            <a:r>
-              <a:rPr lang="en-US" sz="1800" dirty="0">
-                <a:solidFill>
-                  <a:schemeClr val="tx1">
-                    <a:lumMod val="50000"/>
-                    <a:lumOff val="50000"/>
-                  </a:schemeClr>
-                </a:solidFill>
-                <a:effectLst>
-                  <a:outerShdw blurRad="38100" dist="38100" dir="2700000" algn="tl">
-                    <a:srgbClr val="000000">
-                      <a:alpha val="43137"/>
-                    </a:srgbClr>
-                  </a:outerShdw>
-                </a:effectLst>
-              </a:rPr>
-              <a:t> </a:t>
-            </a:r>
-            <a:r>
-              <a:rPr lang="en-US" sz="1200" dirty="0">
-                <a:solidFill>
-                  <a:schemeClr val="tx1">
-                    <a:lumMod val="50000"/>
-                    <a:lumOff val="50000"/>
-                  </a:schemeClr>
-                </a:solidFill>
-                <a:effectLst>
-                  <a:outerShdw blurRad="38100" dist="38100" dir="2700000" algn="tl">
-                    <a:srgbClr val="000000">
-                      <a:alpha val="43137"/>
-                    </a:srgbClr>
-                  </a:outerShdw>
-                </a:effectLst>
-              </a:rPr>
-              <a:t>(String)</a:t>
-            </a:r>
-            <a:endParaRPr lang="en-US" sz="1200" dirty="0"/>
-          </a:p>
-        </p:txBody>
-      </p:sp>
-      <p:sp>
-        <p:nvSpPr>
-          <p:cNvPr id="12" name="TextBox 11">
-            <a:extLst>
-              <a:ext uri="{FF2B5EF4-FFF2-40B4-BE49-F238E27FC236}">
-                <a16:creationId xmlns:a16="http://schemas.microsoft.com/office/drawing/2014/main" id="{06F84E4B-4D9B-4460-9001-E7B1C6D190B1}"/>
-              </a:ext>
-            </a:extLst>
-          </p:cNvPr>
-          <p:cNvSpPr txBox="1"/>
-          <p:nvPr/>
-        </p:nvSpPr>
-        <p:spPr>
-          <a:xfrm>
-            <a:off x="9144002" y="3948410"/>
-            <a:ext cx="2209798" cy="369332"/>
-          </a:xfrm>
-          <a:prstGeom prst="rect">
-            <a:avLst/>
-          </a:prstGeom>
-          <a:noFill/>
-          <a:ln w="38100">
-            <a:solidFill>
-              <a:schemeClr val="tx1"/>
-            </a:solidFill>
-          </a:ln>
-        </p:spPr>
-        <p:txBody>
-          <a:bodyPr wrap="square" rtlCol="0">
-            <a:spAutoFit/>
-          </a:bodyPr>
-          <a:lstStyle/>
-          <a:p>
-            <a:pPr algn="ctr"/>
-            <a:r>
-              <a:rPr lang="en-US" sz="1800" dirty="0"/>
-              <a:t>Location</a:t>
-            </a:r>
-            <a:r>
-              <a:rPr lang="en-US" sz="1800" dirty="0">
-                <a:solidFill>
-                  <a:schemeClr val="tx1">
-                    <a:lumMod val="50000"/>
-                    <a:lumOff val="50000"/>
-                  </a:schemeClr>
-                </a:solidFill>
-                <a:effectLst>
-                  <a:outerShdw blurRad="38100" dist="38100" dir="2700000" algn="tl">
-                    <a:srgbClr val="000000">
-                      <a:alpha val="43137"/>
-                    </a:srgbClr>
-                  </a:outerShdw>
-                </a:effectLst>
-              </a:rPr>
-              <a:t> </a:t>
-            </a:r>
-            <a:r>
-              <a:rPr lang="en-US" sz="1200" dirty="0">
-                <a:solidFill>
-                  <a:schemeClr val="tx1">
-                    <a:lumMod val="50000"/>
-                    <a:lumOff val="50000"/>
-                  </a:schemeClr>
-                </a:solidFill>
-                <a:effectLst>
-                  <a:outerShdw blurRad="38100" dist="38100" dir="2700000" algn="tl">
-                    <a:srgbClr val="000000">
-                      <a:alpha val="43137"/>
-                    </a:srgbClr>
-                  </a:outerShdw>
-                </a:effectLst>
-              </a:rPr>
-              <a:t>(String)</a:t>
-            </a:r>
-            <a:endParaRPr lang="en-US" sz="1200" dirty="0"/>
-          </a:p>
-        </p:txBody>
-      </p:sp>
-      <p:sp>
-        <p:nvSpPr>
-          <p:cNvPr id="13" name="TextBox 12">
-            <a:extLst>
-              <a:ext uri="{FF2B5EF4-FFF2-40B4-BE49-F238E27FC236}">
-                <a16:creationId xmlns:a16="http://schemas.microsoft.com/office/drawing/2014/main" id="{4AEB3D80-3116-4832-88E9-911D9D2F9DB9}"/>
-              </a:ext>
-            </a:extLst>
-          </p:cNvPr>
-          <p:cNvSpPr txBox="1"/>
-          <p:nvPr/>
-        </p:nvSpPr>
-        <p:spPr>
-          <a:xfrm>
-            <a:off x="9144002" y="4652486"/>
-            <a:ext cx="2209798" cy="369332"/>
-          </a:xfrm>
-          <a:prstGeom prst="rect">
-            <a:avLst/>
-          </a:prstGeom>
-          <a:noFill/>
-          <a:ln w="38100">
-            <a:solidFill>
-              <a:schemeClr val="tx1"/>
-            </a:solidFill>
-          </a:ln>
-        </p:spPr>
-        <p:txBody>
-          <a:bodyPr wrap="square" rtlCol="0">
-            <a:spAutoFit/>
-          </a:bodyPr>
-          <a:lstStyle/>
-          <a:p>
-            <a:pPr algn="ctr"/>
-            <a:r>
-              <a:rPr lang="en-US" dirty="0"/>
-              <a:t>Instrument In Need</a:t>
-            </a:r>
-          </a:p>
-        </p:txBody>
-      </p:sp>
-      <p:sp>
-        <p:nvSpPr>
-          <p:cNvPr id="15" name="TextBox 14">
-            <a:extLst>
-              <a:ext uri="{FF2B5EF4-FFF2-40B4-BE49-F238E27FC236}">
-                <a16:creationId xmlns:a16="http://schemas.microsoft.com/office/drawing/2014/main" id="{3555A274-59BD-4966-954D-921FAC89A472}"/>
-              </a:ext>
-            </a:extLst>
-          </p:cNvPr>
-          <p:cNvSpPr txBox="1"/>
-          <p:nvPr/>
-        </p:nvSpPr>
-        <p:spPr>
-          <a:xfrm>
-            <a:off x="9144002" y="5356562"/>
-            <a:ext cx="2209798" cy="369332"/>
-          </a:xfrm>
-          <a:prstGeom prst="rect">
-            <a:avLst/>
-          </a:prstGeom>
-          <a:noFill/>
-          <a:ln w="38100">
-            <a:solidFill>
-              <a:schemeClr val="tx1"/>
-            </a:solidFill>
-          </a:ln>
-        </p:spPr>
-        <p:txBody>
-          <a:bodyPr wrap="square" rtlCol="0">
-            <a:spAutoFit/>
-          </a:bodyPr>
-          <a:lstStyle/>
-          <a:p>
-            <a:pPr algn="ctr"/>
-            <a:r>
-              <a:rPr lang="en-US" dirty="0"/>
-              <a:t>Genre</a:t>
-            </a:r>
-            <a:r>
-              <a:rPr lang="en-US" sz="1800" dirty="0">
-                <a:solidFill>
-                  <a:schemeClr val="tx1">
-                    <a:lumMod val="50000"/>
-                    <a:lumOff val="50000"/>
-                  </a:schemeClr>
-                </a:solidFill>
-                <a:effectLst>
-                  <a:outerShdw blurRad="38100" dist="38100" dir="2700000" algn="tl">
-                    <a:srgbClr val="000000">
-                      <a:alpha val="43137"/>
-                    </a:srgbClr>
-                  </a:outerShdw>
-                </a:effectLst>
-              </a:rPr>
-              <a:t> </a:t>
-            </a:r>
-            <a:r>
-              <a:rPr lang="en-US" sz="1200" dirty="0">
-                <a:solidFill>
-                  <a:schemeClr val="tx1">
-                    <a:lumMod val="50000"/>
-                    <a:lumOff val="50000"/>
-                  </a:schemeClr>
-                </a:solidFill>
-                <a:effectLst>
-                  <a:outerShdw blurRad="38100" dist="38100" dir="2700000" algn="tl">
-                    <a:srgbClr val="000000">
-                      <a:alpha val="43137"/>
-                    </a:srgbClr>
-                  </a:outerShdw>
-                </a:effectLst>
-              </a:rPr>
-              <a:t>(String)</a:t>
-            </a:r>
-            <a:endParaRPr lang="en-US" sz="1200" dirty="0"/>
-          </a:p>
-        </p:txBody>
-      </p:sp>
-      <p:cxnSp>
-        <p:nvCxnSpPr>
-          <p:cNvPr id="18" name="Connector: Elbow 17">
-            <a:extLst>
-              <a:ext uri="{FF2B5EF4-FFF2-40B4-BE49-F238E27FC236}">
-                <a16:creationId xmlns:a16="http://schemas.microsoft.com/office/drawing/2014/main" id="{FBB3F3BA-9496-4EB6-8FF2-731D2EE79486}"/>
-              </a:ext>
-            </a:extLst>
-          </p:cNvPr>
-          <p:cNvCxnSpPr>
-            <a:stCxn id="4" idx="3"/>
-            <a:endCxn id="6" idx="0"/>
-          </p:cNvCxnSpPr>
-          <p:nvPr/>
-        </p:nvCxnSpPr>
-        <p:spPr>
-          <a:xfrm>
-            <a:off x="6943725" y="1506022"/>
-            <a:ext cx="1381126" cy="503752"/>
-          </a:xfrm>
-          <a:prstGeom prst="bentConnector2">
-            <a:avLst/>
-          </a:prstGeom>
-          <a:ln w="25400">
-            <a:tailEnd type="triangle"/>
-          </a:ln>
-        </p:spPr>
-        <p:style>
-          <a:lnRef idx="1">
-            <a:schemeClr val="accent1"/>
-          </a:lnRef>
-          <a:fillRef idx="0">
-            <a:schemeClr val="accent1"/>
-          </a:fillRef>
-          <a:effectRef idx="0">
-            <a:schemeClr val="accent1"/>
-          </a:effectRef>
-          <a:fontRef idx="minor">
-            <a:schemeClr val="tx1"/>
-          </a:fontRef>
-        </p:style>
-      </p:cxnSp>
-      <p:cxnSp>
-        <p:nvCxnSpPr>
-          <p:cNvPr id="20" name="Connector: Elbow 19">
-            <a:extLst>
-              <a:ext uri="{FF2B5EF4-FFF2-40B4-BE49-F238E27FC236}">
-                <a16:creationId xmlns:a16="http://schemas.microsoft.com/office/drawing/2014/main" id="{09FF27AB-9C1B-490E-85C9-C0AC526BBD96}"/>
-              </a:ext>
-            </a:extLst>
-          </p:cNvPr>
-          <p:cNvCxnSpPr>
-            <a:stCxn id="4" idx="1"/>
-            <a:endCxn id="5" idx="0"/>
-          </p:cNvCxnSpPr>
-          <p:nvPr/>
-        </p:nvCxnSpPr>
-        <p:spPr>
-          <a:xfrm rot="10800000" flipV="1">
-            <a:off x="3867151" y="1506022"/>
-            <a:ext cx="1381124" cy="503752"/>
-          </a:xfrm>
-          <a:prstGeom prst="bentConnector2">
-            <a:avLst/>
-          </a:prstGeom>
-          <a:ln w="25400">
-            <a:tailEnd type="triangle"/>
-          </a:ln>
-        </p:spPr>
-        <p:style>
-          <a:lnRef idx="1">
-            <a:schemeClr val="accent1"/>
-          </a:lnRef>
-          <a:fillRef idx="0">
-            <a:schemeClr val="accent1"/>
-          </a:fillRef>
-          <a:effectRef idx="0">
-            <a:schemeClr val="accent1"/>
-          </a:effectRef>
-          <a:fontRef idx="minor">
-            <a:schemeClr val="tx1"/>
-          </a:fontRef>
-        </p:style>
-      </p:cxnSp>
-      <p:cxnSp>
-        <p:nvCxnSpPr>
-          <p:cNvPr id="22" name="Connector: Elbow 21">
-            <a:extLst>
-              <a:ext uri="{FF2B5EF4-FFF2-40B4-BE49-F238E27FC236}">
-                <a16:creationId xmlns:a16="http://schemas.microsoft.com/office/drawing/2014/main" id="{F6BC9CFE-F00A-412E-A1CE-37418DFB9B54}"/>
-              </a:ext>
-            </a:extLst>
-          </p:cNvPr>
-          <p:cNvCxnSpPr>
-            <a:stCxn id="5" idx="4"/>
-            <a:endCxn id="8" idx="3"/>
-          </p:cNvCxnSpPr>
-          <p:nvPr/>
-        </p:nvCxnSpPr>
-        <p:spPr>
-          <a:xfrm rot="5400000">
-            <a:off x="2986089" y="2547937"/>
-            <a:ext cx="685801" cy="1076325"/>
-          </a:xfrm>
-          <a:prstGeom prst="bentConnector2">
-            <a:avLst/>
-          </a:prstGeom>
-          <a:ln w="25400">
-            <a:tailEnd type="triangle"/>
-          </a:ln>
-        </p:spPr>
-        <p:style>
-          <a:lnRef idx="1">
-            <a:schemeClr val="accent1"/>
-          </a:lnRef>
-          <a:fillRef idx="0">
-            <a:schemeClr val="accent1"/>
-          </a:fillRef>
-          <a:effectRef idx="0">
-            <a:schemeClr val="accent1"/>
-          </a:effectRef>
-          <a:fontRef idx="minor">
-            <a:schemeClr val="tx1"/>
-          </a:fontRef>
-        </p:style>
-      </p:cxnSp>
-      <p:cxnSp>
-        <p:nvCxnSpPr>
-          <p:cNvPr id="28" name="Connector: Elbow 27">
-            <a:extLst>
-              <a:ext uri="{FF2B5EF4-FFF2-40B4-BE49-F238E27FC236}">
-                <a16:creationId xmlns:a16="http://schemas.microsoft.com/office/drawing/2014/main" id="{83B0FF15-C69E-4FF8-BC5D-043A5B521F74}"/>
-              </a:ext>
-            </a:extLst>
-          </p:cNvPr>
-          <p:cNvCxnSpPr>
-            <a:stCxn id="5" idx="4"/>
-            <a:endCxn id="9" idx="3"/>
-          </p:cNvCxnSpPr>
-          <p:nvPr/>
-        </p:nvCxnSpPr>
-        <p:spPr>
-          <a:xfrm rot="5400000">
-            <a:off x="2634051" y="2899975"/>
-            <a:ext cx="1389877" cy="1076325"/>
-          </a:xfrm>
-          <a:prstGeom prst="bentConnector2">
-            <a:avLst/>
-          </a:prstGeom>
-          <a:ln w="25400">
-            <a:tailEnd type="triangle"/>
-          </a:ln>
-        </p:spPr>
-        <p:style>
-          <a:lnRef idx="1">
-            <a:schemeClr val="accent1"/>
-          </a:lnRef>
-          <a:fillRef idx="0">
-            <a:schemeClr val="accent1"/>
-          </a:fillRef>
-          <a:effectRef idx="0">
-            <a:schemeClr val="accent1"/>
-          </a:effectRef>
-          <a:fontRef idx="minor">
-            <a:schemeClr val="tx1"/>
-          </a:fontRef>
-        </p:style>
-      </p:cxnSp>
-      <p:cxnSp>
-        <p:nvCxnSpPr>
-          <p:cNvPr id="30" name="Connector: Elbow 29">
-            <a:extLst>
-              <a:ext uri="{FF2B5EF4-FFF2-40B4-BE49-F238E27FC236}">
-                <a16:creationId xmlns:a16="http://schemas.microsoft.com/office/drawing/2014/main" id="{2116D9DD-5D29-48A8-A2D3-300AEBC5386B}"/>
-              </a:ext>
-            </a:extLst>
-          </p:cNvPr>
-          <p:cNvCxnSpPr>
-            <a:stCxn id="5" idx="4"/>
-            <a:endCxn id="10" idx="3"/>
-          </p:cNvCxnSpPr>
-          <p:nvPr/>
-        </p:nvCxnSpPr>
-        <p:spPr>
-          <a:xfrm rot="5400000">
-            <a:off x="2235846" y="3298180"/>
-            <a:ext cx="2186286" cy="1076325"/>
-          </a:xfrm>
-          <a:prstGeom prst="bentConnector2">
-            <a:avLst/>
-          </a:prstGeom>
-          <a:ln w="25400">
-            <a:tailEnd type="triangle"/>
-          </a:ln>
-        </p:spPr>
-        <p:style>
-          <a:lnRef idx="1">
-            <a:schemeClr val="accent1"/>
-          </a:lnRef>
-          <a:fillRef idx="0">
-            <a:schemeClr val="accent1"/>
-          </a:fillRef>
-          <a:effectRef idx="0">
-            <a:schemeClr val="accent1"/>
-          </a:effectRef>
-          <a:fontRef idx="minor">
-            <a:schemeClr val="tx1"/>
-          </a:fontRef>
-        </p:style>
-      </p:cxnSp>
-      <p:cxnSp>
-        <p:nvCxnSpPr>
-          <p:cNvPr id="32" name="Connector: Elbow 31">
-            <a:extLst>
-              <a:ext uri="{FF2B5EF4-FFF2-40B4-BE49-F238E27FC236}">
-                <a16:creationId xmlns:a16="http://schemas.microsoft.com/office/drawing/2014/main" id="{6394D815-BF03-42BB-BB9A-4F2C30AA7C7F}"/>
-              </a:ext>
-            </a:extLst>
-          </p:cNvPr>
-          <p:cNvCxnSpPr>
-            <a:stCxn id="6" idx="4"/>
-            <a:endCxn id="11" idx="1"/>
-          </p:cNvCxnSpPr>
-          <p:nvPr/>
-        </p:nvCxnSpPr>
-        <p:spPr>
-          <a:xfrm rot="16200000" flipH="1">
-            <a:off x="8391526" y="2676523"/>
-            <a:ext cx="685801" cy="819151"/>
-          </a:xfrm>
-          <a:prstGeom prst="bentConnector2">
-            <a:avLst/>
-          </a:prstGeom>
-          <a:ln w="25400">
-            <a:tailEnd type="triangle"/>
-          </a:ln>
-        </p:spPr>
-        <p:style>
-          <a:lnRef idx="1">
-            <a:schemeClr val="accent1"/>
-          </a:lnRef>
-          <a:fillRef idx="0">
-            <a:schemeClr val="accent1"/>
-          </a:fillRef>
-          <a:effectRef idx="0">
-            <a:schemeClr val="accent1"/>
-          </a:effectRef>
-          <a:fontRef idx="minor">
-            <a:schemeClr val="tx1"/>
-          </a:fontRef>
-        </p:style>
-      </p:cxnSp>
-      <p:cxnSp>
-        <p:nvCxnSpPr>
-          <p:cNvPr id="34" name="Connector: Elbow 33">
-            <a:extLst>
-              <a:ext uri="{FF2B5EF4-FFF2-40B4-BE49-F238E27FC236}">
-                <a16:creationId xmlns:a16="http://schemas.microsoft.com/office/drawing/2014/main" id="{BC88EA65-B3FA-48A2-821D-70DA839E8AB0}"/>
-              </a:ext>
-            </a:extLst>
-          </p:cNvPr>
-          <p:cNvCxnSpPr>
-            <a:stCxn id="6" idx="4"/>
-            <a:endCxn id="12" idx="1"/>
-          </p:cNvCxnSpPr>
-          <p:nvPr/>
-        </p:nvCxnSpPr>
-        <p:spPr>
-          <a:xfrm rot="16200000" flipH="1">
-            <a:off x="8039488" y="3028561"/>
-            <a:ext cx="1389877" cy="819151"/>
-          </a:xfrm>
-          <a:prstGeom prst="bentConnector2">
-            <a:avLst/>
-          </a:prstGeom>
-          <a:ln w="25400">
-            <a:tailEnd type="triangle"/>
-          </a:ln>
-        </p:spPr>
-        <p:style>
-          <a:lnRef idx="1">
-            <a:schemeClr val="accent1"/>
-          </a:lnRef>
-          <a:fillRef idx="0">
-            <a:schemeClr val="accent1"/>
-          </a:fillRef>
-          <a:effectRef idx="0">
-            <a:schemeClr val="accent1"/>
-          </a:effectRef>
-          <a:fontRef idx="minor">
-            <a:schemeClr val="tx1"/>
-          </a:fontRef>
-        </p:style>
-      </p:cxnSp>
-      <p:cxnSp>
-        <p:nvCxnSpPr>
-          <p:cNvPr id="36" name="Connector: Elbow 35">
-            <a:extLst>
-              <a:ext uri="{FF2B5EF4-FFF2-40B4-BE49-F238E27FC236}">
-                <a16:creationId xmlns:a16="http://schemas.microsoft.com/office/drawing/2014/main" id="{21C25B0F-D050-4F40-9CF5-2500B97B5833}"/>
-              </a:ext>
-            </a:extLst>
-          </p:cNvPr>
-          <p:cNvCxnSpPr>
-            <a:stCxn id="6" idx="4"/>
-            <a:endCxn id="13" idx="1"/>
-          </p:cNvCxnSpPr>
-          <p:nvPr/>
-        </p:nvCxnSpPr>
-        <p:spPr>
-          <a:xfrm rot="16200000" flipH="1">
-            <a:off x="7687450" y="3380599"/>
-            <a:ext cx="2093953" cy="819151"/>
-          </a:xfrm>
-          <a:prstGeom prst="bentConnector2">
-            <a:avLst/>
-          </a:prstGeom>
-          <a:ln w="25400">
-            <a:tailEnd type="triangle"/>
-          </a:ln>
-        </p:spPr>
-        <p:style>
-          <a:lnRef idx="1">
-            <a:schemeClr val="accent1"/>
-          </a:lnRef>
-          <a:fillRef idx="0">
-            <a:schemeClr val="accent1"/>
-          </a:fillRef>
-          <a:effectRef idx="0">
-            <a:schemeClr val="accent1"/>
-          </a:effectRef>
-          <a:fontRef idx="minor">
-            <a:schemeClr val="tx1"/>
-          </a:fontRef>
-        </p:style>
-      </p:cxnSp>
-      <p:cxnSp>
-        <p:nvCxnSpPr>
-          <p:cNvPr id="38" name="Connector: Elbow 37">
-            <a:extLst>
-              <a:ext uri="{FF2B5EF4-FFF2-40B4-BE49-F238E27FC236}">
-                <a16:creationId xmlns:a16="http://schemas.microsoft.com/office/drawing/2014/main" id="{01FD20A6-7437-425F-BDA1-A5FB560C5051}"/>
-              </a:ext>
-            </a:extLst>
-          </p:cNvPr>
-          <p:cNvCxnSpPr>
-            <a:stCxn id="6" idx="4"/>
-            <a:endCxn id="15" idx="1"/>
-          </p:cNvCxnSpPr>
-          <p:nvPr/>
-        </p:nvCxnSpPr>
-        <p:spPr>
-          <a:xfrm rot="16200000" flipH="1">
-            <a:off x="7335412" y="3732637"/>
-            <a:ext cx="2798029" cy="819151"/>
-          </a:xfrm>
-          <a:prstGeom prst="bentConnector2">
-            <a:avLst/>
-          </a:prstGeom>
-          <a:ln w="25400">
-            <a:tailEnd type="triangle"/>
-          </a:ln>
-        </p:spPr>
-        <p:style>
-          <a:lnRef idx="1">
-            <a:schemeClr val="accent1"/>
-          </a:lnRef>
-          <a:fillRef idx="0">
-            <a:schemeClr val="accent1"/>
-          </a:fillRef>
-          <a:effectRef idx="0">
-            <a:schemeClr val="accent1"/>
-          </a:effectRef>
-          <a:fontRef idx="minor">
-            <a:schemeClr val="tx1"/>
-          </a:fontRef>
-        </p:style>
-      </p:cxnSp>
-      <p:sp>
-        <p:nvSpPr>
-          <p:cNvPr id="39" name="TextBox 38">
-            <a:extLst>
-              <a:ext uri="{FF2B5EF4-FFF2-40B4-BE49-F238E27FC236}">
-                <a16:creationId xmlns:a16="http://schemas.microsoft.com/office/drawing/2014/main" id="{1E38FF72-446C-4B6B-991B-2705D7987FB8}"/>
-              </a:ext>
-            </a:extLst>
-          </p:cNvPr>
-          <p:cNvSpPr txBox="1"/>
-          <p:nvPr/>
-        </p:nvSpPr>
-        <p:spPr>
-          <a:xfrm>
-            <a:off x="9144001" y="6059089"/>
-            <a:ext cx="2209798" cy="369332"/>
-          </a:xfrm>
-          <a:prstGeom prst="rect">
-            <a:avLst/>
-          </a:prstGeom>
-          <a:noFill/>
-          <a:ln w="38100">
-            <a:solidFill>
-              <a:schemeClr val="tx1"/>
-            </a:solidFill>
-          </a:ln>
-        </p:spPr>
-        <p:txBody>
-          <a:bodyPr wrap="square" rtlCol="0">
-            <a:spAutoFit/>
-          </a:bodyPr>
-          <a:lstStyle/>
-          <a:p>
-            <a:pPr algn="ctr"/>
-            <a:r>
-              <a:rPr lang="en-US" dirty="0"/>
-              <a:t>Band Members</a:t>
-            </a:r>
-          </a:p>
-        </p:txBody>
-      </p:sp>
-      <p:cxnSp>
-        <p:nvCxnSpPr>
-          <p:cNvPr id="42" name="Connector: Elbow 41">
-            <a:extLst>
-              <a:ext uri="{FF2B5EF4-FFF2-40B4-BE49-F238E27FC236}">
-                <a16:creationId xmlns:a16="http://schemas.microsoft.com/office/drawing/2014/main" id="{11512B6E-C858-4899-B5CE-50A81E89E66E}"/>
-              </a:ext>
-            </a:extLst>
-          </p:cNvPr>
-          <p:cNvCxnSpPr>
-            <a:stCxn id="6" idx="4"/>
-            <a:endCxn id="39" idx="1"/>
-          </p:cNvCxnSpPr>
-          <p:nvPr/>
-        </p:nvCxnSpPr>
-        <p:spPr>
-          <a:xfrm rot="16200000" flipH="1">
-            <a:off x="6984148" y="4083902"/>
-            <a:ext cx="3500556" cy="819150"/>
-          </a:xfrm>
-          <a:prstGeom prst="bentConnector2">
-            <a:avLst/>
-          </a:prstGeom>
-          <a:ln w="25400">
-            <a:tailEnd type="triangle"/>
-          </a:ln>
-        </p:spPr>
-        <p:style>
-          <a:lnRef idx="1">
-            <a:schemeClr val="accent1"/>
-          </a:lnRef>
-          <a:fillRef idx="0">
-            <a:schemeClr val="accent1"/>
-          </a:fillRef>
-          <a:effectRef idx="0">
-            <a:schemeClr val="accent1"/>
-          </a:effectRef>
-          <a:fontRef idx="minor">
-            <a:schemeClr val="tx1"/>
-          </a:fontRef>
-        </p:style>
-      </p:cxnSp>
     </p:spTree>
     <p:extLst>
       <p:ext uri="{BB962C8B-B14F-4D97-AF65-F5344CB8AC3E}">
-        <p14:creationId xmlns:p14="http://schemas.microsoft.com/office/powerpoint/2010/main" val="1044828157"/>
+        <p14:creationId xmlns:p14="http://schemas.microsoft.com/office/powerpoint/2010/main" val="2205242116"/>
       </p:ext>
     </p:extLst>
   </p:cSld>

</xml_diff>

<commit_message>
Summary:  - Change buttons in menu, from 2 different searches, to 1 search with option inside of it to screen the results - Only UI implemented  - UI:     - Chats --> All UI regarding Chats List, Chat buttons, inside each chat, ALL completed     - Posts --> Posts List design + Each Post design are completed  - UX:     - Chats + Posts --> most of the Ux fixed and improved duo to new UI workflow     - Fixed in most pages the margin and padding of parent layouts, in order to support all screen sizes, without overlapping on the AppBar nor the NavigationBar  - General:     - Edited and improved the PP slide of the Musician Finder Specification Document.pptx file     - Edited to show the curret state of the project of the Monday.com_Musician_Finder.xlsx file
Note:
    Monday.com free trial expired, so I converted it all to a Excel file and attached it to the project directory, I will update it each time someone start or finish working on one of the tasks

 #Lidor
</commit_message>
<xml_diff>
--- a/Musician Finder Specification Document.pptx
+++ b/Musician Finder Specification Document.pptx
@@ -13,10 +13,11 @@
     <p:sldId id="260" r:id="rId7"/>
     <p:sldId id="262" r:id="rId8"/>
     <p:sldId id="265" r:id="rId9"/>
-    <p:sldId id="263" r:id="rId10"/>
-    <p:sldId id="268" r:id="rId11"/>
-    <p:sldId id="264" r:id="rId12"/>
-    <p:sldId id="267" r:id="rId13"/>
+    <p:sldId id="267" r:id="rId10"/>
+    <p:sldId id="269" r:id="rId11"/>
+    <p:sldId id="263" r:id="rId12"/>
+    <p:sldId id="268" r:id="rId13"/>
+    <p:sldId id="264" r:id="rId14"/>
   </p:sldIdLst>
   <p:sldSz cx="12192000" cy="6858000"/>
   <p:notesSz cx="6858000" cy="9144000"/>
@@ -270,7 +271,7 @@
           <a:p>
             <a:fld id="{60236AC0-9DFC-4CD7-B90F-666E0616086E}" type="datetimeFigureOut">
               <a:rPr lang="en-US" smtClean="0"/>
-              <a:t>10/8/2020</a:t>
+              <a:t>10/9/2020</a:t>
             </a:fld>
             <a:endParaRPr lang="en-US"/>
           </a:p>
@@ -468,7 +469,7 @@
           <a:p>
             <a:fld id="{60236AC0-9DFC-4CD7-B90F-666E0616086E}" type="datetimeFigureOut">
               <a:rPr lang="en-US" smtClean="0"/>
-              <a:t>10/8/2020</a:t>
+              <a:t>10/9/2020</a:t>
             </a:fld>
             <a:endParaRPr lang="en-US"/>
           </a:p>
@@ -676,7 +677,7 @@
           <a:p>
             <a:fld id="{60236AC0-9DFC-4CD7-B90F-666E0616086E}" type="datetimeFigureOut">
               <a:rPr lang="en-US" smtClean="0"/>
-              <a:t>10/8/2020</a:t>
+              <a:t>10/9/2020</a:t>
             </a:fld>
             <a:endParaRPr lang="en-US"/>
           </a:p>
@@ -874,7 +875,7 @@
           <a:p>
             <a:fld id="{60236AC0-9DFC-4CD7-B90F-666E0616086E}" type="datetimeFigureOut">
               <a:rPr lang="en-US" smtClean="0"/>
-              <a:t>10/8/2020</a:t>
+              <a:t>10/9/2020</a:t>
             </a:fld>
             <a:endParaRPr lang="en-US"/>
           </a:p>
@@ -1149,7 +1150,7 @@
           <a:p>
             <a:fld id="{60236AC0-9DFC-4CD7-B90F-666E0616086E}" type="datetimeFigureOut">
               <a:rPr lang="en-US" smtClean="0"/>
-              <a:t>10/8/2020</a:t>
+              <a:t>10/9/2020</a:t>
             </a:fld>
             <a:endParaRPr lang="en-US"/>
           </a:p>
@@ -1414,7 +1415,7 @@
           <a:p>
             <a:fld id="{60236AC0-9DFC-4CD7-B90F-666E0616086E}" type="datetimeFigureOut">
               <a:rPr lang="en-US" smtClean="0"/>
-              <a:t>10/8/2020</a:t>
+              <a:t>10/9/2020</a:t>
             </a:fld>
             <a:endParaRPr lang="en-US"/>
           </a:p>
@@ -1826,7 +1827,7 @@
           <a:p>
             <a:fld id="{60236AC0-9DFC-4CD7-B90F-666E0616086E}" type="datetimeFigureOut">
               <a:rPr lang="en-US" smtClean="0"/>
-              <a:t>10/8/2020</a:t>
+              <a:t>10/9/2020</a:t>
             </a:fld>
             <a:endParaRPr lang="en-US"/>
           </a:p>
@@ -1967,7 +1968,7 @@
           <a:p>
             <a:fld id="{60236AC0-9DFC-4CD7-B90F-666E0616086E}" type="datetimeFigureOut">
               <a:rPr lang="en-US" smtClean="0"/>
-              <a:t>10/8/2020</a:t>
+              <a:t>10/9/2020</a:t>
             </a:fld>
             <a:endParaRPr lang="en-US"/>
           </a:p>
@@ -2080,7 +2081,7 @@
           <a:p>
             <a:fld id="{60236AC0-9DFC-4CD7-B90F-666E0616086E}" type="datetimeFigureOut">
               <a:rPr lang="en-US" smtClean="0"/>
-              <a:t>10/8/2020</a:t>
+              <a:t>10/9/2020</a:t>
             </a:fld>
             <a:endParaRPr lang="en-US"/>
           </a:p>
@@ -2391,7 +2392,7 @@
           <a:p>
             <a:fld id="{60236AC0-9DFC-4CD7-B90F-666E0616086E}" type="datetimeFigureOut">
               <a:rPr lang="en-US" smtClean="0"/>
-              <a:t>10/8/2020</a:t>
+              <a:t>10/9/2020</a:t>
             </a:fld>
             <a:endParaRPr lang="en-US"/>
           </a:p>
@@ -2679,7 +2680,7 @@
           <a:p>
             <a:fld id="{60236AC0-9DFC-4CD7-B90F-666E0616086E}" type="datetimeFigureOut">
               <a:rPr lang="en-US" smtClean="0"/>
-              <a:t>10/8/2020</a:t>
+              <a:t>10/9/2020</a:t>
             </a:fld>
             <a:endParaRPr lang="en-US"/>
           </a:p>
@@ -2920,7 +2921,7 @@
           <a:p>
             <a:fld id="{60236AC0-9DFC-4CD7-B90F-666E0616086E}" type="datetimeFigureOut">
               <a:rPr lang="en-US" smtClean="0"/>
-              <a:t>10/8/2020</a:t>
+              <a:t>10/9/2020</a:t>
             </a:fld>
             <a:endParaRPr lang="en-US"/>
           </a:p>
@@ -3486,6 +3487,1338 @@
 </file>
 
 <file path=ppt/slides/slide10.xml><?xml version="1.0" encoding="utf-8"?>
+<p:sld xmlns:a="http://schemas.openxmlformats.org/drawingml/2006/main" xmlns:r="http://schemas.openxmlformats.org/officeDocument/2006/relationships" xmlns:p="http://schemas.openxmlformats.org/presentationml/2006/main">
+  <p:cSld>
+    <p:spTree>
+      <p:nvGrpSpPr>
+        <p:cNvPr id="1" name=""/>
+        <p:cNvGrpSpPr/>
+        <p:nvPr/>
+      </p:nvGrpSpPr>
+      <p:grpSpPr>
+        <a:xfrm>
+          <a:off x="0" y="0"/>
+          <a:ext cx="0" cy="0"/>
+          <a:chOff x="0" y="0"/>
+          <a:chExt cx="0" cy="0"/>
+        </a:xfrm>
+      </p:grpSpPr>
+      <p:sp>
+        <p:nvSpPr>
+          <p:cNvPr id="2" name="Title 1">
+            <a:extLst>
+              <a:ext uri="{FF2B5EF4-FFF2-40B4-BE49-F238E27FC236}">
+                <a16:creationId xmlns:a16="http://schemas.microsoft.com/office/drawing/2014/main" id="{CB494111-5968-4AFE-9F1C-BEF68CAB6BD8}"/>
+              </a:ext>
+            </a:extLst>
+          </p:cNvPr>
+          <p:cNvSpPr>
+            <a:spLocks noGrp="1"/>
+          </p:cNvSpPr>
+          <p:nvPr>
+            <p:ph type="title"/>
+          </p:nvPr>
+        </p:nvSpPr>
+        <p:spPr/>
+        <p:txBody>
+          <a:bodyPr/>
+          <a:lstStyle/>
+          <a:p>
+            <a:r>
+              <a:rPr lang="en-US" b="1" u="sng" dirty="0">
+                <a:effectLst>
+                  <a:outerShdw blurRad="38100" dist="38100" dir="2700000" algn="tl">
+                    <a:srgbClr val="000000">
+                      <a:alpha val="43137"/>
+                    </a:srgbClr>
+                  </a:outerShdw>
+                </a:effectLst>
+              </a:rPr>
+              <a:t>All Posts</a:t>
+            </a:r>
+          </a:p>
+        </p:txBody>
+      </p:sp>
+      <p:sp>
+        <p:nvSpPr>
+          <p:cNvPr id="4" name="TextBox 3">
+            <a:extLst>
+              <a:ext uri="{FF2B5EF4-FFF2-40B4-BE49-F238E27FC236}">
+                <a16:creationId xmlns:a16="http://schemas.microsoft.com/office/drawing/2014/main" id="{93C2B7C3-42CF-4C92-B107-7903901081AF}"/>
+              </a:ext>
+            </a:extLst>
+          </p:cNvPr>
+          <p:cNvSpPr txBox="1"/>
+          <p:nvPr/>
+        </p:nvSpPr>
+        <p:spPr>
+          <a:xfrm>
+            <a:off x="4369293" y="1287263"/>
+            <a:ext cx="3453414" cy="5362113"/>
+          </a:xfrm>
+          <a:prstGeom prst="rect">
+            <a:avLst/>
+          </a:prstGeom>
+          <a:noFill/>
+          <a:ln w="38100">
+            <a:solidFill>
+              <a:schemeClr val="tx1"/>
+            </a:solidFill>
+          </a:ln>
+        </p:spPr>
+        <p:txBody>
+          <a:bodyPr wrap="square" rtlCol="0">
+            <a:spAutoFit/>
+          </a:bodyPr>
+          <a:lstStyle/>
+          <a:p>
+            <a:endParaRPr lang="en-US" dirty="0"/>
+          </a:p>
+        </p:txBody>
+      </p:sp>
+      <p:sp>
+        <p:nvSpPr>
+          <p:cNvPr id="5" name="TextBox 4">
+            <a:extLst>
+              <a:ext uri="{FF2B5EF4-FFF2-40B4-BE49-F238E27FC236}">
+                <a16:creationId xmlns:a16="http://schemas.microsoft.com/office/drawing/2014/main" id="{4362C3D6-6643-4D63-87AC-C0276D8C4B2B}"/>
+              </a:ext>
+            </a:extLst>
+          </p:cNvPr>
+          <p:cNvSpPr txBox="1"/>
+          <p:nvPr/>
+        </p:nvSpPr>
+        <p:spPr>
+          <a:xfrm>
+            <a:off x="5711445" y="1408180"/>
+            <a:ext cx="769110" cy="369332"/>
+          </a:xfrm>
+          <a:prstGeom prst="rect">
+            <a:avLst/>
+          </a:prstGeom>
+          <a:noFill/>
+        </p:spPr>
+        <p:txBody>
+          <a:bodyPr wrap="square" rtlCol="0">
+            <a:spAutoFit/>
+          </a:bodyPr>
+          <a:lstStyle/>
+          <a:p>
+            <a:r>
+              <a:rPr lang="en-US" dirty="0"/>
+              <a:t>Posts</a:t>
+            </a:r>
+          </a:p>
+        </p:txBody>
+      </p:sp>
+      <p:sp>
+        <p:nvSpPr>
+          <p:cNvPr id="6" name="Rectangle 5">
+            <a:extLst>
+              <a:ext uri="{FF2B5EF4-FFF2-40B4-BE49-F238E27FC236}">
+                <a16:creationId xmlns:a16="http://schemas.microsoft.com/office/drawing/2014/main" id="{AABB2021-0577-408D-AE1E-DDE69C4CC3B3}"/>
+              </a:ext>
+            </a:extLst>
+          </p:cNvPr>
+          <p:cNvSpPr/>
+          <p:nvPr/>
+        </p:nvSpPr>
+        <p:spPr>
+          <a:xfrm>
+            <a:off x="4515773" y="1796852"/>
+            <a:ext cx="3160451" cy="307155"/>
+          </a:xfrm>
+          <a:prstGeom prst="rect">
+            <a:avLst/>
+          </a:prstGeom>
+        </p:spPr>
+        <p:style>
+          <a:lnRef idx="2">
+            <a:schemeClr val="accent1">
+              <a:shade val="50000"/>
+            </a:schemeClr>
+          </a:lnRef>
+          <a:fillRef idx="1">
+            <a:schemeClr val="accent1"/>
+          </a:fillRef>
+          <a:effectRef idx="0">
+            <a:schemeClr val="accent1"/>
+          </a:effectRef>
+          <a:fontRef idx="minor">
+            <a:schemeClr val="lt1"/>
+          </a:fontRef>
+        </p:style>
+        <p:txBody>
+          <a:bodyPr rtlCol="0" anchor="ctr"/>
+          <a:lstStyle/>
+          <a:p>
+            <a:pPr algn="ctr"/>
+            <a:r>
+              <a:rPr lang="en-US" dirty="0"/>
+              <a:t>Post 1</a:t>
+            </a:r>
+          </a:p>
+        </p:txBody>
+      </p:sp>
+      <p:sp>
+        <p:nvSpPr>
+          <p:cNvPr id="7" name="Rectangle 6">
+            <a:extLst>
+              <a:ext uri="{FF2B5EF4-FFF2-40B4-BE49-F238E27FC236}">
+                <a16:creationId xmlns:a16="http://schemas.microsoft.com/office/drawing/2014/main" id="{C8D9B19A-4B9E-4E54-B288-91B33F79D81B}"/>
+              </a:ext>
+            </a:extLst>
+          </p:cNvPr>
+          <p:cNvSpPr/>
+          <p:nvPr/>
+        </p:nvSpPr>
+        <p:spPr>
+          <a:xfrm>
+            <a:off x="4515774" y="2213125"/>
+            <a:ext cx="3160451" cy="307155"/>
+          </a:xfrm>
+          <a:prstGeom prst="rect">
+            <a:avLst/>
+          </a:prstGeom>
+        </p:spPr>
+        <p:style>
+          <a:lnRef idx="2">
+            <a:schemeClr val="accent1">
+              <a:shade val="50000"/>
+            </a:schemeClr>
+          </a:lnRef>
+          <a:fillRef idx="1">
+            <a:schemeClr val="accent1"/>
+          </a:fillRef>
+          <a:effectRef idx="0">
+            <a:schemeClr val="accent1"/>
+          </a:effectRef>
+          <a:fontRef idx="minor">
+            <a:schemeClr val="lt1"/>
+          </a:fontRef>
+        </p:style>
+        <p:txBody>
+          <a:bodyPr rtlCol="0" anchor="ctr"/>
+          <a:lstStyle/>
+          <a:p>
+            <a:pPr algn="ctr"/>
+            <a:r>
+              <a:rPr lang="en-US" dirty="0"/>
+              <a:t>Post 2</a:t>
+            </a:r>
+          </a:p>
+        </p:txBody>
+      </p:sp>
+      <p:sp>
+        <p:nvSpPr>
+          <p:cNvPr id="8" name="Rectangle 7">
+            <a:extLst>
+              <a:ext uri="{FF2B5EF4-FFF2-40B4-BE49-F238E27FC236}">
+                <a16:creationId xmlns:a16="http://schemas.microsoft.com/office/drawing/2014/main" id="{063C9B5D-7938-4654-96B2-8DFB8515AA23}"/>
+              </a:ext>
+            </a:extLst>
+          </p:cNvPr>
+          <p:cNvSpPr/>
+          <p:nvPr/>
+        </p:nvSpPr>
+        <p:spPr>
+          <a:xfrm>
+            <a:off x="4515774" y="5562470"/>
+            <a:ext cx="3160451" cy="307155"/>
+          </a:xfrm>
+          <a:prstGeom prst="rect">
+            <a:avLst/>
+          </a:prstGeom>
+        </p:spPr>
+        <p:style>
+          <a:lnRef idx="2">
+            <a:schemeClr val="accent1">
+              <a:shade val="50000"/>
+            </a:schemeClr>
+          </a:lnRef>
+          <a:fillRef idx="1">
+            <a:schemeClr val="accent1"/>
+          </a:fillRef>
+          <a:effectRef idx="0">
+            <a:schemeClr val="accent1"/>
+          </a:effectRef>
+          <a:fontRef idx="minor">
+            <a:schemeClr val="lt1"/>
+          </a:fontRef>
+        </p:style>
+        <p:txBody>
+          <a:bodyPr rtlCol="0" anchor="ctr"/>
+          <a:lstStyle/>
+          <a:p>
+            <a:pPr algn="ctr"/>
+            <a:r>
+              <a:rPr lang="en-US" dirty="0"/>
+              <a:t>Post n</a:t>
+            </a:r>
+          </a:p>
+        </p:txBody>
+      </p:sp>
+      <p:sp>
+        <p:nvSpPr>
+          <p:cNvPr id="9" name="TextBox 8">
+            <a:extLst>
+              <a:ext uri="{FF2B5EF4-FFF2-40B4-BE49-F238E27FC236}">
+                <a16:creationId xmlns:a16="http://schemas.microsoft.com/office/drawing/2014/main" id="{E4EFE505-3960-420B-B30E-32844D64A33D}"/>
+              </a:ext>
+            </a:extLst>
+          </p:cNvPr>
+          <p:cNvSpPr txBox="1"/>
+          <p:nvPr/>
+        </p:nvSpPr>
+        <p:spPr>
+          <a:xfrm>
+            <a:off x="5976414" y="2391533"/>
+            <a:ext cx="239168" cy="830997"/>
+          </a:xfrm>
+          <a:prstGeom prst="rect">
+            <a:avLst/>
+          </a:prstGeom>
+          <a:noFill/>
+        </p:spPr>
+        <p:txBody>
+          <a:bodyPr wrap="none" rtlCol="0">
+            <a:spAutoFit/>
+          </a:bodyPr>
+          <a:lstStyle/>
+          <a:p>
+            <a:r>
+              <a:rPr lang="en-US" sz="1600" b="1" dirty="0">
+                <a:effectLst>
+                  <a:outerShdw blurRad="38100" dist="38100" dir="2700000" algn="tl">
+                    <a:srgbClr val="000000">
+                      <a:alpha val="43137"/>
+                    </a:srgbClr>
+                  </a:outerShdw>
+                </a:effectLst>
+              </a:rPr>
+              <a:t>.</a:t>
+            </a:r>
+          </a:p>
+          <a:p>
+            <a:r>
+              <a:rPr lang="en-US" sz="1600" b="1" dirty="0">
+                <a:effectLst>
+                  <a:outerShdw blurRad="38100" dist="38100" dir="2700000" algn="tl">
+                    <a:srgbClr val="000000">
+                      <a:alpha val="43137"/>
+                    </a:srgbClr>
+                  </a:outerShdw>
+                </a:effectLst>
+              </a:rPr>
+              <a:t>.</a:t>
+            </a:r>
+          </a:p>
+          <a:p>
+            <a:r>
+              <a:rPr lang="en-US" sz="1600" b="1" dirty="0">
+                <a:effectLst>
+                  <a:outerShdw blurRad="38100" dist="38100" dir="2700000" algn="tl">
+                    <a:srgbClr val="000000">
+                      <a:alpha val="43137"/>
+                    </a:srgbClr>
+                  </a:outerShdw>
+                </a:effectLst>
+              </a:rPr>
+              <a:t>.</a:t>
+            </a:r>
+          </a:p>
+        </p:txBody>
+      </p:sp>
+      <p:sp>
+        <p:nvSpPr>
+          <p:cNvPr id="10" name="Oval 9">
+            <a:extLst>
+              <a:ext uri="{FF2B5EF4-FFF2-40B4-BE49-F238E27FC236}">
+                <a16:creationId xmlns:a16="http://schemas.microsoft.com/office/drawing/2014/main" id="{E126EF0D-03FA-4519-BAD4-CE3B41E598C4}"/>
+              </a:ext>
+            </a:extLst>
+          </p:cNvPr>
+          <p:cNvSpPr/>
+          <p:nvPr/>
+        </p:nvSpPr>
+        <p:spPr>
+          <a:xfrm>
+            <a:off x="5647719" y="6110747"/>
+            <a:ext cx="896557" cy="444278"/>
+          </a:xfrm>
+          <a:prstGeom prst="ellipse">
+            <a:avLst/>
+          </a:prstGeom>
+          <a:solidFill>
+            <a:schemeClr val="bg1">
+              <a:lumMod val="95000"/>
+            </a:schemeClr>
+          </a:solidFill>
+          <a:ln w="38100">
+            <a:solidFill>
+              <a:srgbClr val="7030A0"/>
+            </a:solidFill>
+          </a:ln>
+        </p:spPr>
+        <p:style>
+          <a:lnRef idx="2">
+            <a:schemeClr val="accent1">
+              <a:shade val="50000"/>
+            </a:schemeClr>
+          </a:lnRef>
+          <a:fillRef idx="1">
+            <a:schemeClr val="accent1"/>
+          </a:fillRef>
+          <a:effectRef idx="0">
+            <a:schemeClr val="accent1"/>
+          </a:effectRef>
+          <a:fontRef idx="minor">
+            <a:schemeClr val="lt1"/>
+          </a:fontRef>
+        </p:style>
+        <p:txBody>
+          <a:bodyPr rtlCol="0" anchor="ctr"/>
+          <a:lstStyle/>
+          <a:p>
+            <a:pPr algn="ctr"/>
+            <a:r>
+              <a:rPr lang="en-US" sz="1400" dirty="0">
+                <a:solidFill>
+                  <a:schemeClr val="tx1"/>
+                </a:solidFill>
+              </a:rPr>
+              <a:t>Back</a:t>
+            </a:r>
+          </a:p>
+        </p:txBody>
+      </p:sp>
+      <p:sp>
+        <p:nvSpPr>
+          <p:cNvPr id="18" name="Rectangle 17">
+            <a:extLst>
+              <a:ext uri="{FF2B5EF4-FFF2-40B4-BE49-F238E27FC236}">
+                <a16:creationId xmlns:a16="http://schemas.microsoft.com/office/drawing/2014/main" id="{0F9BC0B4-B308-4CF1-AA9E-26A49F182CC0}"/>
+              </a:ext>
+            </a:extLst>
+          </p:cNvPr>
+          <p:cNvSpPr/>
+          <p:nvPr/>
+        </p:nvSpPr>
+        <p:spPr>
+          <a:xfrm>
+            <a:off x="4515773" y="3229517"/>
+            <a:ext cx="3160451" cy="1386871"/>
+          </a:xfrm>
+          <a:prstGeom prst="rect">
+            <a:avLst/>
+          </a:prstGeom>
+        </p:spPr>
+        <p:style>
+          <a:lnRef idx="2">
+            <a:schemeClr val="accent1">
+              <a:shade val="50000"/>
+            </a:schemeClr>
+          </a:lnRef>
+          <a:fillRef idx="1">
+            <a:schemeClr val="accent1"/>
+          </a:fillRef>
+          <a:effectRef idx="0">
+            <a:schemeClr val="accent1"/>
+          </a:effectRef>
+          <a:fontRef idx="minor">
+            <a:schemeClr val="lt1"/>
+          </a:fontRef>
+        </p:style>
+        <p:txBody>
+          <a:bodyPr rtlCol="0" anchor="ctr"/>
+          <a:lstStyle/>
+          <a:p>
+            <a:r>
+              <a:rPr lang="en-US" sz="1400" dirty="0"/>
+              <a:t>Name: David</a:t>
+            </a:r>
+          </a:p>
+          <a:p>
+            <a:r>
+              <a:rPr lang="en-US" sz="1400" dirty="0"/>
+              <a:t>Location:</a:t>
+            </a:r>
+            <a:r>
+              <a:rPr kumimoji="0" lang="en-US" altLang="en-US" sz="1400" b="0" i="0" u="none" strike="noStrike" cap="none" normalizeH="0" baseline="0" dirty="0">
+                <a:ln>
+                  <a:noFill/>
+                </a:ln>
+                <a:solidFill>
+                  <a:srgbClr val="222222"/>
+                </a:solidFill>
+                <a:effectLst/>
+                <a:latin typeface="inherit"/>
+              </a:rPr>
+              <a:t> </a:t>
+            </a:r>
+            <a:r>
+              <a:rPr kumimoji="0" lang="en-US" altLang="en-US" sz="1400" b="0" i="0" u="none" strike="noStrike" cap="none" normalizeH="0" baseline="0" dirty="0">
+                <a:ln>
+                  <a:noFill/>
+                </a:ln>
+                <a:solidFill>
+                  <a:schemeClr val="bg1"/>
+                </a:solidFill>
+                <a:effectLst/>
+                <a:latin typeface="inherit"/>
+              </a:rPr>
+              <a:t>Babylon</a:t>
+            </a:r>
+          </a:p>
+          <a:p>
+            <a:r>
+              <a:rPr lang="en-US" sz="1400" dirty="0">
+                <a:solidFill>
+                  <a:schemeClr val="bg1"/>
+                </a:solidFill>
+                <a:latin typeface="inherit"/>
+              </a:rPr>
+              <a:t>Instrument: My tool</a:t>
+            </a:r>
+          </a:p>
+          <a:p>
+            <a:r>
+              <a:rPr lang="en-US" sz="1400" dirty="0">
+                <a:solidFill>
+                  <a:schemeClr val="bg1"/>
+                </a:solidFill>
+                <a:latin typeface="inherit"/>
+              </a:rPr>
+              <a:t>Content: Some sob story</a:t>
+            </a:r>
+          </a:p>
+          <a:p>
+            <a:endParaRPr lang="en-US" sz="800" dirty="0">
+              <a:solidFill>
+                <a:schemeClr val="bg1"/>
+              </a:solidFill>
+              <a:latin typeface="inherit"/>
+            </a:endParaRPr>
+          </a:p>
+          <a:p>
+            <a:r>
+              <a:rPr lang="en-US" sz="1600" dirty="0">
+                <a:solidFill>
+                  <a:schemeClr val="bg1"/>
+                </a:solidFill>
+                <a:latin typeface="inherit"/>
+              </a:rPr>
+              <a:t>To send a message click here:</a:t>
+            </a:r>
+            <a:endParaRPr lang="en-US" sz="1600" dirty="0">
+              <a:solidFill>
+                <a:schemeClr val="bg1"/>
+              </a:solidFill>
+            </a:endParaRPr>
+          </a:p>
+        </p:txBody>
+      </p:sp>
+      <p:sp>
+        <p:nvSpPr>
+          <p:cNvPr id="20" name="TextBox 19">
+            <a:extLst>
+              <a:ext uri="{FF2B5EF4-FFF2-40B4-BE49-F238E27FC236}">
+                <a16:creationId xmlns:a16="http://schemas.microsoft.com/office/drawing/2014/main" id="{A882BD08-882E-4A6B-B5D9-428F4C4B3DF9}"/>
+              </a:ext>
+            </a:extLst>
+          </p:cNvPr>
+          <p:cNvSpPr txBox="1"/>
+          <p:nvPr/>
+        </p:nvSpPr>
+        <p:spPr>
+          <a:xfrm>
+            <a:off x="5976413" y="4509886"/>
+            <a:ext cx="239168" cy="1077218"/>
+          </a:xfrm>
+          <a:prstGeom prst="rect">
+            <a:avLst/>
+          </a:prstGeom>
+          <a:noFill/>
+        </p:spPr>
+        <p:txBody>
+          <a:bodyPr wrap="none" rtlCol="0">
+            <a:spAutoFit/>
+          </a:bodyPr>
+          <a:lstStyle/>
+          <a:p>
+            <a:r>
+              <a:rPr lang="en-US" sz="1600" b="1" dirty="0">
+                <a:effectLst>
+                  <a:outerShdw blurRad="38100" dist="38100" dir="2700000" algn="tl">
+                    <a:srgbClr val="000000">
+                      <a:alpha val="43137"/>
+                    </a:srgbClr>
+                  </a:outerShdw>
+                </a:effectLst>
+              </a:rPr>
+              <a:t>.</a:t>
+            </a:r>
+          </a:p>
+          <a:p>
+            <a:r>
+              <a:rPr lang="en-US" sz="1600" b="1" dirty="0">
+                <a:effectLst>
+                  <a:outerShdw blurRad="38100" dist="38100" dir="2700000" algn="tl">
+                    <a:srgbClr val="000000">
+                      <a:alpha val="43137"/>
+                    </a:srgbClr>
+                  </a:outerShdw>
+                </a:effectLst>
+              </a:rPr>
+              <a:t>.</a:t>
+            </a:r>
+          </a:p>
+          <a:p>
+            <a:r>
+              <a:rPr lang="en-US" sz="1600" b="1" dirty="0">
+                <a:effectLst>
+                  <a:outerShdw blurRad="38100" dist="38100" dir="2700000" algn="tl">
+                    <a:srgbClr val="000000">
+                      <a:alpha val="43137"/>
+                    </a:srgbClr>
+                  </a:outerShdw>
+                </a:effectLst>
+              </a:rPr>
+              <a:t>.</a:t>
+            </a:r>
+          </a:p>
+          <a:p>
+            <a:r>
+              <a:rPr lang="en-US" sz="1600" b="1" dirty="0">
+                <a:effectLst>
+                  <a:outerShdw blurRad="38100" dist="38100" dir="2700000" algn="tl">
+                    <a:srgbClr val="000000">
+                      <a:alpha val="43137"/>
+                    </a:srgbClr>
+                  </a:outerShdw>
+                </a:effectLst>
+              </a:rPr>
+              <a:t>.</a:t>
+            </a:r>
+          </a:p>
+        </p:txBody>
+      </p:sp>
+      <p:sp>
+        <p:nvSpPr>
+          <p:cNvPr id="26" name="Oval 25">
+            <a:extLst>
+              <a:ext uri="{FF2B5EF4-FFF2-40B4-BE49-F238E27FC236}">
+                <a16:creationId xmlns:a16="http://schemas.microsoft.com/office/drawing/2014/main" id="{617C3E1F-9D46-43BD-8268-FA8884553F83}"/>
+              </a:ext>
+            </a:extLst>
+          </p:cNvPr>
+          <p:cNvSpPr/>
+          <p:nvPr/>
+        </p:nvSpPr>
+        <p:spPr>
+          <a:xfrm>
+            <a:off x="7095409" y="4263620"/>
+            <a:ext cx="521633" cy="291878"/>
+          </a:xfrm>
+          <a:prstGeom prst="ellipse">
+            <a:avLst/>
+          </a:prstGeom>
+          <a:solidFill>
+            <a:schemeClr val="bg1">
+              <a:lumMod val="95000"/>
+            </a:schemeClr>
+          </a:solidFill>
+          <a:ln w="38100">
+            <a:solidFill>
+              <a:schemeClr val="tx1"/>
+            </a:solidFill>
+          </a:ln>
+        </p:spPr>
+        <p:style>
+          <a:lnRef idx="2">
+            <a:schemeClr val="accent1">
+              <a:shade val="50000"/>
+            </a:schemeClr>
+          </a:lnRef>
+          <a:fillRef idx="1">
+            <a:schemeClr val="accent1"/>
+          </a:fillRef>
+          <a:effectRef idx="0">
+            <a:schemeClr val="accent1"/>
+          </a:effectRef>
+          <a:fontRef idx="minor">
+            <a:schemeClr val="lt1"/>
+          </a:fontRef>
+        </p:style>
+        <p:txBody>
+          <a:bodyPr rtlCol="0" anchor="ctr"/>
+          <a:lstStyle/>
+          <a:p>
+            <a:pPr algn="ctr"/>
+            <a:r>
+              <a:rPr lang="en-US" sz="800" b="1" dirty="0">
+                <a:solidFill>
+                  <a:schemeClr val="tx1"/>
+                </a:solidFill>
+                <a:effectLst>
+                  <a:outerShdw blurRad="38100" dist="38100" dir="2700000" algn="tl">
+                    <a:srgbClr val="000000">
+                      <a:alpha val="43137"/>
+                    </a:srgbClr>
+                  </a:outerShdw>
+                </a:effectLst>
+                <a:latin typeface="Cambria" panose="02040503050406030204" pitchFamily="18" charset="0"/>
+                <a:ea typeface="Cambria" panose="02040503050406030204" pitchFamily="18" charset="0"/>
+              </a:rPr>
+              <a:t>text</a:t>
+            </a:r>
+          </a:p>
+        </p:txBody>
+      </p:sp>
+    </p:spTree>
+    <p:extLst>
+      <p:ext uri="{BB962C8B-B14F-4D97-AF65-F5344CB8AC3E}">
+        <p14:creationId xmlns:p14="http://schemas.microsoft.com/office/powerpoint/2010/main" val="3362233845"/>
+      </p:ext>
+    </p:extLst>
+  </p:cSld>
+  <p:clrMapOvr>
+    <a:masterClrMapping/>
+  </p:clrMapOvr>
+</p:sld>
+</file>
+
+<file path=ppt/slides/slide11.xml><?xml version="1.0" encoding="utf-8"?>
+<p:sld xmlns:a="http://schemas.openxmlformats.org/drawingml/2006/main" xmlns:r="http://schemas.openxmlformats.org/officeDocument/2006/relationships" xmlns:p="http://schemas.openxmlformats.org/presentationml/2006/main">
+  <p:cSld>
+    <p:spTree>
+      <p:nvGrpSpPr>
+        <p:cNvPr id="1" name=""/>
+        <p:cNvGrpSpPr/>
+        <p:nvPr/>
+      </p:nvGrpSpPr>
+      <p:grpSpPr>
+        <a:xfrm>
+          <a:off x="0" y="0"/>
+          <a:ext cx="0" cy="0"/>
+          <a:chOff x="0" y="0"/>
+          <a:chExt cx="0" cy="0"/>
+        </a:xfrm>
+      </p:grpSpPr>
+      <p:sp>
+        <p:nvSpPr>
+          <p:cNvPr id="2" name="Title 1">
+            <a:extLst>
+              <a:ext uri="{FF2B5EF4-FFF2-40B4-BE49-F238E27FC236}">
+                <a16:creationId xmlns:a16="http://schemas.microsoft.com/office/drawing/2014/main" id="{B2BB5CC9-69BD-468F-B28D-41F4E6334CE4}"/>
+              </a:ext>
+            </a:extLst>
+          </p:cNvPr>
+          <p:cNvSpPr>
+            <a:spLocks noGrp="1"/>
+          </p:cNvSpPr>
+          <p:nvPr>
+            <p:ph type="title"/>
+          </p:nvPr>
+        </p:nvSpPr>
+        <p:spPr/>
+        <p:txBody>
+          <a:bodyPr/>
+          <a:lstStyle/>
+          <a:p>
+            <a:r>
+              <a:rPr lang="en-US" b="1" i="1" u="sng" dirty="0">
+                <a:effectLst>
+                  <a:outerShdw blurRad="38100" dist="38100" dir="2700000" algn="tl">
+                    <a:srgbClr val="000000">
+                      <a:alpha val="43137"/>
+                    </a:srgbClr>
+                  </a:outerShdw>
+                </a:effectLst>
+              </a:rPr>
+              <a:t>User Datasets</a:t>
+            </a:r>
+          </a:p>
+        </p:txBody>
+      </p:sp>
+      <p:graphicFrame>
+        <p:nvGraphicFramePr>
+          <p:cNvPr id="5" name="Table 5">
+            <a:extLst>
+              <a:ext uri="{FF2B5EF4-FFF2-40B4-BE49-F238E27FC236}">
+                <a16:creationId xmlns:a16="http://schemas.microsoft.com/office/drawing/2014/main" id="{B4883779-8EFB-49E8-A2E8-3297C12FD7C0}"/>
+              </a:ext>
+            </a:extLst>
+          </p:cNvPr>
+          <p:cNvGraphicFramePr>
+            <a:graphicFrameLocks noGrp="1"/>
+          </p:cNvGraphicFramePr>
+          <p:nvPr>
+            <p:ph idx="1"/>
+            <p:extLst>
+              <p:ext uri="{D42A27DB-BD31-4B8C-83A1-F6EECF244321}">
+                <p14:modId xmlns:p14="http://schemas.microsoft.com/office/powerpoint/2010/main" val="1876297956"/>
+              </p:ext>
+            </p:extLst>
+          </p:nvPr>
+        </p:nvGraphicFramePr>
+        <p:xfrm>
+          <a:off x="838200" y="1825625"/>
+          <a:ext cx="10515600" cy="4079872"/>
+        </p:xfrm>
+        <a:graphic>
+          <a:graphicData uri="http://schemas.openxmlformats.org/drawingml/2006/table">
+            <a:tbl>
+              <a:tblPr firstRow="1" bandRow="1">
+                <a:tableStyleId>{5C22544A-7EE6-4342-B048-85BDC9FD1C3A}</a:tableStyleId>
+              </a:tblPr>
+              <a:tblGrid>
+                <a:gridCol w="5257800">
+                  <a:extLst>
+                    <a:ext uri="{9D8B030D-6E8A-4147-A177-3AD203B41FA5}">
+                      <a16:colId xmlns:a16="http://schemas.microsoft.com/office/drawing/2014/main" val="999526759"/>
+                    </a:ext>
+                  </a:extLst>
+                </a:gridCol>
+                <a:gridCol w="5257800">
+                  <a:extLst>
+                    <a:ext uri="{9D8B030D-6E8A-4147-A177-3AD203B41FA5}">
+                      <a16:colId xmlns:a16="http://schemas.microsoft.com/office/drawing/2014/main" val="2621372417"/>
+                    </a:ext>
+                  </a:extLst>
+                </a:gridCol>
+              </a:tblGrid>
+              <a:tr h="509984">
+                <a:tc>
+                  <a:txBody>
+                    <a:bodyPr/>
+                    <a:lstStyle/>
+                    <a:p>
+                      <a:pPr algn="ctr"/>
+                      <a:r>
+                        <a:rPr lang="en-US" dirty="0"/>
+                        <a:t>Private</a:t>
+                      </a:r>
+                    </a:p>
+                  </a:txBody>
+                  <a:tcPr anchor="ctr"/>
+                </a:tc>
+                <a:tc>
+                  <a:txBody>
+                    <a:bodyPr/>
+                    <a:lstStyle/>
+                    <a:p>
+                      <a:pPr algn="ctr"/>
+                      <a:r>
+                        <a:rPr lang="en-US" dirty="0"/>
+                        <a:t>Public</a:t>
+                      </a:r>
+                    </a:p>
+                  </a:txBody>
+                  <a:tcPr anchor="ctr"/>
+                </a:tc>
+                <a:extLst>
+                  <a:ext uri="{0D108BD9-81ED-4DB2-BD59-A6C34878D82A}">
+                    <a16:rowId xmlns:a16="http://schemas.microsoft.com/office/drawing/2014/main" val="1022876577"/>
+                  </a:ext>
+                </a:extLst>
+              </a:tr>
+              <a:tr h="509984">
+                <a:tc>
+                  <a:txBody>
+                    <a:bodyPr/>
+                    <a:lstStyle/>
+                    <a:p>
+                      <a:pPr algn="ctr"/>
+                      <a:r>
+                        <a:rPr lang="en-US" dirty="0"/>
+                        <a:t>Username</a:t>
+                      </a:r>
+                      <a:r>
+                        <a:rPr lang="en-US" dirty="0">
+                          <a:solidFill>
+                            <a:srgbClr val="FF0000"/>
+                          </a:solidFill>
+                          <a:sym typeface="Wingdings" panose="05000000000000000000" pitchFamily="2" charset="2"/>
+                        </a:rPr>
+                        <a:t></a:t>
+                      </a:r>
+                      <a:endParaRPr lang="en-US" dirty="0"/>
+                    </a:p>
+                  </a:txBody>
+                  <a:tcPr anchor="ctr"/>
+                </a:tc>
+                <a:tc>
+                  <a:txBody>
+                    <a:bodyPr/>
+                    <a:lstStyle/>
+                    <a:p>
+                      <a:pPr algn="ctr"/>
+                      <a:r>
+                        <a:rPr lang="en-US" dirty="0"/>
+                        <a:t>Genre List</a:t>
+                      </a:r>
+                      <a:r>
+                        <a:rPr lang="en-US" dirty="0">
+                          <a:solidFill>
+                            <a:schemeClr val="accent1"/>
+                          </a:solidFill>
+                          <a:sym typeface="Wingdings" panose="05000000000000000000" pitchFamily="2" charset="2"/>
+                        </a:rPr>
+                        <a:t></a:t>
+                      </a:r>
+                      <a:endParaRPr lang="en-US" dirty="0"/>
+                    </a:p>
+                  </a:txBody>
+                  <a:tcPr anchor="ctr"/>
+                </a:tc>
+                <a:extLst>
+                  <a:ext uri="{0D108BD9-81ED-4DB2-BD59-A6C34878D82A}">
+                    <a16:rowId xmlns:a16="http://schemas.microsoft.com/office/drawing/2014/main" val="864622098"/>
+                  </a:ext>
+                </a:extLst>
+              </a:tr>
+              <a:tr h="509984">
+                <a:tc>
+                  <a:txBody>
+                    <a:bodyPr/>
+                    <a:lstStyle/>
+                    <a:p>
+                      <a:pPr algn="ctr"/>
+                      <a:r>
+                        <a:rPr lang="en-US" dirty="0"/>
+                        <a:t>Password</a:t>
+                      </a:r>
+                      <a:r>
+                        <a:rPr lang="en-US" dirty="0">
+                          <a:solidFill>
+                            <a:srgbClr val="FF0000"/>
+                          </a:solidFill>
+                          <a:sym typeface="Wingdings" panose="05000000000000000000" pitchFamily="2" charset="2"/>
+                        </a:rPr>
+                        <a:t></a:t>
+                      </a:r>
+                      <a:endParaRPr lang="en-US" dirty="0"/>
+                    </a:p>
+                  </a:txBody>
+                  <a:tcPr anchor="ctr"/>
+                </a:tc>
+                <a:tc>
+                  <a:txBody>
+                    <a:bodyPr/>
+                    <a:lstStyle/>
+                    <a:p>
+                      <a:pPr algn="ctr"/>
+                      <a:r>
+                        <a:rPr lang="en-US" dirty="0"/>
+                        <a:t>Bio</a:t>
+                      </a:r>
+                      <a:r>
+                        <a:rPr lang="en-US" dirty="0">
+                          <a:solidFill>
+                            <a:schemeClr val="accent1"/>
+                          </a:solidFill>
+                          <a:sym typeface="Wingdings" panose="05000000000000000000" pitchFamily="2" charset="2"/>
+                        </a:rPr>
+                        <a:t></a:t>
+                      </a:r>
+                      <a:endParaRPr lang="en-US" dirty="0"/>
+                    </a:p>
+                  </a:txBody>
+                  <a:tcPr anchor="ctr"/>
+                </a:tc>
+                <a:extLst>
+                  <a:ext uri="{0D108BD9-81ED-4DB2-BD59-A6C34878D82A}">
+                    <a16:rowId xmlns:a16="http://schemas.microsoft.com/office/drawing/2014/main" val="2003856590"/>
+                  </a:ext>
+                </a:extLst>
+              </a:tr>
+              <a:tr h="509984">
+                <a:tc>
+                  <a:txBody>
+                    <a:bodyPr/>
+                    <a:lstStyle/>
+                    <a:p>
+                      <a:pPr algn="ctr"/>
+                      <a:endParaRPr lang="en-US" dirty="0"/>
+                    </a:p>
+                  </a:txBody>
+                  <a:tcPr anchor="ctr"/>
+                </a:tc>
+                <a:tc>
+                  <a:txBody>
+                    <a:bodyPr/>
+                    <a:lstStyle/>
+                    <a:p>
+                      <a:pPr algn="ctr"/>
+                      <a:r>
+                        <a:rPr lang="en-US" dirty="0"/>
+                        <a:t>Link to ***</a:t>
+                      </a:r>
+                      <a:r>
+                        <a:rPr lang="en-US" dirty="0">
+                          <a:solidFill>
+                            <a:schemeClr val="accent1"/>
+                          </a:solidFill>
+                          <a:sym typeface="Wingdings" panose="05000000000000000000" pitchFamily="2" charset="2"/>
+                        </a:rPr>
+                        <a:t></a:t>
+                      </a:r>
+                      <a:endParaRPr lang="en-US" dirty="0"/>
+                    </a:p>
+                  </a:txBody>
+                  <a:tcPr anchor="ctr"/>
+                </a:tc>
+                <a:extLst>
+                  <a:ext uri="{0D108BD9-81ED-4DB2-BD59-A6C34878D82A}">
+                    <a16:rowId xmlns:a16="http://schemas.microsoft.com/office/drawing/2014/main" val="1447506110"/>
+                  </a:ext>
+                </a:extLst>
+              </a:tr>
+              <a:tr h="509984">
+                <a:tc>
+                  <a:txBody>
+                    <a:bodyPr/>
+                    <a:lstStyle/>
+                    <a:p>
+                      <a:pPr marL="0" marR="0" lvl="0" indent="0" algn="ctr" defTabSz="914400" rtl="0" eaLnBrk="1" fontAlgn="auto" latinLnBrk="0" hangingPunct="1">
+                        <a:lnSpc>
+                          <a:spcPct val="100000"/>
+                        </a:lnSpc>
+                        <a:spcBef>
+                          <a:spcPts val="0"/>
+                        </a:spcBef>
+                        <a:spcAft>
+                          <a:spcPts val="0"/>
+                        </a:spcAft>
+                        <a:buClrTx/>
+                        <a:buSzTx/>
+                        <a:buFontTx/>
+                        <a:buNone/>
+                        <a:tabLst/>
+                        <a:defRPr/>
+                      </a:pPr>
+                      <a:endParaRPr lang="en-US" dirty="0"/>
+                    </a:p>
+                  </a:txBody>
+                  <a:tcPr anchor="ctr"/>
+                </a:tc>
+                <a:tc>
+                  <a:txBody>
+                    <a:bodyPr/>
+                    <a:lstStyle/>
+                    <a:p>
+                      <a:pPr algn="ctr"/>
+                      <a:r>
+                        <a:rPr lang="en-US" dirty="0"/>
+                        <a:t>Instruments + details per one</a:t>
+                      </a:r>
+                      <a:r>
+                        <a:rPr lang="en-US" dirty="0">
+                          <a:solidFill>
+                            <a:srgbClr val="FF0000"/>
+                          </a:solidFill>
+                          <a:sym typeface="Wingdings" panose="05000000000000000000" pitchFamily="2" charset="2"/>
+                        </a:rPr>
+                        <a:t></a:t>
+                      </a:r>
+                      <a:endParaRPr lang="en-US" dirty="0"/>
+                    </a:p>
+                  </a:txBody>
+                  <a:tcPr anchor="ctr"/>
+                </a:tc>
+                <a:extLst>
+                  <a:ext uri="{0D108BD9-81ED-4DB2-BD59-A6C34878D82A}">
+                    <a16:rowId xmlns:a16="http://schemas.microsoft.com/office/drawing/2014/main" val="1286390632"/>
+                  </a:ext>
+                </a:extLst>
+              </a:tr>
+              <a:tr h="509984">
+                <a:tc>
+                  <a:txBody>
+                    <a:bodyPr/>
+                    <a:lstStyle/>
+                    <a:p>
+                      <a:pPr algn="ctr"/>
+                      <a:endParaRPr lang="en-US" dirty="0"/>
+                    </a:p>
+                  </a:txBody>
+                  <a:tcPr anchor="ctr"/>
+                </a:tc>
+                <a:tc>
+                  <a:txBody>
+                    <a:bodyPr/>
+                    <a:lstStyle/>
+                    <a:p>
+                      <a:pPr marL="0" marR="0" lvl="0" indent="0" algn="ctr" defTabSz="914400" rtl="0" eaLnBrk="1" fontAlgn="auto" latinLnBrk="0" hangingPunct="1">
+                        <a:lnSpc>
+                          <a:spcPct val="100000"/>
+                        </a:lnSpc>
+                        <a:spcBef>
+                          <a:spcPts val="0"/>
+                        </a:spcBef>
+                        <a:spcAft>
+                          <a:spcPts val="0"/>
+                        </a:spcAft>
+                        <a:buClrTx/>
+                        <a:buSzTx/>
+                        <a:buFontTx/>
+                        <a:buNone/>
+                        <a:tabLst/>
+                        <a:defRPr/>
+                      </a:pPr>
+                      <a:r>
+                        <a:rPr lang="en-US" dirty="0"/>
+                        <a:t>User </a:t>
+                      </a:r>
+                      <a:r>
+                        <a:rPr lang="en-US" sz="1800" kern="1200" dirty="0">
+                          <a:solidFill>
+                            <a:schemeClr val="dk1"/>
+                          </a:solidFill>
+                          <a:effectLst/>
+                          <a:latin typeface="+mn-lt"/>
+                          <a:ea typeface="+mn-ea"/>
+                          <a:cs typeface="+mn-cs"/>
+                        </a:rPr>
+                        <a:t>Location</a:t>
+                      </a:r>
+                      <a:r>
+                        <a:rPr lang="en-US" dirty="0">
+                          <a:solidFill>
+                            <a:srgbClr val="FF0000"/>
+                          </a:solidFill>
+                          <a:sym typeface="Wingdings" panose="05000000000000000000" pitchFamily="2" charset="2"/>
+                        </a:rPr>
+                        <a:t></a:t>
+                      </a:r>
+                      <a:endParaRPr lang="en-US" dirty="0"/>
+                    </a:p>
+                  </a:txBody>
+                  <a:tcPr anchor="ctr"/>
+                </a:tc>
+                <a:extLst>
+                  <a:ext uri="{0D108BD9-81ED-4DB2-BD59-A6C34878D82A}">
+                    <a16:rowId xmlns:a16="http://schemas.microsoft.com/office/drawing/2014/main" val="787995426"/>
+                  </a:ext>
+                </a:extLst>
+              </a:tr>
+              <a:tr h="509984">
+                <a:tc>
+                  <a:txBody>
+                    <a:bodyPr/>
+                    <a:lstStyle/>
+                    <a:p>
+                      <a:pPr algn="ctr"/>
+                      <a:endParaRPr lang="en-US" dirty="0"/>
+                    </a:p>
+                  </a:txBody>
+                  <a:tcPr anchor="ctr"/>
+                </a:tc>
+                <a:tc>
+                  <a:txBody>
+                    <a:bodyPr/>
+                    <a:lstStyle/>
+                    <a:p>
+                      <a:pPr marL="0" marR="0" lvl="0" indent="0" algn="ctr" defTabSz="914400" rtl="0" eaLnBrk="1" fontAlgn="auto" latinLnBrk="0" hangingPunct="1">
+                        <a:lnSpc>
+                          <a:spcPct val="100000"/>
+                        </a:lnSpc>
+                        <a:spcBef>
+                          <a:spcPts val="0"/>
+                        </a:spcBef>
+                        <a:spcAft>
+                          <a:spcPts val="0"/>
+                        </a:spcAft>
+                        <a:buClrTx/>
+                        <a:buSzTx/>
+                        <a:buFontTx/>
+                        <a:buNone/>
+                        <a:tabLst/>
+                        <a:defRPr/>
+                      </a:pPr>
+                      <a:r>
+                        <a:rPr lang="en-US"/>
+                        <a:t>Age</a:t>
+                      </a:r>
+                      <a:r>
+                        <a:rPr lang="en-US">
+                          <a:solidFill>
+                            <a:srgbClr val="FF0000"/>
+                          </a:solidFill>
+                          <a:sym typeface="Wingdings" panose="05000000000000000000" pitchFamily="2" charset="2"/>
+                        </a:rPr>
+                        <a:t></a:t>
+                      </a:r>
+                      <a:endParaRPr lang="en-US" dirty="0"/>
+                    </a:p>
+                  </a:txBody>
+                  <a:tcPr anchor="ctr"/>
+                </a:tc>
+                <a:extLst>
+                  <a:ext uri="{0D108BD9-81ED-4DB2-BD59-A6C34878D82A}">
+                    <a16:rowId xmlns:a16="http://schemas.microsoft.com/office/drawing/2014/main" val="3148044796"/>
+                  </a:ext>
+                </a:extLst>
+              </a:tr>
+              <a:tr h="509984">
+                <a:tc>
+                  <a:txBody>
+                    <a:bodyPr/>
+                    <a:lstStyle/>
+                    <a:p>
+                      <a:pPr algn="ctr"/>
+                      <a:endParaRPr lang="en-US" dirty="0"/>
+                    </a:p>
+                  </a:txBody>
+                  <a:tcPr anchor="ctr"/>
+                </a:tc>
+                <a:tc>
+                  <a:txBody>
+                    <a:bodyPr/>
+                    <a:lstStyle/>
+                    <a:p>
+                      <a:pPr marL="0" marR="0" lvl="0" indent="0" algn="ctr" defTabSz="914400" rtl="0" eaLnBrk="1" fontAlgn="auto" latinLnBrk="0" hangingPunct="1">
+                        <a:lnSpc>
+                          <a:spcPct val="100000"/>
+                        </a:lnSpc>
+                        <a:spcBef>
+                          <a:spcPts val="0"/>
+                        </a:spcBef>
+                        <a:spcAft>
+                          <a:spcPts val="0"/>
+                        </a:spcAft>
+                        <a:buClrTx/>
+                        <a:buSzTx/>
+                        <a:buFontTx/>
+                        <a:buNone/>
+                        <a:tabLst/>
+                        <a:defRPr/>
+                      </a:pPr>
+                      <a:r>
+                        <a:rPr lang="en-US" dirty="0"/>
+                        <a:t>Name</a:t>
+                      </a:r>
+                      <a:r>
+                        <a:rPr lang="en-US" dirty="0">
+                          <a:solidFill>
+                            <a:srgbClr val="FF0000"/>
+                          </a:solidFill>
+                          <a:sym typeface="Wingdings" panose="05000000000000000000" pitchFamily="2" charset="2"/>
+                        </a:rPr>
+                        <a:t></a:t>
+                      </a:r>
+                      <a:endParaRPr lang="en-US" dirty="0"/>
+                    </a:p>
+                  </a:txBody>
+                  <a:tcPr anchor="ctr"/>
+                </a:tc>
+                <a:extLst>
+                  <a:ext uri="{0D108BD9-81ED-4DB2-BD59-A6C34878D82A}">
+                    <a16:rowId xmlns:a16="http://schemas.microsoft.com/office/drawing/2014/main" val="2921019506"/>
+                  </a:ext>
+                </a:extLst>
+              </a:tr>
+            </a:tbl>
+          </a:graphicData>
+        </a:graphic>
+      </p:graphicFrame>
+      <p:sp>
+        <p:nvSpPr>
+          <p:cNvPr id="6" name="TextBox 5">
+            <a:extLst>
+              <a:ext uri="{FF2B5EF4-FFF2-40B4-BE49-F238E27FC236}">
+                <a16:creationId xmlns:a16="http://schemas.microsoft.com/office/drawing/2014/main" id="{C50DB1BC-E153-4AC7-AE20-770D0C9C0419}"/>
+              </a:ext>
+            </a:extLst>
+          </p:cNvPr>
+          <p:cNvSpPr txBox="1"/>
+          <p:nvPr/>
+        </p:nvSpPr>
+        <p:spPr>
+          <a:xfrm>
+            <a:off x="9182100" y="704740"/>
+            <a:ext cx="2171700" cy="646331"/>
+          </a:xfrm>
+          <a:prstGeom prst="rect">
+            <a:avLst/>
+          </a:prstGeom>
+          <a:noFill/>
+          <a:ln w="38100">
+            <a:solidFill>
+              <a:schemeClr val="tx1">
+                <a:lumMod val="50000"/>
+                <a:lumOff val="50000"/>
+              </a:schemeClr>
+            </a:solidFill>
+          </a:ln>
+        </p:spPr>
+        <p:txBody>
+          <a:bodyPr wrap="square" rtlCol="0">
+            <a:spAutoFit/>
+          </a:bodyPr>
+          <a:lstStyle/>
+          <a:p>
+            <a:r>
+              <a:rPr lang="en-US" dirty="0">
+                <a:solidFill>
+                  <a:srgbClr val="FF0000"/>
+                </a:solidFill>
+                <a:sym typeface="Wingdings" panose="05000000000000000000" pitchFamily="2" charset="2"/>
+              </a:rPr>
+              <a:t> </a:t>
+            </a:r>
+            <a:r>
+              <a:rPr lang="en-US" sz="1400" dirty="0">
+                <a:solidFill>
+                  <a:srgbClr val="FF0000"/>
+                </a:solidFill>
+                <a:sym typeface="Wingdings" panose="05000000000000000000" pitchFamily="2" charset="2"/>
+              </a:rPr>
+              <a:t>Mandatory</a:t>
+            </a:r>
+          </a:p>
+          <a:p>
+            <a:r>
+              <a:rPr lang="en-US" dirty="0">
+                <a:solidFill>
+                  <a:schemeClr val="accent1"/>
+                </a:solidFill>
+                <a:sym typeface="Wingdings" panose="05000000000000000000" pitchFamily="2" charset="2"/>
+              </a:rPr>
+              <a:t> </a:t>
+            </a:r>
+            <a:r>
+              <a:rPr lang="en-US" sz="1400" dirty="0">
+                <a:solidFill>
+                  <a:schemeClr val="accent1"/>
+                </a:solidFill>
+                <a:sym typeface="Wingdings" panose="05000000000000000000" pitchFamily="2" charset="2"/>
+              </a:rPr>
+              <a:t>Optional</a:t>
+            </a:r>
+            <a:endParaRPr lang="en-US" sz="1400" dirty="0">
+              <a:solidFill>
+                <a:schemeClr val="accent1"/>
+              </a:solidFill>
+            </a:endParaRPr>
+          </a:p>
+        </p:txBody>
+      </p:sp>
+    </p:spTree>
+    <p:extLst>
+      <p:ext uri="{BB962C8B-B14F-4D97-AF65-F5344CB8AC3E}">
+        <p14:creationId xmlns:p14="http://schemas.microsoft.com/office/powerpoint/2010/main" val="2205242116"/>
+      </p:ext>
+    </p:extLst>
+  </p:cSld>
+  <p:clrMapOvr>
+    <a:masterClrMapping/>
+  </p:clrMapOvr>
+</p:sld>
+</file>
+
+<file path=ppt/slides/slide12.xml><?xml version="1.0" encoding="utf-8"?>
 <p:sld xmlns:a="http://schemas.openxmlformats.org/drawingml/2006/main" xmlns:r="http://schemas.openxmlformats.org/officeDocument/2006/relationships" xmlns:p="http://schemas.openxmlformats.org/presentationml/2006/main">
   <p:cSld>
     <p:spTree>
@@ -4163,7 +5496,7 @@
 </p:sld>
 </file>
 
-<file path=ppt/slides/slide11.xml><?xml version="1.0" encoding="utf-8"?>
+<file path=ppt/slides/slide13.xml><?xml version="1.0" encoding="utf-8"?>
 <p:sld xmlns:a="http://schemas.openxmlformats.org/drawingml/2006/main" xmlns:r="http://schemas.openxmlformats.org/officeDocument/2006/relationships" xmlns:p="http://schemas.openxmlformats.org/presentationml/2006/main">
   <p:cSld>
     <p:spTree>
@@ -5253,493 +6586,6 @@
     <p:extLst>
       <p:ext uri="{BB962C8B-B14F-4D97-AF65-F5344CB8AC3E}">
         <p14:creationId xmlns:p14="http://schemas.microsoft.com/office/powerpoint/2010/main" val="1221341823"/>
-      </p:ext>
-    </p:extLst>
-  </p:cSld>
-  <p:clrMapOvr>
-    <a:masterClrMapping/>
-  </p:clrMapOvr>
-</p:sld>
-</file>
-
-<file path=ppt/slides/slide12.xml><?xml version="1.0" encoding="utf-8"?>
-<p:sld xmlns:a="http://schemas.openxmlformats.org/drawingml/2006/main" xmlns:r="http://schemas.openxmlformats.org/officeDocument/2006/relationships" xmlns:p="http://schemas.openxmlformats.org/presentationml/2006/main">
-  <p:cSld>
-    <p:spTree>
-      <p:nvGrpSpPr>
-        <p:cNvPr id="1" name=""/>
-        <p:cNvGrpSpPr/>
-        <p:nvPr/>
-      </p:nvGrpSpPr>
-      <p:grpSpPr>
-        <a:xfrm>
-          <a:off x="0" y="0"/>
-          <a:ext cx="0" cy="0"/>
-          <a:chOff x="0" y="0"/>
-          <a:chExt cx="0" cy="0"/>
-        </a:xfrm>
-      </p:grpSpPr>
-      <p:sp>
-        <p:nvSpPr>
-          <p:cNvPr id="2" name="Title 1">
-            <a:extLst>
-              <a:ext uri="{FF2B5EF4-FFF2-40B4-BE49-F238E27FC236}">
-                <a16:creationId xmlns:a16="http://schemas.microsoft.com/office/drawing/2014/main" id="{898184F1-7FCE-45D6-9341-1F5570B63BDD}"/>
-              </a:ext>
-            </a:extLst>
-          </p:cNvPr>
-          <p:cNvSpPr>
-            <a:spLocks noGrp="1"/>
-          </p:cNvSpPr>
-          <p:nvPr>
-            <p:ph type="title"/>
-          </p:nvPr>
-        </p:nvSpPr>
-        <p:spPr/>
-        <p:txBody>
-          <a:bodyPr/>
-          <a:lstStyle/>
-          <a:p>
-            <a:r>
-              <a:rPr lang="en-US" dirty="0"/>
-              <a:t>Chat Area</a:t>
-            </a:r>
-          </a:p>
-        </p:txBody>
-      </p:sp>
-      <p:sp>
-        <p:nvSpPr>
-          <p:cNvPr id="4" name="TextBox 3">
-            <a:extLst>
-              <a:ext uri="{FF2B5EF4-FFF2-40B4-BE49-F238E27FC236}">
-                <a16:creationId xmlns:a16="http://schemas.microsoft.com/office/drawing/2014/main" id="{59F6C74D-92C0-47BC-8CD7-3900E4C809D8}"/>
-              </a:ext>
-            </a:extLst>
-          </p:cNvPr>
-          <p:cNvSpPr txBox="1"/>
-          <p:nvPr/>
-        </p:nvSpPr>
-        <p:spPr>
-          <a:xfrm>
-            <a:off x="4110361" y="1331650"/>
-            <a:ext cx="3453414" cy="5362113"/>
-          </a:xfrm>
-          <a:prstGeom prst="rect">
-            <a:avLst/>
-          </a:prstGeom>
-          <a:noFill/>
-          <a:ln w="38100">
-            <a:solidFill>
-              <a:schemeClr val="tx1"/>
-            </a:solidFill>
-          </a:ln>
-        </p:spPr>
-        <p:txBody>
-          <a:bodyPr wrap="square" rtlCol="0">
-            <a:spAutoFit/>
-          </a:bodyPr>
-          <a:lstStyle/>
-          <a:p>
-            <a:endParaRPr lang="en-US" dirty="0"/>
-          </a:p>
-        </p:txBody>
-      </p:sp>
-      <p:sp>
-        <p:nvSpPr>
-          <p:cNvPr id="5" name="Rectangle 4">
-            <a:extLst>
-              <a:ext uri="{FF2B5EF4-FFF2-40B4-BE49-F238E27FC236}">
-                <a16:creationId xmlns:a16="http://schemas.microsoft.com/office/drawing/2014/main" id="{48034934-DCE1-4B47-AAED-D6E943722F05}"/>
-              </a:ext>
-            </a:extLst>
-          </p:cNvPr>
-          <p:cNvSpPr/>
-          <p:nvPr/>
-        </p:nvSpPr>
-        <p:spPr>
-          <a:xfrm>
-            <a:off x="4333875" y="1841238"/>
-            <a:ext cx="2990850" cy="3464188"/>
-          </a:xfrm>
-          <a:prstGeom prst="rect">
-            <a:avLst/>
-          </a:prstGeom>
-          <a:noFill/>
-          <a:ln w="50800"/>
-        </p:spPr>
-        <p:style>
-          <a:lnRef idx="2">
-            <a:schemeClr val="accent1">
-              <a:shade val="50000"/>
-            </a:schemeClr>
-          </a:lnRef>
-          <a:fillRef idx="1">
-            <a:schemeClr val="accent1"/>
-          </a:fillRef>
-          <a:effectRef idx="0">
-            <a:schemeClr val="accent1"/>
-          </a:effectRef>
-          <a:fontRef idx="minor">
-            <a:schemeClr val="lt1"/>
-          </a:fontRef>
-        </p:style>
-        <p:txBody>
-          <a:bodyPr rtlCol="0" anchor="ctr"/>
-          <a:lstStyle/>
-          <a:p>
-            <a:r>
-              <a:rPr lang="en-US" dirty="0" err="1">
-                <a:solidFill>
-                  <a:schemeClr val="tx1"/>
-                </a:solidFill>
-              </a:rPr>
-              <a:t>Sgfdgsdgd</a:t>
-            </a:r>
-            <a:endParaRPr lang="en-US" dirty="0">
-              <a:solidFill>
-                <a:schemeClr val="tx1"/>
-              </a:solidFill>
-            </a:endParaRPr>
-          </a:p>
-          <a:p>
-            <a:endParaRPr lang="en-US" dirty="0">
-              <a:solidFill>
-                <a:schemeClr val="tx1"/>
-              </a:solidFill>
-            </a:endParaRPr>
-          </a:p>
-          <a:p>
-            <a:pPr algn="r"/>
-            <a:r>
-              <a:rPr lang="en-US" dirty="0" err="1">
-                <a:solidFill>
-                  <a:schemeClr val="tx1"/>
-                </a:solidFill>
-              </a:rPr>
-              <a:t>Sdfgsdfgdsgds</a:t>
-            </a:r>
-            <a:endParaRPr lang="en-US" dirty="0">
-              <a:solidFill>
-                <a:schemeClr val="tx1"/>
-              </a:solidFill>
-            </a:endParaRPr>
-          </a:p>
-          <a:p>
-            <a:endParaRPr lang="en-US" dirty="0">
-              <a:solidFill>
-                <a:schemeClr val="tx1"/>
-              </a:solidFill>
-            </a:endParaRPr>
-          </a:p>
-          <a:p>
-            <a:r>
-              <a:rPr lang="en-US" dirty="0" err="1">
-                <a:solidFill>
-                  <a:schemeClr val="tx1"/>
-                </a:solidFill>
-              </a:rPr>
-              <a:t>Uytiyuiyi</a:t>
-            </a:r>
-            <a:endParaRPr lang="en-US" dirty="0">
-              <a:solidFill>
-                <a:schemeClr val="tx1"/>
-              </a:solidFill>
-            </a:endParaRPr>
-          </a:p>
-          <a:p>
-            <a:endParaRPr lang="en-US" dirty="0">
-              <a:solidFill>
-                <a:schemeClr val="tx1"/>
-              </a:solidFill>
-            </a:endParaRPr>
-          </a:p>
-          <a:p>
-            <a:pPr algn="r"/>
-            <a:r>
-              <a:rPr lang="en-US" dirty="0" err="1">
-                <a:solidFill>
-                  <a:schemeClr val="tx1"/>
-                </a:solidFill>
-              </a:rPr>
-              <a:t>Nmhjk,jh,hj</a:t>
-            </a:r>
-            <a:r>
-              <a:rPr lang="en-US" dirty="0">
-                <a:solidFill>
-                  <a:schemeClr val="tx1"/>
-                </a:solidFill>
-              </a:rPr>
-              <a:t>,</a:t>
-            </a:r>
-          </a:p>
-          <a:p>
-            <a:pPr algn="r"/>
-            <a:endParaRPr lang="en-US" dirty="0">
-              <a:solidFill>
-                <a:schemeClr val="tx1"/>
-              </a:solidFill>
-            </a:endParaRPr>
-          </a:p>
-          <a:p>
-            <a:pPr algn="r"/>
-            <a:r>
-              <a:rPr lang="en-US" dirty="0" err="1">
-                <a:solidFill>
-                  <a:schemeClr val="tx1"/>
-                </a:solidFill>
-              </a:rPr>
-              <a:t>Fgdfghdfgdhd</a:t>
-            </a:r>
-            <a:endParaRPr lang="en-US" dirty="0">
-              <a:solidFill>
-                <a:schemeClr val="tx1"/>
-              </a:solidFill>
-            </a:endParaRPr>
-          </a:p>
-          <a:p>
-            <a:pPr algn="r"/>
-            <a:endParaRPr lang="en-US" dirty="0">
-              <a:solidFill>
-                <a:schemeClr val="tx1"/>
-              </a:solidFill>
-            </a:endParaRPr>
-          </a:p>
-          <a:p>
-            <a:r>
-              <a:rPr lang="en-US" dirty="0">
-                <a:solidFill>
-                  <a:schemeClr val="tx1"/>
-                </a:solidFill>
-              </a:rPr>
-              <a:t>fdgdfg76686786</a:t>
-            </a:r>
-          </a:p>
-        </p:txBody>
-      </p:sp>
-      <p:sp>
-        <p:nvSpPr>
-          <p:cNvPr id="6" name="Rectangle 5">
-            <a:extLst>
-              <a:ext uri="{FF2B5EF4-FFF2-40B4-BE49-F238E27FC236}">
-                <a16:creationId xmlns:a16="http://schemas.microsoft.com/office/drawing/2014/main" id="{9B3988EB-0059-490C-A480-33E333D07784}"/>
-              </a:ext>
-            </a:extLst>
-          </p:cNvPr>
-          <p:cNvSpPr/>
-          <p:nvPr/>
-        </p:nvSpPr>
-        <p:spPr>
-          <a:xfrm>
-            <a:off x="4333875" y="5526350"/>
-            <a:ext cx="2990850" cy="966525"/>
-          </a:xfrm>
-          <a:prstGeom prst="rect">
-            <a:avLst/>
-          </a:prstGeom>
-          <a:noFill/>
-          <a:ln w="50800"/>
-        </p:spPr>
-        <p:style>
-          <a:lnRef idx="2">
-            <a:schemeClr val="accent1">
-              <a:shade val="50000"/>
-            </a:schemeClr>
-          </a:lnRef>
-          <a:fillRef idx="1">
-            <a:schemeClr val="accent1"/>
-          </a:fillRef>
-          <a:effectRef idx="0">
-            <a:schemeClr val="accent1"/>
-          </a:effectRef>
-          <a:fontRef idx="minor">
-            <a:schemeClr val="lt1"/>
-          </a:fontRef>
-        </p:style>
-        <p:txBody>
-          <a:bodyPr rtlCol="0" anchor="ctr"/>
-          <a:lstStyle/>
-          <a:p>
-            <a:pPr algn="ctr"/>
-            <a:endParaRPr lang="en-US"/>
-          </a:p>
-        </p:txBody>
-      </p:sp>
-      <p:sp>
-        <p:nvSpPr>
-          <p:cNvPr id="7" name="Rectangle 6">
-            <a:extLst>
-              <a:ext uri="{FF2B5EF4-FFF2-40B4-BE49-F238E27FC236}">
-                <a16:creationId xmlns:a16="http://schemas.microsoft.com/office/drawing/2014/main" id="{47C7D643-C2C5-4455-B9E7-B7BF3C184110}"/>
-              </a:ext>
-            </a:extLst>
-          </p:cNvPr>
-          <p:cNvSpPr/>
-          <p:nvPr/>
-        </p:nvSpPr>
-        <p:spPr>
-          <a:xfrm>
-            <a:off x="4467225" y="5676900"/>
-            <a:ext cx="2085975" cy="657225"/>
-          </a:xfrm>
-          <a:prstGeom prst="rect">
-            <a:avLst/>
-          </a:prstGeom>
-          <a:solidFill>
-            <a:schemeClr val="accent2"/>
-          </a:solidFill>
-          <a:ln w="38100">
-            <a:solidFill>
-              <a:srgbClr val="FF0000"/>
-            </a:solidFill>
-          </a:ln>
-        </p:spPr>
-        <p:style>
-          <a:lnRef idx="2">
-            <a:schemeClr val="accent1">
-              <a:shade val="50000"/>
-            </a:schemeClr>
-          </a:lnRef>
-          <a:fillRef idx="1">
-            <a:schemeClr val="accent1"/>
-          </a:fillRef>
-          <a:effectRef idx="0">
-            <a:schemeClr val="accent1"/>
-          </a:effectRef>
-          <a:fontRef idx="minor">
-            <a:schemeClr val="lt1"/>
-          </a:fontRef>
-        </p:style>
-        <p:txBody>
-          <a:bodyPr rtlCol="0" anchor="ctr"/>
-          <a:lstStyle/>
-          <a:p>
-            <a:pPr algn="ctr"/>
-            <a:endParaRPr lang="en-US"/>
-          </a:p>
-        </p:txBody>
-      </p:sp>
-      <p:sp>
-        <p:nvSpPr>
-          <p:cNvPr id="8" name="Oval 7">
-            <a:extLst>
-              <a:ext uri="{FF2B5EF4-FFF2-40B4-BE49-F238E27FC236}">
-                <a16:creationId xmlns:a16="http://schemas.microsoft.com/office/drawing/2014/main" id="{3753DEEE-01BC-49CE-B3C3-E9D673A207AB}"/>
-              </a:ext>
-            </a:extLst>
-          </p:cNvPr>
-          <p:cNvSpPr/>
-          <p:nvPr/>
-        </p:nvSpPr>
-        <p:spPr>
-          <a:xfrm>
-            <a:off x="6619875" y="5676901"/>
-            <a:ext cx="628649" cy="595050"/>
-          </a:xfrm>
-          <a:prstGeom prst="ellipse">
-            <a:avLst/>
-          </a:prstGeom>
-          <a:solidFill>
-            <a:schemeClr val="bg2">
-              <a:lumMod val="90000"/>
-            </a:schemeClr>
-          </a:solidFill>
-          <a:ln w="25400">
-            <a:solidFill>
-              <a:schemeClr val="tx1"/>
-            </a:solidFill>
-          </a:ln>
-        </p:spPr>
-        <p:style>
-          <a:lnRef idx="2">
-            <a:schemeClr val="accent1">
-              <a:shade val="50000"/>
-            </a:schemeClr>
-          </a:lnRef>
-          <a:fillRef idx="1">
-            <a:schemeClr val="accent1"/>
-          </a:fillRef>
-          <a:effectRef idx="0">
-            <a:schemeClr val="accent1"/>
-          </a:effectRef>
-          <a:fontRef idx="minor">
-            <a:schemeClr val="lt1"/>
-          </a:fontRef>
-        </p:style>
-        <p:txBody>
-          <a:bodyPr rtlCol="0" anchor="ctr"/>
-          <a:lstStyle/>
-          <a:p>
-            <a:pPr algn="ctr"/>
-            <a:r>
-              <a:rPr lang="en-US" sz="2800" b="1" dirty="0">
-                <a:solidFill>
-                  <a:schemeClr val="tx1"/>
-                </a:solidFill>
-                <a:effectLst>
-                  <a:outerShdw blurRad="38100" dist="38100" dir="2700000" algn="tl">
-                    <a:srgbClr val="000000">
-                      <a:alpha val="43137"/>
-                    </a:srgbClr>
-                  </a:outerShdw>
-                </a:effectLst>
-                <a:sym typeface="Wingdings 3" panose="05040102010807070707" pitchFamily="18" charset="2"/>
-              </a:rPr>
-              <a:t></a:t>
-            </a:r>
-            <a:endParaRPr lang="en-US" sz="2800" b="1" dirty="0">
-              <a:solidFill>
-                <a:schemeClr val="tx1"/>
-              </a:solidFill>
-              <a:effectLst>
-                <a:outerShdw blurRad="38100" dist="38100" dir="2700000" algn="tl">
-                  <a:srgbClr val="000000">
-                    <a:alpha val="43137"/>
-                  </a:srgbClr>
-                </a:outerShdw>
-              </a:effectLst>
-            </a:endParaRPr>
-          </a:p>
-        </p:txBody>
-      </p:sp>
-      <p:sp>
-        <p:nvSpPr>
-          <p:cNvPr id="10" name="TextBox 9">
-            <a:extLst>
-              <a:ext uri="{FF2B5EF4-FFF2-40B4-BE49-F238E27FC236}">
-                <a16:creationId xmlns:a16="http://schemas.microsoft.com/office/drawing/2014/main" id="{9B953738-B017-4C5C-A889-5B55729076DD}"/>
-              </a:ext>
-            </a:extLst>
-          </p:cNvPr>
-          <p:cNvSpPr txBox="1"/>
-          <p:nvPr/>
-        </p:nvSpPr>
-        <p:spPr>
-          <a:xfrm>
-            <a:off x="4467225" y="1331650"/>
-            <a:ext cx="2781299" cy="369332"/>
-          </a:xfrm>
-          <a:prstGeom prst="rect">
-            <a:avLst/>
-          </a:prstGeom>
-          <a:noFill/>
-        </p:spPr>
-        <p:txBody>
-          <a:bodyPr wrap="square" rtlCol="0">
-            <a:spAutoFit/>
-          </a:bodyPr>
-          <a:lstStyle/>
-          <a:p>
-            <a:r>
-              <a:rPr lang="en-US" dirty="0"/>
-              <a:t>Name</a:t>
-            </a:r>
-          </a:p>
-        </p:txBody>
-      </p:sp>
-    </p:spTree>
-    <p:extLst>
-      <p:ext uri="{BB962C8B-B14F-4D97-AF65-F5344CB8AC3E}">
-        <p14:creationId xmlns:p14="http://schemas.microsoft.com/office/powerpoint/2010/main" val="1919413370"/>
       </p:ext>
     </p:extLst>
   </p:cSld>
@@ -7496,10 +8342,10 @@
       </p:sp>
       <p:sp>
         <p:nvSpPr>
-          <p:cNvPr id="5" name="TextBox 4">
-            <a:extLst>
-              <a:ext uri="{FF2B5EF4-FFF2-40B4-BE49-F238E27FC236}">
-                <a16:creationId xmlns:a16="http://schemas.microsoft.com/office/drawing/2014/main" id="{E7B6F9B3-406C-4E82-9B92-37494BE9C56F}"/>
+          <p:cNvPr id="6" name="TextBox 5">
+            <a:extLst>
+              <a:ext uri="{FF2B5EF4-FFF2-40B4-BE49-F238E27FC236}">
+                <a16:creationId xmlns:a16="http://schemas.microsoft.com/office/drawing/2014/main" id="{405EEAD3-293D-47AB-9EB0-CAE854FB1231}"/>
               </a:ext>
             </a:extLst>
           </p:cNvPr>
@@ -7508,8 +8354,8 @@
         </p:nvSpPr>
         <p:spPr>
           <a:xfrm>
-            <a:off x="4333874" y="2854326"/>
-            <a:ext cx="2733675" cy="738664"/>
+            <a:off x="4333873" y="1695101"/>
+            <a:ext cx="2733675" cy="553998"/>
           </a:xfrm>
           <a:prstGeom prst="rect">
             <a:avLst/>
@@ -7528,27 +8374,27 @@
           <a:lstStyle/>
           <a:p>
             <a:pPr algn="ctr"/>
-            <a:endParaRPr lang="en-US" sz="1400" dirty="0"/>
+            <a:endParaRPr lang="en-US" sz="800" dirty="0"/>
           </a:p>
           <a:p>
             <a:pPr algn="ctr"/>
             <a:r>
               <a:rPr lang="en-US" sz="1400" dirty="0"/>
-              <a:t>Find a Band</a:t>
-            </a:r>
-          </a:p>
-          <a:p>
-            <a:pPr algn="ctr"/>
-            <a:endParaRPr lang="en-US" sz="1400" dirty="0"/>
-          </a:p>
-        </p:txBody>
-      </p:sp>
-      <p:sp>
-        <p:nvSpPr>
-          <p:cNvPr id="6" name="TextBox 5">
-            <a:extLst>
-              <a:ext uri="{FF2B5EF4-FFF2-40B4-BE49-F238E27FC236}">
-                <a16:creationId xmlns:a16="http://schemas.microsoft.com/office/drawing/2014/main" id="{405EEAD3-293D-47AB-9EB0-CAE854FB1231}"/>
+              <a:t>Private Area</a:t>
+            </a:r>
+          </a:p>
+          <a:p>
+            <a:pPr algn="ctr"/>
+            <a:endParaRPr lang="en-US" sz="800" dirty="0"/>
+          </a:p>
+        </p:txBody>
+      </p:sp>
+      <p:sp>
+        <p:nvSpPr>
+          <p:cNvPr id="10" name="TextBox 9">
+            <a:extLst>
+              <a:ext uri="{FF2B5EF4-FFF2-40B4-BE49-F238E27FC236}">
+                <a16:creationId xmlns:a16="http://schemas.microsoft.com/office/drawing/2014/main" id="{1E618F17-2BC7-4608-A534-1993198A7C0B}"/>
               </a:ext>
             </a:extLst>
           </p:cNvPr>
@@ -7557,8 +8403,79 @@
         </p:nvSpPr>
         <p:spPr>
           <a:xfrm>
-            <a:off x="4333874" y="1750220"/>
-            <a:ext cx="2733675" cy="738664"/>
+            <a:off x="7410447" y="1579548"/>
+            <a:ext cx="3739906" cy="3539430"/>
+          </a:xfrm>
+          <a:prstGeom prst="rect">
+            <a:avLst/>
+          </a:prstGeom>
+          <a:noFill/>
+        </p:spPr>
+        <p:txBody>
+          <a:bodyPr wrap="square" rtlCol="0">
+            <a:spAutoFit/>
+          </a:bodyPr>
+          <a:lstStyle/>
+          <a:p>
+            <a:r>
+              <a:rPr lang="en-US" sz="4000" dirty="0"/>
+              <a:t>→  Slide 5</a:t>
+            </a:r>
+          </a:p>
+          <a:p>
+            <a:endParaRPr lang="en-US" sz="600" dirty="0"/>
+          </a:p>
+          <a:p>
+            <a:r>
+              <a:rPr lang="en-US" sz="4000" dirty="0"/>
+              <a:t>→  Slide 6</a:t>
+            </a:r>
+          </a:p>
+          <a:p>
+            <a:endParaRPr lang="en-US" sz="600" dirty="0"/>
+          </a:p>
+          <a:p>
+            <a:r>
+              <a:rPr lang="en-US" sz="4000" dirty="0"/>
+              <a:t>→  Slide 7</a:t>
+            </a:r>
+          </a:p>
+          <a:p>
+            <a:endParaRPr lang="en-US" sz="600" dirty="0"/>
+          </a:p>
+          <a:p>
+            <a:r>
+              <a:rPr lang="en-US" sz="4000" dirty="0"/>
+              <a:t>→  Slide 9</a:t>
+            </a:r>
+          </a:p>
+          <a:p>
+            <a:endParaRPr lang="en-US" sz="600" dirty="0"/>
+          </a:p>
+          <a:p>
+            <a:r>
+              <a:rPr lang="en-US" sz="4000" dirty="0"/>
+              <a:t>→  Slide 10</a:t>
+            </a:r>
+          </a:p>
+        </p:txBody>
+      </p:sp>
+      <p:sp>
+        <p:nvSpPr>
+          <p:cNvPr id="12" name="TextBox 11">
+            <a:extLst>
+              <a:ext uri="{FF2B5EF4-FFF2-40B4-BE49-F238E27FC236}">
+                <a16:creationId xmlns:a16="http://schemas.microsoft.com/office/drawing/2014/main" id="{9089E417-9CF7-4369-B2B8-D2717F6491DF}"/>
+              </a:ext>
+            </a:extLst>
+          </p:cNvPr>
+          <p:cNvSpPr txBox="1"/>
+          <p:nvPr/>
+        </p:nvSpPr>
+        <p:spPr>
+          <a:xfrm>
+            <a:off x="4333873" y="2395913"/>
+            <a:ext cx="2733675" cy="553998"/>
           </a:xfrm>
           <a:prstGeom prst="rect">
             <a:avLst/>
@@ -7577,27 +8494,27 @@
           <a:lstStyle/>
           <a:p>
             <a:pPr algn="ctr"/>
-            <a:endParaRPr lang="en-US" sz="1400" dirty="0"/>
+            <a:endParaRPr lang="en-US" sz="800" dirty="0"/>
           </a:p>
           <a:p>
             <a:pPr algn="ctr"/>
             <a:r>
               <a:rPr lang="en-US" sz="1400" dirty="0"/>
-              <a:t>Private Area</a:t>
-            </a:r>
-          </a:p>
-          <a:p>
-            <a:pPr algn="ctr"/>
-            <a:endParaRPr lang="en-US" sz="1400" dirty="0"/>
-          </a:p>
-        </p:txBody>
-      </p:sp>
-      <p:sp>
-        <p:nvSpPr>
-          <p:cNvPr id="7" name="TextBox 6">
-            <a:extLst>
-              <a:ext uri="{FF2B5EF4-FFF2-40B4-BE49-F238E27FC236}">
-                <a16:creationId xmlns:a16="http://schemas.microsoft.com/office/drawing/2014/main" id="{1D938D68-30BB-4E98-AF9A-43DB0B4EF53C}"/>
+              <a:t>Search</a:t>
+            </a:r>
+          </a:p>
+          <a:p>
+            <a:pPr algn="ctr"/>
+            <a:endParaRPr lang="en-US" sz="800" dirty="0"/>
+          </a:p>
+        </p:txBody>
+      </p:sp>
+      <p:sp>
+        <p:nvSpPr>
+          <p:cNvPr id="13" name="TextBox 12">
+            <a:extLst>
+              <a:ext uri="{FF2B5EF4-FFF2-40B4-BE49-F238E27FC236}">
+                <a16:creationId xmlns:a16="http://schemas.microsoft.com/office/drawing/2014/main" id="{508B1C87-B5B3-4790-AD6B-8FBA292ACE40}"/>
               </a:ext>
             </a:extLst>
           </p:cNvPr>
@@ -7606,8 +8523,8 @@
         </p:nvSpPr>
         <p:spPr>
           <a:xfrm>
-            <a:off x="4324349" y="3958432"/>
-            <a:ext cx="2733675" cy="738664"/>
+            <a:off x="4333872" y="4507733"/>
+            <a:ext cx="2733675" cy="553998"/>
           </a:xfrm>
           <a:prstGeom prst="rect">
             <a:avLst/>
@@ -7626,27 +8543,27 @@
           <a:lstStyle/>
           <a:p>
             <a:pPr algn="ctr"/>
-            <a:endParaRPr lang="en-US" sz="1400" dirty="0"/>
+            <a:endParaRPr lang="en-US" sz="800" dirty="0"/>
           </a:p>
           <a:p>
             <a:pPr algn="ctr"/>
             <a:r>
               <a:rPr lang="en-US" sz="1400" dirty="0"/>
-              <a:t>Find a Musician</a:t>
-            </a:r>
-          </a:p>
-          <a:p>
-            <a:pPr algn="ctr"/>
-            <a:endParaRPr lang="en-US" sz="1400" dirty="0"/>
-          </a:p>
-        </p:txBody>
-      </p:sp>
-      <p:sp>
-        <p:nvSpPr>
-          <p:cNvPr id="8" name="TextBox 7">
-            <a:extLst>
-              <a:ext uri="{FF2B5EF4-FFF2-40B4-BE49-F238E27FC236}">
-                <a16:creationId xmlns:a16="http://schemas.microsoft.com/office/drawing/2014/main" id="{68A37D14-C87B-4287-BB5C-8EFE6CBBC3F6}"/>
+              <a:t>All Posts</a:t>
+            </a:r>
+          </a:p>
+          <a:p>
+            <a:pPr algn="ctr"/>
+            <a:endParaRPr lang="en-US" sz="800" dirty="0"/>
+          </a:p>
+        </p:txBody>
+      </p:sp>
+      <p:sp>
+        <p:nvSpPr>
+          <p:cNvPr id="14" name="TextBox 13">
+            <a:extLst>
+              <a:ext uri="{FF2B5EF4-FFF2-40B4-BE49-F238E27FC236}">
+                <a16:creationId xmlns:a16="http://schemas.microsoft.com/office/drawing/2014/main" id="{EB6505FA-234E-4A70-8BDD-36B24F50354B}"/>
               </a:ext>
             </a:extLst>
           </p:cNvPr>
@@ -7655,8 +8572,8 @@
         </p:nvSpPr>
         <p:spPr>
           <a:xfrm>
-            <a:off x="4324349" y="5062538"/>
-            <a:ext cx="2733675" cy="738664"/>
+            <a:off x="4333872" y="3798887"/>
+            <a:ext cx="2733675" cy="553998"/>
           </a:xfrm>
           <a:prstGeom prst="rect">
             <a:avLst/>
@@ -7675,27 +8592,27 @@
           <a:lstStyle/>
           <a:p>
             <a:pPr algn="ctr"/>
-            <a:endParaRPr lang="en-US" sz="1400" dirty="0"/>
+            <a:endParaRPr lang="en-US" sz="800" dirty="0"/>
           </a:p>
           <a:p>
             <a:pPr algn="ctr"/>
             <a:r>
               <a:rPr lang="en-US" sz="1400" dirty="0"/>
-              <a:t>Publish Yourself</a:t>
-            </a:r>
-          </a:p>
-          <a:p>
-            <a:pPr algn="ctr"/>
-            <a:endParaRPr lang="en-US" sz="1400" dirty="0"/>
-          </a:p>
-        </p:txBody>
-      </p:sp>
-      <p:sp>
-        <p:nvSpPr>
-          <p:cNvPr id="10" name="TextBox 9">
-            <a:extLst>
-              <a:ext uri="{FF2B5EF4-FFF2-40B4-BE49-F238E27FC236}">
-                <a16:creationId xmlns:a16="http://schemas.microsoft.com/office/drawing/2014/main" id="{1E618F17-2BC7-4608-A534-1993198A7C0B}"/>
+              <a:t>Chats</a:t>
+            </a:r>
+          </a:p>
+          <a:p>
+            <a:pPr algn="ctr"/>
+            <a:endParaRPr lang="en-US" sz="800" dirty="0"/>
+          </a:p>
+        </p:txBody>
+      </p:sp>
+      <p:sp>
+        <p:nvSpPr>
+          <p:cNvPr id="15" name="TextBox 14">
+            <a:extLst>
+              <a:ext uri="{FF2B5EF4-FFF2-40B4-BE49-F238E27FC236}">
+                <a16:creationId xmlns:a16="http://schemas.microsoft.com/office/drawing/2014/main" id="{6A793AAE-C590-49A2-B4CE-BEEF0A943FD9}"/>
               </a:ext>
             </a:extLst>
           </p:cNvPr>
@@ -7704,13 +8621,18 @@
         </p:nvSpPr>
         <p:spPr>
           <a:xfrm>
-            <a:off x="7391399" y="1701145"/>
-            <a:ext cx="2419350" cy="4154984"/>
+            <a:off x="4333873" y="3100434"/>
+            <a:ext cx="2733675" cy="553998"/>
           </a:xfrm>
           <a:prstGeom prst="rect">
             <a:avLst/>
           </a:prstGeom>
           <a:noFill/>
+          <a:ln w="38100">
+            <a:solidFill>
+              <a:schemeClr val="tx1"/>
+            </a:solidFill>
+          </a:ln>
         </p:spPr>
         <p:txBody>
           <a:bodyPr wrap="square" rtlCol="0">
@@ -7718,37 +8640,19 @@
           </a:bodyPr>
           <a:lstStyle/>
           <a:p>
-            <a:r>
-              <a:rPr lang="en-US" sz="4000" dirty="0"/>
-              <a:t>→  Slide 4</a:t>
-            </a:r>
-          </a:p>
-          <a:p>
-            <a:endParaRPr lang="en-US" sz="3600" dirty="0"/>
-          </a:p>
-          <a:p>
-            <a:r>
-              <a:rPr lang="en-US" sz="4000" dirty="0"/>
-              <a:t>→  Slide 5</a:t>
-            </a:r>
-          </a:p>
-          <a:p>
-            <a:endParaRPr lang="en-US" sz="3600" dirty="0"/>
-          </a:p>
-          <a:p>
-            <a:r>
-              <a:rPr lang="en-US" sz="4000" dirty="0"/>
-              <a:t>→  Slide 6</a:t>
-            </a:r>
-          </a:p>
-          <a:p>
-            <a:endParaRPr lang="en-US" sz="3200" dirty="0"/>
-          </a:p>
-          <a:p>
-            <a:r>
-              <a:rPr lang="en-US" sz="4000" dirty="0"/>
-              <a:t>→  Slide 7</a:t>
-            </a:r>
+            <a:pPr algn="ctr"/>
+            <a:endParaRPr lang="en-US" sz="800" dirty="0"/>
+          </a:p>
+          <a:p>
+            <a:pPr algn="ctr"/>
+            <a:r>
+              <a:rPr lang="en-US" sz="1400" dirty="0"/>
+              <a:t>Publish Yourself</a:t>
+            </a:r>
+          </a:p>
+          <a:p>
+            <a:pPr algn="ctr"/>
+            <a:endParaRPr lang="en-US" sz="800" dirty="0"/>
           </a:p>
         </p:txBody>
       </p:sp>
@@ -10573,7 +11477,7 @@
           <p:cNvPr id="2" name="Title 1">
             <a:extLst>
               <a:ext uri="{FF2B5EF4-FFF2-40B4-BE49-F238E27FC236}">
-                <a16:creationId xmlns:a16="http://schemas.microsoft.com/office/drawing/2014/main" id="{B2BB5CC9-69BD-468F-B28D-41F4E6334CE4}"/>
+                <a16:creationId xmlns:a16="http://schemas.microsoft.com/office/drawing/2014/main" id="{898184F1-7FCE-45D6-9341-1F5570B63BDD}"/>
               </a:ext>
             </a:extLst>
           </p:cNvPr>
@@ -10584,13 +11488,18 @@
             <p:ph type="title"/>
           </p:nvPr>
         </p:nvSpPr>
-        <p:spPr/>
+        <p:spPr>
+          <a:xfrm>
+            <a:off x="838200" y="187565"/>
+            <a:ext cx="10515600" cy="1325563"/>
+          </a:xfrm>
+        </p:spPr>
         <p:txBody>
           <a:bodyPr/>
           <a:lstStyle/>
           <a:p>
             <a:r>
-              <a:rPr lang="en-US" b="1" i="1" u="sng" dirty="0">
+              <a:rPr lang="en-US" b="1" u="sng" dirty="0">
                 <a:effectLst>
                   <a:outerShdw blurRad="38100" dist="38100" dir="2700000" algn="tl">
                     <a:srgbClr val="000000">
@@ -10599,499 +11508,33 @@
                   </a:outerShdw>
                 </a:effectLst>
               </a:rPr>
-              <a:t>User Datasets</a:t>
-            </a:r>
-          </a:p>
-        </p:txBody>
-      </p:sp>
-      <p:graphicFrame>
-        <p:nvGraphicFramePr>
-          <p:cNvPr id="5" name="Table 5">
-            <a:extLst>
-              <a:ext uri="{FF2B5EF4-FFF2-40B4-BE49-F238E27FC236}">
-                <a16:creationId xmlns:a16="http://schemas.microsoft.com/office/drawing/2014/main" id="{B4883779-8EFB-49E8-A2E8-3297C12FD7C0}"/>
-              </a:ext>
-            </a:extLst>
-          </p:cNvPr>
-          <p:cNvGraphicFramePr>
-            <a:graphicFrameLocks noGrp="1"/>
-          </p:cNvGraphicFramePr>
-          <p:nvPr>
-            <p:ph idx="1"/>
-            <p:extLst>
-              <p:ext uri="{D42A27DB-BD31-4B8C-83A1-F6EECF244321}">
-                <p14:modId xmlns:p14="http://schemas.microsoft.com/office/powerpoint/2010/main" val="1876297956"/>
-              </p:ext>
-            </p:extLst>
-          </p:nvPr>
-        </p:nvGraphicFramePr>
-        <p:xfrm>
-          <a:off x="838200" y="1825625"/>
-          <a:ext cx="10515600" cy="4079872"/>
-        </p:xfrm>
-        <a:graphic>
-          <a:graphicData uri="http://schemas.openxmlformats.org/drawingml/2006/table">
-            <a:tbl>
-              <a:tblPr firstRow="1" bandRow="1">
-                <a:tableStyleId>{5C22544A-7EE6-4342-B048-85BDC9FD1C3A}</a:tableStyleId>
-              </a:tblPr>
-              <a:tblGrid>
-                <a:gridCol w="5257800">
-                  <a:extLst>
-                    <a:ext uri="{9D8B030D-6E8A-4147-A177-3AD203B41FA5}">
-                      <a16:colId xmlns:a16="http://schemas.microsoft.com/office/drawing/2014/main" val="999526759"/>
-                    </a:ext>
-                  </a:extLst>
-                </a:gridCol>
-                <a:gridCol w="5257800">
-                  <a:extLst>
-                    <a:ext uri="{9D8B030D-6E8A-4147-A177-3AD203B41FA5}">
-                      <a16:colId xmlns:a16="http://schemas.microsoft.com/office/drawing/2014/main" val="2621372417"/>
-                    </a:ext>
-                  </a:extLst>
-                </a:gridCol>
-              </a:tblGrid>
-              <a:tr h="509984">
-                <a:tc>
-                  <a:txBody>
-                    <a:bodyPr/>
-                    <a:lstStyle/>
-                    <a:p>
-                      <a:pPr algn="ctr"/>
-                      <a:r>
-                        <a:rPr lang="en-US" dirty="0"/>
-                        <a:t>Private</a:t>
-                      </a:r>
-                    </a:p>
-                  </a:txBody>
-                  <a:tcPr anchor="ctr"/>
-                </a:tc>
-                <a:tc>
-                  <a:txBody>
-                    <a:bodyPr/>
-                    <a:lstStyle/>
-                    <a:p>
-                      <a:pPr algn="ctr"/>
-                      <a:r>
-                        <a:rPr lang="en-US" dirty="0"/>
-                        <a:t>Public</a:t>
-                      </a:r>
-                    </a:p>
-                  </a:txBody>
-                  <a:tcPr anchor="ctr"/>
-                </a:tc>
-                <a:extLst>
-                  <a:ext uri="{0D108BD9-81ED-4DB2-BD59-A6C34878D82A}">
-                    <a16:rowId xmlns:a16="http://schemas.microsoft.com/office/drawing/2014/main" val="1022876577"/>
-                  </a:ext>
-                </a:extLst>
-              </a:tr>
-              <a:tr h="509984">
-                <a:tc>
-                  <a:txBody>
-                    <a:bodyPr/>
-                    <a:lstStyle/>
-                    <a:p>
-                      <a:pPr algn="ctr"/>
-                      <a:r>
-                        <a:rPr lang="en-US" dirty="0"/>
-                        <a:t>Username</a:t>
-                      </a:r>
-                      <a:r>
-                        <a:rPr lang="en-US" dirty="0">
-                          <a:solidFill>
-                            <a:srgbClr val="FF0000"/>
-                          </a:solidFill>
-                          <a:sym typeface="Wingdings" panose="05000000000000000000" pitchFamily="2" charset="2"/>
-                        </a:rPr>
-                        <a:t></a:t>
-                      </a:r>
-                      <a:endParaRPr lang="en-US" dirty="0"/>
-                    </a:p>
-                  </a:txBody>
-                  <a:tcPr anchor="ctr"/>
-                </a:tc>
-                <a:tc>
-                  <a:txBody>
-                    <a:bodyPr/>
-                    <a:lstStyle/>
-                    <a:p>
-                      <a:pPr algn="ctr"/>
-                      <a:r>
-                        <a:rPr lang="en-US" dirty="0"/>
-                        <a:t>Genre List</a:t>
-                      </a:r>
-                      <a:r>
-                        <a:rPr lang="en-US" dirty="0">
-                          <a:solidFill>
-                            <a:schemeClr val="accent1"/>
-                          </a:solidFill>
-                          <a:sym typeface="Wingdings" panose="05000000000000000000" pitchFamily="2" charset="2"/>
-                        </a:rPr>
-                        <a:t></a:t>
-                      </a:r>
-                      <a:endParaRPr lang="en-US" dirty="0"/>
-                    </a:p>
-                  </a:txBody>
-                  <a:tcPr anchor="ctr"/>
-                </a:tc>
-                <a:extLst>
-                  <a:ext uri="{0D108BD9-81ED-4DB2-BD59-A6C34878D82A}">
-                    <a16:rowId xmlns:a16="http://schemas.microsoft.com/office/drawing/2014/main" val="864622098"/>
-                  </a:ext>
-                </a:extLst>
-              </a:tr>
-              <a:tr h="509984">
-                <a:tc>
-                  <a:txBody>
-                    <a:bodyPr/>
-                    <a:lstStyle/>
-                    <a:p>
-                      <a:pPr algn="ctr"/>
-                      <a:r>
-                        <a:rPr lang="en-US" dirty="0"/>
-                        <a:t>Password</a:t>
-                      </a:r>
-                      <a:r>
-                        <a:rPr lang="en-US" dirty="0">
-                          <a:solidFill>
-                            <a:srgbClr val="FF0000"/>
-                          </a:solidFill>
-                          <a:sym typeface="Wingdings" panose="05000000000000000000" pitchFamily="2" charset="2"/>
-                        </a:rPr>
-                        <a:t></a:t>
-                      </a:r>
-                      <a:endParaRPr lang="en-US" dirty="0"/>
-                    </a:p>
-                  </a:txBody>
-                  <a:tcPr anchor="ctr"/>
-                </a:tc>
-                <a:tc>
-                  <a:txBody>
-                    <a:bodyPr/>
-                    <a:lstStyle/>
-                    <a:p>
-                      <a:pPr algn="ctr"/>
-                      <a:r>
-                        <a:rPr lang="en-US" dirty="0"/>
-                        <a:t>Bio</a:t>
-                      </a:r>
-                      <a:r>
-                        <a:rPr lang="en-US" dirty="0">
-                          <a:solidFill>
-                            <a:schemeClr val="accent1"/>
-                          </a:solidFill>
-                          <a:sym typeface="Wingdings" panose="05000000000000000000" pitchFamily="2" charset="2"/>
-                        </a:rPr>
-                        <a:t></a:t>
-                      </a:r>
-                      <a:endParaRPr lang="en-US" dirty="0"/>
-                    </a:p>
-                  </a:txBody>
-                  <a:tcPr anchor="ctr"/>
-                </a:tc>
-                <a:extLst>
-                  <a:ext uri="{0D108BD9-81ED-4DB2-BD59-A6C34878D82A}">
-                    <a16:rowId xmlns:a16="http://schemas.microsoft.com/office/drawing/2014/main" val="2003856590"/>
-                  </a:ext>
-                </a:extLst>
-              </a:tr>
-              <a:tr h="509984">
-                <a:tc>
-                  <a:txBody>
-                    <a:bodyPr/>
-                    <a:lstStyle/>
-                    <a:p>
-                      <a:pPr algn="ctr"/>
-                      <a:endParaRPr lang="en-US" dirty="0"/>
-                    </a:p>
-                  </a:txBody>
-                  <a:tcPr anchor="ctr"/>
-                </a:tc>
-                <a:tc>
-                  <a:txBody>
-                    <a:bodyPr/>
-                    <a:lstStyle/>
-                    <a:p>
-                      <a:pPr algn="ctr"/>
-                      <a:r>
-                        <a:rPr lang="en-US" dirty="0"/>
-                        <a:t>Link to ***</a:t>
-                      </a:r>
-                      <a:r>
-                        <a:rPr lang="en-US" dirty="0">
-                          <a:solidFill>
-                            <a:schemeClr val="accent1"/>
-                          </a:solidFill>
-                          <a:sym typeface="Wingdings" panose="05000000000000000000" pitchFamily="2" charset="2"/>
-                        </a:rPr>
-                        <a:t></a:t>
-                      </a:r>
-                      <a:endParaRPr lang="en-US" dirty="0"/>
-                    </a:p>
-                  </a:txBody>
-                  <a:tcPr anchor="ctr"/>
-                </a:tc>
-                <a:extLst>
-                  <a:ext uri="{0D108BD9-81ED-4DB2-BD59-A6C34878D82A}">
-                    <a16:rowId xmlns:a16="http://schemas.microsoft.com/office/drawing/2014/main" val="1447506110"/>
-                  </a:ext>
-                </a:extLst>
-              </a:tr>
-              <a:tr h="509984">
-                <a:tc>
-                  <a:txBody>
-                    <a:bodyPr/>
-                    <a:lstStyle/>
-                    <a:p>
-                      <a:pPr marL="0" marR="0" lvl="0" indent="0" algn="ctr" defTabSz="914400" rtl="0" eaLnBrk="1" fontAlgn="auto" latinLnBrk="0" hangingPunct="1">
-                        <a:lnSpc>
-                          <a:spcPct val="100000"/>
-                        </a:lnSpc>
-                        <a:spcBef>
-                          <a:spcPts val="0"/>
-                        </a:spcBef>
-                        <a:spcAft>
-                          <a:spcPts val="0"/>
-                        </a:spcAft>
-                        <a:buClrTx/>
-                        <a:buSzTx/>
-                        <a:buFontTx/>
-                        <a:buNone/>
-                        <a:tabLst/>
-                        <a:defRPr/>
-                      </a:pPr>
-                      <a:endParaRPr lang="en-US" dirty="0"/>
-                    </a:p>
-                  </a:txBody>
-                  <a:tcPr anchor="ctr"/>
-                </a:tc>
-                <a:tc>
-                  <a:txBody>
-                    <a:bodyPr/>
-                    <a:lstStyle/>
-                    <a:p>
-                      <a:pPr algn="ctr"/>
-                      <a:r>
-                        <a:rPr lang="en-US" dirty="0"/>
-                        <a:t>Instruments + details per one</a:t>
-                      </a:r>
-                      <a:r>
-                        <a:rPr lang="en-US" dirty="0">
-                          <a:solidFill>
-                            <a:srgbClr val="FF0000"/>
-                          </a:solidFill>
-                          <a:sym typeface="Wingdings" panose="05000000000000000000" pitchFamily="2" charset="2"/>
-                        </a:rPr>
-                        <a:t></a:t>
-                      </a:r>
-                      <a:endParaRPr lang="en-US" dirty="0"/>
-                    </a:p>
-                  </a:txBody>
-                  <a:tcPr anchor="ctr"/>
-                </a:tc>
-                <a:extLst>
-                  <a:ext uri="{0D108BD9-81ED-4DB2-BD59-A6C34878D82A}">
-                    <a16:rowId xmlns:a16="http://schemas.microsoft.com/office/drawing/2014/main" val="1286390632"/>
-                  </a:ext>
-                </a:extLst>
-              </a:tr>
-              <a:tr h="509984">
-                <a:tc>
-                  <a:txBody>
-                    <a:bodyPr/>
-                    <a:lstStyle/>
-                    <a:p>
-                      <a:pPr algn="ctr"/>
-                      <a:endParaRPr lang="en-US" dirty="0"/>
-                    </a:p>
-                  </a:txBody>
-                  <a:tcPr anchor="ctr"/>
-                </a:tc>
-                <a:tc>
-                  <a:txBody>
-                    <a:bodyPr/>
-                    <a:lstStyle/>
-                    <a:p>
-                      <a:pPr marL="0" marR="0" lvl="0" indent="0" algn="ctr" defTabSz="914400" rtl="0" eaLnBrk="1" fontAlgn="auto" latinLnBrk="0" hangingPunct="1">
-                        <a:lnSpc>
-                          <a:spcPct val="100000"/>
-                        </a:lnSpc>
-                        <a:spcBef>
-                          <a:spcPts val="0"/>
-                        </a:spcBef>
-                        <a:spcAft>
-                          <a:spcPts val="0"/>
-                        </a:spcAft>
-                        <a:buClrTx/>
-                        <a:buSzTx/>
-                        <a:buFontTx/>
-                        <a:buNone/>
-                        <a:tabLst/>
-                        <a:defRPr/>
-                      </a:pPr>
-                      <a:r>
-                        <a:rPr lang="en-US" dirty="0"/>
-                        <a:t>User </a:t>
-                      </a:r>
-                      <a:r>
-                        <a:rPr lang="en-US" sz="1800" kern="1200" dirty="0">
-                          <a:solidFill>
-                            <a:schemeClr val="dk1"/>
-                          </a:solidFill>
-                          <a:effectLst/>
-                          <a:latin typeface="+mn-lt"/>
-                          <a:ea typeface="+mn-ea"/>
-                          <a:cs typeface="+mn-cs"/>
-                        </a:rPr>
-                        <a:t>Location</a:t>
-                      </a:r>
-                      <a:r>
-                        <a:rPr lang="en-US" dirty="0">
-                          <a:solidFill>
-                            <a:srgbClr val="FF0000"/>
-                          </a:solidFill>
-                          <a:sym typeface="Wingdings" panose="05000000000000000000" pitchFamily="2" charset="2"/>
-                        </a:rPr>
-                        <a:t></a:t>
-                      </a:r>
-                      <a:endParaRPr lang="en-US" dirty="0"/>
-                    </a:p>
-                  </a:txBody>
-                  <a:tcPr anchor="ctr"/>
-                </a:tc>
-                <a:extLst>
-                  <a:ext uri="{0D108BD9-81ED-4DB2-BD59-A6C34878D82A}">
-                    <a16:rowId xmlns:a16="http://schemas.microsoft.com/office/drawing/2014/main" val="787995426"/>
-                  </a:ext>
-                </a:extLst>
-              </a:tr>
-              <a:tr h="509984">
-                <a:tc>
-                  <a:txBody>
-                    <a:bodyPr/>
-                    <a:lstStyle/>
-                    <a:p>
-                      <a:pPr algn="ctr"/>
-                      <a:endParaRPr lang="en-US" dirty="0"/>
-                    </a:p>
-                  </a:txBody>
-                  <a:tcPr anchor="ctr"/>
-                </a:tc>
-                <a:tc>
-                  <a:txBody>
-                    <a:bodyPr/>
-                    <a:lstStyle/>
-                    <a:p>
-                      <a:pPr marL="0" marR="0" lvl="0" indent="0" algn="ctr" defTabSz="914400" rtl="0" eaLnBrk="1" fontAlgn="auto" latinLnBrk="0" hangingPunct="1">
-                        <a:lnSpc>
-                          <a:spcPct val="100000"/>
-                        </a:lnSpc>
-                        <a:spcBef>
-                          <a:spcPts val="0"/>
-                        </a:spcBef>
-                        <a:spcAft>
-                          <a:spcPts val="0"/>
-                        </a:spcAft>
-                        <a:buClrTx/>
-                        <a:buSzTx/>
-                        <a:buFontTx/>
-                        <a:buNone/>
-                        <a:tabLst/>
-                        <a:defRPr/>
-                      </a:pPr>
-                      <a:r>
-                        <a:rPr lang="en-US"/>
-                        <a:t>Age</a:t>
-                      </a:r>
-                      <a:r>
-                        <a:rPr lang="en-US">
-                          <a:solidFill>
-                            <a:srgbClr val="FF0000"/>
-                          </a:solidFill>
-                          <a:sym typeface="Wingdings" panose="05000000000000000000" pitchFamily="2" charset="2"/>
-                        </a:rPr>
-                        <a:t></a:t>
-                      </a:r>
-                      <a:endParaRPr lang="en-US" dirty="0"/>
-                    </a:p>
-                  </a:txBody>
-                  <a:tcPr anchor="ctr"/>
-                </a:tc>
-                <a:extLst>
-                  <a:ext uri="{0D108BD9-81ED-4DB2-BD59-A6C34878D82A}">
-                    <a16:rowId xmlns:a16="http://schemas.microsoft.com/office/drawing/2014/main" val="3148044796"/>
-                  </a:ext>
-                </a:extLst>
-              </a:tr>
-              <a:tr h="509984">
-                <a:tc>
-                  <a:txBody>
-                    <a:bodyPr/>
-                    <a:lstStyle/>
-                    <a:p>
-                      <a:pPr algn="ctr"/>
-                      <a:endParaRPr lang="en-US" dirty="0"/>
-                    </a:p>
-                  </a:txBody>
-                  <a:tcPr anchor="ctr"/>
-                </a:tc>
-                <a:tc>
-                  <a:txBody>
-                    <a:bodyPr/>
-                    <a:lstStyle/>
-                    <a:p>
-                      <a:pPr marL="0" marR="0" lvl="0" indent="0" algn="ctr" defTabSz="914400" rtl="0" eaLnBrk="1" fontAlgn="auto" latinLnBrk="0" hangingPunct="1">
-                        <a:lnSpc>
-                          <a:spcPct val="100000"/>
-                        </a:lnSpc>
-                        <a:spcBef>
-                          <a:spcPts val="0"/>
-                        </a:spcBef>
-                        <a:spcAft>
-                          <a:spcPts val="0"/>
-                        </a:spcAft>
-                        <a:buClrTx/>
-                        <a:buSzTx/>
-                        <a:buFontTx/>
-                        <a:buNone/>
-                        <a:tabLst/>
-                        <a:defRPr/>
-                      </a:pPr>
-                      <a:r>
-                        <a:rPr lang="en-US" dirty="0"/>
-                        <a:t>Name</a:t>
-                      </a:r>
-                      <a:r>
-                        <a:rPr lang="en-US" dirty="0">
-                          <a:solidFill>
-                            <a:srgbClr val="FF0000"/>
-                          </a:solidFill>
-                          <a:sym typeface="Wingdings" panose="05000000000000000000" pitchFamily="2" charset="2"/>
-                        </a:rPr>
-                        <a:t></a:t>
-                      </a:r>
-                      <a:endParaRPr lang="en-US" dirty="0"/>
-                    </a:p>
-                  </a:txBody>
-                  <a:tcPr anchor="ctr"/>
-                </a:tc>
-                <a:extLst>
-                  <a:ext uri="{0D108BD9-81ED-4DB2-BD59-A6C34878D82A}">
-                    <a16:rowId xmlns:a16="http://schemas.microsoft.com/office/drawing/2014/main" val="2921019506"/>
-                  </a:ext>
-                </a:extLst>
-              </a:tr>
-            </a:tbl>
-          </a:graphicData>
-        </a:graphic>
-      </p:graphicFrame>
-      <p:sp>
-        <p:nvSpPr>
-          <p:cNvPr id="6" name="TextBox 5">
-            <a:extLst>
-              <a:ext uri="{FF2B5EF4-FFF2-40B4-BE49-F238E27FC236}">
-                <a16:creationId xmlns:a16="http://schemas.microsoft.com/office/drawing/2014/main" id="{C50DB1BC-E153-4AC7-AE20-770D0C9C0419}"/>
+              <a:t>Chat Area</a:t>
+            </a:r>
+            <a:r>
+              <a:rPr lang="en-US" dirty="0"/>
+              <a:t>					</a:t>
+            </a:r>
+            <a:r>
+              <a:rPr lang="en-US" sz="4000" b="1" u="sng" dirty="0">
+                <a:effectLst>
+                  <a:outerShdw blurRad="38100" dist="38100" dir="2700000" algn="tl">
+                    <a:srgbClr val="000000">
+                      <a:alpha val="43137"/>
+                    </a:srgbClr>
+                  </a:outerShdw>
+                </a:effectLst>
+              </a:rPr>
+              <a:t>Inside Of Each Chat</a:t>
+            </a:r>
+          </a:p>
+        </p:txBody>
+      </p:sp>
+      <p:sp>
+        <p:nvSpPr>
+          <p:cNvPr id="4" name="TextBox 3">
+            <a:extLst>
+              <a:ext uri="{FF2B5EF4-FFF2-40B4-BE49-F238E27FC236}">
+                <a16:creationId xmlns:a16="http://schemas.microsoft.com/office/drawing/2014/main" id="{59F6C74D-92C0-47BC-8CD7-3900E4C809D8}"/>
               </a:ext>
             </a:extLst>
           </p:cNvPr>
@@ -11100,8 +11543,8 @@
         </p:nvSpPr>
         <p:spPr>
           <a:xfrm>
-            <a:off x="9182100" y="704740"/>
-            <a:ext cx="2171700" cy="646331"/>
+            <a:off x="8096445" y="1411552"/>
+            <a:ext cx="3453414" cy="5362113"/>
           </a:xfrm>
           <a:prstGeom prst="rect">
             <a:avLst/>
@@ -11109,10 +11552,7 @@
           <a:noFill/>
           <a:ln w="38100">
             <a:solidFill>
-              <a:schemeClr val="tx1">
-                <a:lumMod val="50000"/>
-                <a:lumOff val="50000"/>
-              </a:schemeClr>
+              <a:schemeClr val="tx1"/>
             </a:solidFill>
           </a:ln>
         </p:spPr>
@@ -11122,56 +11562,864 @@
           </a:bodyPr>
           <a:lstStyle/>
           <a:p>
+            <a:endParaRPr lang="en-US" dirty="0"/>
+          </a:p>
+        </p:txBody>
+      </p:sp>
+      <p:sp>
+        <p:nvSpPr>
+          <p:cNvPr id="5" name="Rectangle 4">
+            <a:extLst>
+              <a:ext uri="{FF2B5EF4-FFF2-40B4-BE49-F238E27FC236}">
+                <a16:creationId xmlns:a16="http://schemas.microsoft.com/office/drawing/2014/main" id="{48034934-DCE1-4B47-AAED-D6E943722F05}"/>
+              </a:ext>
+            </a:extLst>
+          </p:cNvPr>
+          <p:cNvSpPr/>
+          <p:nvPr/>
+        </p:nvSpPr>
+        <p:spPr>
+          <a:xfrm>
+            <a:off x="8319959" y="1921140"/>
+            <a:ext cx="2990850" cy="3464188"/>
+          </a:xfrm>
+          <a:prstGeom prst="rect">
+            <a:avLst/>
+          </a:prstGeom>
+          <a:noFill/>
+          <a:ln w="50800"/>
+        </p:spPr>
+        <p:style>
+          <a:lnRef idx="2">
+            <a:schemeClr val="accent1">
+              <a:shade val="50000"/>
+            </a:schemeClr>
+          </a:lnRef>
+          <a:fillRef idx="1">
+            <a:schemeClr val="accent1"/>
+          </a:fillRef>
+          <a:effectRef idx="0">
+            <a:schemeClr val="accent1"/>
+          </a:effectRef>
+          <a:fontRef idx="minor">
+            <a:schemeClr val="lt1"/>
+          </a:fontRef>
+        </p:style>
+        <p:txBody>
+          <a:bodyPr rtlCol="0" anchor="ctr"/>
+          <a:lstStyle/>
+          <a:p>
+            <a:r>
+              <a:rPr lang="en-US" dirty="0" err="1">
+                <a:solidFill>
+                  <a:schemeClr val="tx1"/>
+                </a:solidFill>
+              </a:rPr>
+              <a:t>Sgfdgsdgd</a:t>
+            </a:r>
+            <a:endParaRPr lang="en-US" dirty="0">
+              <a:solidFill>
+                <a:schemeClr val="tx1"/>
+              </a:solidFill>
+            </a:endParaRPr>
+          </a:p>
+          <a:p>
+            <a:endParaRPr lang="en-US" dirty="0">
+              <a:solidFill>
+                <a:schemeClr val="tx1"/>
+              </a:solidFill>
+            </a:endParaRPr>
+          </a:p>
+          <a:p>
+            <a:pPr algn="r"/>
+            <a:r>
+              <a:rPr lang="en-US" dirty="0" err="1">
+                <a:solidFill>
+                  <a:schemeClr val="tx1"/>
+                </a:solidFill>
+              </a:rPr>
+              <a:t>Sdfgsdfgdsgds</a:t>
+            </a:r>
+            <a:endParaRPr lang="en-US" dirty="0">
+              <a:solidFill>
+                <a:schemeClr val="tx1"/>
+              </a:solidFill>
+            </a:endParaRPr>
+          </a:p>
+          <a:p>
+            <a:endParaRPr lang="en-US" dirty="0">
+              <a:solidFill>
+                <a:schemeClr val="tx1"/>
+              </a:solidFill>
+            </a:endParaRPr>
+          </a:p>
+          <a:p>
+            <a:r>
+              <a:rPr lang="en-US" dirty="0" err="1">
+                <a:solidFill>
+                  <a:schemeClr val="tx1"/>
+                </a:solidFill>
+              </a:rPr>
+              <a:t>Uytiyuiyi</a:t>
+            </a:r>
+            <a:endParaRPr lang="en-US" dirty="0">
+              <a:solidFill>
+                <a:schemeClr val="tx1"/>
+              </a:solidFill>
+            </a:endParaRPr>
+          </a:p>
+          <a:p>
+            <a:endParaRPr lang="en-US" dirty="0">
+              <a:solidFill>
+                <a:schemeClr val="tx1"/>
+              </a:solidFill>
+            </a:endParaRPr>
+          </a:p>
+          <a:p>
+            <a:pPr algn="r"/>
+            <a:r>
+              <a:rPr lang="en-US" dirty="0" err="1">
+                <a:solidFill>
+                  <a:schemeClr val="tx1"/>
+                </a:solidFill>
+              </a:rPr>
+              <a:t>Nmhjk,jh,hj</a:t>
+            </a:r>
             <a:r>
               <a:rPr lang="en-US" dirty="0">
                 <a:solidFill>
-                  <a:srgbClr val="FF0000"/>
+                  <a:schemeClr val="tx1"/>
                 </a:solidFill>
-                <a:sym typeface="Wingdings" panose="05000000000000000000" pitchFamily="2" charset="2"/>
               </a:rPr>
-              <a:t> </a:t>
-            </a:r>
+              <a:t>,</a:t>
+            </a:r>
+          </a:p>
+          <a:p>
+            <a:pPr algn="r"/>
+            <a:endParaRPr lang="en-US" dirty="0">
+              <a:solidFill>
+                <a:schemeClr val="tx1"/>
+              </a:solidFill>
+            </a:endParaRPr>
+          </a:p>
+          <a:p>
+            <a:pPr algn="r"/>
+            <a:r>
+              <a:rPr lang="en-US" dirty="0" err="1">
+                <a:solidFill>
+                  <a:schemeClr val="tx1"/>
+                </a:solidFill>
+              </a:rPr>
+              <a:t>Fgdfghdfgdhd</a:t>
+            </a:r>
+            <a:endParaRPr lang="en-US" dirty="0">
+              <a:solidFill>
+                <a:schemeClr val="tx1"/>
+              </a:solidFill>
+            </a:endParaRPr>
+          </a:p>
+          <a:p>
+            <a:pPr algn="r"/>
+            <a:endParaRPr lang="en-US" dirty="0">
+              <a:solidFill>
+                <a:schemeClr val="tx1"/>
+              </a:solidFill>
+            </a:endParaRPr>
+          </a:p>
+          <a:p>
+            <a:r>
+              <a:rPr lang="en-US" dirty="0">
+                <a:solidFill>
+                  <a:schemeClr val="tx1"/>
+                </a:solidFill>
+              </a:rPr>
+              <a:t>fdgdfg76686786</a:t>
+            </a:r>
+          </a:p>
+        </p:txBody>
+      </p:sp>
+      <p:sp>
+        <p:nvSpPr>
+          <p:cNvPr id="6" name="Rectangle 5">
+            <a:extLst>
+              <a:ext uri="{FF2B5EF4-FFF2-40B4-BE49-F238E27FC236}">
+                <a16:creationId xmlns:a16="http://schemas.microsoft.com/office/drawing/2014/main" id="{9B3988EB-0059-490C-A480-33E333D07784}"/>
+              </a:ext>
+            </a:extLst>
+          </p:cNvPr>
+          <p:cNvSpPr/>
+          <p:nvPr/>
+        </p:nvSpPr>
+        <p:spPr>
+          <a:xfrm>
+            <a:off x="8319959" y="5606252"/>
+            <a:ext cx="2990850" cy="966525"/>
+          </a:xfrm>
+          <a:prstGeom prst="rect">
+            <a:avLst/>
+          </a:prstGeom>
+          <a:noFill/>
+          <a:ln w="50800"/>
+        </p:spPr>
+        <p:style>
+          <a:lnRef idx="2">
+            <a:schemeClr val="accent1">
+              <a:shade val="50000"/>
+            </a:schemeClr>
+          </a:lnRef>
+          <a:fillRef idx="1">
+            <a:schemeClr val="accent1"/>
+          </a:fillRef>
+          <a:effectRef idx="0">
+            <a:schemeClr val="accent1"/>
+          </a:effectRef>
+          <a:fontRef idx="minor">
+            <a:schemeClr val="lt1"/>
+          </a:fontRef>
+        </p:style>
+        <p:txBody>
+          <a:bodyPr rtlCol="0" anchor="ctr"/>
+          <a:lstStyle/>
+          <a:p>
+            <a:pPr algn="ctr"/>
+            <a:endParaRPr lang="en-US"/>
+          </a:p>
+        </p:txBody>
+      </p:sp>
+      <p:sp>
+        <p:nvSpPr>
+          <p:cNvPr id="7" name="Rectangle 6">
+            <a:extLst>
+              <a:ext uri="{FF2B5EF4-FFF2-40B4-BE49-F238E27FC236}">
+                <a16:creationId xmlns:a16="http://schemas.microsoft.com/office/drawing/2014/main" id="{47C7D643-C2C5-4455-B9E7-B7BF3C184110}"/>
+              </a:ext>
+            </a:extLst>
+          </p:cNvPr>
+          <p:cNvSpPr/>
+          <p:nvPr/>
+        </p:nvSpPr>
+        <p:spPr>
+          <a:xfrm>
+            <a:off x="8453309" y="5756802"/>
+            <a:ext cx="2085975" cy="657225"/>
+          </a:xfrm>
+          <a:prstGeom prst="rect">
+            <a:avLst/>
+          </a:prstGeom>
+          <a:solidFill>
+            <a:schemeClr val="accent2"/>
+          </a:solidFill>
+          <a:ln w="38100">
+            <a:solidFill>
+              <a:srgbClr val="FF0000"/>
+            </a:solidFill>
+          </a:ln>
+        </p:spPr>
+        <p:style>
+          <a:lnRef idx="2">
+            <a:schemeClr val="accent1">
+              <a:shade val="50000"/>
+            </a:schemeClr>
+          </a:lnRef>
+          <a:fillRef idx="1">
+            <a:schemeClr val="accent1"/>
+          </a:fillRef>
+          <a:effectRef idx="0">
+            <a:schemeClr val="accent1"/>
+          </a:effectRef>
+          <a:fontRef idx="minor">
+            <a:schemeClr val="lt1"/>
+          </a:fontRef>
+        </p:style>
+        <p:txBody>
+          <a:bodyPr rtlCol="0" anchor="ctr"/>
+          <a:lstStyle/>
+          <a:p>
+            <a:pPr algn="ctr"/>
+            <a:endParaRPr lang="en-US"/>
+          </a:p>
+        </p:txBody>
+      </p:sp>
+      <p:sp>
+        <p:nvSpPr>
+          <p:cNvPr id="8" name="Oval 7">
+            <a:extLst>
+              <a:ext uri="{FF2B5EF4-FFF2-40B4-BE49-F238E27FC236}">
+                <a16:creationId xmlns:a16="http://schemas.microsoft.com/office/drawing/2014/main" id="{3753DEEE-01BC-49CE-B3C3-E9D673A207AB}"/>
+              </a:ext>
+            </a:extLst>
+          </p:cNvPr>
+          <p:cNvSpPr/>
+          <p:nvPr/>
+        </p:nvSpPr>
+        <p:spPr>
+          <a:xfrm>
+            <a:off x="10605959" y="5756803"/>
+            <a:ext cx="628649" cy="595050"/>
+          </a:xfrm>
+          <a:prstGeom prst="ellipse">
+            <a:avLst/>
+          </a:prstGeom>
+          <a:solidFill>
+            <a:schemeClr val="bg2">
+              <a:lumMod val="90000"/>
+            </a:schemeClr>
+          </a:solidFill>
+          <a:ln w="25400">
+            <a:solidFill>
+              <a:schemeClr val="tx1"/>
+            </a:solidFill>
+          </a:ln>
+        </p:spPr>
+        <p:style>
+          <a:lnRef idx="2">
+            <a:schemeClr val="accent1">
+              <a:shade val="50000"/>
+            </a:schemeClr>
+          </a:lnRef>
+          <a:fillRef idx="1">
+            <a:schemeClr val="accent1"/>
+          </a:fillRef>
+          <a:effectRef idx="0">
+            <a:schemeClr val="accent1"/>
+          </a:effectRef>
+          <a:fontRef idx="minor">
+            <a:schemeClr val="lt1"/>
+          </a:fontRef>
+        </p:style>
+        <p:txBody>
+          <a:bodyPr rtlCol="0" anchor="ctr"/>
+          <a:lstStyle/>
+          <a:p>
+            <a:pPr algn="ctr"/>
+            <a:r>
+              <a:rPr lang="en-US" sz="2800" b="1" dirty="0">
+                <a:solidFill>
+                  <a:schemeClr val="tx1"/>
+                </a:solidFill>
+                <a:effectLst>
+                  <a:outerShdw blurRad="38100" dist="38100" dir="2700000" algn="tl">
+                    <a:srgbClr val="000000">
+                      <a:alpha val="43137"/>
+                    </a:srgbClr>
+                  </a:outerShdw>
+                </a:effectLst>
+                <a:sym typeface="Wingdings 3" panose="05040102010807070707" pitchFamily="18" charset="2"/>
+              </a:rPr>
+              <a:t></a:t>
+            </a:r>
+            <a:endParaRPr lang="en-US" sz="2800" b="1" dirty="0">
+              <a:solidFill>
+                <a:schemeClr val="tx1"/>
+              </a:solidFill>
+              <a:effectLst>
+                <a:outerShdw blurRad="38100" dist="38100" dir="2700000" algn="tl">
+                  <a:srgbClr val="000000">
+                    <a:alpha val="43137"/>
+                  </a:srgbClr>
+                </a:outerShdw>
+              </a:effectLst>
+            </a:endParaRPr>
+          </a:p>
+        </p:txBody>
+      </p:sp>
+      <p:sp>
+        <p:nvSpPr>
+          <p:cNvPr id="10" name="TextBox 9">
+            <a:extLst>
+              <a:ext uri="{FF2B5EF4-FFF2-40B4-BE49-F238E27FC236}">
+                <a16:creationId xmlns:a16="http://schemas.microsoft.com/office/drawing/2014/main" id="{9B953738-B017-4C5C-A889-5B55729076DD}"/>
+              </a:ext>
+            </a:extLst>
+          </p:cNvPr>
+          <p:cNvSpPr txBox="1"/>
+          <p:nvPr/>
+        </p:nvSpPr>
+        <p:spPr>
+          <a:xfrm>
+            <a:off x="9676660" y="1411552"/>
+            <a:ext cx="1557948" cy="369332"/>
+          </a:xfrm>
+          <a:prstGeom prst="rect">
+            <a:avLst/>
+          </a:prstGeom>
+          <a:noFill/>
+        </p:spPr>
+        <p:txBody>
+          <a:bodyPr wrap="square" rtlCol="0">
+            <a:spAutoFit/>
+          </a:bodyPr>
+          <a:lstStyle/>
+          <a:p>
+            <a:r>
+              <a:rPr lang="en-US" dirty="0"/>
+              <a:t>Name</a:t>
+            </a:r>
+          </a:p>
+        </p:txBody>
+      </p:sp>
+      <p:sp>
+        <p:nvSpPr>
+          <p:cNvPr id="9" name="TextBox 8">
+            <a:extLst>
+              <a:ext uri="{FF2B5EF4-FFF2-40B4-BE49-F238E27FC236}">
+                <a16:creationId xmlns:a16="http://schemas.microsoft.com/office/drawing/2014/main" id="{D1CAC025-D715-4D84-9D96-669F8210B094}"/>
+              </a:ext>
+            </a:extLst>
+          </p:cNvPr>
+          <p:cNvSpPr txBox="1"/>
+          <p:nvPr/>
+        </p:nvSpPr>
+        <p:spPr>
+          <a:xfrm>
+            <a:off x="1652716" y="1411551"/>
+            <a:ext cx="3453414" cy="5362113"/>
+          </a:xfrm>
+          <a:prstGeom prst="rect">
+            <a:avLst/>
+          </a:prstGeom>
+          <a:noFill/>
+          <a:ln w="38100">
+            <a:solidFill>
+              <a:schemeClr val="tx1"/>
+            </a:solidFill>
+          </a:ln>
+        </p:spPr>
+        <p:txBody>
+          <a:bodyPr wrap="square" rtlCol="0">
+            <a:spAutoFit/>
+          </a:bodyPr>
+          <a:lstStyle/>
+          <a:p>
+            <a:endParaRPr lang="en-US" dirty="0"/>
+          </a:p>
+        </p:txBody>
+      </p:sp>
+      <p:sp>
+        <p:nvSpPr>
+          <p:cNvPr id="12" name="TextBox 11">
+            <a:extLst>
+              <a:ext uri="{FF2B5EF4-FFF2-40B4-BE49-F238E27FC236}">
+                <a16:creationId xmlns:a16="http://schemas.microsoft.com/office/drawing/2014/main" id="{BB00A5EF-99C4-49A3-9884-B1A14AE3D9B9}"/>
+              </a:ext>
+            </a:extLst>
+          </p:cNvPr>
+          <p:cNvSpPr txBox="1"/>
+          <p:nvPr/>
+        </p:nvSpPr>
+        <p:spPr>
+          <a:xfrm>
+            <a:off x="2994868" y="1532468"/>
+            <a:ext cx="769110" cy="369332"/>
+          </a:xfrm>
+          <a:prstGeom prst="rect">
+            <a:avLst/>
+          </a:prstGeom>
+          <a:noFill/>
+        </p:spPr>
+        <p:txBody>
+          <a:bodyPr wrap="square" rtlCol="0">
+            <a:spAutoFit/>
+          </a:bodyPr>
+          <a:lstStyle/>
+          <a:p>
+            <a:r>
+              <a:rPr lang="en-US" dirty="0"/>
+              <a:t>Chats</a:t>
+            </a:r>
+          </a:p>
+        </p:txBody>
+      </p:sp>
+      <p:sp>
+        <p:nvSpPr>
+          <p:cNvPr id="14" name="Rectangle 13">
+            <a:extLst>
+              <a:ext uri="{FF2B5EF4-FFF2-40B4-BE49-F238E27FC236}">
+                <a16:creationId xmlns:a16="http://schemas.microsoft.com/office/drawing/2014/main" id="{B17CF6B4-6923-4BC3-9C7E-71C27F184E2E}"/>
+              </a:ext>
+            </a:extLst>
+          </p:cNvPr>
+          <p:cNvSpPr/>
+          <p:nvPr/>
+        </p:nvSpPr>
+        <p:spPr>
+          <a:xfrm>
+            <a:off x="1799196" y="1921140"/>
+            <a:ext cx="3160451" cy="307155"/>
+          </a:xfrm>
+          <a:prstGeom prst="rect">
+            <a:avLst/>
+          </a:prstGeom>
+        </p:spPr>
+        <p:style>
+          <a:lnRef idx="2">
+            <a:schemeClr val="accent1">
+              <a:shade val="50000"/>
+            </a:schemeClr>
+          </a:lnRef>
+          <a:fillRef idx="1">
+            <a:schemeClr val="accent1"/>
+          </a:fillRef>
+          <a:effectRef idx="0">
+            <a:schemeClr val="accent1"/>
+          </a:effectRef>
+          <a:fontRef idx="minor">
+            <a:schemeClr val="lt1"/>
+          </a:fontRef>
+        </p:style>
+        <p:txBody>
+          <a:bodyPr rtlCol="0" anchor="ctr"/>
+          <a:lstStyle/>
+          <a:p>
+            <a:pPr algn="ctr"/>
+            <a:r>
+              <a:rPr lang="en-US" dirty="0"/>
+              <a:t>Chat 1</a:t>
+            </a:r>
+          </a:p>
+        </p:txBody>
+      </p:sp>
+      <p:sp>
+        <p:nvSpPr>
+          <p:cNvPr id="15" name="Rectangle 14">
+            <a:extLst>
+              <a:ext uri="{FF2B5EF4-FFF2-40B4-BE49-F238E27FC236}">
+                <a16:creationId xmlns:a16="http://schemas.microsoft.com/office/drawing/2014/main" id="{C68E3105-7F2E-4BFC-AE12-6C9669B66919}"/>
+              </a:ext>
+            </a:extLst>
+          </p:cNvPr>
+          <p:cNvSpPr/>
+          <p:nvPr/>
+        </p:nvSpPr>
+        <p:spPr>
+          <a:xfrm>
+            <a:off x="1799197" y="2337413"/>
+            <a:ext cx="3160451" cy="307155"/>
+          </a:xfrm>
+          <a:prstGeom prst="rect">
+            <a:avLst/>
+          </a:prstGeom>
+        </p:spPr>
+        <p:style>
+          <a:lnRef idx="2">
+            <a:schemeClr val="accent1">
+              <a:shade val="50000"/>
+            </a:schemeClr>
+          </a:lnRef>
+          <a:fillRef idx="1">
+            <a:schemeClr val="accent1"/>
+          </a:fillRef>
+          <a:effectRef idx="0">
+            <a:schemeClr val="accent1"/>
+          </a:effectRef>
+          <a:fontRef idx="minor">
+            <a:schemeClr val="lt1"/>
+          </a:fontRef>
+        </p:style>
+        <p:txBody>
+          <a:bodyPr rtlCol="0" anchor="ctr"/>
+          <a:lstStyle/>
+          <a:p>
+            <a:pPr algn="ctr"/>
+            <a:r>
+              <a:rPr lang="en-US" dirty="0"/>
+              <a:t>Chat 2</a:t>
+            </a:r>
+          </a:p>
+        </p:txBody>
+      </p:sp>
+      <p:sp>
+        <p:nvSpPr>
+          <p:cNvPr id="16" name="Rectangle 15">
+            <a:extLst>
+              <a:ext uri="{FF2B5EF4-FFF2-40B4-BE49-F238E27FC236}">
+                <a16:creationId xmlns:a16="http://schemas.microsoft.com/office/drawing/2014/main" id="{5A9B16F5-E536-46DD-88A0-7C9D3884D40E}"/>
+              </a:ext>
+            </a:extLst>
+          </p:cNvPr>
+          <p:cNvSpPr/>
+          <p:nvPr/>
+        </p:nvSpPr>
+        <p:spPr>
+          <a:xfrm>
+            <a:off x="1799197" y="4079897"/>
+            <a:ext cx="3160451" cy="307155"/>
+          </a:xfrm>
+          <a:prstGeom prst="rect">
+            <a:avLst/>
+          </a:prstGeom>
+        </p:spPr>
+        <p:style>
+          <a:lnRef idx="2">
+            <a:schemeClr val="accent1">
+              <a:shade val="50000"/>
+            </a:schemeClr>
+          </a:lnRef>
+          <a:fillRef idx="1">
+            <a:schemeClr val="accent1"/>
+          </a:fillRef>
+          <a:effectRef idx="0">
+            <a:schemeClr val="accent1"/>
+          </a:effectRef>
+          <a:fontRef idx="minor">
+            <a:schemeClr val="lt1"/>
+          </a:fontRef>
+        </p:style>
+        <p:txBody>
+          <a:bodyPr rtlCol="0" anchor="ctr"/>
+          <a:lstStyle/>
+          <a:p>
+            <a:pPr algn="ctr"/>
+            <a:r>
+              <a:rPr lang="en-US" dirty="0"/>
+              <a:t>Chat n</a:t>
+            </a:r>
+          </a:p>
+        </p:txBody>
+      </p:sp>
+      <p:sp>
+        <p:nvSpPr>
+          <p:cNvPr id="17" name="TextBox 16">
+            <a:extLst>
+              <a:ext uri="{FF2B5EF4-FFF2-40B4-BE49-F238E27FC236}">
+                <a16:creationId xmlns:a16="http://schemas.microsoft.com/office/drawing/2014/main" id="{0EC36D66-D38F-4E1C-A23F-F3CEB4F1E3E7}"/>
+              </a:ext>
+            </a:extLst>
+          </p:cNvPr>
+          <p:cNvSpPr txBox="1"/>
+          <p:nvPr/>
+        </p:nvSpPr>
+        <p:spPr>
+          <a:xfrm>
+            <a:off x="3259837" y="2515821"/>
+            <a:ext cx="239168" cy="1569660"/>
+          </a:xfrm>
+          <a:prstGeom prst="rect">
+            <a:avLst/>
+          </a:prstGeom>
+          <a:noFill/>
+        </p:spPr>
+        <p:txBody>
+          <a:bodyPr wrap="none" rtlCol="0">
+            <a:spAutoFit/>
+          </a:bodyPr>
+          <a:lstStyle/>
+          <a:p>
+            <a:r>
+              <a:rPr lang="en-US" sz="1600" b="1" dirty="0">
+                <a:effectLst>
+                  <a:outerShdw blurRad="38100" dist="38100" dir="2700000" algn="tl">
+                    <a:srgbClr val="000000">
+                      <a:alpha val="43137"/>
+                    </a:srgbClr>
+                  </a:outerShdw>
+                </a:effectLst>
+              </a:rPr>
+              <a:t>.</a:t>
+            </a:r>
+          </a:p>
+          <a:p>
+            <a:r>
+              <a:rPr lang="en-US" sz="1600" b="1" dirty="0">
+                <a:effectLst>
+                  <a:outerShdw blurRad="38100" dist="38100" dir="2700000" algn="tl">
+                    <a:srgbClr val="000000">
+                      <a:alpha val="43137"/>
+                    </a:srgbClr>
+                  </a:outerShdw>
+                </a:effectLst>
+              </a:rPr>
+              <a:t>.</a:t>
+            </a:r>
+          </a:p>
+          <a:p>
+            <a:r>
+              <a:rPr lang="en-US" sz="1600" b="1" dirty="0">
+                <a:effectLst>
+                  <a:outerShdw blurRad="38100" dist="38100" dir="2700000" algn="tl">
+                    <a:srgbClr val="000000">
+                      <a:alpha val="43137"/>
+                    </a:srgbClr>
+                  </a:outerShdw>
+                </a:effectLst>
+              </a:rPr>
+              <a:t>.</a:t>
+            </a:r>
+          </a:p>
+          <a:p>
+            <a:r>
+              <a:rPr lang="en-US" sz="1600" b="1" dirty="0">
+                <a:effectLst>
+                  <a:outerShdw blurRad="38100" dist="38100" dir="2700000" algn="tl">
+                    <a:srgbClr val="000000">
+                      <a:alpha val="43137"/>
+                    </a:srgbClr>
+                  </a:outerShdw>
+                </a:effectLst>
+              </a:rPr>
+              <a:t>.</a:t>
+            </a:r>
+          </a:p>
+          <a:p>
+            <a:r>
+              <a:rPr lang="en-US" sz="1600" b="1" dirty="0">
+                <a:effectLst>
+                  <a:outerShdw blurRad="38100" dist="38100" dir="2700000" algn="tl">
+                    <a:srgbClr val="000000">
+                      <a:alpha val="43137"/>
+                    </a:srgbClr>
+                  </a:outerShdw>
+                </a:effectLst>
+              </a:rPr>
+              <a:t>.</a:t>
+            </a:r>
+          </a:p>
+          <a:p>
+            <a:r>
+              <a:rPr lang="en-US" sz="1600" b="1" dirty="0">
+                <a:effectLst>
+                  <a:outerShdw blurRad="38100" dist="38100" dir="2700000" algn="tl">
+                    <a:srgbClr val="000000">
+                      <a:alpha val="43137"/>
+                    </a:srgbClr>
+                  </a:outerShdw>
+                </a:effectLst>
+              </a:rPr>
+              <a:t>.</a:t>
+            </a:r>
+          </a:p>
+        </p:txBody>
+      </p:sp>
+      <p:sp>
+        <p:nvSpPr>
+          <p:cNvPr id="20" name="Oval 19">
+            <a:extLst>
+              <a:ext uri="{FF2B5EF4-FFF2-40B4-BE49-F238E27FC236}">
+                <a16:creationId xmlns:a16="http://schemas.microsoft.com/office/drawing/2014/main" id="{F48B2229-6635-4BA9-A933-0446FCE78681}"/>
+              </a:ext>
+            </a:extLst>
+          </p:cNvPr>
+          <p:cNvSpPr/>
+          <p:nvPr/>
+        </p:nvSpPr>
+        <p:spPr>
+          <a:xfrm>
+            <a:off x="2811558" y="6191888"/>
+            <a:ext cx="896557" cy="444278"/>
+          </a:xfrm>
+          <a:prstGeom prst="ellipse">
+            <a:avLst/>
+          </a:prstGeom>
+          <a:solidFill>
+            <a:schemeClr val="bg1">
+              <a:lumMod val="95000"/>
+            </a:schemeClr>
+          </a:solidFill>
+          <a:ln w="38100">
+            <a:solidFill>
+              <a:srgbClr val="7030A0"/>
+            </a:solidFill>
+          </a:ln>
+        </p:spPr>
+        <p:style>
+          <a:lnRef idx="2">
+            <a:schemeClr val="accent1">
+              <a:shade val="50000"/>
+            </a:schemeClr>
+          </a:lnRef>
+          <a:fillRef idx="1">
+            <a:schemeClr val="accent1"/>
+          </a:fillRef>
+          <a:effectRef idx="0">
+            <a:schemeClr val="accent1"/>
+          </a:effectRef>
+          <a:fontRef idx="minor">
+            <a:schemeClr val="lt1"/>
+          </a:fontRef>
+        </p:style>
+        <p:txBody>
+          <a:bodyPr rtlCol="0" anchor="ctr"/>
+          <a:lstStyle/>
+          <a:p>
+            <a:pPr algn="ctr"/>
             <a:r>
               <a:rPr lang="en-US" sz="1400" dirty="0">
                 <a:solidFill>
-                  <a:srgbClr val="FF0000"/>
+                  <a:schemeClr val="tx1"/>
                 </a:solidFill>
-                <a:sym typeface="Wingdings" panose="05000000000000000000" pitchFamily="2" charset="2"/>
               </a:rPr>
-              <a:t>Mandatory</a:t>
-            </a:r>
-          </a:p>
-          <a:p>
-            <a:r>
-              <a:rPr lang="en-US" dirty="0">
-                <a:solidFill>
-                  <a:schemeClr val="accent1"/>
-                </a:solidFill>
-                <a:sym typeface="Wingdings" panose="05000000000000000000" pitchFamily="2" charset="2"/>
-              </a:rPr>
-              <a:t> </a:t>
-            </a:r>
+              <a:t>Back</a:t>
+            </a:r>
+          </a:p>
+        </p:txBody>
+      </p:sp>
+      <p:sp>
+        <p:nvSpPr>
+          <p:cNvPr id="22" name="Oval 21">
+            <a:extLst>
+              <a:ext uri="{FF2B5EF4-FFF2-40B4-BE49-F238E27FC236}">
+                <a16:creationId xmlns:a16="http://schemas.microsoft.com/office/drawing/2014/main" id="{B35AAAFF-9AE3-4A94-ACDC-93A2957D32D9}"/>
+              </a:ext>
+            </a:extLst>
+          </p:cNvPr>
+          <p:cNvSpPr/>
+          <p:nvPr/>
+        </p:nvSpPr>
+        <p:spPr>
+          <a:xfrm>
+            <a:off x="8302203" y="1479012"/>
+            <a:ext cx="753020" cy="369332"/>
+          </a:xfrm>
+          <a:prstGeom prst="ellipse">
+            <a:avLst/>
+          </a:prstGeom>
+          <a:solidFill>
+            <a:schemeClr val="bg1">
+              <a:lumMod val="95000"/>
+            </a:schemeClr>
+          </a:solidFill>
+          <a:ln w="38100">
+            <a:solidFill>
+              <a:srgbClr val="7030A0"/>
+            </a:solidFill>
+          </a:ln>
+        </p:spPr>
+        <p:style>
+          <a:lnRef idx="2">
+            <a:schemeClr val="accent1">
+              <a:shade val="50000"/>
+            </a:schemeClr>
+          </a:lnRef>
+          <a:fillRef idx="1">
+            <a:schemeClr val="accent1"/>
+          </a:fillRef>
+          <a:effectRef idx="0">
+            <a:schemeClr val="accent1"/>
+          </a:effectRef>
+          <a:fontRef idx="minor">
+            <a:schemeClr val="lt1"/>
+          </a:fontRef>
+        </p:style>
+        <p:txBody>
+          <a:bodyPr rtlCol="0" anchor="ctr"/>
+          <a:lstStyle/>
+          <a:p>
+            <a:pPr algn="ctr"/>
             <a:r>
               <a:rPr lang="en-US" sz="1400" dirty="0">
                 <a:solidFill>
-                  <a:schemeClr val="accent1"/>
+                  <a:schemeClr val="tx1"/>
                 </a:solidFill>
-                <a:sym typeface="Wingdings" panose="05000000000000000000" pitchFamily="2" charset="2"/>
               </a:rPr>
-              <a:t>Optional</a:t>
-            </a:r>
-            <a:endParaRPr lang="en-US" sz="1400" dirty="0">
-              <a:solidFill>
-                <a:schemeClr val="accent1"/>
-              </a:solidFill>
-            </a:endParaRPr>
+              <a:t>Back</a:t>
+            </a:r>
           </a:p>
         </p:txBody>
       </p:sp>
     </p:spTree>
     <p:extLst>
       <p:ext uri="{BB962C8B-B14F-4D97-AF65-F5344CB8AC3E}">
-        <p14:creationId xmlns:p14="http://schemas.microsoft.com/office/powerpoint/2010/main" val="2205242116"/>
+        <p14:creationId xmlns:p14="http://schemas.microsoft.com/office/powerpoint/2010/main" val="1919413370"/>
       </p:ext>
     </p:extLst>
   </p:cSld>

</xml_diff>